<commit_message>
Add data linkage slide
</commit_message>
<xml_diff>
--- a/Python/python_gis.pptx
+++ b/Python/python_gis.pptx
@@ -5,7 +5,7 @@
     <p:sldMasterId id="2147483672" r:id="rId1"/>
   </p:sldMasterIdLst>
   <p:notesMasterIdLst>
-    <p:notesMasterId r:id="rId8"/>
+    <p:notesMasterId r:id="rId9"/>
   </p:notesMasterIdLst>
   <p:sldIdLst>
     <p:sldId id="256" r:id="rId2"/>
@@ -13,7 +13,8 @@
     <p:sldId id="266" r:id="rId4"/>
     <p:sldId id="267" r:id="rId5"/>
     <p:sldId id="268" r:id="rId6"/>
-    <p:sldId id="265" r:id="rId7"/>
+    <p:sldId id="269" r:id="rId7"/>
+    <p:sldId id="265" r:id="rId8"/>
   </p:sldIdLst>
   <p:sldSz cx="9144000" cy="6858000" type="screen4x3"/>
   <p:notesSz cx="6858000" cy="9144000"/>
@@ -7309,7 +7310,7 @@
           <a:p>
             <a:r>
               <a:rPr lang="en-US" dirty="0" smtClean="0"/>
-              <a:t>Further reading</a:t>
+              <a:t>Data linkage issue</a:t>
             </a:r>
             <a:endParaRPr lang="en-US" dirty="0"/>
           </a:p>
@@ -7317,7 +7318,7 @@
       </p:sp>
       <p:sp>
         <p:nvSpPr>
-          <p:cNvPr id="3" name="Content Placeholder 2"/>
+          <p:cNvPr id="4" name="Content Placeholder 3"/>
           <p:cNvSpPr>
             <a:spLocks noGrp="1"/>
           </p:cNvSpPr>
@@ -7332,89 +7333,51 @@
           <a:p>
             <a:r>
               <a:rPr lang="en-US" dirty="0" smtClean="0"/>
-              <a:t>Fiona manual</a:t>
-            </a:r>
-            <a:r>
-              <a:rPr lang="en-US" dirty="0"/>
-              <a:t/>
-            </a:r>
-            <a:br>
-              <a:rPr lang="en-US" dirty="0"/>
-            </a:br>
-            <a:r>
-              <a:rPr lang="en-US" sz="2000" dirty="0">
-                <a:hlinkClick r:id="rId2"/>
-              </a:rPr>
-              <a:t>http://</a:t>
-            </a:r>
-            <a:r>
-              <a:rPr lang="en-US" sz="2000" dirty="0" smtClean="0">
-                <a:hlinkClick r:id="rId2"/>
-              </a:rPr>
-              <a:t>toblerity.org/fiona/index.html</a:t>
-            </a:r>
-            <a:endParaRPr lang="en-US" sz="2000" dirty="0" smtClean="0"/>
-          </a:p>
-          <a:p>
-            <a:r>
-              <a:rPr lang="en-US" dirty="0"/>
-              <a:t>Folium manual</a:t>
-            </a:r>
-            <a:br>
-              <a:rPr lang="en-US" dirty="0"/>
-            </a:br>
-            <a:r>
-              <a:rPr lang="en-US" sz="2000" dirty="0">
-                <a:hlinkClick r:id="rId3"/>
-              </a:rPr>
-              <a:t>http://python-visualization.github.io/folium/docs-master</a:t>
-            </a:r>
-            <a:r>
-              <a:rPr lang="en-US" sz="2000" dirty="0" smtClean="0">
-                <a:hlinkClick r:id="rId3"/>
-              </a:rPr>
-              <a:t>/</a:t>
-            </a:r>
-            <a:r>
-              <a:rPr lang="en-US" sz="2000" dirty="0" smtClean="0"/>
-              <a:t> </a:t>
+              <a:t>In World Happiness Index: </a:t>
+            </a:r>
+            <a:r>
+              <a:rPr lang="en-US" dirty="0" smtClean="0">
+                <a:solidFill>
+                  <a:srgbClr val="C00000"/>
+                </a:solidFill>
+              </a:rPr>
+              <a:t>United States</a:t>
+            </a:r>
+          </a:p>
+          <a:p>
+            <a:r>
+              <a:rPr lang="en-US" dirty="0" smtClean="0"/>
+              <a:t>In </a:t>
+            </a:r>
+            <a:r>
+              <a:rPr lang="en-US" dirty="0" err="1" smtClean="0"/>
+              <a:t>GeoJSON</a:t>
+            </a:r>
+            <a:r>
+              <a:rPr lang="en-US" dirty="0" smtClean="0"/>
+              <a:t> file: </a:t>
+            </a:r>
+            <a:r>
+              <a:rPr lang="en-US" dirty="0" smtClean="0">
+                <a:solidFill>
+                  <a:srgbClr val="00B050"/>
+                </a:solidFill>
+              </a:rPr>
+              <a:t>United States of America</a:t>
+            </a:r>
+          </a:p>
+          <a:p>
+            <a:r>
+              <a:rPr lang="en-US" dirty="0" smtClean="0"/>
+              <a:t>Fix: change names, e.g.,</a:t>
             </a:r>
             <a:endParaRPr lang="en-US" dirty="0"/>
           </a:p>
-          <a:p>
-            <a:r>
-              <a:rPr lang="en-US" dirty="0" smtClean="0"/>
-              <a:t>Shapely manual</a:t>
-            </a:r>
-            <a:r>
-              <a:rPr lang="en-US" dirty="0" smtClean="0"/>
-              <a:t/>
-            </a:r>
-            <a:br>
-              <a:rPr lang="en-US" dirty="0" smtClean="0"/>
-            </a:br>
-            <a:r>
-              <a:rPr lang="en-US" sz="2000" dirty="0">
-                <a:hlinkClick r:id="rId4"/>
-              </a:rPr>
-              <a:t>https://shapely.readthedocs.io/en/latest</a:t>
-            </a:r>
-            <a:r>
-              <a:rPr lang="en-US" sz="2000" dirty="0" smtClean="0">
-                <a:hlinkClick r:id="rId4"/>
-              </a:rPr>
-              <a:t>/</a:t>
-            </a:r>
-            <a:endParaRPr lang="en-US" sz="2000" dirty="0" smtClean="0"/>
-          </a:p>
-          <a:p>
-            <a:endParaRPr lang="en-US" dirty="0" smtClean="0"/>
-          </a:p>
-        </p:txBody>
-      </p:sp>
-      <p:sp>
-        <p:nvSpPr>
-          <p:cNvPr id="4" name="Slide Number Placeholder 3"/>
+        </p:txBody>
+      </p:sp>
+      <p:sp>
+        <p:nvSpPr>
+          <p:cNvPr id="3" name="Slide Number Placeholder 2"/>
           <p:cNvSpPr>
             <a:spLocks noGrp="1"/>
           </p:cNvSpPr>
@@ -7437,6 +7400,519 @@
               </a:rPr>
               <a:pPr/>
               <a:t>6</a:t>
+            </a:fld>
+            <a:endParaRPr lang="nl-BE">
+              <a:solidFill>
+                <a:prstClr val="black">
+                  <a:tint val="75000"/>
+                </a:prstClr>
+              </a:solidFill>
+            </a:endParaRPr>
+          </a:p>
+        </p:txBody>
+      </p:sp>
+      <p:sp>
+        <p:nvSpPr>
+          <p:cNvPr id="5" name="TextBox 4"/>
+          <p:cNvSpPr txBox="1"/>
+          <p:nvPr/>
+        </p:nvSpPr>
+        <p:spPr>
+          <a:xfrm>
+            <a:off x="304800" y="3453774"/>
+            <a:ext cx="8711381" cy="369332"/>
+          </a:xfrm>
+          <a:prstGeom prst="rect">
+            <a:avLst/>
+          </a:prstGeom>
+          <a:solidFill>
+            <a:schemeClr val="accent4">
+              <a:lumMod val="40000"/>
+              <a:lumOff val="60000"/>
+            </a:schemeClr>
+          </a:solidFill>
+        </p:spPr>
+        <p:txBody>
+          <a:bodyPr wrap="square" rtlCol="0">
+            <a:spAutoFit/>
+          </a:bodyPr>
+          <a:lstStyle/>
+          <a:p>
+            <a:r>
+              <a:rPr lang="en-US" dirty="0">
+                <a:latin typeface="Courier New" pitchFamily="49" charset="0"/>
+                <a:cs typeface="Courier New" pitchFamily="49" charset="0"/>
+              </a:rPr>
+              <a:t>happiness_data.at[12, 'Country'] = 'United States of America'</a:t>
+            </a:r>
+            <a:endParaRPr lang="en-US" dirty="0" smtClean="0">
+              <a:latin typeface="Courier New" pitchFamily="49" charset="0"/>
+              <a:cs typeface="Courier New" pitchFamily="49" charset="0"/>
+            </a:endParaRPr>
+          </a:p>
+        </p:txBody>
+      </p:sp>
+      <p:pic>
+        <p:nvPicPr>
+          <p:cNvPr id="6" name="Picture 5"/>
+          <p:cNvPicPr>
+            <a:picLocks noChangeAspect="1"/>
+          </p:cNvPicPr>
+          <p:nvPr/>
+        </p:nvPicPr>
+        <p:blipFill>
+          <a:blip r:embed="rId2">
+            <a:extLst>
+              <a:ext uri="{28A0092B-C50C-407E-A947-70E740481C1C}">
+                <a14:useLocalDpi xmlns:a14="http://schemas.microsoft.com/office/drawing/2010/main" val="0"/>
+              </a:ext>
+            </a:extLst>
+          </a:blip>
+          <a:stretch>
+            <a:fillRect/>
+          </a:stretch>
+        </p:blipFill>
+        <p:spPr>
+          <a:xfrm>
+            <a:off x="1612490" y="3990596"/>
+            <a:ext cx="4404852" cy="2640217"/>
+          </a:xfrm>
+          <a:prstGeom prst="rect">
+            <a:avLst/>
+          </a:prstGeom>
+        </p:spPr>
+      </p:pic>
+    </p:spTree>
+    <p:extLst>
+      <p:ext uri="{BB962C8B-B14F-4D97-AF65-F5344CB8AC3E}">
+        <p14:creationId xmlns:p14="http://schemas.microsoft.com/office/powerpoint/2010/main" val="1737312593"/>
+      </p:ext>
+    </p:extLst>
+  </p:cSld>
+  <p:clrMapOvr>
+    <a:masterClrMapping/>
+  </p:clrMapOvr>
+  <p:timing>
+    <p:tnLst>
+      <p:par>
+        <p:cTn id="1" dur="indefinite" restart="never" nodeType="tmRoot">
+          <p:childTnLst>
+            <p:seq concurrent="1" nextAc="seek">
+              <p:cTn id="2" dur="indefinite" nodeType="mainSeq">
+                <p:childTnLst>
+                  <p:par>
+                    <p:cTn id="3" fill="hold">
+                      <p:stCondLst>
+                        <p:cond delay="indefinite"/>
+                        <p:cond evt="onBegin" delay="0">
+                          <p:tn val="2"/>
+                        </p:cond>
+                      </p:stCondLst>
+                      <p:childTnLst>
+                        <p:par>
+                          <p:cTn id="4" fill="hold">
+                            <p:stCondLst>
+                              <p:cond delay="0"/>
+                            </p:stCondLst>
+                            <p:childTnLst>
+                              <p:par>
+                                <p:cTn id="5" presetID="1" presetClass="entr" presetSubtype="0" fill="hold" grpId="0" nodeType="withEffect">
+                                  <p:stCondLst>
+                                    <p:cond delay="0"/>
+                                  </p:stCondLst>
+                                  <p:childTnLst>
+                                    <p:set>
+                                      <p:cBhvr>
+                                        <p:cTn id="6" dur="1" fill="hold">
+                                          <p:stCondLst>
+                                            <p:cond delay="0"/>
+                                          </p:stCondLst>
+                                        </p:cTn>
+                                        <p:tgtEl>
+                                          <p:spTgt spid="4">
+                                            <p:txEl>
+                                              <p:pRg st="0" end="0"/>
+                                            </p:txEl>
+                                          </p:spTgt>
+                                        </p:tgtEl>
+                                        <p:attrNameLst>
+                                          <p:attrName>style.visibility</p:attrName>
+                                        </p:attrNameLst>
+                                      </p:cBhvr>
+                                      <p:to>
+                                        <p:strVal val="visible"/>
+                                      </p:to>
+                                    </p:set>
+                                  </p:childTnLst>
+                                </p:cTn>
+                              </p:par>
+                            </p:childTnLst>
+                          </p:cTn>
+                        </p:par>
+                      </p:childTnLst>
+                    </p:cTn>
+                  </p:par>
+                  <p:par>
+                    <p:cTn id="7" fill="hold">
+                      <p:stCondLst>
+                        <p:cond delay="indefinite"/>
+                      </p:stCondLst>
+                      <p:childTnLst>
+                        <p:par>
+                          <p:cTn id="8" fill="hold">
+                            <p:stCondLst>
+                              <p:cond delay="0"/>
+                            </p:stCondLst>
+                            <p:childTnLst>
+                              <p:par>
+                                <p:cTn id="9" presetID="1" presetClass="entr" presetSubtype="0" fill="hold" grpId="0" nodeType="clickEffect">
+                                  <p:stCondLst>
+                                    <p:cond delay="0"/>
+                                  </p:stCondLst>
+                                  <p:childTnLst>
+                                    <p:set>
+                                      <p:cBhvr>
+                                        <p:cTn id="10" dur="1" fill="hold">
+                                          <p:stCondLst>
+                                            <p:cond delay="0"/>
+                                          </p:stCondLst>
+                                        </p:cTn>
+                                        <p:tgtEl>
+                                          <p:spTgt spid="4">
+                                            <p:txEl>
+                                              <p:pRg st="1" end="1"/>
+                                            </p:txEl>
+                                          </p:spTgt>
+                                        </p:tgtEl>
+                                        <p:attrNameLst>
+                                          <p:attrName>style.visibility</p:attrName>
+                                        </p:attrNameLst>
+                                      </p:cBhvr>
+                                      <p:to>
+                                        <p:strVal val="visible"/>
+                                      </p:to>
+                                    </p:set>
+                                  </p:childTnLst>
+                                </p:cTn>
+                              </p:par>
+                            </p:childTnLst>
+                          </p:cTn>
+                        </p:par>
+                      </p:childTnLst>
+                    </p:cTn>
+                  </p:par>
+                  <p:par>
+                    <p:cTn id="11" fill="hold">
+                      <p:stCondLst>
+                        <p:cond delay="indefinite"/>
+                      </p:stCondLst>
+                      <p:childTnLst>
+                        <p:par>
+                          <p:cTn id="12" fill="hold">
+                            <p:stCondLst>
+                              <p:cond delay="0"/>
+                            </p:stCondLst>
+                            <p:childTnLst>
+                              <p:par>
+                                <p:cTn id="13" presetID="1" presetClass="entr" presetSubtype="0" fill="hold" grpId="0" nodeType="clickEffect">
+                                  <p:stCondLst>
+                                    <p:cond delay="0"/>
+                                  </p:stCondLst>
+                                  <p:childTnLst>
+                                    <p:set>
+                                      <p:cBhvr>
+                                        <p:cTn id="14" dur="1" fill="hold">
+                                          <p:stCondLst>
+                                            <p:cond delay="0"/>
+                                          </p:stCondLst>
+                                        </p:cTn>
+                                        <p:tgtEl>
+                                          <p:spTgt spid="4">
+                                            <p:txEl>
+                                              <p:pRg st="2" end="2"/>
+                                            </p:txEl>
+                                          </p:spTgt>
+                                        </p:tgtEl>
+                                        <p:attrNameLst>
+                                          <p:attrName>style.visibility</p:attrName>
+                                        </p:attrNameLst>
+                                      </p:cBhvr>
+                                      <p:to>
+                                        <p:strVal val="visible"/>
+                                      </p:to>
+                                    </p:set>
+                                  </p:childTnLst>
+                                </p:cTn>
+                              </p:par>
+                              <p:par>
+                                <p:cTn id="15" presetID="1" presetClass="entr" presetSubtype="0" fill="hold" grpId="0" nodeType="withEffect">
+                                  <p:stCondLst>
+                                    <p:cond delay="0"/>
+                                  </p:stCondLst>
+                                  <p:childTnLst>
+                                    <p:set>
+                                      <p:cBhvr>
+                                        <p:cTn id="16" dur="1" fill="hold">
+                                          <p:stCondLst>
+                                            <p:cond delay="0"/>
+                                          </p:stCondLst>
+                                        </p:cTn>
+                                        <p:tgtEl>
+                                          <p:spTgt spid="5"/>
+                                        </p:tgtEl>
+                                        <p:attrNameLst>
+                                          <p:attrName>style.visibility</p:attrName>
+                                        </p:attrNameLst>
+                                      </p:cBhvr>
+                                      <p:to>
+                                        <p:strVal val="visible"/>
+                                      </p:to>
+                                    </p:set>
+                                  </p:childTnLst>
+                                </p:cTn>
+                              </p:par>
+                            </p:childTnLst>
+                          </p:cTn>
+                        </p:par>
+                      </p:childTnLst>
+                    </p:cTn>
+                  </p:par>
+                  <p:par>
+                    <p:cTn id="17" fill="hold">
+                      <p:stCondLst>
+                        <p:cond delay="indefinite"/>
+                      </p:stCondLst>
+                      <p:childTnLst>
+                        <p:par>
+                          <p:cTn id="18" fill="hold">
+                            <p:stCondLst>
+                              <p:cond delay="0"/>
+                            </p:stCondLst>
+                            <p:childTnLst>
+                              <p:par>
+                                <p:cTn id="19" presetID="1" presetClass="entr" presetSubtype="0" fill="hold" nodeType="clickEffect">
+                                  <p:stCondLst>
+                                    <p:cond delay="0"/>
+                                  </p:stCondLst>
+                                  <p:childTnLst>
+                                    <p:set>
+                                      <p:cBhvr>
+                                        <p:cTn id="20" dur="1" fill="hold">
+                                          <p:stCondLst>
+                                            <p:cond delay="0"/>
+                                          </p:stCondLst>
+                                        </p:cTn>
+                                        <p:tgtEl>
+                                          <p:spTgt spid="6"/>
+                                        </p:tgtEl>
+                                        <p:attrNameLst>
+                                          <p:attrName>style.visibility</p:attrName>
+                                        </p:attrNameLst>
+                                      </p:cBhvr>
+                                      <p:to>
+                                        <p:strVal val="visible"/>
+                                      </p:to>
+                                    </p:set>
+                                  </p:childTnLst>
+                                </p:cTn>
+                              </p:par>
+                            </p:childTnLst>
+                          </p:cTn>
+                        </p:par>
+                      </p:childTnLst>
+                    </p:cTn>
+                  </p:par>
+                </p:childTnLst>
+              </p:cTn>
+              <p:prevCondLst>
+                <p:cond evt="onPrev" delay="0">
+                  <p:tgtEl>
+                    <p:sldTgt/>
+                  </p:tgtEl>
+                </p:cond>
+              </p:prevCondLst>
+              <p:nextCondLst>
+                <p:cond evt="onNext" delay="0">
+                  <p:tgtEl>
+                    <p:sldTgt/>
+                  </p:tgtEl>
+                </p:cond>
+              </p:nextCondLst>
+            </p:seq>
+          </p:childTnLst>
+        </p:cTn>
+      </p:par>
+    </p:tnLst>
+    <p:bldLst>
+      <p:bldP spid="4" grpId="0" uiExpand="1" build="p"/>
+      <p:bldP spid="5" grpId="0" animBg="1"/>
+    </p:bldLst>
+  </p:timing>
+</p:sld>
+</file>
+
+<file path=ppt/slides/slide7.xml><?xml version="1.0" encoding="utf-8"?>
+<p:sld xmlns:a="http://schemas.openxmlformats.org/drawingml/2006/main" xmlns:r="http://schemas.openxmlformats.org/officeDocument/2006/relationships" xmlns:p="http://schemas.openxmlformats.org/presentationml/2006/main">
+  <p:cSld>
+    <p:spTree>
+      <p:nvGrpSpPr>
+        <p:cNvPr id="1" name=""/>
+        <p:cNvGrpSpPr/>
+        <p:nvPr/>
+      </p:nvGrpSpPr>
+      <p:grpSpPr>
+        <a:xfrm>
+          <a:off x="0" y="0"/>
+          <a:ext cx="0" cy="0"/>
+          <a:chOff x="0" y="0"/>
+          <a:chExt cx="0" cy="0"/>
+        </a:xfrm>
+      </p:grpSpPr>
+      <p:sp>
+        <p:nvSpPr>
+          <p:cNvPr id="2" name="Title 1"/>
+          <p:cNvSpPr>
+            <a:spLocks noGrp="1"/>
+          </p:cNvSpPr>
+          <p:nvPr>
+            <p:ph type="title"/>
+          </p:nvPr>
+        </p:nvSpPr>
+        <p:spPr/>
+        <p:txBody>
+          <a:bodyPr/>
+          <a:lstStyle/>
+          <a:p>
+            <a:r>
+              <a:rPr lang="en-US" dirty="0" smtClean="0"/>
+              <a:t>Further reading</a:t>
+            </a:r>
+            <a:endParaRPr lang="en-US" dirty="0"/>
+          </a:p>
+        </p:txBody>
+      </p:sp>
+      <p:sp>
+        <p:nvSpPr>
+          <p:cNvPr id="3" name="Content Placeholder 2"/>
+          <p:cNvSpPr>
+            <a:spLocks noGrp="1"/>
+          </p:cNvSpPr>
+          <p:nvPr>
+            <p:ph idx="1"/>
+          </p:nvPr>
+        </p:nvSpPr>
+        <p:spPr/>
+        <p:txBody>
+          <a:bodyPr/>
+          <a:lstStyle/>
+          <a:p>
+            <a:r>
+              <a:rPr lang="en-US" dirty="0" smtClean="0"/>
+              <a:t>Fiona manual</a:t>
+            </a:r>
+            <a:r>
+              <a:rPr lang="en-US" dirty="0"/>
+              <a:t/>
+            </a:r>
+            <a:br>
+              <a:rPr lang="en-US" dirty="0"/>
+            </a:br>
+            <a:r>
+              <a:rPr lang="en-US" sz="2000" dirty="0">
+                <a:hlinkClick r:id="rId2"/>
+              </a:rPr>
+              <a:t>http://</a:t>
+            </a:r>
+            <a:r>
+              <a:rPr lang="en-US" sz="2000" dirty="0" smtClean="0">
+                <a:hlinkClick r:id="rId2"/>
+              </a:rPr>
+              <a:t>toblerity.org/fiona/index.html</a:t>
+            </a:r>
+            <a:endParaRPr lang="en-US" sz="2000" dirty="0" smtClean="0"/>
+          </a:p>
+          <a:p>
+            <a:r>
+              <a:rPr lang="en-US" dirty="0"/>
+              <a:t>Folium manual</a:t>
+            </a:r>
+            <a:br>
+              <a:rPr lang="en-US" dirty="0"/>
+            </a:br>
+            <a:r>
+              <a:rPr lang="en-US" sz="2000" dirty="0">
+                <a:hlinkClick r:id="rId3"/>
+              </a:rPr>
+              <a:t>http://python-visualization.github.io/folium/docs-master</a:t>
+            </a:r>
+            <a:r>
+              <a:rPr lang="en-US" sz="2000" dirty="0" smtClean="0">
+                <a:hlinkClick r:id="rId3"/>
+              </a:rPr>
+              <a:t>/</a:t>
+            </a:r>
+            <a:r>
+              <a:rPr lang="en-US" sz="2000" dirty="0" smtClean="0"/>
+              <a:t> </a:t>
+            </a:r>
+            <a:endParaRPr lang="en-US" dirty="0"/>
+          </a:p>
+          <a:p>
+            <a:r>
+              <a:rPr lang="en-US" dirty="0" smtClean="0"/>
+              <a:t>Shapely manual</a:t>
+            </a:r>
+            <a:r>
+              <a:rPr lang="en-US" dirty="0" smtClean="0"/>
+              <a:t/>
+            </a:r>
+            <a:br>
+              <a:rPr lang="en-US" dirty="0" smtClean="0"/>
+            </a:br>
+            <a:r>
+              <a:rPr lang="en-US" sz="2000" dirty="0">
+                <a:hlinkClick r:id="rId4"/>
+              </a:rPr>
+              <a:t>https://shapely.readthedocs.io/en/latest</a:t>
+            </a:r>
+            <a:r>
+              <a:rPr lang="en-US" sz="2000" dirty="0" smtClean="0">
+                <a:hlinkClick r:id="rId4"/>
+              </a:rPr>
+              <a:t>/</a:t>
+            </a:r>
+            <a:endParaRPr lang="en-US" sz="2000" dirty="0" smtClean="0"/>
+          </a:p>
+          <a:p>
+            <a:endParaRPr lang="en-US" dirty="0" smtClean="0"/>
+          </a:p>
+        </p:txBody>
+      </p:sp>
+      <p:sp>
+        <p:nvSpPr>
+          <p:cNvPr id="4" name="Slide Number Placeholder 3"/>
+          <p:cNvSpPr>
+            <a:spLocks noGrp="1"/>
+          </p:cNvSpPr>
+          <p:nvPr>
+            <p:ph type="sldNum" sz="quarter" idx="12"/>
+          </p:nvPr>
+        </p:nvSpPr>
+        <p:spPr/>
+        <p:txBody>
+          <a:bodyPr/>
+          <a:lstStyle/>
+          <a:p>
+            <a:fld id="{5A209D72-2E9D-49B0-8977-41DCCC66C0BB}" type="slidenum">
+              <a:rPr lang="nl-BE" smtClean="0">
+                <a:solidFill>
+                  <a:prstClr val="black">
+                    <a:tint val="75000"/>
+                  </a:prstClr>
+                </a:solidFill>
+              </a:rPr>
+              <a:pPr/>
+              <a:t>7</a:t>
             </a:fld>
             <a:endParaRPr lang="nl-BE">
               <a:solidFill>

</xml_diff>

<commit_message>
Add slide on Shapely objects
</commit_message>
<xml_diff>
--- a/Python/python_gis.pptx
+++ b/Python/python_gis.pptx
@@ -5,7 +5,7 @@
     <p:sldMasterId id="2147483672" r:id="rId1"/>
   </p:sldMasterIdLst>
   <p:notesMasterIdLst>
-    <p:notesMasterId r:id="rId9"/>
+    <p:notesMasterId r:id="rId11"/>
   </p:notesMasterIdLst>
   <p:sldIdLst>
     <p:sldId id="256" r:id="rId2"/>
@@ -14,7 +14,9 @@
     <p:sldId id="267" r:id="rId5"/>
     <p:sldId id="268" r:id="rId6"/>
     <p:sldId id="269" r:id="rId7"/>
-    <p:sldId id="265" r:id="rId8"/>
+    <p:sldId id="270" r:id="rId8"/>
+    <p:sldId id="271" r:id="rId9"/>
+    <p:sldId id="265" r:id="rId10"/>
   </p:sldIdLst>
   <p:sldSz cx="9144000" cy="6858000" type="screen4x3"/>
   <p:notesSz cx="6858000" cy="9144000"/>
@@ -203,7 +205,7 @@
           <a:p>
             <a:fld id="{794915E2-5A19-401A-AAB5-929FAFDC4B58}" type="datetimeFigureOut">
               <a:rPr lang="en-US" smtClean="0"/>
-              <a:t>2017-10-23</a:t>
+              <a:t>2017-10-26</a:t>
             </a:fld>
             <a:endParaRPr lang="en-US"/>
           </a:p>
@@ -659,7 +661,7 @@
                 </a:solidFill>
               </a:rPr>
               <a:pPr/>
-              <a:t>23/10/2017</a:t>
+              <a:t>26/10/2017</a:t>
             </a:fld>
             <a:endParaRPr lang="nl-BE">
               <a:solidFill>
@@ -861,7 +863,7 @@
                 </a:solidFill>
               </a:rPr>
               <a:pPr/>
-              <a:t>23/10/2017</a:t>
+              <a:t>26/10/2017</a:t>
             </a:fld>
             <a:endParaRPr lang="nl-BE">
               <a:solidFill>
@@ -1073,7 +1075,7 @@
                 </a:solidFill>
               </a:rPr>
               <a:pPr/>
-              <a:t>23/10/2017</a:t>
+              <a:t>26/10/2017</a:t>
             </a:fld>
             <a:endParaRPr lang="nl-BE">
               <a:solidFill>
@@ -1275,7 +1277,7 @@
                 </a:solidFill>
               </a:rPr>
               <a:pPr/>
-              <a:t>23/10/2017</a:t>
+              <a:t>26/10/2017</a:t>
             </a:fld>
             <a:endParaRPr lang="nl-BE">
               <a:solidFill>
@@ -1553,7 +1555,7 @@
                 </a:solidFill>
               </a:rPr>
               <a:pPr/>
-              <a:t>23/10/2017</a:t>
+              <a:t>26/10/2017</a:t>
             </a:fld>
             <a:endParaRPr lang="nl-BE">
               <a:solidFill>
@@ -1873,7 +1875,7 @@
                 </a:solidFill>
               </a:rPr>
               <a:pPr/>
-              <a:t>23/10/2017</a:t>
+              <a:t>26/10/2017</a:t>
             </a:fld>
             <a:endParaRPr lang="nl-BE">
               <a:solidFill>
@@ -2327,7 +2329,7 @@
                 </a:solidFill>
               </a:rPr>
               <a:pPr/>
-              <a:t>23/10/2017</a:t>
+              <a:t>26/10/2017</a:t>
             </a:fld>
             <a:endParaRPr lang="nl-BE">
               <a:solidFill>
@@ -2477,7 +2479,7 @@
                 </a:solidFill>
               </a:rPr>
               <a:pPr/>
-              <a:t>23/10/2017</a:t>
+              <a:t>26/10/2017</a:t>
             </a:fld>
             <a:endParaRPr lang="nl-BE">
               <a:solidFill>
@@ -2604,7 +2606,7 @@
                 </a:solidFill>
               </a:rPr>
               <a:pPr/>
-              <a:t>23/10/2017</a:t>
+              <a:t>26/10/2017</a:t>
             </a:fld>
             <a:endParaRPr lang="nl-BE">
               <a:solidFill>
@@ -2913,7 +2915,7 @@
                 </a:solidFill>
               </a:rPr>
               <a:pPr/>
-              <a:t>23/10/2017</a:t>
+              <a:t>26/10/2017</a:t>
             </a:fld>
             <a:endParaRPr lang="nl-BE">
               <a:solidFill>
@@ -3198,7 +3200,7 @@
                 </a:solidFill>
               </a:rPr>
               <a:pPr/>
-              <a:t>23/10/2017</a:t>
+              <a:t>26/10/2017</a:t>
             </a:fld>
             <a:endParaRPr lang="nl-BE">
               <a:solidFill>
@@ -3443,7 +3445,7 @@
                 </a:solidFill>
               </a:rPr>
               <a:pPr/>
-              <a:t>23/10/2017</a:t>
+              <a:t>26/10/2017</a:t>
             </a:fld>
             <a:endParaRPr lang="nl-BE">
               <a:solidFill>
@@ -4059,7 +4061,6 @@
               <a:rPr lang="en-US" dirty="0" smtClean="0"/>
               <a:t>QGIS</a:t>
             </a:r>
-            <a:endParaRPr lang="en-US" dirty="0" smtClean="0"/>
           </a:p>
           <a:p>
             <a:r>
@@ -4092,37 +4093,22 @@
             <a:pPr lvl="1"/>
             <a:r>
               <a:rPr lang="en-US" dirty="0" smtClean="0"/>
-              <a:t>I/O library: </a:t>
-            </a:r>
+              <a:t>I/O library: Fiona</a:t>
+            </a:r>
+          </a:p>
+          <a:p>
+            <a:pPr lvl="1"/>
             <a:r>
               <a:rPr lang="en-US" dirty="0" smtClean="0"/>
-              <a:t>Fiona</a:t>
-            </a:r>
-            <a:endParaRPr lang="en-US" dirty="0" smtClean="0"/>
+              <a:t>visualization: Folium</a:t>
+            </a:r>
           </a:p>
           <a:p>
             <a:pPr lvl="1"/>
             <a:r>
               <a:rPr lang="en-US" dirty="0" smtClean="0"/>
-              <a:t>visualization: </a:t>
-            </a:r>
-            <a:r>
-              <a:rPr lang="en-US" dirty="0" smtClean="0"/>
-              <a:t>Folium</a:t>
-            </a:r>
-            <a:endParaRPr lang="en-US" dirty="0" smtClean="0"/>
-          </a:p>
-          <a:p>
-            <a:pPr lvl="1"/>
-            <a:r>
-              <a:rPr lang="en-US" dirty="0" smtClean="0"/>
-              <a:t>data processing/modeling: </a:t>
-            </a:r>
-            <a:r>
-              <a:rPr lang="en-US" dirty="0" smtClean="0"/>
-              <a:t>Shapely</a:t>
-            </a:r>
-            <a:endParaRPr lang="en-US" dirty="0" smtClean="0"/>
+              <a:t>data processing/modeling: Shapely</a:t>
+            </a:r>
           </a:p>
         </p:txBody>
       </p:sp>
@@ -5217,11 +5203,7 @@
             </a:r>
             <a:r>
               <a:rPr lang="en-US" dirty="0" smtClean="0"/>
-              <a:t>olium </a:t>
-            </a:r>
-            <a:r>
-              <a:rPr lang="en-US" dirty="0" smtClean="0"/>
-              <a:t>visualization</a:t>
+              <a:t>olium visualization</a:t>
             </a:r>
             <a:endParaRPr lang="en-US" dirty="0"/>
           </a:p>
@@ -7785,7 +7767,7 @@
           <a:p>
             <a:r>
               <a:rPr lang="en-US" dirty="0" smtClean="0"/>
-              <a:t>Further reading</a:t>
+              <a:t>Shapely geometric objects</a:t>
             </a:r>
             <a:endParaRPr lang="en-US" dirty="0"/>
           </a:p>
@@ -7801,90 +7783,174 @@
             <p:ph idx="1"/>
           </p:nvPr>
         </p:nvSpPr>
-        <p:spPr/>
-        <p:txBody>
-          <a:bodyPr/>
+        <p:spPr>
+          <a:xfrm>
+            <a:off x="457200" y="1600200"/>
+            <a:ext cx="7211961" cy="4525963"/>
+          </a:xfrm>
+        </p:spPr>
+        <p:txBody>
+          <a:bodyPr>
+            <a:normAutofit fontScale="85000" lnSpcReduction="10000"/>
+          </a:bodyPr>
           <a:lstStyle/>
           <a:p>
             <a:r>
+              <a:rPr lang="en-US" dirty="0" smtClean="0">
+                <a:latin typeface="Courier New" panose="02070309020205020404" pitchFamily="49" charset="0"/>
+                <a:cs typeface="Courier New" panose="02070309020205020404" pitchFamily="49" charset="0"/>
+              </a:rPr>
+              <a:t>Point</a:t>
+            </a:r>
+            <a:r>
               <a:rPr lang="en-US" dirty="0" smtClean="0"/>
-              <a:t>Fiona manual</a:t>
-            </a:r>
-            <a:r>
-              <a:rPr lang="en-US" dirty="0"/>
-              <a:t/>
-            </a:r>
-            <a:br>
-              <a:rPr lang="en-US" dirty="0"/>
-            </a:br>
-            <a:r>
-              <a:rPr lang="en-US" sz="2000" dirty="0">
-                <a:hlinkClick r:id="rId2"/>
-              </a:rPr>
-              <a:t>http://</a:t>
-            </a:r>
-            <a:r>
-              <a:rPr lang="en-US" sz="2000" dirty="0" smtClean="0">
-                <a:hlinkClick r:id="rId2"/>
-              </a:rPr>
-              <a:t>toblerity.org/fiona/index.html</a:t>
-            </a:r>
-            <a:endParaRPr lang="en-US" sz="2000" dirty="0" smtClean="0"/>
-          </a:p>
-          <a:p>
-            <a:r>
-              <a:rPr lang="en-US" dirty="0"/>
-              <a:t>Folium manual</a:t>
-            </a:r>
-            <a:br>
-              <a:rPr lang="en-US" dirty="0"/>
-            </a:br>
-            <a:r>
-              <a:rPr lang="en-US" sz="2000" dirty="0">
-                <a:hlinkClick r:id="rId3"/>
-              </a:rPr>
-              <a:t>http://python-visualization.github.io/folium/docs-master</a:t>
-            </a:r>
-            <a:r>
-              <a:rPr lang="en-US" sz="2000" dirty="0" smtClean="0">
-                <a:hlinkClick r:id="rId3"/>
-              </a:rPr>
-              <a:t>/</a:t>
-            </a:r>
-            <a:r>
-              <a:rPr lang="en-US" sz="2000" dirty="0" smtClean="0"/>
-              <a:t> </a:t>
+              <a:t>: 2D or 3D</a:t>
+            </a:r>
+          </a:p>
+          <a:p>
+            <a:r>
+              <a:rPr lang="en-US" dirty="0" err="1" smtClean="0">
+                <a:latin typeface="Courier New" panose="02070309020205020404" pitchFamily="49" charset="0"/>
+                <a:cs typeface="Courier New" panose="02070309020205020404" pitchFamily="49" charset="0"/>
+              </a:rPr>
+              <a:t>LineString</a:t>
+            </a:r>
+            <a:r>
+              <a:rPr lang="en-US" dirty="0" smtClean="0"/>
+              <a:t>: sequence of </a:t>
+            </a:r>
+            <a:r>
+              <a:rPr lang="en-US" dirty="0" smtClean="0">
+                <a:latin typeface="Courier New" panose="02070309020205020404" pitchFamily="49" charset="0"/>
+                <a:cs typeface="Courier New" panose="02070309020205020404" pitchFamily="49" charset="0"/>
+              </a:rPr>
+              <a:t>Point</a:t>
+            </a:r>
+          </a:p>
+          <a:p>
+            <a:r>
+              <a:rPr lang="en-US" dirty="0" err="1" smtClean="0">
+                <a:latin typeface="Courier New" panose="02070309020205020404" pitchFamily="49" charset="0"/>
+                <a:cs typeface="Courier New" panose="02070309020205020404" pitchFamily="49" charset="0"/>
+              </a:rPr>
+              <a:t>MultiLineString</a:t>
+            </a:r>
+            <a:r>
+              <a:rPr lang="en-US" dirty="0" smtClean="0"/>
+              <a:t>: multiple </a:t>
+            </a:r>
+            <a:r>
+              <a:rPr lang="en-US" dirty="0" err="1" smtClean="0">
+                <a:latin typeface="Courier New" panose="02070309020205020404" pitchFamily="49" charset="0"/>
+                <a:cs typeface="Courier New" panose="02070309020205020404" pitchFamily="49" charset="0"/>
+              </a:rPr>
+              <a:t>LineString</a:t>
+            </a:r>
+            <a:endParaRPr lang="en-US" dirty="0" smtClean="0">
+              <a:latin typeface="Courier New" panose="02070309020205020404" pitchFamily="49" charset="0"/>
+              <a:cs typeface="Courier New" panose="02070309020205020404" pitchFamily="49" charset="0"/>
+            </a:endParaRPr>
+          </a:p>
+          <a:p>
+            <a:r>
+              <a:rPr lang="en-US" dirty="0" err="1" smtClean="0">
+                <a:latin typeface="Courier New" panose="02070309020205020404" pitchFamily="49" charset="0"/>
+                <a:cs typeface="Courier New" panose="02070309020205020404" pitchFamily="49" charset="0"/>
+              </a:rPr>
+              <a:t>LinearRing</a:t>
+            </a:r>
+            <a:r>
+              <a:rPr lang="en-US" dirty="0" smtClean="0"/>
+              <a:t>: closed </a:t>
+            </a:r>
+            <a:r>
+              <a:rPr lang="en-US" dirty="0" err="1" smtClean="0">
+                <a:latin typeface="Courier New" panose="02070309020205020404" pitchFamily="49" charset="0"/>
+                <a:cs typeface="Courier New" panose="02070309020205020404" pitchFamily="49" charset="0"/>
+              </a:rPr>
+              <a:t>LineString</a:t>
+            </a:r>
+            <a:endParaRPr lang="en-US" dirty="0" smtClean="0">
+              <a:latin typeface="Courier New" panose="02070309020205020404" pitchFamily="49" charset="0"/>
+              <a:cs typeface="Courier New" panose="02070309020205020404" pitchFamily="49" charset="0"/>
+            </a:endParaRPr>
+          </a:p>
+          <a:p>
+            <a:pPr lvl="1"/>
+            <a:r>
+              <a:rPr lang="en-US" dirty="0" smtClean="0"/>
+              <a:t>should not cross</a:t>
+            </a:r>
+          </a:p>
+          <a:p>
+            <a:r>
+              <a:rPr lang="en-US" dirty="0" smtClean="0">
+                <a:latin typeface="Courier New" panose="02070309020205020404" pitchFamily="49" charset="0"/>
+                <a:cs typeface="Courier New" panose="02070309020205020404" pitchFamily="49" charset="0"/>
+              </a:rPr>
+              <a:t>Polygon</a:t>
+            </a:r>
+            <a:r>
+              <a:rPr lang="en-US" dirty="0" smtClean="0"/>
+              <a:t>: </a:t>
+            </a:r>
+            <a:r>
+              <a:rPr lang="en-US" dirty="0" err="1" smtClean="0">
+                <a:latin typeface="Courier New" panose="02070309020205020404" pitchFamily="49" charset="0"/>
+                <a:cs typeface="Courier New" panose="02070309020205020404" pitchFamily="49" charset="0"/>
+              </a:rPr>
+              <a:t>LinearRing</a:t>
+            </a:r>
+            <a:r>
+              <a:rPr lang="en-US" dirty="0" smtClean="0"/>
+              <a:t> as outer boundary, optionally multiple </a:t>
+            </a:r>
+            <a:r>
+              <a:rPr lang="en-US" dirty="0" err="1" smtClean="0">
+                <a:latin typeface="Courier New" panose="02070309020205020404" pitchFamily="49" charset="0"/>
+                <a:cs typeface="Courier New" panose="02070309020205020404" pitchFamily="49" charset="0"/>
+              </a:rPr>
+              <a:t>LinearRing</a:t>
+            </a:r>
+            <a:r>
+              <a:rPr lang="en-US" dirty="0" smtClean="0"/>
+              <a:t> as "holes"</a:t>
+            </a:r>
+          </a:p>
+          <a:p>
+            <a:pPr lvl="1"/>
+            <a:r>
+              <a:rPr lang="en-US" dirty="0" smtClean="0"/>
+              <a:t>should not touch in more than one point</a:t>
+            </a:r>
+          </a:p>
+          <a:p>
+            <a:r>
+              <a:rPr lang="en-US" dirty="0" err="1" smtClean="0">
+                <a:latin typeface="Courier New" panose="02070309020205020404" pitchFamily="49" charset="0"/>
+                <a:cs typeface="Courier New" panose="02070309020205020404" pitchFamily="49" charset="0"/>
+              </a:rPr>
+              <a:t>MultiPolygon</a:t>
+            </a:r>
+            <a:r>
+              <a:rPr lang="en-US" dirty="0" smtClean="0"/>
+              <a:t>: multiple </a:t>
+            </a:r>
+            <a:r>
+              <a:rPr lang="en-US" dirty="0" smtClean="0">
+                <a:latin typeface="Courier New" panose="02070309020205020404" pitchFamily="49" charset="0"/>
+                <a:cs typeface="Courier New" panose="02070309020205020404" pitchFamily="49" charset="0"/>
+              </a:rPr>
+              <a:t>Polygon</a:t>
+            </a:r>
+          </a:p>
+          <a:p>
+            <a:pPr lvl="1"/>
+            <a:r>
+              <a:rPr lang="en-US" dirty="0" smtClean="0"/>
+              <a:t>should not touch in more than one point</a:t>
             </a:r>
             <a:endParaRPr lang="en-US" dirty="0"/>
-          </a:p>
-          <a:p>
-            <a:r>
-              <a:rPr lang="en-US" dirty="0" smtClean="0"/>
-              <a:t>Shapely manual</a:t>
-            </a:r>
-            <a:r>
-              <a:rPr lang="en-US" dirty="0" smtClean="0"/>
-              <a:t/>
-            </a:r>
-            <a:br>
-              <a:rPr lang="en-US" dirty="0" smtClean="0"/>
-            </a:br>
-            <a:r>
-              <a:rPr lang="en-US" sz="2000" dirty="0">
-                <a:hlinkClick r:id="rId4"/>
-              </a:rPr>
-              <a:t>https://shapely.readthedocs.io/en/latest</a:t>
-            </a:r>
-            <a:r>
-              <a:rPr lang="en-US" sz="2000" dirty="0" smtClean="0">
-                <a:hlinkClick r:id="rId4"/>
-              </a:rPr>
-              <a:t>/</a:t>
-            </a:r>
-            <a:endParaRPr lang="en-US" sz="2000" dirty="0" smtClean="0"/>
-          </a:p>
-          <a:p>
-            <a:endParaRPr lang="en-US" dirty="0" smtClean="0"/>
           </a:p>
         </p:txBody>
       </p:sp>
@@ -7913,6 +7979,1208 @@
               </a:rPr>
               <a:pPr/>
               <a:t>7</a:t>
+            </a:fld>
+            <a:endParaRPr lang="nl-BE">
+              <a:solidFill>
+                <a:prstClr val="black">
+                  <a:tint val="75000"/>
+                </a:prstClr>
+              </a:solidFill>
+            </a:endParaRPr>
+          </a:p>
+        </p:txBody>
+      </p:sp>
+      <p:pic>
+        <p:nvPicPr>
+          <p:cNvPr id="5" name="Picture 4"/>
+          <p:cNvPicPr>
+            <a:picLocks noChangeAspect="1"/>
+          </p:cNvPicPr>
+          <p:nvPr/>
+        </p:nvPicPr>
+        <p:blipFill>
+          <a:blip r:embed="rId2">
+            <a:extLst>
+              <a:ext uri="{28A0092B-C50C-407E-A947-70E740481C1C}">
+                <a14:useLocalDpi xmlns:a14="http://schemas.microsoft.com/office/drawing/2010/main" val="0"/>
+              </a:ext>
+            </a:extLst>
+          </a:blip>
+          <a:stretch>
+            <a:fillRect/>
+          </a:stretch>
+        </p:blipFill>
+        <p:spPr>
+          <a:xfrm>
+            <a:off x="6275717" y="1858758"/>
+            <a:ext cx="1033374" cy="555830"/>
+          </a:xfrm>
+          <a:prstGeom prst="rect">
+            <a:avLst/>
+          </a:prstGeom>
+          <a:effectLst>
+            <a:outerShdw blurRad="50800" dist="38100" dir="2700000" algn="tl" rotWithShape="0">
+              <a:prstClr val="black">
+                <a:alpha val="40000"/>
+              </a:prstClr>
+            </a:outerShdw>
+          </a:effectLst>
+        </p:spPr>
+      </p:pic>
+      <p:pic>
+        <p:nvPicPr>
+          <p:cNvPr id="6" name="Picture 5"/>
+          <p:cNvPicPr>
+            <a:picLocks noChangeAspect="1"/>
+          </p:cNvPicPr>
+          <p:nvPr/>
+        </p:nvPicPr>
+        <p:blipFill>
+          <a:blip r:embed="rId3">
+            <a:extLst>
+              <a:ext uri="{28A0092B-C50C-407E-A947-70E740481C1C}">
+                <a14:useLocalDpi xmlns:a14="http://schemas.microsoft.com/office/drawing/2010/main" val="0"/>
+              </a:ext>
+            </a:extLst>
+          </a:blip>
+          <a:stretch>
+            <a:fillRect/>
+          </a:stretch>
+        </p:blipFill>
+        <p:spPr>
+          <a:xfrm>
+            <a:off x="7669161" y="2414588"/>
+            <a:ext cx="1257300" cy="581025"/>
+          </a:xfrm>
+          <a:prstGeom prst="rect">
+            <a:avLst/>
+          </a:prstGeom>
+          <a:effectLst>
+            <a:outerShdw blurRad="50800" dist="38100" dir="2700000" algn="tl" rotWithShape="0">
+              <a:prstClr val="black">
+                <a:alpha val="40000"/>
+              </a:prstClr>
+            </a:outerShdw>
+          </a:effectLst>
+        </p:spPr>
+      </p:pic>
+      <p:pic>
+        <p:nvPicPr>
+          <p:cNvPr id="7" name="Picture 6"/>
+          <p:cNvPicPr>
+            <a:picLocks noChangeAspect="1"/>
+          </p:cNvPicPr>
+          <p:nvPr/>
+        </p:nvPicPr>
+        <p:blipFill>
+          <a:blip r:embed="rId4">
+            <a:extLst>
+              <a:ext uri="{28A0092B-C50C-407E-A947-70E740481C1C}">
+                <a14:useLocalDpi xmlns:a14="http://schemas.microsoft.com/office/drawing/2010/main" val="0"/>
+              </a:ext>
+            </a:extLst>
+          </a:blip>
+          <a:stretch>
+            <a:fillRect/>
+          </a:stretch>
+        </p:blipFill>
+        <p:spPr>
+          <a:xfrm>
+            <a:off x="7669161" y="3800858"/>
+            <a:ext cx="801402" cy="795141"/>
+          </a:xfrm>
+          <a:prstGeom prst="rect">
+            <a:avLst/>
+          </a:prstGeom>
+          <a:effectLst>
+            <a:outerShdw blurRad="50800" dist="38100" dir="2700000" algn="tl" rotWithShape="0">
+              <a:prstClr val="black">
+                <a:alpha val="40000"/>
+              </a:prstClr>
+            </a:outerShdw>
+          </a:effectLst>
+        </p:spPr>
+      </p:pic>
+      <p:pic>
+        <p:nvPicPr>
+          <p:cNvPr id="8" name="Picture 7"/>
+          <p:cNvPicPr>
+            <a:picLocks noChangeAspect="1"/>
+          </p:cNvPicPr>
+          <p:nvPr/>
+        </p:nvPicPr>
+        <p:blipFill>
+          <a:blip r:embed="rId5">
+            <a:extLst>
+              <a:ext uri="{28A0092B-C50C-407E-A947-70E740481C1C}">
+                <a14:useLocalDpi xmlns:a14="http://schemas.microsoft.com/office/drawing/2010/main" val="0"/>
+              </a:ext>
+            </a:extLst>
+          </a:blip>
+          <a:stretch>
+            <a:fillRect/>
+          </a:stretch>
+        </p:blipFill>
+        <p:spPr>
+          <a:xfrm>
+            <a:off x="6753670" y="5154613"/>
+            <a:ext cx="1228725" cy="971550"/>
+          </a:xfrm>
+          <a:prstGeom prst="rect">
+            <a:avLst/>
+          </a:prstGeom>
+          <a:effectLst>
+            <a:outerShdw blurRad="50800" dist="38100" dir="2700000" algn="tl" rotWithShape="0">
+              <a:prstClr val="black">
+                <a:alpha val="40000"/>
+              </a:prstClr>
+            </a:outerShdw>
+          </a:effectLst>
+        </p:spPr>
+      </p:pic>
+    </p:spTree>
+    <p:extLst>
+      <p:ext uri="{BB962C8B-B14F-4D97-AF65-F5344CB8AC3E}">
+        <p14:creationId xmlns:p14="http://schemas.microsoft.com/office/powerpoint/2010/main" val="65218945"/>
+      </p:ext>
+    </p:extLst>
+  </p:cSld>
+  <p:clrMapOvr>
+    <a:masterClrMapping/>
+  </p:clrMapOvr>
+  <p:timing>
+    <p:tnLst>
+      <p:par>
+        <p:cTn id="1" dur="indefinite" restart="never" nodeType="tmRoot">
+          <p:childTnLst>
+            <p:seq concurrent="1" nextAc="seek">
+              <p:cTn id="2" dur="indefinite" nodeType="mainSeq">
+                <p:childTnLst>
+                  <p:par>
+                    <p:cTn id="3" fill="hold">
+                      <p:stCondLst>
+                        <p:cond delay="indefinite"/>
+                        <p:cond evt="onBegin" delay="0">
+                          <p:tn val="2"/>
+                        </p:cond>
+                      </p:stCondLst>
+                      <p:childTnLst>
+                        <p:par>
+                          <p:cTn id="4" fill="hold">
+                            <p:stCondLst>
+                              <p:cond delay="0"/>
+                            </p:stCondLst>
+                            <p:childTnLst>
+                              <p:par>
+                                <p:cTn id="5" presetID="1" presetClass="entr" presetSubtype="0" fill="hold" grpId="0" nodeType="withEffect">
+                                  <p:stCondLst>
+                                    <p:cond delay="0"/>
+                                  </p:stCondLst>
+                                  <p:childTnLst>
+                                    <p:set>
+                                      <p:cBhvr>
+                                        <p:cTn id="6" dur="1" fill="hold">
+                                          <p:stCondLst>
+                                            <p:cond delay="0"/>
+                                          </p:stCondLst>
+                                        </p:cTn>
+                                        <p:tgtEl>
+                                          <p:spTgt spid="3">
+                                            <p:txEl>
+                                              <p:pRg st="0" end="0"/>
+                                            </p:txEl>
+                                          </p:spTgt>
+                                        </p:tgtEl>
+                                        <p:attrNameLst>
+                                          <p:attrName>style.visibility</p:attrName>
+                                        </p:attrNameLst>
+                                      </p:cBhvr>
+                                      <p:to>
+                                        <p:strVal val="visible"/>
+                                      </p:to>
+                                    </p:set>
+                                  </p:childTnLst>
+                                </p:cTn>
+                              </p:par>
+                            </p:childTnLst>
+                          </p:cTn>
+                        </p:par>
+                      </p:childTnLst>
+                    </p:cTn>
+                  </p:par>
+                  <p:par>
+                    <p:cTn id="7" fill="hold">
+                      <p:stCondLst>
+                        <p:cond delay="indefinite"/>
+                      </p:stCondLst>
+                      <p:childTnLst>
+                        <p:par>
+                          <p:cTn id="8" fill="hold">
+                            <p:stCondLst>
+                              <p:cond delay="0"/>
+                            </p:stCondLst>
+                            <p:childTnLst>
+                              <p:par>
+                                <p:cTn id="9" presetID="1" presetClass="entr" presetSubtype="0" fill="hold" grpId="0" nodeType="clickEffect">
+                                  <p:stCondLst>
+                                    <p:cond delay="0"/>
+                                  </p:stCondLst>
+                                  <p:childTnLst>
+                                    <p:set>
+                                      <p:cBhvr>
+                                        <p:cTn id="10" dur="1" fill="hold">
+                                          <p:stCondLst>
+                                            <p:cond delay="0"/>
+                                          </p:stCondLst>
+                                        </p:cTn>
+                                        <p:tgtEl>
+                                          <p:spTgt spid="3">
+                                            <p:txEl>
+                                              <p:pRg st="1" end="1"/>
+                                            </p:txEl>
+                                          </p:spTgt>
+                                        </p:tgtEl>
+                                        <p:attrNameLst>
+                                          <p:attrName>style.visibility</p:attrName>
+                                        </p:attrNameLst>
+                                      </p:cBhvr>
+                                      <p:to>
+                                        <p:strVal val="visible"/>
+                                      </p:to>
+                                    </p:set>
+                                  </p:childTnLst>
+                                </p:cTn>
+                              </p:par>
+                              <p:par>
+                                <p:cTn id="11" presetID="1" presetClass="entr" presetSubtype="0" fill="hold" nodeType="withEffect">
+                                  <p:stCondLst>
+                                    <p:cond delay="0"/>
+                                  </p:stCondLst>
+                                  <p:childTnLst>
+                                    <p:set>
+                                      <p:cBhvr>
+                                        <p:cTn id="12" dur="1" fill="hold">
+                                          <p:stCondLst>
+                                            <p:cond delay="0"/>
+                                          </p:stCondLst>
+                                        </p:cTn>
+                                        <p:tgtEl>
+                                          <p:spTgt spid="5"/>
+                                        </p:tgtEl>
+                                        <p:attrNameLst>
+                                          <p:attrName>style.visibility</p:attrName>
+                                        </p:attrNameLst>
+                                      </p:cBhvr>
+                                      <p:to>
+                                        <p:strVal val="visible"/>
+                                      </p:to>
+                                    </p:set>
+                                  </p:childTnLst>
+                                </p:cTn>
+                              </p:par>
+                            </p:childTnLst>
+                          </p:cTn>
+                        </p:par>
+                      </p:childTnLst>
+                    </p:cTn>
+                  </p:par>
+                  <p:par>
+                    <p:cTn id="13" fill="hold">
+                      <p:stCondLst>
+                        <p:cond delay="indefinite"/>
+                      </p:stCondLst>
+                      <p:childTnLst>
+                        <p:par>
+                          <p:cTn id="14" fill="hold">
+                            <p:stCondLst>
+                              <p:cond delay="0"/>
+                            </p:stCondLst>
+                            <p:childTnLst>
+                              <p:par>
+                                <p:cTn id="15" presetID="1" presetClass="entr" presetSubtype="0" fill="hold" grpId="0" nodeType="clickEffect">
+                                  <p:stCondLst>
+                                    <p:cond delay="0"/>
+                                  </p:stCondLst>
+                                  <p:childTnLst>
+                                    <p:set>
+                                      <p:cBhvr>
+                                        <p:cTn id="16" dur="1" fill="hold">
+                                          <p:stCondLst>
+                                            <p:cond delay="0"/>
+                                          </p:stCondLst>
+                                        </p:cTn>
+                                        <p:tgtEl>
+                                          <p:spTgt spid="3">
+                                            <p:txEl>
+                                              <p:pRg st="2" end="2"/>
+                                            </p:txEl>
+                                          </p:spTgt>
+                                        </p:tgtEl>
+                                        <p:attrNameLst>
+                                          <p:attrName>style.visibility</p:attrName>
+                                        </p:attrNameLst>
+                                      </p:cBhvr>
+                                      <p:to>
+                                        <p:strVal val="visible"/>
+                                      </p:to>
+                                    </p:set>
+                                  </p:childTnLst>
+                                </p:cTn>
+                              </p:par>
+                              <p:par>
+                                <p:cTn id="17" presetID="1" presetClass="entr" presetSubtype="0" fill="hold" nodeType="withEffect">
+                                  <p:stCondLst>
+                                    <p:cond delay="0"/>
+                                  </p:stCondLst>
+                                  <p:childTnLst>
+                                    <p:set>
+                                      <p:cBhvr>
+                                        <p:cTn id="18" dur="1" fill="hold">
+                                          <p:stCondLst>
+                                            <p:cond delay="0"/>
+                                          </p:stCondLst>
+                                        </p:cTn>
+                                        <p:tgtEl>
+                                          <p:spTgt spid="6"/>
+                                        </p:tgtEl>
+                                        <p:attrNameLst>
+                                          <p:attrName>style.visibility</p:attrName>
+                                        </p:attrNameLst>
+                                      </p:cBhvr>
+                                      <p:to>
+                                        <p:strVal val="visible"/>
+                                      </p:to>
+                                    </p:set>
+                                  </p:childTnLst>
+                                </p:cTn>
+                              </p:par>
+                            </p:childTnLst>
+                          </p:cTn>
+                        </p:par>
+                      </p:childTnLst>
+                    </p:cTn>
+                  </p:par>
+                  <p:par>
+                    <p:cTn id="19" fill="hold">
+                      <p:stCondLst>
+                        <p:cond delay="indefinite"/>
+                      </p:stCondLst>
+                      <p:childTnLst>
+                        <p:par>
+                          <p:cTn id="20" fill="hold">
+                            <p:stCondLst>
+                              <p:cond delay="0"/>
+                            </p:stCondLst>
+                            <p:childTnLst>
+                              <p:par>
+                                <p:cTn id="21" presetID="1" presetClass="entr" presetSubtype="0" fill="hold" grpId="0" nodeType="clickEffect">
+                                  <p:stCondLst>
+                                    <p:cond delay="0"/>
+                                  </p:stCondLst>
+                                  <p:childTnLst>
+                                    <p:set>
+                                      <p:cBhvr>
+                                        <p:cTn id="22" dur="1" fill="hold">
+                                          <p:stCondLst>
+                                            <p:cond delay="0"/>
+                                          </p:stCondLst>
+                                        </p:cTn>
+                                        <p:tgtEl>
+                                          <p:spTgt spid="3">
+                                            <p:txEl>
+                                              <p:pRg st="3" end="3"/>
+                                            </p:txEl>
+                                          </p:spTgt>
+                                        </p:tgtEl>
+                                        <p:attrNameLst>
+                                          <p:attrName>style.visibility</p:attrName>
+                                        </p:attrNameLst>
+                                      </p:cBhvr>
+                                      <p:to>
+                                        <p:strVal val="visible"/>
+                                      </p:to>
+                                    </p:set>
+                                  </p:childTnLst>
+                                </p:cTn>
+                              </p:par>
+                              <p:par>
+                                <p:cTn id="23" presetID="1" presetClass="entr" presetSubtype="0" fill="hold" grpId="0" nodeType="withEffect">
+                                  <p:stCondLst>
+                                    <p:cond delay="0"/>
+                                  </p:stCondLst>
+                                  <p:childTnLst>
+                                    <p:set>
+                                      <p:cBhvr>
+                                        <p:cTn id="24" dur="1" fill="hold">
+                                          <p:stCondLst>
+                                            <p:cond delay="0"/>
+                                          </p:stCondLst>
+                                        </p:cTn>
+                                        <p:tgtEl>
+                                          <p:spTgt spid="3">
+                                            <p:txEl>
+                                              <p:pRg st="4" end="4"/>
+                                            </p:txEl>
+                                          </p:spTgt>
+                                        </p:tgtEl>
+                                        <p:attrNameLst>
+                                          <p:attrName>style.visibility</p:attrName>
+                                        </p:attrNameLst>
+                                      </p:cBhvr>
+                                      <p:to>
+                                        <p:strVal val="visible"/>
+                                      </p:to>
+                                    </p:set>
+                                  </p:childTnLst>
+                                </p:cTn>
+                              </p:par>
+                            </p:childTnLst>
+                          </p:cTn>
+                        </p:par>
+                      </p:childTnLst>
+                    </p:cTn>
+                  </p:par>
+                  <p:par>
+                    <p:cTn id="25" fill="hold">
+                      <p:stCondLst>
+                        <p:cond delay="indefinite"/>
+                      </p:stCondLst>
+                      <p:childTnLst>
+                        <p:par>
+                          <p:cTn id="26" fill="hold">
+                            <p:stCondLst>
+                              <p:cond delay="0"/>
+                            </p:stCondLst>
+                            <p:childTnLst>
+                              <p:par>
+                                <p:cTn id="27" presetID="1" presetClass="entr" presetSubtype="0" fill="hold" grpId="0" nodeType="clickEffect">
+                                  <p:stCondLst>
+                                    <p:cond delay="0"/>
+                                  </p:stCondLst>
+                                  <p:childTnLst>
+                                    <p:set>
+                                      <p:cBhvr>
+                                        <p:cTn id="28" dur="1" fill="hold">
+                                          <p:stCondLst>
+                                            <p:cond delay="0"/>
+                                          </p:stCondLst>
+                                        </p:cTn>
+                                        <p:tgtEl>
+                                          <p:spTgt spid="3">
+                                            <p:txEl>
+                                              <p:pRg st="5" end="5"/>
+                                            </p:txEl>
+                                          </p:spTgt>
+                                        </p:tgtEl>
+                                        <p:attrNameLst>
+                                          <p:attrName>style.visibility</p:attrName>
+                                        </p:attrNameLst>
+                                      </p:cBhvr>
+                                      <p:to>
+                                        <p:strVal val="visible"/>
+                                      </p:to>
+                                    </p:set>
+                                  </p:childTnLst>
+                                </p:cTn>
+                              </p:par>
+                              <p:par>
+                                <p:cTn id="29" presetID="1" presetClass="entr" presetSubtype="0" fill="hold" grpId="0" nodeType="withEffect">
+                                  <p:stCondLst>
+                                    <p:cond delay="0"/>
+                                  </p:stCondLst>
+                                  <p:childTnLst>
+                                    <p:set>
+                                      <p:cBhvr>
+                                        <p:cTn id="30" dur="1" fill="hold">
+                                          <p:stCondLst>
+                                            <p:cond delay="0"/>
+                                          </p:stCondLst>
+                                        </p:cTn>
+                                        <p:tgtEl>
+                                          <p:spTgt spid="3">
+                                            <p:txEl>
+                                              <p:pRg st="6" end="6"/>
+                                            </p:txEl>
+                                          </p:spTgt>
+                                        </p:tgtEl>
+                                        <p:attrNameLst>
+                                          <p:attrName>style.visibility</p:attrName>
+                                        </p:attrNameLst>
+                                      </p:cBhvr>
+                                      <p:to>
+                                        <p:strVal val="visible"/>
+                                      </p:to>
+                                    </p:set>
+                                  </p:childTnLst>
+                                </p:cTn>
+                              </p:par>
+                              <p:par>
+                                <p:cTn id="31" presetID="1" presetClass="entr" presetSubtype="0" fill="hold" nodeType="withEffect">
+                                  <p:stCondLst>
+                                    <p:cond delay="0"/>
+                                  </p:stCondLst>
+                                  <p:childTnLst>
+                                    <p:set>
+                                      <p:cBhvr>
+                                        <p:cTn id="32" dur="1" fill="hold">
+                                          <p:stCondLst>
+                                            <p:cond delay="0"/>
+                                          </p:stCondLst>
+                                        </p:cTn>
+                                        <p:tgtEl>
+                                          <p:spTgt spid="7"/>
+                                        </p:tgtEl>
+                                        <p:attrNameLst>
+                                          <p:attrName>style.visibility</p:attrName>
+                                        </p:attrNameLst>
+                                      </p:cBhvr>
+                                      <p:to>
+                                        <p:strVal val="visible"/>
+                                      </p:to>
+                                    </p:set>
+                                  </p:childTnLst>
+                                </p:cTn>
+                              </p:par>
+                            </p:childTnLst>
+                          </p:cTn>
+                        </p:par>
+                      </p:childTnLst>
+                    </p:cTn>
+                  </p:par>
+                  <p:par>
+                    <p:cTn id="33" fill="hold">
+                      <p:stCondLst>
+                        <p:cond delay="indefinite"/>
+                      </p:stCondLst>
+                      <p:childTnLst>
+                        <p:par>
+                          <p:cTn id="34" fill="hold">
+                            <p:stCondLst>
+                              <p:cond delay="0"/>
+                            </p:stCondLst>
+                            <p:childTnLst>
+                              <p:par>
+                                <p:cTn id="35" presetID="1" presetClass="entr" presetSubtype="0" fill="hold" grpId="0" nodeType="clickEffect">
+                                  <p:stCondLst>
+                                    <p:cond delay="0"/>
+                                  </p:stCondLst>
+                                  <p:childTnLst>
+                                    <p:set>
+                                      <p:cBhvr>
+                                        <p:cTn id="36" dur="1" fill="hold">
+                                          <p:stCondLst>
+                                            <p:cond delay="0"/>
+                                          </p:stCondLst>
+                                        </p:cTn>
+                                        <p:tgtEl>
+                                          <p:spTgt spid="3">
+                                            <p:txEl>
+                                              <p:pRg st="7" end="7"/>
+                                            </p:txEl>
+                                          </p:spTgt>
+                                        </p:tgtEl>
+                                        <p:attrNameLst>
+                                          <p:attrName>style.visibility</p:attrName>
+                                        </p:attrNameLst>
+                                      </p:cBhvr>
+                                      <p:to>
+                                        <p:strVal val="visible"/>
+                                      </p:to>
+                                    </p:set>
+                                  </p:childTnLst>
+                                </p:cTn>
+                              </p:par>
+                              <p:par>
+                                <p:cTn id="37" presetID="1" presetClass="entr" presetSubtype="0" fill="hold" grpId="0" nodeType="withEffect">
+                                  <p:stCondLst>
+                                    <p:cond delay="0"/>
+                                  </p:stCondLst>
+                                  <p:childTnLst>
+                                    <p:set>
+                                      <p:cBhvr>
+                                        <p:cTn id="38" dur="1" fill="hold">
+                                          <p:stCondLst>
+                                            <p:cond delay="0"/>
+                                          </p:stCondLst>
+                                        </p:cTn>
+                                        <p:tgtEl>
+                                          <p:spTgt spid="3">
+                                            <p:txEl>
+                                              <p:pRg st="8" end="8"/>
+                                            </p:txEl>
+                                          </p:spTgt>
+                                        </p:tgtEl>
+                                        <p:attrNameLst>
+                                          <p:attrName>style.visibility</p:attrName>
+                                        </p:attrNameLst>
+                                      </p:cBhvr>
+                                      <p:to>
+                                        <p:strVal val="visible"/>
+                                      </p:to>
+                                    </p:set>
+                                  </p:childTnLst>
+                                </p:cTn>
+                              </p:par>
+                              <p:par>
+                                <p:cTn id="39" presetID="1" presetClass="entr" presetSubtype="0" fill="hold" nodeType="withEffect">
+                                  <p:stCondLst>
+                                    <p:cond delay="0"/>
+                                  </p:stCondLst>
+                                  <p:childTnLst>
+                                    <p:set>
+                                      <p:cBhvr>
+                                        <p:cTn id="40" dur="1" fill="hold">
+                                          <p:stCondLst>
+                                            <p:cond delay="0"/>
+                                          </p:stCondLst>
+                                        </p:cTn>
+                                        <p:tgtEl>
+                                          <p:spTgt spid="8"/>
+                                        </p:tgtEl>
+                                        <p:attrNameLst>
+                                          <p:attrName>style.visibility</p:attrName>
+                                        </p:attrNameLst>
+                                      </p:cBhvr>
+                                      <p:to>
+                                        <p:strVal val="visible"/>
+                                      </p:to>
+                                    </p:set>
+                                  </p:childTnLst>
+                                </p:cTn>
+                              </p:par>
+                            </p:childTnLst>
+                          </p:cTn>
+                        </p:par>
+                      </p:childTnLst>
+                    </p:cTn>
+                  </p:par>
+                </p:childTnLst>
+              </p:cTn>
+              <p:prevCondLst>
+                <p:cond evt="onPrev" delay="0">
+                  <p:tgtEl>
+                    <p:sldTgt/>
+                  </p:tgtEl>
+                </p:cond>
+              </p:prevCondLst>
+              <p:nextCondLst>
+                <p:cond evt="onNext" delay="0">
+                  <p:tgtEl>
+                    <p:sldTgt/>
+                  </p:tgtEl>
+                </p:cond>
+              </p:nextCondLst>
+            </p:seq>
+          </p:childTnLst>
+        </p:cTn>
+      </p:par>
+    </p:tnLst>
+    <p:bldLst>
+      <p:bldP spid="3" grpId="0" uiExpand="1" build="p"/>
+    </p:bldLst>
+  </p:timing>
+</p:sld>
+</file>
+
+<file path=ppt/slides/slide8.xml><?xml version="1.0" encoding="utf-8"?>
+<p:sld xmlns:a="http://schemas.openxmlformats.org/drawingml/2006/main" xmlns:r="http://schemas.openxmlformats.org/officeDocument/2006/relationships" xmlns:p="http://schemas.openxmlformats.org/presentationml/2006/main">
+  <p:cSld>
+    <p:spTree>
+      <p:nvGrpSpPr>
+        <p:cNvPr id="1" name=""/>
+        <p:cNvGrpSpPr/>
+        <p:nvPr/>
+      </p:nvGrpSpPr>
+      <p:grpSpPr>
+        <a:xfrm>
+          <a:off x="0" y="0"/>
+          <a:ext cx="0" cy="0"/>
+          <a:chOff x="0" y="0"/>
+          <a:chExt cx="0" cy="0"/>
+        </a:xfrm>
+      </p:grpSpPr>
+      <p:sp>
+        <p:nvSpPr>
+          <p:cNvPr id="2" name="Title 1"/>
+          <p:cNvSpPr>
+            <a:spLocks noGrp="1"/>
+          </p:cNvSpPr>
+          <p:nvPr>
+            <p:ph type="title"/>
+          </p:nvPr>
+        </p:nvSpPr>
+        <p:spPr/>
+        <p:txBody>
+          <a:bodyPr/>
+          <a:lstStyle/>
+          <a:p>
+            <a:r>
+              <a:rPr lang="en-US" dirty="0" smtClean="0"/>
+              <a:t>Shapely objects examples</a:t>
+            </a:r>
+            <a:endParaRPr lang="en-US" dirty="0"/>
+          </a:p>
+        </p:txBody>
+      </p:sp>
+      <p:sp>
+        <p:nvSpPr>
+          <p:cNvPr id="3" name="Content Placeholder 2"/>
+          <p:cNvSpPr>
+            <a:spLocks noGrp="1"/>
+          </p:cNvSpPr>
+          <p:nvPr>
+            <p:ph idx="1"/>
+          </p:nvPr>
+        </p:nvSpPr>
+        <p:spPr/>
+        <p:txBody>
+          <a:bodyPr/>
+          <a:lstStyle/>
+          <a:p>
+            <a:r>
+              <a:rPr lang="en-US" dirty="0" err="1" smtClean="0">
+                <a:latin typeface="Courier New" panose="02070309020205020404" pitchFamily="49" charset="0"/>
+                <a:cs typeface="Courier New" panose="02070309020205020404" pitchFamily="49" charset="0"/>
+              </a:rPr>
+              <a:t>LineString</a:t>
+            </a:r>
+            <a:endParaRPr lang="en-US" dirty="0" smtClean="0">
+              <a:latin typeface="Courier New" panose="02070309020205020404" pitchFamily="49" charset="0"/>
+              <a:cs typeface="Courier New" panose="02070309020205020404" pitchFamily="49" charset="0"/>
+            </a:endParaRPr>
+          </a:p>
+          <a:p>
+            <a:endParaRPr lang="en-US" dirty="0"/>
+          </a:p>
+          <a:p>
+            <a:r>
+              <a:rPr lang="en-US" dirty="0" err="1" smtClean="0">
+                <a:latin typeface="Courier New" panose="02070309020205020404" pitchFamily="49" charset="0"/>
+                <a:cs typeface="Courier New" panose="02070309020205020404" pitchFamily="49" charset="0"/>
+              </a:rPr>
+              <a:t>LinearRing</a:t>
+            </a:r>
+            <a:endParaRPr lang="en-US" dirty="0">
+              <a:latin typeface="Courier New" panose="02070309020205020404" pitchFamily="49" charset="0"/>
+              <a:cs typeface="Courier New" panose="02070309020205020404" pitchFamily="49" charset="0"/>
+            </a:endParaRPr>
+          </a:p>
+        </p:txBody>
+      </p:sp>
+      <p:sp>
+        <p:nvSpPr>
+          <p:cNvPr id="4" name="Slide Number Placeholder 3"/>
+          <p:cNvSpPr>
+            <a:spLocks noGrp="1"/>
+          </p:cNvSpPr>
+          <p:nvPr>
+            <p:ph type="sldNum" sz="quarter" idx="12"/>
+          </p:nvPr>
+        </p:nvSpPr>
+        <p:spPr/>
+        <p:txBody>
+          <a:bodyPr/>
+          <a:lstStyle/>
+          <a:p>
+            <a:fld id="{5A209D72-2E9D-49B0-8977-41DCCC66C0BB}" type="slidenum">
+              <a:rPr lang="nl-BE" smtClean="0">
+                <a:solidFill>
+                  <a:prstClr val="black">
+                    <a:tint val="75000"/>
+                  </a:prstClr>
+                </a:solidFill>
+              </a:rPr>
+              <a:pPr/>
+              <a:t>8</a:t>
+            </a:fld>
+            <a:endParaRPr lang="nl-BE">
+              <a:solidFill>
+                <a:prstClr val="black">
+                  <a:tint val="75000"/>
+                </a:prstClr>
+              </a:solidFill>
+            </a:endParaRPr>
+          </a:p>
+        </p:txBody>
+      </p:sp>
+      <p:sp>
+        <p:nvSpPr>
+          <p:cNvPr id="5" name="TextBox 4"/>
+          <p:cNvSpPr txBox="1"/>
+          <p:nvPr/>
+        </p:nvSpPr>
+        <p:spPr>
+          <a:xfrm>
+            <a:off x="782174" y="2174280"/>
+            <a:ext cx="8155349" cy="369332"/>
+          </a:xfrm>
+          <a:prstGeom prst="rect">
+            <a:avLst/>
+          </a:prstGeom>
+          <a:solidFill>
+            <a:schemeClr val="accent4">
+              <a:lumMod val="40000"/>
+              <a:lumOff val="60000"/>
+            </a:schemeClr>
+          </a:solidFill>
+        </p:spPr>
+        <p:txBody>
+          <a:bodyPr wrap="square" rtlCol="0">
+            <a:spAutoFit/>
+          </a:bodyPr>
+          <a:lstStyle/>
+          <a:p>
+            <a:r>
+              <a:rPr lang="en-US" dirty="0" smtClean="0">
+                <a:latin typeface="Courier New" pitchFamily="49" charset="0"/>
+                <a:cs typeface="Courier New" pitchFamily="49" charset="0"/>
+              </a:rPr>
+              <a:t>line </a:t>
+            </a:r>
+            <a:r>
+              <a:rPr lang="en-US" dirty="0">
+                <a:latin typeface="Courier New" pitchFamily="49" charset="0"/>
+                <a:cs typeface="Courier New" pitchFamily="49" charset="0"/>
+              </a:rPr>
+              <a:t>= </a:t>
+            </a:r>
+            <a:r>
+              <a:rPr lang="en-US" dirty="0" err="1">
+                <a:latin typeface="Courier New" pitchFamily="49" charset="0"/>
+                <a:cs typeface="Courier New" pitchFamily="49" charset="0"/>
+              </a:rPr>
+              <a:t>LineString</a:t>
+            </a:r>
+            <a:r>
+              <a:rPr lang="en-US" dirty="0">
+                <a:latin typeface="Courier New" pitchFamily="49" charset="0"/>
+                <a:cs typeface="Courier New" pitchFamily="49" charset="0"/>
+              </a:rPr>
+              <a:t>([(0.0, 0.0), (1.0, 1.0), (2.0, 0.5)])</a:t>
+            </a:r>
+            <a:endParaRPr lang="en-US" dirty="0" smtClean="0">
+              <a:latin typeface="Courier New" pitchFamily="49" charset="0"/>
+              <a:cs typeface="Courier New" pitchFamily="49" charset="0"/>
+            </a:endParaRPr>
+          </a:p>
+        </p:txBody>
+      </p:sp>
+      <p:pic>
+        <p:nvPicPr>
+          <p:cNvPr id="6" name="Picture 5"/>
+          <p:cNvPicPr>
+            <a:picLocks noChangeAspect="1"/>
+          </p:cNvPicPr>
+          <p:nvPr/>
+        </p:nvPicPr>
+        <p:blipFill>
+          <a:blip r:embed="rId2">
+            <a:extLst>
+              <a:ext uri="{28A0092B-C50C-407E-A947-70E740481C1C}">
+                <a14:useLocalDpi xmlns:a14="http://schemas.microsoft.com/office/drawing/2010/main" val="0"/>
+              </a:ext>
+            </a:extLst>
+          </a:blip>
+          <a:stretch>
+            <a:fillRect/>
+          </a:stretch>
+        </p:blipFill>
+        <p:spPr>
+          <a:xfrm>
+            <a:off x="7401132" y="1457406"/>
+            <a:ext cx="1033374" cy="555830"/>
+          </a:xfrm>
+          <a:prstGeom prst="rect">
+            <a:avLst/>
+          </a:prstGeom>
+          <a:effectLst>
+            <a:outerShdw blurRad="50800" dist="38100" dir="2700000" algn="tl" rotWithShape="0">
+              <a:prstClr val="black">
+                <a:alpha val="40000"/>
+              </a:prstClr>
+            </a:outerShdw>
+          </a:effectLst>
+        </p:spPr>
+      </p:pic>
+    </p:spTree>
+    <p:extLst>
+      <p:ext uri="{BB962C8B-B14F-4D97-AF65-F5344CB8AC3E}">
+        <p14:creationId xmlns:p14="http://schemas.microsoft.com/office/powerpoint/2010/main" val="718425353"/>
+      </p:ext>
+    </p:extLst>
+  </p:cSld>
+  <p:clrMapOvr>
+    <a:masterClrMapping/>
+  </p:clrMapOvr>
+  <p:timing>
+    <p:tnLst>
+      <p:par>
+        <p:cTn id="1" dur="indefinite" restart="never" nodeType="tmRoot">
+          <p:childTnLst>
+            <p:seq concurrent="1" nextAc="seek">
+              <p:cTn id="2" dur="indefinite" nodeType="mainSeq">
+                <p:childTnLst>
+                  <p:par>
+                    <p:cTn id="3" fill="hold">
+                      <p:stCondLst>
+                        <p:cond delay="indefinite"/>
+                        <p:cond evt="onBegin" delay="0">
+                          <p:tn val="2"/>
+                        </p:cond>
+                      </p:stCondLst>
+                      <p:childTnLst>
+                        <p:par>
+                          <p:cTn id="4" fill="hold">
+                            <p:stCondLst>
+                              <p:cond delay="0"/>
+                            </p:stCondLst>
+                            <p:childTnLst>
+                              <p:par>
+                                <p:cTn id="5" presetID="1" presetClass="entr" presetSubtype="0" fill="hold" grpId="0" nodeType="withEffect">
+                                  <p:stCondLst>
+                                    <p:cond delay="0"/>
+                                  </p:stCondLst>
+                                  <p:childTnLst>
+                                    <p:set>
+                                      <p:cBhvr>
+                                        <p:cTn id="6" dur="1" fill="hold">
+                                          <p:stCondLst>
+                                            <p:cond delay="0"/>
+                                          </p:stCondLst>
+                                        </p:cTn>
+                                        <p:tgtEl>
+                                          <p:spTgt spid="5"/>
+                                        </p:tgtEl>
+                                        <p:attrNameLst>
+                                          <p:attrName>style.visibility</p:attrName>
+                                        </p:attrNameLst>
+                                      </p:cBhvr>
+                                      <p:to>
+                                        <p:strVal val="visible"/>
+                                      </p:to>
+                                    </p:set>
+                                  </p:childTnLst>
+                                </p:cTn>
+                              </p:par>
+                              <p:par>
+                                <p:cTn id="7" presetID="1" presetClass="entr" presetSubtype="0" fill="hold" nodeType="withEffect">
+                                  <p:stCondLst>
+                                    <p:cond delay="0"/>
+                                  </p:stCondLst>
+                                  <p:childTnLst>
+                                    <p:set>
+                                      <p:cBhvr>
+                                        <p:cTn id="8" dur="1" fill="hold">
+                                          <p:stCondLst>
+                                            <p:cond delay="0"/>
+                                          </p:stCondLst>
+                                        </p:cTn>
+                                        <p:tgtEl>
+                                          <p:spTgt spid="6"/>
+                                        </p:tgtEl>
+                                        <p:attrNameLst>
+                                          <p:attrName>style.visibility</p:attrName>
+                                        </p:attrNameLst>
+                                      </p:cBhvr>
+                                      <p:to>
+                                        <p:strVal val="visible"/>
+                                      </p:to>
+                                    </p:set>
+                                  </p:childTnLst>
+                                </p:cTn>
+                              </p:par>
+                            </p:childTnLst>
+                          </p:cTn>
+                        </p:par>
+                      </p:childTnLst>
+                    </p:cTn>
+                  </p:par>
+                </p:childTnLst>
+              </p:cTn>
+              <p:prevCondLst>
+                <p:cond evt="onPrev" delay="0">
+                  <p:tgtEl>
+                    <p:sldTgt/>
+                  </p:tgtEl>
+                </p:cond>
+              </p:prevCondLst>
+              <p:nextCondLst>
+                <p:cond evt="onNext" delay="0">
+                  <p:tgtEl>
+                    <p:sldTgt/>
+                  </p:tgtEl>
+                </p:cond>
+              </p:nextCondLst>
+            </p:seq>
+          </p:childTnLst>
+        </p:cTn>
+      </p:par>
+    </p:tnLst>
+    <p:bldLst>
+      <p:bldP spid="5" grpId="0" animBg="1"/>
+    </p:bldLst>
+  </p:timing>
+</p:sld>
+</file>
+
+<file path=ppt/slides/slide9.xml><?xml version="1.0" encoding="utf-8"?>
+<p:sld xmlns:a="http://schemas.openxmlformats.org/drawingml/2006/main" xmlns:r="http://schemas.openxmlformats.org/officeDocument/2006/relationships" xmlns:p="http://schemas.openxmlformats.org/presentationml/2006/main">
+  <p:cSld>
+    <p:spTree>
+      <p:nvGrpSpPr>
+        <p:cNvPr id="1" name=""/>
+        <p:cNvGrpSpPr/>
+        <p:nvPr/>
+      </p:nvGrpSpPr>
+      <p:grpSpPr>
+        <a:xfrm>
+          <a:off x="0" y="0"/>
+          <a:ext cx="0" cy="0"/>
+          <a:chOff x="0" y="0"/>
+          <a:chExt cx="0" cy="0"/>
+        </a:xfrm>
+      </p:grpSpPr>
+      <p:sp>
+        <p:nvSpPr>
+          <p:cNvPr id="2" name="Title 1"/>
+          <p:cNvSpPr>
+            <a:spLocks noGrp="1"/>
+          </p:cNvSpPr>
+          <p:nvPr>
+            <p:ph type="title"/>
+          </p:nvPr>
+        </p:nvSpPr>
+        <p:spPr/>
+        <p:txBody>
+          <a:bodyPr/>
+          <a:lstStyle/>
+          <a:p>
+            <a:r>
+              <a:rPr lang="en-US" dirty="0" smtClean="0"/>
+              <a:t>Further reading</a:t>
+            </a:r>
+            <a:endParaRPr lang="en-US" dirty="0"/>
+          </a:p>
+        </p:txBody>
+      </p:sp>
+      <p:sp>
+        <p:nvSpPr>
+          <p:cNvPr id="3" name="Content Placeholder 2"/>
+          <p:cNvSpPr>
+            <a:spLocks noGrp="1"/>
+          </p:cNvSpPr>
+          <p:nvPr>
+            <p:ph idx="1"/>
+          </p:nvPr>
+        </p:nvSpPr>
+        <p:spPr/>
+        <p:txBody>
+          <a:bodyPr/>
+          <a:lstStyle/>
+          <a:p>
+            <a:r>
+              <a:rPr lang="en-US" dirty="0" smtClean="0"/>
+              <a:t>Fiona manual</a:t>
+            </a:r>
+            <a:r>
+              <a:rPr lang="en-US" dirty="0"/>
+              <a:t/>
+            </a:r>
+            <a:br>
+              <a:rPr lang="en-US" dirty="0"/>
+            </a:br>
+            <a:r>
+              <a:rPr lang="en-US" sz="2000" dirty="0">
+                <a:hlinkClick r:id="rId2"/>
+              </a:rPr>
+              <a:t>http://</a:t>
+            </a:r>
+            <a:r>
+              <a:rPr lang="en-US" sz="2000" dirty="0" smtClean="0">
+                <a:hlinkClick r:id="rId2"/>
+              </a:rPr>
+              <a:t>toblerity.org/fiona/index.html</a:t>
+            </a:r>
+            <a:endParaRPr lang="en-US" sz="2000" dirty="0" smtClean="0"/>
+          </a:p>
+          <a:p>
+            <a:r>
+              <a:rPr lang="en-US" dirty="0"/>
+              <a:t>Folium manual</a:t>
+            </a:r>
+            <a:br>
+              <a:rPr lang="en-US" dirty="0"/>
+            </a:br>
+            <a:r>
+              <a:rPr lang="en-US" sz="2000" dirty="0">
+                <a:hlinkClick r:id="rId3"/>
+              </a:rPr>
+              <a:t>http://python-visualization.github.io/folium/docs-master</a:t>
+            </a:r>
+            <a:r>
+              <a:rPr lang="en-US" sz="2000" dirty="0" smtClean="0">
+                <a:hlinkClick r:id="rId3"/>
+              </a:rPr>
+              <a:t>/</a:t>
+            </a:r>
+            <a:r>
+              <a:rPr lang="en-US" sz="2000" dirty="0" smtClean="0"/>
+              <a:t> </a:t>
+            </a:r>
+            <a:endParaRPr lang="en-US" dirty="0"/>
+          </a:p>
+          <a:p>
+            <a:r>
+              <a:rPr lang="en-US" dirty="0" smtClean="0"/>
+              <a:t>Shapely manual</a:t>
+            </a:r>
+            <a:br>
+              <a:rPr lang="en-US" dirty="0" smtClean="0"/>
+            </a:br>
+            <a:r>
+              <a:rPr lang="en-US" sz="2000" dirty="0">
+                <a:hlinkClick r:id="rId4"/>
+              </a:rPr>
+              <a:t>https://shapely.readthedocs.io/en/latest</a:t>
+            </a:r>
+            <a:r>
+              <a:rPr lang="en-US" sz="2000" dirty="0" smtClean="0">
+                <a:hlinkClick r:id="rId4"/>
+              </a:rPr>
+              <a:t>/</a:t>
+            </a:r>
+            <a:endParaRPr lang="en-US" sz="2000" dirty="0" smtClean="0"/>
+          </a:p>
+          <a:p>
+            <a:endParaRPr lang="en-US" dirty="0" smtClean="0"/>
+          </a:p>
+        </p:txBody>
+      </p:sp>
+      <p:sp>
+        <p:nvSpPr>
+          <p:cNvPr id="4" name="Slide Number Placeholder 3"/>
+          <p:cNvSpPr>
+            <a:spLocks noGrp="1"/>
+          </p:cNvSpPr>
+          <p:nvPr>
+            <p:ph type="sldNum" sz="quarter" idx="12"/>
+          </p:nvPr>
+        </p:nvSpPr>
+        <p:spPr/>
+        <p:txBody>
+          <a:bodyPr/>
+          <a:lstStyle/>
+          <a:p>
+            <a:fld id="{5A209D72-2E9D-49B0-8977-41DCCC66C0BB}" type="slidenum">
+              <a:rPr lang="nl-BE" smtClean="0">
+                <a:solidFill>
+                  <a:prstClr val="black">
+                    <a:tint val="75000"/>
+                  </a:prstClr>
+                </a:solidFill>
+              </a:rPr>
+              <a:pPr/>
+              <a:t>9</a:t>
             </a:fld>
             <a:endParaRPr lang="nl-BE">
               <a:solidFill>

</xml_diff>

<commit_message>
Add Shapely object examples slide
</commit_message>
<xml_diff>
--- a/Python/python_gis.pptx
+++ b/Python/python_gis.pptx
@@ -8716,7 +8716,15 @@
           <a:p>
             <a:r>
               <a:rPr lang="en-US" dirty="0" smtClean="0"/>
-              <a:t>Shapely objects examples</a:t>
+              <a:t>Shapely </a:t>
+            </a:r>
+            <a:r>
+              <a:rPr lang="en-US" dirty="0" smtClean="0"/>
+              <a:t>object </a:t>
+            </a:r>
+            <a:r>
+              <a:rPr lang="en-US" dirty="0" smtClean="0"/>
+              <a:t>examples</a:t>
             </a:r>
             <a:endParaRPr lang="en-US" dirty="0"/>
           </a:p>
@@ -8759,6 +8767,37 @@
                 <a:cs typeface="Courier New" panose="02070309020205020404" pitchFamily="49" charset="0"/>
               </a:rPr>
               <a:t>LinearRing</a:t>
+            </a:r>
+            <a:endParaRPr lang="en-US" dirty="0" smtClean="0">
+              <a:latin typeface="Courier New" panose="02070309020205020404" pitchFamily="49" charset="0"/>
+              <a:cs typeface="Courier New" panose="02070309020205020404" pitchFamily="49" charset="0"/>
+            </a:endParaRPr>
+          </a:p>
+          <a:p>
+            <a:endParaRPr lang="en-US" dirty="0">
+              <a:latin typeface="Courier New" panose="02070309020205020404" pitchFamily="49" charset="0"/>
+              <a:cs typeface="Courier New" panose="02070309020205020404" pitchFamily="49" charset="0"/>
+            </a:endParaRPr>
+          </a:p>
+          <a:p>
+            <a:endParaRPr lang="en-US" dirty="0" smtClean="0">
+              <a:latin typeface="Courier New" panose="02070309020205020404" pitchFamily="49" charset="0"/>
+              <a:cs typeface="Courier New" panose="02070309020205020404" pitchFamily="49" charset="0"/>
+            </a:endParaRPr>
+          </a:p>
+          <a:p>
+            <a:endParaRPr lang="en-US" dirty="0">
+              <a:latin typeface="Courier New" panose="02070309020205020404" pitchFamily="49" charset="0"/>
+              <a:cs typeface="Courier New" panose="02070309020205020404" pitchFamily="49" charset="0"/>
+            </a:endParaRPr>
+          </a:p>
+          <a:p>
+            <a:r>
+              <a:rPr lang="en-US" dirty="0" smtClean="0">
+                <a:latin typeface="Courier New" panose="02070309020205020404" pitchFamily="49" charset="0"/>
+                <a:cs typeface="Courier New" panose="02070309020205020404" pitchFamily="49" charset="0"/>
+              </a:rPr>
+              <a:t>Polygon</a:t>
             </a:r>
             <a:endParaRPr lang="en-US" dirty="0">
               <a:latin typeface="Courier New" panose="02070309020205020404" pitchFamily="49" charset="0"/>
@@ -8856,12 +8895,15 @@
                 <a:latin typeface="Courier New" pitchFamily="49" charset="0"/>
                 <a:cs typeface="Courier New" pitchFamily="49" charset="0"/>
               </a:rPr>
-              <a:t>([(0.0, 0.0), (1.0, 1.0), (2.0, 0.5)])</a:t>
-            </a:r>
-            <a:endParaRPr lang="en-US" dirty="0" smtClean="0">
-              <a:latin typeface="Courier New" pitchFamily="49" charset="0"/>
-              <a:cs typeface="Courier New" pitchFamily="49" charset="0"/>
-            </a:endParaRPr>
+              <a:t>([(0.0, 0.0), (1.0, 1.0), (2.0, 0.5</a:t>
+            </a:r>
+            <a:r>
+              <a:rPr lang="en-US" dirty="0" smtClean="0">
+                <a:latin typeface="Courier New" pitchFamily="49" charset="0"/>
+                <a:cs typeface="Courier New" pitchFamily="49" charset="0"/>
+              </a:rPr>
+              <a:t>)])</a:t>
+            </a:r>
           </a:p>
         </p:txBody>
       </p:sp>
@@ -8889,6 +8931,356 @@
           <a:xfrm>
             <a:off x="7401132" y="1457406"/>
             <a:ext cx="1033374" cy="555830"/>
+          </a:xfrm>
+          <a:prstGeom prst="rect">
+            <a:avLst/>
+          </a:prstGeom>
+          <a:effectLst>
+            <a:outerShdw blurRad="50800" dist="38100" dir="2700000" algn="tl" rotWithShape="0">
+              <a:prstClr val="black">
+                <a:alpha val="40000"/>
+              </a:prstClr>
+            </a:outerShdw>
+          </a:effectLst>
+        </p:spPr>
+      </p:pic>
+      <p:sp>
+        <p:nvSpPr>
+          <p:cNvPr id="7" name="TextBox 6"/>
+          <p:cNvSpPr txBox="1"/>
+          <p:nvPr/>
+        </p:nvSpPr>
+        <p:spPr>
+          <a:xfrm>
+            <a:off x="782173" y="3411557"/>
+            <a:ext cx="8155349" cy="1754326"/>
+          </a:xfrm>
+          <a:prstGeom prst="rect">
+            <a:avLst/>
+          </a:prstGeom>
+          <a:solidFill>
+            <a:schemeClr val="accent4">
+              <a:lumMod val="40000"/>
+              <a:lumOff val="60000"/>
+            </a:schemeClr>
+          </a:solidFill>
+        </p:spPr>
+        <p:txBody>
+          <a:bodyPr wrap="square" rtlCol="0">
+            <a:spAutoFit/>
+          </a:bodyPr>
+          <a:lstStyle/>
+          <a:p>
+            <a:r>
+              <a:rPr lang="en-US" dirty="0" smtClean="0">
+                <a:latin typeface="Courier New" pitchFamily="49" charset="0"/>
+                <a:cs typeface="Courier New" pitchFamily="49" charset="0"/>
+              </a:rPr>
+              <a:t>outer </a:t>
+            </a:r>
+            <a:r>
+              <a:rPr lang="en-US" dirty="0">
+                <a:latin typeface="Courier New" pitchFamily="49" charset="0"/>
+                <a:cs typeface="Courier New" pitchFamily="49" charset="0"/>
+              </a:rPr>
+              <a:t>= </a:t>
+            </a:r>
+            <a:r>
+              <a:rPr lang="en-US" dirty="0" err="1">
+                <a:latin typeface="Courier New" pitchFamily="49" charset="0"/>
+                <a:cs typeface="Courier New" pitchFamily="49" charset="0"/>
+              </a:rPr>
+              <a:t>LinearRing</a:t>
+            </a:r>
+            <a:r>
+              <a:rPr lang="en-US" dirty="0">
+                <a:latin typeface="Courier New" pitchFamily="49" charset="0"/>
+                <a:cs typeface="Courier New" pitchFamily="49" charset="0"/>
+              </a:rPr>
+              <a:t>([(3.0, 2.0), (3.0, 5.0), (6.0, 5.0</a:t>
+            </a:r>
+            <a:r>
+              <a:rPr lang="en-US" dirty="0" smtClean="0">
+                <a:latin typeface="Courier New" pitchFamily="49" charset="0"/>
+                <a:cs typeface="Courier New" pitchFamily="49" charset="0"/>
+              </a:rPr>
+              <a:t>),</a:t>
+            </a:r>
+          </a:p>
+          <a:p>
+            <a:r>
+              <a:rPr lang="en-US" dirty="0">
+                <a:latin typeface="Courier New" pitchFamily="49" charset="0"/>
+                <a:cs typeface="Courier New" pitchFamily="49" charset="0"/>
+              </a:rPr>
+              <a:t> </a:t>
+            </a:r>
+            <a:r>
+              <a:rPr lang="en-US" dirty="0" smtClean="0">
+                <a:latin typeface="Courier New" pitchFamily="49" charset="0"/>
+                <a:cs typeface="Courier New" pitchFamily="49" charset="0"/>
+              </a:rPr>
+              <a:t>                   </a:t>
+            </a:r>
+            <a:r>
+              <a:rPr lang="en-US" dirty="0">
+                <a:latin typeface="Courier New" pitchFamily="49" charset="0"/>
+                <a:cs typeface="Courier New" pitchFamily="49" charset="0"/>
+              </a:rPr>
+              <a:t>(6.0, 2.0</a:t>
+            </a:r>
+            <a:r>
+              <a:rPr lang="en-US" dirty="0" smtClean="0">
+                <a:latin typeface="Courier New" pitchFamily="49" charset="0"/>
+                <a:cs typeface="Courier New" pitchFamily="49" charset="0"/>
+              </a:rPr>
+              <a:t>)])</a:t>
+            </a:r>
+          </a:p>
+          <a:p>
+            <a:r>
+              <a:rPr lang="en-US" dirty="0" smtClean="0">
+                <a:latin typeface="Courier New" pitchFamily="49" charset="0"/>
+                <a:cs typeface="Courier New" pitchFamily="49" charset="0"/>
+              </a:rPr>
+              <a:t>inner1 </a:t>
+            </a:r>
+            <a:r>
+              <a:rPr lang="en-US" dirty="0">
+                <a:latin typeface="Courier New" pitchFamily="49" charset="0"/>
+                <a:cs typeface="Courier New" pitchFamily="49" charset="0"/>
+              </a:rPr>
+              <a:t>= </a:t>
+            </a:r>
+            <a:r>
+              <a:rPr lang="en-US" dirty="0" err="1">
+                <a:latin typeface="Courier New" pitchFamily="49" charset="0"/>
+                <a:cs typeface="Courier New" pitchFamily="49" charset="0"/>
+              </a:rPr>
+              <a:t>LinearRing</a:t>
+            </a:r>
+            <a:r>
+              <a:rPr lang="en-US" dirty="0">
+                <a:latin typeface="Courier New" pitchFamily="49" charset="0"/>
+                <a:cs typeface="Courier New" pitchFamily="49" charset="0"/>
+              </a:rPr>
+              <a:t>([(3.5, 2.5), (3.5, 4.5), (4.5, 4.5</a:t>
+            </a:r>
+            <a:r>
+              <a:rPr lang="en-US" dirty="0" smtClean="0">
+                <a:latin typeface="Courier New" pitchFamily="49" charset="0"/>
+                <a:cs typeface="Courier New" pitchFamily="49" charset="0"/>
+              </a:rPr>
+              <a:t>),</a:t>
+            </a:r>
+          </a:p>
+          <a:p>
+            <a:r>
+              <a:rPr lang="en-US" dirty="0">
+                <a:latin typeface="Courier New" pitchFamily="49" charset="0"/>
+                <a:cs typeface="Courier New" pitchFamily="49" charset="0"/>
+              </a:rPr>
+              <a:t> </a:t>
+            </a:r>
+            <a:r>
+              <a:rPr lang="en-US" dirty="0" smtClean="0">
+                <a:latin typeface="Courier New" pitchFamily="49" charset="0"/>
+                <a:cs typeface="Courier New" pitchFamily="49" charset="0"/>
+              </a:rPr>
+              <a:t>                    </a:t>
+            </a:r>
+            <a:r>
+              <a:rPr lang="en-US" dirty="0">
+                <a:latin typeface="Courier New" pitchFamily="49" charset="0"/>
+                <a:cs typeface="Courier New" pitchFamily="49" charset="0"/>
+              </a:rPr>
+              <a:t>(4.5, 2.5</a:t>
+            </a:r>
+            <a:r>
+              <a:rPr lang="en-US" dirty="0" smtClean="0">
+                <a:latin typeface="Courier New" pitchFamily="49" charset="0"/>
+                <a:cs typeface="Courier New" pitchFamily="49" charset="0"/>
+              </a:rPr>
+              <a:t>)])</a:t>
+            </a:r>
+          </a:p>
+          <a:p>
+            <a:r>
+              <a:rPr lang="en-US" dirty="0" smtClean="0">
+                <a:latin typeface="Courier New" pitchFamily="49" charset="0"/>
+                <a:cs typeface="Courier New" pitchFamily="49" charset="0"/>
+              </a:rPr>
+              <a:t>inner2 </a:t>
+            </a:r>
+            <a:r>
+              <a:rPr lang="en-US" dirty="0">
+                <a:latin typeface="Courier New" pitchFamily="49" charset="0"/>
+                <a:cs typeface="Courier New" pitchFamily="49" charset="0"/>
+              </a:rPr>
+              <a:t>= </a:t>
+            </a:r>
+            <a:r>
+              <a:rPr lang="en-US" dirty="0" err="1">
+                <a:latin typeface="Courier New" pitchFamily="49" charset="0"/>
+                <a:cs typeface="Courier New" pitchFamily="49" charset="0"/>
+              </a:rPr>
+              <a:t>LinearRing</a:t>
+            </a:r>
+            <a:r>
+              <a:rPr lang="en-US" dirty="0">
+                <a:latin typeface="Courier New" pitchFamily="49" charset="0"/>
+                <a:cs typeface="Courier New" pitchFamily="49" charset="0"/>
+              </a:rPr>
+              <a:t>([(5.0, 2.5), (5.0, 4.5), (5.5, 4.5</a:t>
+            </a:r>
+            <a:r>
+              <a:rPr lang="en-US" dirty="0" smtClean="0">
+                <a:latin typeface="Courier New" pitchFamily="49" charset="0"/>
+                <a:cs typeface="Courier New" pitchFamily="49" charset="0"/>
+              </a:rPr>
+              <a:t>),</a:t>
+            </a:r>
+            <a:br>
+              <a:rPr lang="en-US" dirty="0" smtClean="0">
+                <a:latin typeface="Courier New" pitchFamily="49" charset="0"/>
+                <a:cs typeface="Courier New" pitchFamily="49" charset="0"/>
+              </a:rPr>
+            </a:br>
+            <a:r>
+              <a:rPr lang="en-US" dirty="0" smtClean="0">
+                <a:latin typeface="Courier New" pitchFamily="49" charset="0"/>
+                <a:cs typeface="Courier New" pitchFamily="49" charset="0"/>
+              </a:rPr>
+              <a:t>                     </a:t>
+            </a:r>
+            <a:r>
+              <a:rPr lang="en-US" dirty="0">
+                <a:latin typeface="Courier New" pitchFamily="49" charset="0"/>
+                <a:cs typeface="Courier New" pitchFamily="49" charset="0"/>
+              </a:rPr>
+              <a:t>(5.5, 2.5)])</a:t>
+            </a:r>
+            <a:endParaRPr lang="en-US" dirty="0" smtClean="0">
+              <a:latin typeface="Courier New" pitchFamily="49" charset="0"/>
+              <a:cs typeface="Courier New" pitchFamily="49" charset="0"/>
+            </a:endParaRPr>
+          </a:p>
+        </p:txBody>
+      </p:sp>
+      <p:sp>
+        <p:nvSpPr>
+          <p:cNvPr id="8" name="TextBox 7"/>
+          <p:cNvSpPr txBox="1"/>
+          <p:nvPr/>
+        </p:nvSpPr>
+        <p:spPr>
+          <a:xfrm>
+            <a:off x="782172" y="5782463"/>
+            <a:ext cx="8155349" cy="369332"/>
+          </a:xfrm>
+          <a:prstGeom prst="rect">
+            <a:avLst/>
+          </a:prstGeom>
+          <a:solidFill>
+            <a:schemeClr val="accent4">
+              <a:lumMod val="40000"/>
+              <a:lumOff val="60000"/>
+            </a:schemeClr>
+          </a:solidFill>
+        </p:spPr>
+        <p:txBody>
+          <a:bodyPr wrap="square" rtlCol="0">
+            <a:spAutoFit/>
+          </a:bodyPr>
+          <a:lstStyle/>
+          <a:p>
+            <a:r>
+              <a:rPr lang="en-US" dirty="0" smtClean="0">
+                <a:latin typeface="Courier New" pitchFamily="49" charset="0"/>
+                <a:cs typeface="Courier New" pitchFamily="49" charset="0"/>
+              </a:rPr>
+              <a:t>polygon </a:t>
+            </a:r>
+            <a:r>
+              <a:rPr lang="en-US" dirty="0">
+                <a:latin typeface="Courier New" pitchFamily="49" charset="0"/>
+                <a:cs typeface="Courier New" pitchFamily="49" charset="0"/>
+              </a:rPr>
+              <a:t>= </a:t>
+            </a:r>
+            <a:r>
+              <a:rPr lang="en-US" dirty="0" smtClean="0">
+                <a:latin typeface="Courier New" pitchFamily="49" charset="0"/>
+                <a:cs typeface="Courier New" pitchFamily="49" charset="0"/>
+              </a:rPr>
+              <a:t>Polygon(outer</a:t>
+            </a:r>
+            <a:r>
+              <a:rPr lang="en-US" dirty="0">
+                <a:latin typeface="Courier New" pitchFamily="49" charset="0"/>
+                <a:cs typeface="Courier New" pitchFamily="49" charset="0"/>
+              </a:rPr>
+              <a:t>, </a:t>
+            </a:r>
+            <a:r>
+              <a:rPr lang="en-US" dirty="0" smtClean="0">
+                <a:latin typeface="Courier New" pitchFamily="49" charset="0"/>
+                <a:cs typeface="Courier New" pitchFamily="49" charset="0"/>
+              </a:rPr>
+              <a:t>inner1</a:t>
+            </a:r>
+            <a:r>
+              <a:rPr lang="en-US" dirty="0">
+                <a:latin typeface="Courier New" pitchFamily="49" charset="0"/>
+                <a:cs typeface="Courier New" pitchFamily="49" charset="0"/>
+              </a:rPr>
+              <a:t>, </a:t>
+            </a:r>
+            <a:r>
+              <a:rPr lang="en-US" dirty="0" smtClean="0">
+                <a:latin typeface="Courier New" pitchFamily="49" charset="0"/>
+                <a:cs typeface="Courier New" pitchFamily="49" charset="0"/>
+              </a:rPr>
+              <a:t>inner2</a:t>
+            </a:r>
+            <a:r>
+              <a:rPr lang="en-US" dirty="0">
+                <a:latin typeface="Courier New" pitchFamily="49" charset="0"/>
+                <a:cs typeface="Courier New" pitchFamily="49" charset="0"/>
+              </a:rPr>
+              <a:t>])</a:t>
+            </a:r>
+            <a:endParaRPr lang="en-US" dirty="0" smtClean="0">
+              <a:latin typeface="Courier New" pitchFamily="49" charset="0"/>
+              <a:cs typeface="Courier New" pitchFamily="49" charset="0"/>
+            </a:endParaRPr>
+          </a:p>
+        </p:txBody>
+      </p:sp>
+      <p:pic>
+        <p:nvPicPr>
+          <p:cNvPr id="9" name="Picture 8"/>
+          <p:cNvPicPr>
+            <a:picLocks noChangeAspect="1"/>
+          </p:cNvPicPr>
+          <p:nvPr/>
+        </p:nvPicPr>
+        <p:blipFill>
+          <a:blip r:embed="rId3">
+            <a:extLst>
+              <a:ext uri="{28A0092B-C50C-407E-A947-70E740481C1C}">
+                <a14:useLocalDpi xmlns:a14="http://schemas.microsoft.com/office/drawing/2010/main" val="0"/>
+              </a:ext>
+            </a:extLst>
+          </a:blip>
+          <a:stretch>
+            <a:fillRect/>
+          </a:stretch>
+        </p:blipFill>
+        <p:spPr>
+          <a:xfrm>
+            <a:off x="7000431" y="5504882"/>
+            <a:ext cx="801402" cy="795141"/>
           </a:xfrm>
           <a:prstGeom prst="rect">
             <a:avLst/>
@@ -8949,6 +9341,37 @@
                                           </p:stCondLst>
                                         </p:cTn>
                                         <p:tgtEl>
+                                          <p:spTgt spid="3">
+                                            <p:txEl>
+                                              <p:pRg st="0" end="0"/>
+                                            </p:txEl>
+                                          </p:spTgt>
+                                        </p:tgtEl>
+                                        <p:attrNameLst>
+                                          <p:attrName>style.visibility</p:attrName>
+                                        </p:attrNameLst>
+                                      </p:cBhvr>
+                                      <p:to>
+                                        <p:strVal val="visible"/>
+                                      </p:to>
+                                    </p:set>
+                                  </p:childTnLst>
+                                </p:cTn>
+                              </p:par>
+                              <p:par>
+                                <p:cTn id="7" presetID="1" presetClass="entr" presetSubtype="0" fill="hold" grpId="0" nodeType="withEffect">
+                                  <p:stCondLst>
+                                    <p:cond delay="0"/>
+                                  </p:stCondLst>
+                                  <p:childTnLst>
+                                    <p:set>
+                                      <p:cBhvr>
+                                        <p:cTn id="8" dur="1" fill="hold">
+                                          <p:stCondLst>
+                                            <p:cond delay="0"/>
+                                          </p:stCondLst>
+                                        </p:cTn>
+                                        <p:tgtEl>
                                           <p:spTgt spid="5"/>
                                         </p:tgtEl>
                                         <p:attrNameLst>
@@ -8962,21 +9385,236 @@
                                   </p:childTnLst>
                                 </p:cTn>
                               </p:par>
+                            </p:childTnLst>
+                          </p:cTn>
+                        </p:par>
+                      </p:childTnLst>
+                    </p:cTn>
+                  </p:par>
+                  <p:par>
+                    <p:cTn id="9" fill="hold">
+                      <p:stCondLst>
+                        <p:cond delay="indefinite"/>
+                      </p:stCondLst>
+                      <p:childTnLst>
+                        <p:par>
+                          <p:cTn id="10" fill="hold">
+                            <p:stCondLst>
+                              <p:cond delay="0"/>
+                            </p:stCondLst>
+                            <p:childTnLst>
                               <p:par>
-                                <p:cTn id="7" presetID="1" presetClass="entr" presetSubtype="0" fill="hold" nodeType="withEffect">
+                                <p:cTn id="11" presetID="1" presetClass="entr" presetSubtype="0" fill="hold" nodeType="clickEffect">
                                   <p:stCondLst>
                                     <p:cond delay="0"/>
                                   </p:stCondLst>
                                   <p:childTnLst>
                                     <p:set>
                                       <p:cBhvr>
-                                        <p:cTn id="8" dur="1" fill="hold">
+                                        <p:cTn id="12" dur="1" fill="hold">
                                           <p:stCondLst>
                                             <p:cond delay="0"/>
                                           </p:stCondLst>
                                         </p:cTn>
                                         <p:tgtEl>
                                           <p:spTgt spid="6"/>
+                                        </p:tgtEl>
+                                        <p:attrNameLst>
+                                          <p:attrName>style.visibility</p:attrName>
+                                        </p:attrNameLst>
+                                      </p:cBhvr>
+                                      <p:to>
+                                        <p:strVal val="visible"/>
+                                      </p:to>
+                                    </p:set>
+                                  </p:childTnLst>
+                                </p:cTn>
+                              </p:par>
+                            </p:childTnLst>
+                          </p:cTn>
+                        </p:par>
+                      </p:childTnLst>
+                    </p:cTn>
+                  </p:par>
+                  <p:par>
+                    <p:cTn id="13" fill="hold">
+                      <p:stCondLst>
+                        <p:cond delay="indefinite"/>
+                      </p:stCondLst>
+                      <p:childTnLst>
+                        <p:par>
+                          <p:cTn id="14" fill="hold">
+                            <p:stCondLst>
+                              <p:cond delay="0"/>
+                            </p:stCondLst>
+                            <p:childTnLst>
+                              <p:par>
+                                <p:cTn id="15" presetID="1" presetClass="entr" presetSubtype="0" fill="hold" grpId="0" nodeType="clickEffect">
+                                  <p:stCondLst>
+                                    <p:cond delay="0"/>
+                                  </p:stCondLst>
+                                  <p:childTnLst>
+                                    <p:set>
+                                      <p:cBhvr>
+                                        <p:cTn id="16" dur="1" fill="hold">
+                                          <p:stCondLst>
+                                            <p:cond delay="0"/>
+                                          </p:stCondLst>
+                                        </p:cTn>
+                                        <p:tgtEl>
+                                          <p:spTgt spid="3">
+                                            <p:txEl>
+                                              <p:pRg st="2" end="2"/>
+                                            </p:txEl>
+                                          </p:spTgt>
+                                        </p:tgtEl>
+                                        <p:attrNameLst>
+                                          <p:attrName>style.visibility</p:attrName>
+                                        </p:attrNameLst>
+                                      </p:cBhvr>
+                                      <p:to>
+                                        <p:strVal val="visible"/>
+                                      </p:to>
+                                    </p:set>
+                                  </p:childTnLst>
+                                </p:cTn>
+                              </p:par>
+                              <p:par>
+                                <p:cTn id="17" presetID="1" presetClass="entr" presetSubtype="0" fill="hold" grpId="0" nodeType="withEffect">
+                                  <p:stCondLst>
+                                    <p:cond delay="0"/>
+                                  </p:stCondLst>
+                                  <p:childTnLst>
+                                    <p:set>
+                                      <p:cBhvr>
+                                        <p:cTn id="18" dur="1" fill="hold">
+                                          <p:stCondLst>
+                                            <p:cond delay="0"/>
+                                          </p:stCondLst>
+                                        </p:cTn>
+                                        <p:tgtEl>
+                                          <p:spTgt spid="7"/>
+                                        </p:tgtEl>
+                                        <p:attrNameLst>
+                                          <p:attrName>style.visibility</p:attrName>
+                                        </p:attrNameLst>
+                                      </p:cBhvr>
+                                      <p:to>
+                                        <p:strVal val="visible"/>
+                                      </p:to>
+                                    </p:set>
+                                  </p:childTnLst>
+                                </p:cTn>
+                              </p:par>
+                            </p:childTnLst>
+                          </p:cTn>
+                        </p:par>
+                      </p:childTnLst>
+                    </p:cTn>
+                  </p:par>
+                  <p:par>
+                    <p:cTn id="19" fill="hold">
+                      <p:stCondLst>
+                        <p:cond delay="indefinite"/>
+                      </p:stCondLst>
+                      <p:childTnLst>
+                        <p:par>
+                          <p:cTn id="20" fill="hold">
+                            <p:stCondLst>
+                              <p:cond delay="0"/>
+                            </p:stCondLst>
+                            <p:childTnLst>
+                              <p:par>
+                                <p:cTn id="21" presetID="1" presetClass="entr" presetSubtype="0" fill="hold" grpId="0" nodeType="clickEffect">
+                                  <p:stCondLst>
+                                    <p:cond delay="0"/>
+                                  </p:stCondLst>
+                                  <p:childTnLst>
+                                    <p:set>
+                                      <p:cBhvr>
+                                        <p:cTn id="22" dur="1" fill="hold">
+                                          <p:stCondLst>
+                                            <p:cond delay="0"/>
+                                          </p:stCondLst>
+                                        </p:cTn>
+                                        <p:tgtEl>
+                                          <p:spTgt spid="3">
+                                            <p:txEl>
+                                              <p:pRg st="6" end="6"/>
+                                            </p:txEl>
+                                          </p:spTgt>
+                                        </p:tgtEl>
+                                        <p:attrNameLst>
+                                          <p:attrName>style.visibility</p:attrName>
+                                        </p:attrNameLst>
+                                      </p:cBhvr>
+                                      <p:to>
+                                        <p:strVal val="visible"/>
+                                      </p:to>
+                                    </p:set>
+                                  </p:childTnLst>
+                                </p:cTn>
+                              </p:par>
+                              <p:par>
+                                <p:cTn id="23" presetID="1" presetClass="entr" presetSubtype="0" fill="hold" grpId="0" nodeType="withEffect">
+                                  <p:stCondLst>
+                                    <p:cond delay="0"/>
+                                  </p:stCondLst>
+                                  <p:childTnLst>
+                                    <p:set>
+                                      <p:cBhvr>
+                                        <p:cTn id="24" dur="1" fill="hold">
+                                          <p:stCondLst>
+                                            <p:cond delay="0"/>
+                                          </p:stCondLst>
+                                        </p:cTn>
+                                        <p:tgtEl>
+                                          <p:spTgt spid="8"/>
+                                        </p:tgtEl>
+                                        <p:attrNameLst>
+                                          <p:attrName>style.visibility</p:attrName>
+                                        </p:attrNameLst>
+                                      </p:cBhvr>
+                                      <p:to>
+                                        <p:strVal val="visible"/>
+                                      </p:to>
+                                    </p:set>
+                                  </p:childTnLst>
+                                </p:cTn>
+                              </p:par>
+                            </p:childTnLst>
+                          </p:cTn>
+                        </p:par>
+                      </p:childTnLst>
+                    </p:cTn>
+                  </p:par>
+                  <p:par>
+                    <p:cTn id="25" fill="hold">
+                      <p:stCondLst>
+                        <p:cond delay="indefinite"/>
+                      </p:stCondLst>
+                      <p:childTnLst>
+                        <p:par>
+                          <p:cTn id="26" fill="hold">
+                            <p:stCondLst>
+                              <p:cond delay="0"/>
+                            </p:stCondLst>
+                            <p:childTnLst>
+                              <p:par>
+                                <p:cTn id="27" presetID="1" presetClass="entr" presetSubtype="0" fill="hold" nodeType="clickEffect">
+                                  <p:stCondLst>
+                                    <p:cond delay="0"/>
+                                  </p:stCondLst>
+                                  <p:childTnLst>
+                                    <p:set>
+                                      <p:cBhvr>
+                                        <p:cTn id="28" dur="1" fill="hold">
+                                          <p:stCondLst>
+                                            <p:cond delay="0"/>
+                                          </p:stCondLst>
+                                        </p:cTn>
+                                        <p:tgtEl>
+                                          <p:spTgt spid="9"/>
                                         </p:tgtEl>
                                         <p:attrNameLst>
                                           <p:attrName>style.visibility</p:attrName>
@@ -9017,7 +9655,10 @@
       </p:par>
     </p:tnLst>
     <p:bldLst>
+      <p:bldP spid="3" grpId="0" uiExpand="1" build="p"/>
       <p:bldP spid="5" grpId="0" animBg="1"/>
+      <p:bldP spid="7" grpId="0" animBg="1"/>
+      <p:bldP spid="8" grpId="0" animBg="1"/>
     </p:bldLst>
   </p:timing>
 </p:sld>

</xml_diff>

<commit_message>
Add slide on Shapely predicates
</commit_message>
<xml_diff>
--- a/Python/python_gis.pptx
+++ b/Python/python_gis.pptx
@@ -206,7 +206,7 @@
           <a:p>
             <a:fld id="{794915E2-5A19-401A-AAB5-929FAFDC4B58}" type="datetimeFigureOut">
               <a:rPr lang="en-US" smtClean="0"/>
-              <a:t>2017-10-26</a:t>
+              <a:t>2017-10-27</a:t>
             </a:fld>
             <a:endParaRPr lang="en-US"/>
           </a:p>
@@ -662,7 +662,7 @@
                 </a:solidFill>
               </a:rPr>
               <a:pPr/>
-              <a:t>26/10/2017</a:t>
+              <a:t>27/10/2017</a:t>
             </a:fld>
             <a:endParaRPr lang="nl-BE">
               <a:solidFill>
@@ -864,7 +864,7 @@
                 </a:solidFill>
               </a:rPr>
               <a:pPr/>
-              <a:t>26/10/2017</a:t>
+              <a:t>27/10/2017</a:t>
             </a:fld>
             <a:endParaRPr lang="nl-BE">
               <a:solidFill>
@@ -1076,7 +1076,7 @@
                 </a:solidFill>
               </a:rPr>
               <a:pPr/>
-              <a:t>26/10/2017</a:t>
+              <a:t>27/10/2017</a:t>
             </a:fld>
             <a:endParaRPr lang="nl-BE">
               <a:solidFill>
@@ -1278,7 +1278,7 @@
                 </a:solidFill>
               </a:rPr>
               <a:pPr/>
-              <a:t>26/10/2017</a:t>
+              <a:t>27/10/2017</a:t>
             </a:fld>
             <a:endParaRPr lang="nl-BE">
               <a:solidFill>
@@ -1556,7 +1556,7 @@
                 </a:solidFill>
               </a:rPr>
               <a:pPr/>
-              <a:t>26/10/2017</a:t>
+              <a:t>27/10/2017</a:t>
             </a:fld>
             <a:endParaRPr lang="nl-BE">
               <a:solidFill>
@@ -1876,7 +1876,7 @@
                 </a:solidFill>
               </a:rPr>
               <a:pPr/>
-              <a:t>26/10/2017</a:t>
+              <a:t>27/10/2017</a:t>
             </a:fld>
             <a:endParaRPr lang="nl-BE">
               <a:solidFill>
@@ -2330,7 +2330,7 @@
                 </a:solidFill>
               </a:rPr>
               <a:pPr/>
-              <a:t>26/10/2017</a:t>
+              <a:t>27/10/2017</a:t>
             </a:fld>
             <a:endParaRPr lang="nl-BE">
               <a:solidFill>
@@ -2480,7 +2480,7 @@
                 </a:solidFill>
               </a:rPr>
               <a:pPr/>
-              <a:t>26/10/2017</a:t>
+              <a:t>27/10/2017</a:t>
             </a:fld>
             <a:endParaRPr lang="nl-BE">
               <a:solidFill>
@@ -2607,7 +2607,7 @@
                 </a:solidFill>
               </a:rPr>
               <a:pPr/>
-              <a:t>26/10/2017</a:t>
+              <a:t>27/10/2017</a:t>
             </a:fld>
             <a:endParaRPr lang="nl-BE">
               <a:solidFill>
@@ -2916,7 +2916,7 @@
                 </a:solidFill>
               </a:rPr>
               <a:pPr/>
-              <a:t>26/10/2017</a:t>
+              <a:t>27/10/2017</a:t>
             </a:fld>
             <a:endParaRPr lang="nl-BE">
               <a:solidFill>
@@ -3201,7 +3201,7 @@
                 </a:solidFill>
               </a:rPr>
               <a:pPr/>
-              <a:t>26/10/2017</a:t>
+              <a:t>27/10/2017</a:t>
             </a:fld>
             <a:endParaRPr lang="nl-BE">
               <a:solidFill>
@@ -3446,7 +3446,7 @@
                 </a:solidFill>
               </a:rPr>
               <a:pPr/>
-              <a:t>26/10/2017</a:t>
+              <a:t>27/10/2017</a:t>
             </a:fld>
             <a:endParaRPr lang="nl-BE">
               <a:solidFill>
@@ -9082,15 +9082,7 @@
           <a:p>
             <a:r>
               <a:rPr lang="en-US" dirty="0" smtClean="0"/>
-              <a:t>Shapely </a:t>
-            </a:r>
-            <a:r>
-              <a:rPr lang="en-US" dirty="0" smtClean="0"/>
-              <a:t>object </a:t>
-            </a:r>
-            <a:r>
-              <a:rPr lang="en-US" dirty="0" smtClean="0"/>
-              <a:t>examples</a:t>
+              <a:t>Shapely object examples</a:t>
             </a:r>
             <a:endParaRPr lang="en-US" dirty="0"/>
           </a:p>
@@ -10064,7 +10056,11 @@
           <a:p>
             <a:r>
               <a:rPr lang="en-US" dirty="0" smtClean="0"/>
-              <a:t>Shapely spatial analysis</a:t>
+              <a:t>Shapely </a:t>
+            </a:r>
+            <a:r>
+              <a:rPr lang="en-US" dirty="0" smtClean="0"/>
+              <a:t>predicates</a:t>
             </a:r>
             <a:endParaRPr lang="en-US" dirty="0"/>
           </a:p>
@@ -10085,6 +10081,177 @@
           <a:bodyPr/>
           <a:lstStyle/>
           <a:p>
+            <a:r>
+              <a:rPr lang="en-US" dirty="0" err="1" smtClean="0">
+                <a:latin typeface="Courier New" panose="02070309020205020404" pitchFamily="49" charset="0"/>
+                <a:cs typeface="Courier New" panose="02070309020205020404" pitchFamily="49" charset="0"/>
+              </a:rPr>
+              <a:t>a.within</a:t>
+            </a:r>
+            <a:r>
+              <a:rPr lang="en-US" dirty="0" smtClean="0">
+                <a:latin typeface="Courier New" panose="02070309020205020404" pitchFamily="49" charset="0"/>
+                <a:cs typeface="Courier New" panose="02070309020205020404" pitchFamily="49" charset="0"/>
+              </a:rPr>
+              <a:t>(b)</a:t>
+            </a:r>
+            <a:r>
+              <a:rPr lang="en-US" dirty="0" smtClean="0"/>
+              <a:t> </a:t>
+            </a:r>
+            <a:r>
+              <a:rPr lang="en-US" dirty="0" smtClean="0">
+                <a:sym typeface="Symbol" panose="05050102010706020507" pitchFamily="18" charset="2"/>
+              </a:rPr>
+              <a:t></a:t>
+            </a:r>
+            <a:r>
+              <a:rPr lang="en-US" dirty="0" smtClean="0"/>
+              <a:t> </a:t>
+            </a:r>
+            <a:r>
+              <a:rPr lang="en-US" dirty="0" err="1" smtClean="0">
+                <a:latin typeface="Courier New" panose="02070309020205020404" pitchFamily="49" charset="0"/>
+                <a:cs typeface="Courier New" panose="02070309020205020404" pitchFamily="49" charset="0"/>
+              </a:rPr>
+              <a:t>b.contains</a:t>
+            </a:r>
+            <a:r>
+              <a:rPr lang="en-US" dirty="0" smtClean="0">
+                <a:latin typeface="Courier New" panose="02070309020205020404" pitchFamily="49" charset="0"/>
+                <a:cs typeface="Courier New" panose="02070309020205020404" pitchFamily="49" charset="0"/>
+              </a:rPr>
+              <a:t>(a)</a:t>
+            </a:r>
+          </a:p>
+          <a:p>
+            <a:r>
+              <a:rPr lang="en-US" dirty="0" err="1" smtClean="0">
+                <a:latin typeface="Courier New" panose="02070309020205020404" pitchFamily="49" charset="0"/>
+                <a:cs typeface="Courier New" panose="02070309020205020404" pitchFamily="49" charset="0"/>
+              </a:rPr>
+              <a:t>a.intersects</a:t>
+            </a:r>
+            <a:r>
+              <a:rPr lang="en-US" dirty="0" smtClean="0">
+                <a:latin typeface="Courier New" panose="02070309020205020404" pitchFamily="49" charset="0"/>
+                <a:cs typeface="Courier New" panose="02070309020205020404" pitchFamily="49" charset="0"/>
+              </a:rPr>
+              <a:t>(b)</a:t>
+            </a:r>
+            <a:r>
+              <a:rPr lang="en-US" dirty="0"/>
+              <a:t> </a:t>
+            </a:r>
+            <a:r>
+              <a:rPr lang="en-US" dirty="0" smtClean="0"/>
+              <a:t> </a:t>
+            </a:r>
+            <a:br>
+              <a:rPr lang="en-US" dirty="0" smtClean="0"/>
+            </a:br>
+            <a:r>
+              <a:rPr lang="en-US" dirty="0" smtClean="0"/>
+              <a:t>             </a:t>
+            </a:r>
+            <a:r>
+              <a:rPr lang="en-US" dirty="0" smtClean="0">
+                <a:sym typeface="Symbol" panose="05050102010706020507" pitchFamily="18" charset="2"/>
+              </a:rPr>
+              <a:t></a:t>
+            </a:r>
+            <a:r>
+              <a:rPr lang="en-US" dirty="0" smtClean="0"/>
+              <a:t> </a:t>
+            </a:r>
+            <a:r>
+              <a:rPr lang="en-US" dirty="0" smtClean="0">
+                <a:latin typeface="Courier New" panose="02070309020205020404" pitchFamily="49" charset="0"/>
+                <a:cs typeface="Courier New" panose="02070309020205020404" pitchFamily="49" charset="0"/>
+              </a:rPr>
+              <a:t>not </a:t>
+            </a:r>
+            <a:r>
+              <a:rPr lang="en-US" dirty="0" err="1" smtClean="0">
+                <a:latin typeface="Courier New" panose="02070309020205020404" pitchFamily="49" charset="0"/>
+                <a:cs typeface="Courier New" panose="02070309020205020404" pitchFamily="49" charset="0"/>
+              </a:rPr>
+              <a:t>a.disjoint</a:t>
+            </a:r>
+            <a:r>
+              <a:rPr lang="en-US" dirty="0" smtClean="0">
+                <a:latin typeface="Courier New" panose="02070309020205020404" pitchFamily="49" charset="0"/>
+                <a:cs typeface="Courier New" panose="02070309020205020404" pitchFamily="49" charset="0"/>
+              </a:rPr>
+              <a:t>(b)</a:t>
+            </a:r>
+          </a:p>
+          <a:p>
+            <a:r>
+              <a:rPr lang="en-US" dirty="0" err="1" smtClean="0">
+                <a:latin typeface="Courier New" panose="02070309020205020404" pitchFamily="49" charset="0"/>
+                <a:cs typeface="Courier New" panose="02070309020205020404" pitchFamily="49" charset="0"/>
+              </a:rPr>
+              <a:t>a.crosses</a:t>
+            </a:r>
+            <a:r>
+              <a:rPr lang="en-US" dirty="0" smtClean="0">
+                <a:latin typeface="Courier New" panose="02070309020205020404" pitchFamily="49" charset="0"/>
+                <a:cs typeface="Courier New" panose="02070309020205020404" pitchFamily="49" charset="0"/>
+              </a:rPr>
+              <a:t>(b)</a:t>
+            </a:r>
+          </a:p>
+          <a:p>
+            <a:r>
+              <a:rPr lang="en-US" dirty="0" err="1" smtClean="0">
+                <a:latin typeface="Courier New" panose="02070309020205020404" pitchFamily="49" charset="0"/>
+                <a:cs typeface="Courier New" panose="02070309020205020404" pitchFamily="49" charset="0"/>
+              </a:rPr>
+              <a:t>a.almostequals</a:t>
+            </a:r>
+            <a:r>
+              <a:rPr lang="en-US" dirty="0" smtClean="0">
+                <a:latin typeface="Courier New" panose="02070309020205020404" pitchFamily="49" charset="0"/>
+                <a:cs typeface="Courier New" panose="02070309020205020404" pitchFamily="49" charset="0"/>
+              </a:rPr>
+              <a:t>(b, decimal=3)</a:t>
+            </a:r>
+          </a:p>
+          <a:p>
+            <a:r>
+              <a:rPr lang="en-US" dirty="0" err="1" smtClean="0">
+                <a:latin typeface="Courier New" panose="02070309020205020404" pitchFamily="49" charset="0"/>
+                <a:cs typeface="Courier New" panose="02070309020205020404" pitchFamily="49" charset="0"/>
+              </a:rPr>
+              <a:t>a.is_valid</a:t>
+            </a:r>
+            <a:endParaRPr lang="en-US" dirty="0" smtClean="0">
+              <a:latin typeface="Courier New" panose="02070309020205020404" pitchFamily="49" charset="0"/>
+              <a:cs typeface="Courier New" panose="02070309020205020404" pitchFamily="49" charset="0"/>
+            </a:endParaRPr>
+          </a:p>
+          <a:p>
+            <a:pPr lvl="1"/>
+            <a:r>
+              <a:rPr lang="en-US" dirty="0" smtClean="0"/>
+              <a:t>Shapely lets you create invalid objects</a:t>
+            </a:r>
+          </a:p>
+          <a:p>
+            <a:r>
+              <a:rPr lang="en-US" dirty="0" err="1" smtClean="0">
+                <a:latin typeface="Courier New" panose="02070309020205020404" pitchFamily="49" charset="0"/>
+                <a:cs typeface="Courier New" panose="02070309020205020404" pitchFamily="49" charset="0"/>
+              </a:rPr>
+              <a:t>line.is_ring</a:t>
+            </a:r>
+            <a:endParaRPr lang="en-US" dirty="0" smtClean="0">
+              <a:latin typeface="Courier New" panose="02070309020205020404" pitchFamily="49" charset="0"/>
+              <a:cs typeface="Courier New" panose="02070309020205020404" pitchFamily="49" charset="0"/>
+            </a:endParaRPr>
+          </a:p>
+          <a:p>
             <a:endParaRPr lang="en-US" dirty="0"/>
           </a:p>
         </p:txBody>
@@ -10138,9 +10305,363 @@
   <p:timing>
     <p:tnLst>
       <p:par>
-        <p:cTn id="1" dur="indefinite" restart="never" nodeType="tmRoot"/>
+        <p:cTn id="1" dur="indefinite" restart="never" nodeType="tmRoot">
+          <p:childTnLst>
+            <p:seq concurrent="1" nextAc="seek">
+              <p:cTn id="2" dur="indefinite" nodeType="mainSeq">
+                <p:childTnLst>
+                  <p:par>
+                    <p:cTn id="3" fill="hold">
+                      <p:stCondLst>
+                        <p:cond delay="indefinite"/>
+                        <p:cond evt="onBegin" delay="0">
+                          <p:tn val="2"/>
+                        </p:cond>
+                      </p:stCondLst>
+                      <p:childTnLst>
+                        <p:par>
+                          <p:cTn id="4" fill="hold">
+                            <p:stCondLst>
+                              <p:cond delay="0"/>
+                            </p:stCondLst>
+                            <p:childTnLst>
+                              <p:par>
+                                <p:cTn id="5" presetID="1" presetClass="entr" presetSubtype="0" fill="hold" grpId="0" nodeType="withEffect">
+                                  <p:stCondLst>
+                                    <p:cond delay="0"/>
+                                  </p:stCondLst>
+                                  <p:childTnLst>
+                                    <p:set>
+                                      <p:cBhvr>
+                                        <p:cTn id="6" dur="1" fill="hold">
+                                          <p:stCondLst>
+                                            <p:cond delay="0"/>
+                                          </p:stCondLst>
+                                        </p:cTn>
+                                        <p:tgtEl>
+                                          <p:spTgt spid="3">
+                                            <p:txEl>
+                                              <p:pRg st="0" end="0"/>
+                                            </p:txEl>
+                                          </p:spTgt>
+                                        </p:tgtEl>
+                                        <p:attrNameLst>
+                                          <p:attrName>style.visibility</p:attrName>
+                                        </p:attrNameLst>
+                                      </p:cBhvr>
+                                      <p:to>
+                                        <p:strVal val="visible"/>
+                                      </p:to>
+                                    </p:set>
+                                  </p:childTnLst>
+                                </p:cTn>
+                              </p:par>
+                            </p:childTnLst>
+                          </p:cTn>
+                        </p:par>
+                      </p:childTnLst>
+                    </p:cTn>
+                  </p:par>
+                  <p:par>
+                    <p:cTn id="7" fill="hold">
+                      <p:stCondLst>
+                        <p:cond delay="indefinite"/>
+                      </p:stCondLst>
+                      <p:childTnLst>
+                        <p:par>
+                          <p:cTn id="8" fill="hold">
+                            <p:stCondLst>
+                              <p:cond delay="0"/>
+                            </p:stCondLst>
+                            <p:childTnLst>
+                              <p:par>
+                                <p:cTn id="9" presetID="1" presetClass="entr" presetSubtype="0" fill="hold" grpId="0" nodeType="clickEffect">
+                                  <p:stCondLst>
+                                    <p:cond delay="0"/>
+                                  </p:stCondLst>
+                                  <p:childTnLst>
+                                    <p:set>
+                                      <p:cBhvr>
+                                        <p:cTn id="10" dur="1" fill="hold">
+                                          <p:stCondLst>
+                                            <p:cond delay="0"/>
+                                          </p:stCondLst>
+                                        </p:cTn>
+                                        <p:tgtEl>
+                                          <p:spTgt spid="3">
+                                            <p:txEl>
+                                              <p:pRg st="1" end="1"/>
+                                            </p:txEl>
+                                          </p:spTgt>
+                                        </p:tgtEl>
+                                        <p:attrNameLst>
+                                          <p:attrName>style.visibility</p:attrName>
+                                        </p:attrNameLst>
+                                      </p:cBhvr>
+                                      <p:to>
+                                        <p:strVal val="visible"/>
+                                      </p:to>
+                                    </p:set>
+                                  </p:childTnLst>
+                                </p:cTn>
+                              </p:par>
+                            </p:childTnLst>
+                          </p:cTn>
+                        </p:par>
+                      </p:childTnLst>
+                    </p:cTn>
+                  </p:par>
+                  <p:par>
+                    <p:cTn id="11" fill="hold">
+                      <p:stCondLst>
+                        <p:cond delay="indefinite"/>
+                      </p:stCondLst>
+                      <p:childTnLst>
+                        <p:par>
+                          <p:cTn id="12" fill="hold">
+                            <p:stCondLst>
+                              <p:cond delay="0"/>
+                            </p:stCondLst>
+                            <p:childTnLst>
+                              <p:par>
+                                <p:cTn id="13" presetID="1" presetClass="entr" presetSubtype="0" fill="hold" grpId="0" nodeType="clickEffect">
+                                  <p:stCondLst>
+                                    <p:cond delay="0"/>
+                                  </p:stCondLst>
+                                  <p:childTnLst>
+                                    <p:set>
+                                      <p:cBhvr>
+                                        <p:cTn id="14" dur="1" fill="hold">
+                                          <p:stCondLst>
+                                            <p:cond delay="0"/>
+                                          </p:stCondLst>
+                                        </p:cTn>
+                                        <p:tgtEl>
+                                          <p:spTgt spid="3">
+                                            <p:txEl>
+                                              <p:pRg st="2" end="2"/>
+                                            </p:txEl>
+                                          </p:spTgt>
+                                        </p:tgtEl>
+                                        <p:attrNameLst>
+                                          <p:attrName>style.visibility</p:attrName>
+                                        </p:attrNameLst>
+                                      </p:cBhvr>
+                                      <p:to>
+                                        <p:strVal val="visible"/>
+                                      </p:to>
+                                    </p:set>
+                                  </p:childTnLst>
+                                </p:cTn>
+                              </p:par>
+                            </p:childTnLst>
+                          </p:cTn>
+                        </p:par>
+                      </p:childTnLst>
+                    </p:cTn>
+                  </p:par>
+                  <p:par>
+                    <p:cTn id="15" fill="hold">
+                      <p:stCondLst>
+                        <p:cond delay="indefinite"/>
+                      </p:stCondLst>
+                      <p:childTnLst>
+                        <p:par>
+                          <p:cTn id="16" fill="hold">
+                            <p:stCondLst>
+                              <p:cond delay="0"/>
+                            </p:stCondLst>
+                            <p:childTnLst>
+                              <p:par>
+                                <p:cTn id="17" presetID="1" presetClass="entr" presetSubtype="0" fill="hold" grpId="0" nodeType="clickEffect">
+                                  <p:stCondLst>
+                                    <p:cond delay="0"/>
+                                  </p:stCondLst>
+                                  <p:childTnLst>
+                                    <p:set>
+                                      <p:cBhvr>
+                                        <p:cTn id="18" dur="1" fill="hold">
+                                          <p:stCondLst>
+                                            <p:cond delay="0"/>
+                                          </p:stCondLst>
+                                        </p:cTn>
+                                        <p:tgtEl>
+                                          <p:spTgt spid="3">
+                                            <p:txEl>
+                                              <p:pRg st="3" end="3"/>
+                                            </p:txEl>
+                                          </p:spTgt>
+                                        </p:tgtEl>
+                                        <p:attrNameLst>
+                                          <p:attrName>style.visibility</p:attrName>
+                                        </p:attrNameLst>
+                                      </p:cBhvr>
+                                      <p:to>
+                                        <p:strVal val="visible"/>
+                                      </p:to>
+                                    </p:set>
+                                  </p:childTnLst>
+                                </p:cTn>
+                              </p:par>
+                            </p:childTnLst>
+                          </p:cTn>
+                        </p:par>
+                      </p:childTnLst>
+                    </p:cTn>
+                  </p:par>
+                  <p:par>
+                    <p:cTn id="19" fill="hold">
+                      <p:stCondLst>
+                        <p:cond delay="indefinite"/>
+                      </p:stCondLst>
+                      <p:childTnLst>
+                        <p:par>
+                          <p:cTn id="20" fill="hold">
+                            <p:stCondLst>
+                              <p:cond delay="0"/>
+                            </p:stCondLst>
+                            <p:childTnLst>
+                              <p:par>
+                                <p:cTn id="21" presetID="1" presetClass="entr" presetSubtype="0" fill="hold" grpId="0" nodeType="clickEffect">
+                                  <p:stCondLst>
+                                    <p:cond delay="0"/>
+                                  </p:stCondLst>
+                                  <p:childTnLst>
+                                    <p:set>
+                                      <p:cBhvr>
+                                        <p:cTn id="22" dur="1" fill="hold">
+                                          <p:stCondLst>
+                                            <p:cond delay="0"/>
+                                          </p:stCondLst>
+                                        </p:cTn>
+                                        <p:tgtEl>
+                                          <p:spTgt spid="3">
+                                            <p:txEl>
+                                              <p:pRg st="4" end="4"/>
+                                            </p:txEl>
+                                          </p:spTgt>
+                                        </p:tgtEl>
+                                        <p:attrNameLst>
+                                          <p:attrName>style.visibility</p:attrName>
+                                        </p:attrNameLst>
+                                      </p:cBhvr>
+                                      <p:to>
+                                        <p:strVal val="visible"/>
+                                      </p:to>
+                                    </p:set>
+                                  </p:childTnLst>
+                                </p:cTn>
+                              </p:par>
+                              <p:par>
+                                <p:cTn id="23" presetID="1" presetClass="entr" presetSubtype="0" fill="hold" grpId="0" nodeType="withEffect">
+                                  <p:stCondLst>
+                                    <p:cond delay="0"/>
+                                  </p:stCondLst>
+                                  <p:childTnLst>
+                                    <p:set>
+                                      <p:cBhvr>
+                                        <p:cTn id="24" dur="1" fill="hold">
+                                          <p:stCondLst>
+                                            <p:cond delay="0"/>
+                                          </p:stCondLst>
+                                        </p:cTn>
+                                        <p:tgtEl>
+                                          <p:spTgt spid="3">
+                                            <p:txEl>
+                                              <p:pRg st="5" end="5"/>
+                                            </p:txEl>
+                                          </p:spTgt>
+                                        </p:tgtEl>
+                                        <p:attrNameLst>
+                                          <p:attrName>style.visibility</p:attrName>
+                                        </p:attrNameLst>
+                                      </p:cBhvr>
+                                      <p:to>
+                                        <p:strVal val="visible"/>
+                                      </p:to>
+                                    </p:set>
+                                  </p:childTnLst>
+                                </p:cTn>
+                              </p:par>
+                            </p:childTnLst>
+                          </p:cTn>
+                        </p:par>
+                      </p:childTnLst>
+                    </p:cTn>
+                  </p:par>
+                  <p:par>
+                    <p:cTn id="25" fill="hold">
+                      <p:stCondLst>
+                        <p:cond delay="indefinite"/>
+                      </p:stCondLst>
+                      <p:childTnLst>
+                        <p:par>
+                          <p:cTn id="26" fill="hold">
+                            <p:stCondLst>
+                              <p:cond delay="0"/>
+                            </p:stCondLst>
+                            <p:childTnLst>
+                              <p:par>
+                                <p:cTn id="27" presetID="1" presetClass="entr" presetSubtype="0" fill="hold" grpId="0" nodeType="clickEffect">
+                                  <p:stCondLst>
+                                    <p:cond delay="0"/>
+                                  </p:stCondLst>
+                                  <p:childTnLst>
+                                    <p:set>
+                                      <p:cBhvr>
+                                        <p:cTn id="28" dur="1" fill="hold">
+                                          <p:stCondLst>
+                                            <p:cond delay="0"/>
+                                          </p:stCondLst>
+                                        </p:cTn>
+                                        <p:tgtEl>
+                                          <p:spTgt spid="3">
+                                            <p:txEl>
+                                              <p:pRg st="6" end="6"/>
+                                            </p:txEl>
+                                          </p:spTgt>
+                                        </p:tgtEl>
+                                        <p:attrNameLst>
+                                          <p:attrName>style.visibility</p:attrName>
+                                        </p:attrNameLst>
+                                      </p:cBhvr>
+                                      <p:to>
+                                        <p:strVal val="visible"/>
+                                      </p:to>
+                                    </p:set>
+                                  </p:childTnLst>
+                                </p:cTn>
+                              </p:par>
+                            </p:childTnLst>
+                          </p:cTn>
+                        </p:par>
+                      </p:childTnLst>
+                    </p:cTn>
+                  </p:par>
+                </p:childTnLst>
+              </p:cTn>
+              <p:prevCondLst>
+                <p:cond evt="onPrev" delay="0">
+                  <p:tgtEl>
+                    <p:sldTgt/>
+                  </p:tgtEl>
+                </p:cond>
+              </p:prevCondLst>
+              <p:nextCondLst>
+                <p:cond evt="onNext" delay="0">
+                  <p:tgtEl>
+                    <p:sldTgt/>
+                  </p:tgtEl>
+                </p:cond>
+              </p:nextCondLst>
+            </p:seq>
+          </p:childTnLst>
+        </p:cTn>
       </p:par>
     </p:tnLst>
+    <p:bldLst>
+      <p:bldP spid="3" grpId="0" uiExpand="1" build="p"/>
+    </p:bldLst>
   </p:timing>
 </p:sld>
 </file>

</xml_diff>

<commit_message>
Add Shapely spatial analysis slide
</commit_message>
<xml_diff>
--- a/Python/python_gis.pptx
+++ b/Python/python_gis.pptx
@@ -5,7 +5,7 @@
     <p:sldMasterId id="2147483672" r:id="rId1"/>
   </p:sldMasterIdLst>
   <p:notesMasterIdLst>
-    <p:notesMasterId r:id="rId12"/>
+    <p:notesMasterId r:id="rId13"/>
   </p:notesMasterIdLst>
   <p:sldIdLst>
     <p:sldId id="256" r:id="rId2"/>
@@ -17,7 +17,8 @@
     <p:sldId id="270" r:id="rId8"/>
     <p:sldId id="271" r:id="rId9"/>
     <p:sldId id="272" r:id="rId10"/>
-    <p:sldId id="265" r:id="rId11"/>
+    <p:sldId id="273" r:id="rId11"/>
+    <p:sldId id="265" r:id="rId12"/>
   </p:sldIdLst>
   <p:sldSz cx="9144000" cy="6858000" type="screen4x3"/>
   <p:notesSz cx="6858000" cy="9144000"/>
@@ -4021,7 +4022,7 @@
           <a:p>
             <a:r>
               <a:rPr lang="en-US" dirty="0" smtClean="0"/>
-              <a:t>Further reading</a:t>
+              <a:t>Shapely spatial analysis</a:t>
             </a:r>
             <a:endParaRPr lang="en-US" dirty="0"/>
           </a:p>
@@ -4043,80 +4044,71 @@
           <a:lstStyle/>
           <a:p>
             <a:r>
-              <a:rPr lang="en-US" dirty="0" smtClean="0"/>
-              <a:t>Fiona manual</a:t>
-            </a:r>
-            <a:r>
-              <a:rPr lang="en-US" dirty="0"/>
-              <a:t/>
-            </a:r>
-            <a:br>
-              <a:rPr lang="en-US" dirty="0"/>
-            </a:br>
-            <a:r>
-              <a:rPr lang="en-US" sz="2000" dirty="0">
-                <a:hlinkClick r:id="rId2"/>
-              </a:rPr>
-              <a:t>http://</a:t>
-            </a:r>
-            <a:r>
-              <a:rPr lang="en-US" sz="2000" dirty="0" smtClean="0">
-                <a:hlinkClick r:id="rId2"/>
-              </a:rPr>
-              <a:t>toblerity.org/fiona/index.html</a:t>
-            </a:r>
-            <a:endParaRPr lang="en-US" sz="2000" dirty="0" smtClean="0"/>
-          </a:p>
-          <a:p>
-            <a:r>
-              <a:rPr lang="en-US" dirty="0"/>
-              <a:t>Folium manual</a:t>
-            </a:r>
-            <a:br>
-              <a:rPr lang="en-US" dirty="0"/>
-            </a:br>
-            <a:r>
-              <a:rPr lang="en-US" sz="2000" dirty="0">
-                <a:hlinkClick r:id="rId3"/>
-              </a:rPr>
-              <a:t>http://python-visualization.github.io/folium/docs-master</a:t>
-            </a:r>
-            <a:r>
-              <a:rPr lang="en-US" sz="2000" dirty="0" smtClean="0">
-                <a:hlinkClick r:id="rId3"/>
-              </a:rPr>
-              <a:t>/</a:t>
-            </a:r>
-            <a:r>
-              <a:rPr lang="en-US" sz="2000" dirty="0" smtClean="0"/>
-              <a:t> </a:t>
-            </a:r>
-            <a:endParaRPr lang="en-US" dirty="0"/>
-          </a:p>
-          <a:p>
-            <a:r>
-              <a:rPr lang="en-US" dirty="0" smtClean="0"/>
-              <a:t>Shapely manual</a:t>
-            </a:r>
-            <a:br>
-              <a:rPr lang="en-US" dirty="0" smtClean="0"/>
-            </a:br>
-            <a:r>
-              <a:rPr lang="en-US" sz="2000" dirty="0">
-                <a:hlinkClick r:id="rId4"/>
-              </a:rPr>
-              <a:t>https://shapely.readthedocs.io/en/latest</a:t>
-            </a:r>
-            <a:r>
-              <a:rPr lang="en-US" sz="2000" dirty="0" smtClean="0">
-                <a:hlinkClick r:id="rId4"/>
-              </a:rPr>
-              <a:t>/</a:t>
-            </a:r>
-            <a:endParaRPr lang="en-US" sz="2000" dirty="0" smtClean="0"/>
-          </a:p>
-          <a:p>
-            <a:endParaRPr lang="en-US" dirty="0" smtClean="0"/>
+              <a:rPr lang="en-US" dirty="0" err="1" smtClean="0">
+                <a:latin typeface="Courier New" panose="02070309020205020404" pitchFamily="49" charset="0"/>
+                <a:cs typeface="Courier New" panose="02070309020205020404" pitchFamily="49" charset="0"/>
+              </a:rPr>
+              <a:t>a.intersection</a:t>
+            </a:r>
+            <a:r>
+              <a:rPr lang="en-US" dirty="0" smtClean="0">
+                <a:latin typeface="Courier New" panose="02070309020205020404" pitchFamily="49" charset="0"/>
+                <a:cs typeface="Courier New" panose="02070309020205020404" pitchFamily="49" charset="0"/>
+              </a:rPr>
+              <a:t>(b)</a:t>
+            </a:r>
+          </a:p>
+          <a:p>
+            <a:r>
+              <a:rPr lang="en-US" dirty="0" err="1" smtClean="0">
+                <a:latin typeface="Courier New" panose="02070309020205020404" pitchFamily="49" charset="0"/>
+                <a:cs typeface="Courier New" panose="02070309020205020404" pitchFamily="49" charset="0"/>
+              </a:rPr>
+              <a:t>a.union</a:t>
+            </a:r>
+            <a:r>
+              <a:rPr lang="en-US" dirty="0" smtClean="0">
+                <a:latin typeface="Courier New" panose="02070309020205020404" pitchFamily="49" charset="0"/>
+                <a:cs typeface="Courier New" panose="02070309020205020404" pitchFamily="49" charset="0"/>
+              </a:rPr>
+              <a:t>(b)</a:t>
+            </a:r>
+          </a:p>
+          <a:p>
+            <a:r>
+              <a:rPr lang="en-US" dirty="0" err="1" smtClean="0">
+                <a:latin typeface="Courier New" panose="02070309020205020404" pitchFamily="49" charset="0"/>
+                <a:cs typeface="Courier New" panose="02070309020205020404" pitchFamily="49" charset="0"/>
+              </a:rPr>
+              <a:t>a.difference</a:t>
+            </a:r>
+            <a:r>
+              <a:rPr lang="en-US" dirty="0" smtClean="0">
+                <a:latin typeface="Courier New" panose="02070309020205020404" pitchFamily="49" charset="0"/>
+                <a:cs typeface="Courier New" panose="02070309020205020404" pitchFamily="49" charset="0"/>
+              </a:rPr>
+              <a:t>(b)</a:t>
+            </a:r>
+          </a:p>
+          <a:p>
+            <a:r>
+              <a:rPr lang="en-US" dirty="0" err="1" smtClean="0">
+                <a:latin typeface="Courier New" panose="02070309020205020404" pitchFamily="49" charset="0"/>
+                <a:cs typeface="Courier New" panose="02070309020205020404" pitchFamily="49" charset="0"/>
+              </a:rPr>
+              <a:t>a.symmetric_difference</a:t>
+            </a:r>
+            <a:r>
+              <a:rPr lang="en-US" dirty="0" smtClean="0">
+                <a:latin typeface="Courier New" panose="02070309020205020404" pitchFamily="49" charset="0"/>
+                <a:cs typeface="Courier New" panose="02070309020205020404" pitchFamily="49" charset="0"/>
+              </a:rPr>
+              <a:t>(b)</a:t>
+            </a:r>
+            <a:endParaRPr lang="en-US" dirty="0">
+              <a:latin typeface="Courier New" panose="02070309020205020404" pitchFamily="49" charset="0"/>
+              <a:cs typeface="Courier New" panose="02070309020205020404" pitchFamily="49" charset="0"/>
+            </a:endParaRPr>
           </a:p>
         </p:txBody>
       </p:sp>
@@ -4145,6 +4137,734 @@
               </a:rPr>
               <a:pPr/>
               <a:t>10</a:t>
+            </a:fld>
+            <a:endParaRPr lang="nl-BE">
+              <a:solidFill>
+                <a:prstClr val="black">
+                  <a:tint val="75000"/>
+                </a:prstClr>
+              </a:solidFill>
+            </a:endParaRPr>
+          </a:p>
+        </p:txBody>
+      </p:sp>
+      <p:sp>
+        <p:nvSpPr>
+          <p:cNvPr id="5" name="TextBox 4"/>
+          <p:cNvSpPr txBox="1"/>
+          <p:nvPr/>
+        </p:nvSpPr>
+        <p:spPr>
+          <a:xfrm>
+            <a:off x="5947507" y="2104845"/>
+            <a:ext cx="2054793" cy="954107"/>
+          </a:xfrm>
+          <a:prstGeom prst="rect">
+            <a:avLst/>
+          </a:prstGeom>
+          <a:noFill/>
+          <a:ln>
+            <a:solidFill>
+              <a:schemeClr val="tx1"/>
+            </a:solidFill>
+          </a:ln>
+        </p:spPr>
+        <p:txBody>
+          <a:bodyPr wrap="none" rtlCol="0">
+            <a:spAutoFit/>
+          </a:bodyPr>
+          <a:lstStyle/>
+          <a:p>
+            <a:r>
+              <a:rPr lang="en-US" sz="2800" dirty="0" smtClean="0"/>
+              <a:t>Set theoretic</a:t>
+            </a:r>
+            <a:br>
+              <a:rPr lang="en-US" sz="2800" dirty="0" smtClean="0"/>
+            </a:br>
+            <a:r>
+              <a:rPr lang="en-US" sz="2800" dirty="0" smtClean="0"/>
+              <a:t>operations</a:t>
+            </a:r>
+            <a:endParaRPr lang="en-US" sz="2800" dirty="0"/>
+          </a:p>
+        </p:txBody>
+      </p:sp>
+      <p:sp>
+        <p:nvSpPr>
+          <p:cNvPr id="6" name="TextBox 5"/>
+          <p:cNvSpPr txBox="1"/>
+          <p:nvPr/>
+        </p:nvSpPr>
+        <p:spPr>
+          <a:xfrm>
+            <a:off x="397351" y="4287328"/>
+            <a:ext cx="8289449" cy="400110"/>
+          </a:xfrm>
+          <a:prstGeom prst="rect">
+            <a:avLst/>
+          </a:prstGeom>
+          <a:noFill/>
+        </p:spPr>
+        <p:txBody>
+          <a:bodyPr wrap="none" rtlCol="0">
+            <a:spAutoFit/>
+          </a:bodyPr>
+          <a:lstStyle/>
+          <a:p>
+            <a:r>
+              <a:rPr lang="en-US" sz="2000" dirty="0" smtClean="0">
+                <a:latin typeface="Courier New" panose="02070309020205020404" pitchFamily="49" charset="0"/>
+                <a:cs typeface="Courier New" panose="02070309020205020404" pitchFamily="49" charset="0"/>
+              </a:rPr>
+              <a:t>a</a:t>
+            </a:r>
+            <a:r>
+              <a:rPr lang="en-US" sz="2000" dirty="0"/>
+              <a:t> </a:t>
+            </a:r>
+            <a:r>
+              <a:rPr lang="en-US" sz="2000" dirty="0">
+                <a:sym typeface="Symbol" panose="05050102010706020507" pitchFamily="18" charset="2"/>
+              </a:rPr>
+              <a:t></a:t>
+            </a:r>
+            <a:r>
+              <a:rPr lang="en-US" sz="2000" dirty="0"/>
+              <a:t> </a:t>
+            </a:r>
+            <a:r>
+              <a:rPr lang="en-US" sz="2000" dirty="0" err="1" smtClean="0">
+                <a:latin typeface="Courier New" panose="02070309020205020404" pitchFamily="49" charset="0"/>
+                <a:cs typeface="Courier New" panose="02070309020205020404" pitchFamily="49" charset="0"/>
+              </a:rPr>
+              <a:t>a.intersection</a:t>
+            </a:r>
+            <a:r>
+              <a:rPr lang="en-US" sz="2000" dirty="0" smtClean="0">
+                <a:latin typeface="Courier New" panose="02070309020205020404" pitchFamily="49" charset="0"/>
+                <a:cs typeface="Courier New" panose="02070309020205020404" pitchFamily="49" charset="0"/>
+              </a:rPr>
+              <a:t>(b).union(</a:t>
+            </a:r>
+            <a:r>
+              <a:rPr lang="en-US" sz="2000" dirty="0" err="1" smtClean="0">
+                <a:latin typeface="Courier New" panose="02070309020205020404" pitchFamily="49" charset="0"/>
+                <a:cs typeface="Courier New" panose="02070309020205020404" pitchFamily="49" charset="0"/>
+              </a:rPr>
+              <a:t>a.symmetric_difference</a:t>
+            </a:r>
+            <a:r>
+              <a:rPr lang="en-US" sz="2000" dirty="0" smtClean="0">
+                <a:latin typeface="Courier New" panose="02070309020205020404" pitchFamily="49" charset="0"/>
+                <a:cs typeface="Courier New" panose="02070309020205020404" pitchFamily="49" charset="0"/>
+              </a:rPr>
+              <a:t>(b))</a:t>
+            </a:r>
+            <a:endParaRPr lang="en-US" sz="2000" dirty="0">
+              <a:latin typeface="Courier New" panose="02070309020205020404" pitchFamily="49" charset="0"/>
+              <a:cs typeface="Courier New" panose="02070309020205020404" pitchFamily="49" charset="0"/>
+            </a:endParaRPr>
+          </a:p>
+        </p:txBody>
+      </p:sp>
+      <p:sp>
+        <p:nvSpPr>
+          <p:cNvPr id="7" name="TextBox 6"/>
+          <p:cNvSpPr txBox="1"/>
+          <p:nvPr/>
+        </p:nvSpPr>
+        <p:spPr>
+          <a:xfrm>
+            <a:off x="457200" y="5015731"/>
+            <a:ext cx="7366119" cy="707886"/>
+          </a:xfrm>
+          <a:prstGeom prst="rect">
+            <a:avLst/>
+          </a:prstGeom>
+          <a:noFill/>
+        </p:spPr>
+        <p:txBody>
+          <a:bodyPr wrap="none" rtlCol="0">
+            <a:spAutoFit/>
+          </a:bodyPr>
+          <a:lstStyle/>
+          <a:p>
+            <a:r>
+              <a:rPr lang="en-US" sz="2000" dirty="0" err="1">
+                <a:latin typeface="Courier New" panose="02070309020205020404" pitchFamily="49" charset="0"/>
+                <a:cs typeface="Courier New" panose="02070309020205020404" pitchFamily="49" charset="0"/>
+              </a:rPr>
+              <a:t>a.symmetric_difference</a:t>
+            </a:r>
+            <a:r>
+              <a:rPr lang="en-US" sz="2000" dirty="0">
+                <a:latin typeface="Courier New" panose="02070309020205020404" pitchFamily="49" charset="0"/>
+                <a:cs typeface="Courier New" panose="02070309020205020404" pitchFamily="49" charset="0"/>
+              </a:rPr>
+              <a:t>(b</a:t>
+            </a:r>
+            <a:r>
+              <a:rPr lang="en-US" sz="2000" dirty="0" smtClean="0">
+                <a:latin typeface="Courier New" panose="02070309020205020404" pitchFamily="49" charset="0"/>
+                <a:cs typeface="Courier New" panose="02070309020205020404" pitchFamily="49" charset="0"/>
+              </a:rPr>
+              <a:t>)</a:t>
+            </a:r>
+            <a:br>
+              <a:rPr lang="en-US" sz="2000" dirty="0" smtClean="0">
+                <a:latin typeface="Courier New" panose="02070309020205020404" pitchFamily="49" charset="0"/>
+                <a:cs typeface="Courier New" panose="02070309020205020404" pitchFamily="49" charset="0"/>
+              </a:rPr>
+            </a:br>
+            <a:r>
+              <a:rPr lang="en-US" sz="2000" dirty="0" smtClean="0">
+                <a:latin typeface="Courier New" panose="02070309020205020404" pitchFamily="49" charset="0"/>
+                <a:cs typeface="Courier New" panose="02070309020205020404" pitchFamily="49" charset="0"/>
+              </a:rPr>
+              <a:t>       </a:t>
+            </a:r>
+            <a:r>
+              <a:rPr lang="en-US" sz="2000" dirty="0" smtClean="0"/>
+              <a:t> </a:t>
+            </a:r>
+            <a:r>
+              <a:rPr lang="en-US" sz="2000" dirty="0">
+                <a:sym typeface="Symbol" panose="05050102010706020507" pitchFamily="18" charset="2"/>
+              </a:rPr>
+              <a:t></a:t>
+            </a:r>
+            <a:r>
+              <a:rPr lang="en-US" sz="2000" dirty="0"/>
+              <a:t> </a:t>
+            </a:r>
+            <a:r>
+              <a:rPr lang="en-US" sz="2000" dirty="0" err="1" smtClean="0">
+                <a:latin typeface="Courier New" panose="02070309020205020404" pitchFamily="49" charset="0"/>
+                <a:cs typeface="Courier New" panose="02070309020205020404" pitchFamily="49" charset="0"/>
+              </a:rPr>
+              <a:t>a.difference</a:t>
+            </a:r>
+            <a:r>
+              <a:rPr lang="en-US" sz="2000" dirty="0" smtClean="0">
+                <a:latin typeface="Courier New" panose="02070309020205020404" pitchFamily="49" charset="0"/>
+                <a:cs typeface="Courier New" panose="02070309020205020404" pitchFamily="49" charset="0"/>
+              </a:rPr>
+              <a:t>(b).union(</a:t>
+            </a:r>
+            <a:r>
+              <a:rPr lang="en-US" sz="2000" dirty="0" err="1" smtClean="0">
+                <a:latin typeface="Courier New" panose="02070309020205020404" pitchFamily="49" charset="0"/>
+                <a:cs typeface="Courier New" panose="02070309020205020404" pitchFamily="49" charset="0"/>
+              </a:rPr>
+              <a:t>b.difference</a:t>
+            </a:r>
+            <a:r>
+              <a:rPr lang="en-US" sz="2000" dirty="0" smtClean="0">
+                <a:latin typeface="Courier New" panose="02070309020205020404" pitchFamily="49" charset="0"/>
+                <a:cs typeface="Courier New" panose="02070309020205020404" pitchFamily="49" charset="0"/>
+              </a:rPr>
+              <a:t>(a))</a:t>
+            </a:r>
+            <a:endParaRPr lang="en-US" sz="2000" dirty="0">
+              <a:latin typeface="Courier New" panose="02070309020205020404" pitchFamily="49" charset="0"/>
+              <a:cs typeface="Courier New" panose="02070309020205020404" pitchFamily="49" charset="0"/>
+            </a:endParaRPr>
+          </a:p>
+        </p:txBody>
+      </p:sp>
+    </p:spTree>
+    <p:extLst>
+      <p:ext uri="{BB962C8B-B14F-4D97-AF65-F5344CB8AC3E}">
+        <p14:creationId xmlns:p14="http://schemas.microsoft.com/office/powerpoint/2010/main" val="3716621734"/>
+      </p:ext>
+    </p:extLst>
+  </p:cSld>
+  <p:clrMapOvr>
+    <a:masterClrMapping/>
+  </p:clrMapOvr>
+  <p:timing>
+    <p:tnLst>
+      <p:par>
+        <p:cTn id="1" dur="indefinite" restart="never" nodeType="tmRoot">
+          <p:childTnLst>
+            <p:seq concurrent="1" nextAc="seek">
+              <p:cTn id="2" dur="indefinite" nodeType="mainSeq">
+                <p:childTnLst>
+                  <p:par>
+                    <p:cTn id="3" fill="hold">
+                      <p:stCondLst>
+                        <p:cond delay="indefinite"/>
+                      </p:stCondLst>
+                      <p:childTnLst>
+                        <p:par>
+                          <p:cTn id="4" fill="hold">
+                            <p:stCondLst>
+                              <p:cond delay="0"/>
+                            </p:stCondLst>
+                            <p:childTnLst>
+                              <p:par>
+                                <p:cTn id="5" presetID="1" presetClass="entr" presetSubtype="0" fill="hold" grpId="0" nodeType="clickEffect">
+                                  <p:stCondLst>
+                                    <p:cond delay="0"/>
+                                  </p:stCondLst>
+                                  <p:childTnLst>
+                                    <p:set>
+                                      <p:cBhvr>
+                                        <p:cTn id="6" dur="1" fill="hold">
+                                          <p:stCondLst>
+                                            <p:cond delay="0"/>
+                                          </p:stCondLst>
+                                        </p:cTn>
+                                        <p:tgtEl>
+                                          <p:spTgt spid="3">
+                                            <p:txEl>
+                                              <p:pRg st="0" end="0"/>
+                                            </p:txEl>
+                                          </p:spTgt>
+                                        </p:tgtEl>
+                                        <p:attrNameLst>
+                                          <p:attrName>style.visibility</p:attrName>
+                                        </p:attrNameLst>
+                                      </p:cBhvr>
+                                      <p:to>
+                                        <p:strVal val="visible"/>
+                                      </p:to>
+                                    </p:set>
+                                  </p:childTnLst>
+                                </p:cTn>
+                              </p:par>
+                            </p:childTnLst>
+                          </p:cTn>
+                        </p:par>
+                      </p:childTnLst>
+                    </p:cTn>
+                  </p:par>
+                  <p:par>
+                    <p:cTn id="7" fill="hold">
+                      <p:stCondLst>
+                        <p:cond delay="indefinite"/>
+                      </p:stCondLst>
+                      <p:childTnLst>
+                        <p:par>
+                          <p:cTn id="8" fill="hold">
+                            <p:stCondLst>
+                              <p:cond delay="0"/>
+                            </p:stCondLst>
+                            <p:childTnLst>
+                              <p:par>
+                                <p:cTn id="9" presetID="1" presetClass="entr" presetSubtype="0" fill="hold" grpId="0" nodeType="clickEffect">
+                                  <p:stCondLst>
+                                    <p:cond delay="0"/>
+                                  </p:stCondLst>
+                                  <p:childTnLst>
+                                    <p:set>
+                                      <p:cBhvr>
+                                        <p:cTn id="10" dur="1" fill="hold">
+                                          <p:stCondLst>
+                                            <p:cond delay="0"/>
+                                          </p:stCondLst>
+                                        </p:cTn>
+                                        <p:tgtEl>
+                                          <p:spTgt spid="3">
+                                            <p:txEl>
+                                              <p:pRg st="1" end="1"/>
+                                            </p:txEl>
+                                          </p:spTgt>
+                                        </p:tgtEl>
+                                        <p:attrNameLst>
+                                          <p:attrName>style.visibility</p:attrName>
+                                        </p:attrNameLst>
+                                      </p:cBhvr>
+                                      <p:to>
+                                        <p:strVal val="visible"/>
+                                      </p:to>
+                                    </p:set>
+                                  </p:childTnLst>
+                                </p:cTn>
+                              </p:par>
+                            </p:childTnLst>
+                          </p:cTn>
+                        </p:par>
+                      </p:childTnLst>
+                    </p:cTn>
+                  </p:par>
+                  <p:par>
+                    <p:cTn id="11" fill="hold">
+                      <p:stCondLst>
+                        <p:cond delay="indefinite"/>
+                      </p:stCondLst>
+                      <p:childTnLst>
+                        <p:par>
+                          <p:cTn id="12" fill="hold">
+                            <p:stCondLst>
+                              <p:cond delay="0"/>
+                            </p:stCondLst>
+                            <p:childTnLst>
+                              <p:par>
+                                <p:cTn id="13" presetID="1" presetClass="entr" presetSubtype="0" fill="hold" grpId="0" nodeType="clickEffect">
+                                  <p:stCondLst>
+                                    <p:cond delay="0"/>
+                                  </p:stCondLst>
+                                  <p:childTnLst>
+                                    <p:set>
+                                      <p:cBhvr>
+                                        <p:cTn id="14" dur="1" fill="hold">
+                                          <p:stCondLst>
+                                            <p:cond delay="0"/>
+                                          </p:stCondLst>
+                                        </p:cTn>
+                                        <p:tgtEl>
+                                          <p:spTgt spid="3">
+                                            <p:txEl>
+                                              <p:pRg st="2" end="2"/>
+                                            </p:txEl>
+                                          </p:spTgt>
+                                        </p:tgtEl>
+                                        <p:attrNameLst>
+                                          <p:attrName>style.visibility</p:attrName>
+                                        </p:attrNameLst>
+                                      </p:cBhvr>
+                                      <p:to>
+                                        <p:strVal val="visible"/>
+                                      </p:to>
+                                    </p:set>
+                                  </p:childTnLst>
+                                </p:cTn>
+                              </p:par>
+                            </p:childTnLst>
+                          </p:cTn>
+                        </p:par>
+                      </p:childTnLst>
+                    </p:cTn>
+                  </p:par>
+                  <p:par>
+                    <p:cTn id="15" fill="hold">
+                      <p:stCondLst>
+                        <p:cond delay="indefinite"/>
+                      </p:stCondLst>
+                      <p:childTnLst>
+                        <p:par>
+                          <p:cTn id="16" fill="hold">
+                            <p:stCondLst>
+                              <p:cond delay="0"/>
+                            </p:stCondLst>
+                            <p:childTnLst>
+                              <p:par>
+                                <p:cTn id="17" presetID="1" presetClass="entr" presetSubtype="0" fill="hold" grpId="0" nodeType="clickEffect">
+                                  <p:stCondLst>
+                                    <p:cond delay="0"/>
+                                  </p:stCondLst>
+                                  <p:childTnLst>
+                                    <p:set>
+                                      <p:cBhvr>
+                                        <p:cTn id="18" dur="1" fill="hold">
+                                          <p:stCondLst>
+                                            <p:cond delay="0"/>
+                                          </p:stCondLst>
+                                        </p:cTn>
+                                        <p:tgtEl>
+                                          <p:spTgt spid="3">
+                                            <p:txEl>
+                                              <p:pRg st="3" end="3"/>
+                                            </p:txEl>
+                                          </p:spTgt>
+                                        </p:tgtEl>
+                                        <p:attrNameLst>
+                                          <p:attrName>style.visibility</p:attrName>
+                                        </p:attrNameLst>
+                                      </p:cBhvr>
+                                      <p:to>
+                                        <p:strVal val="visible"/>
+                                      </p:to>
+                                    </p:set>
+                                  </p:childTnLst>
+                                </p:cTn>
+                              </p:par>
+                            </p:childTnLst>
+                          </p:cTn>
+                        </p:par>
+                      </p:childTnLst>
+                    </p:cTn>
+                  </p:par>
+                  <p:par>
+                    <p:cTn id="19" fill="hold">
+                      <p:stCondLst>
+                        <p:cond delay="indefinite"/>
+                      </p:stCondLst>
+                      <p:childTnLst>
+                        <p:par>
+                          <p:cTn id="20" fill="hold">
+                            <p:stCondLst>
+                              <p:cond delay="0"/>
+                            </p:stCondLst>
+                            <p:childTnLst>
+                              <p:par>
+                                <p:cTn id="21" presetID="1" presetClass="entr" presetSubtype="0" fill="hold" grpId="0" nodeType="clickEffect">
+                                  <p:stCondLst>
+                                    <p:cond delay="0"/>
+                                  </p:stCondLst>
+                                  <p:childTnLst>
+                                    <p:set>
+                                      <p:cBhvr>
+                                        <p:cTn id="22" dur="1" fill="hold">
+                                          <p:stCondLst>
+                                            <p:cond delay="0"/>
+                                          </p:stCondLst>
+                                        </p:cTn>
+                                        <p:tgtEl>
+                                          <p:spTgt spid="6"/>
+                                        </p:tgtEl>
+                                        <p:attrNameLst>
+                                          <p:attrName>style.visibility</p:attrName>
+                                        </p:attrNameLst>
+                                      </p:cBhvr>
+                                      <p:to>
+                                        <p:strVal val="visible"/>
+                                      </p:to>
+                                    </p:set>
+                                  </p:childTnLst>
+                                </p:cTn>
+                              </p:par>
+                            </p:childTnLst>
+                          </p:cTn>
+                        </p:par>
+                      </p:childTnLst>
+                    </p:cTn>
+                  </p:par>
+                  <p:par>
+                    <p:cTn id="23" fill="hold">
+                      <p:stCondLst>
+                        <p:cond delay="indefinite"/>
+                      </p:stCondLst>
+                      <p:childTnLst>
+                        <p:par>
+                          <p:cTn id="24" fill="hold">
+                            <p:stCondLst>
+                              <p:cond delay="0"/>
+                            </p:stCondLst>
+                            <p:childTnLst>
+                              <p:par>
+                                <p:cTn id="25" presetID="1" presetClass="entr" presetSubtype="0" fill="hold" grpId="0" nodeType="clickEffect">
+                                  <p:stCondLst>
+                                    <p:cond delay="0"/>
+                                  </p:stCondLst>
+                                  <p:childTnLst>
+                                    <p:set>
+                                      <p:cBhvr>
+                                        <p:cTn id="26" dur="1" fill="hold">
+                                          <p:stCondLst>
+                                            <p:cond delay="0"/>
+                                          </p:stCondLst>
+                                        </p:cTn>
+                                        <p:tgtEl>
+                                          <p:spTgt spid="7"/>
+                                        </p:tgtEl>
+                                        <p:attrNameLst>
+                                          <p:attrName>style.visibility</p:attrName>
+                                        </p:attrNameLst>
+                                      </p:cBhvr>
+                                      <p:to>
+                                        <p:strVal val="visible"/>
+                                      </p:to>
+                                    </p:set>
+                                  </p:childTnLst>
+                                </p:cTn>
+                              </p:par>
+                            </p:childTnLst>
+                          </p:cTn>
+                        </p:par>
+                      </p:childTnLst>
+                    </p:cTn>
+                  </p:par>
+                </p:childTnLst>
+              </p:cTn>
+              <p:prevCondLst>
+                <p:cond evt="onPrev" delay="0">
+                  <p:tgtEl>
+                    <p:sldTgt/>
+                  </p:tgtEl>
+                </p:cond>
+              </p:prevCondLst>
+              <p:nextCondLst>
+                <p:cond evt="onNext" delay="0">
+                  <p:tgtEl>
+                    <p:sldTgt/>
+                  </p:tgtEl>
+                </p:cond>
+              </p:nextCondLst>
+            </p:seq>
+          </p:childTnLst>
+        </p:cTn>
+      </p:par>
+    </p:tnLst>
+    <p:bldLst>
+      <p:bldP spid="3" grpId="0" uiExpand="1" build="p"/>
+      <p:bldP spid="6" grpId="0"/>
+      <p:bldP spid="7" grpId="0"/>
+    </p:bldLst>
+  </p:timing>
+</p:sld>
+</file>
+
+<file path=ppt/slides/slide11.xml><?xml version="1.0" encoding="utf-8"?>
+<p:sld xmlns:a="http://schemas.openxmlformats.org/drawingml/2006/main" xmlns:r="http://schemas.openxmlformats.org/officeDocument/2006/relationships" xmlns:p="http://schemas.openxmlformats.org/presentationml/2006/main">
+  <p:cSld>
+    <p:spTree>
+      <p:nvGrpSpPr>
+        <p:cNvPr id="1" name=""/>
+        <p:cNvGrpSpPr/>
+        <p:nvPr/>
+      </p:nvGrpSpPr>
+      <p:grpSpPr>
+        <a:xfrm>
+          <a:off x="0" y="0"/>
+          <a:ext cx="0" cy="0"/>
+          <a:chOff x="0" y="0"/>
+          <a:chExt cx="0" cy="0"/>
+        </a:xfrm>
+      </p:grpSpPr>
+      <p:sp>
+        <p:nvSpPr>
+          <p:cNvPr id="2" name="Title 1"/>
+          <p:cNvSpPr>
+            <a:spLocks noGrp="1"/>
+          </p:cNvSpPr>
+          <p:nvPr>
+            <p:ph type="title"/>
+          </p:nvPr>
+        </p:nvSpPr>
+        <p:spPr/>
+        <p:txBody>
+          <a:bodyPr/>
+          <a:lstStyle/>
+          <a:p>
+            <a:r>
+              <a:rPr lang="en-US" dirty="0" smtClean="0"/>
+              <a:t>Further reading</a:t>
+            </a:r>
+            <a:endParaRPr lang="en-US" dirty="0"/>
+          </a:p>
+        </p:txBody>
+      </p:sp>
+      <p:sp>
+        <p:nvSpPr>
+          <p:cNvPr id="3" name="Content Placeholder 2"/>
+          <p:cNvSpPr>
+            <a:spLocks noGrp="1"/>
+          </p:cNvSpPr>
+          <p:nvPr>
+            <p:ph idx="1"/>
+          </p:nvPr>
+        </p:nvSpPr>
+        <p:spPr/>
+        <p:txBody>
+          <a:bodyPr/>
+          <a:lstStyle/>
+          <a:p>
+            <a:r>
+              <a:rPr lang="en-US" dirty="0" smtClean="0"/>
+              <a:t>Fiona manual</a:t>
+            </a:r>
+            <a:r>
+              <a:rPr lang="en-US" dirty="0"/>
+              <a:t/>
+            </a:r>
+            <a:br>
+              <a:rPr lang="en-US" dirty="0"/>
+            </a:br>
+            <a:r>
+              <a:rPr lang="en-US" sz="2000" dirty="0">
+                <a:hlinkClick r:id="rId2"/>
+              </a:rPr>
+              <a:t>http://</a:t>
+            </a:r>
+            <a:r>
+              <a:rPr lang="en-US" sz="2000" dirty="0" smtClean="0">
+                <a:hlinkClick r:id="rId2"/>
+              </a:rPr>
+              <a:t>toblerity.org/fiona/index.html</a:t>
+            </a:r>
+            <a:endParaRPr lang="en-US" sz="2000" dirty="0" smtClean="0"/>
+          </a:p>
+          <a:p>
+            <a:r>
+              <a:rPr lang="en-US" dirty="0"/>
+              <a:t>Folium manual</a:t>
+            </a:r>
+            <a:br>
+              <a:rPr lang="en-US" dirty="0"/>
+            </a:br>
+            <a:r>
+              <a:rPr lang="en-US" sz="2000" dirty="0">
+                <a:hlinkClick r:id="rId3"/>
+              </a:rPr>
+              <a:t>http://python-visualization.github.io/folium/docs-master</a:t>
+            </a:r>
+            <a:r>
+              <a:rPr lang="en-US" sz="2000" dirty="0" smtClean="0">
+                <a:hlinkClick r:id="rId3"/>
+              </a:rPr>
+              <a:t>/</a:t>
+            </a:r>
+            <a:r>
+              <a:rPr lang="en-US" sz="2000" dirty="0" smtClean="0"/>
+              <a:t> </a:t>
+            </a:r>
+            <a:endParaRPr lang="en-US" dirty="0"/>
+          </a:p>
+          <a:p>
+            <a:r>
+              <a:rPr lang="en-US" dirty="0" smtClean="0"/>
+              <a:t>Shapely manual</a:t>
+            </a:r>
+            <a:br>
+              <a:rPr lang="en-US" dirty="0" smtClean="0"/>
+            </a:br>
+            <a:r>
+              <a:rPr lang="en-US" sz="2000" dirty="0">
+                <a:hlinkClick r:id="rId4"/>
+              </a:rPr>
+              <a:t>https://shapely.readthedocs.io/en/latest</a:t>
+            </a:r>
+            <a:r>
+              <a:rPr lang="en-US" sz="2000" dirty="0" smtClean="0">
+                <a:hlinkClick r:id="rId4"/>
+              </a:rPr>
+              <a:t>/</a:t>
+            </a:r>
+            <a:endParaRPr lang="en-US" sz="2000" dirty="0" smtClean="0"/>
+          </a:p>
+          <a:p>
+            <a:endParaRPr lang="en-US" dirty="0" smtClean="0"/>
+          </a:p>
+        </p:txBody>
+      </p:sp>
+      <p:sp>
+        <p:nvSpPr>
+          <p:cNvPr id="4" name="Slide Number Placeholder 3"/>
+          <p:cNvSpPr>
+            <a:spLocks noGrp="1"/>
+          </p:cNvSpPr>
+          <p:nvPr>
+            <p:ph type="sldNum" sz="quarter" idx="12"/>
+          </p:nvPr>
+        </p:nvSpPr>
+        <p:spPr/>
+        <p:txBody>
+          <a:bodyPr/>
+          <a:lstStyle/>
+          <a:p>
+            <a:fld id="{5A209D72-2E9D-49B0-8977-41DCCC66C0BB}" type="slidenum">
+              <a:rPr lang="nl-BE" smtClean="0">
+                <a:solidFill>
+                  <a:prstClr val="black">
+                    <a:tint val="75000"/>
+                  </a:prstClr>
+                </a:solidFill>
+              </a:rPr>
+              <a:pPr/>
+              <a:t>11</a:t>
             </a:fld>
             <a:endParaRPr lang="nl-BE">
               <a:solidFill>

</xml_diff>

<commit_message>
Add slide on Shapely buffer
</commit_message>
<xml_diff>
--- a/Python/python_gis.pptx
+++ b/Python/python_gis.pptx
@@ -5,7 +5,7 @@
     <p:sldMasterId id="2147483672" r:id="rId1"/>
   </p:sldMasterIdLst>
   <p:notesMasterIdLst>
-    <p:notesMasterId r:id="rId13"/>
+    <p:notesMasterId r:id="rId14"/>
   </p:notesMasterIdLst>
   <p:sldIdLst>
     <p:sldId id="256" r:id="rId2"/>
@@ -18,7 +18,8 @@
     <p:sldId id="271" r:id="rId9"/>
     <p:sldId id="272" r:id="rId10"/>
     <p:sldId id="273" r:id="rId11"/>
-    <p:sldId id="265" r:id="rId12"/>
+    <p:sldId id="274" r:id="rId12"/>
+    <p:sldId id="265" r:id="rId13"/>
   </p:sldIdLst>
   <p:sldSz cx="9144000" cy="6858000" type="screen4x3"/>
   <p:notesSz cx="6858000" cy="9144000"/>
@@ -4022,7 +4023,7 @@
           <a:p>
             <a:r>
               <a:rPr lang="en-US" dirty="0" smtClean="0"/>
-              <a:t>Shapely spatial analysis</a:t>
+              <a:t>Shapely: spatial analysis</a:t>
             </a:r>
             <a:endParaRPr lang="en-US" dirty="0"/>
           </a:p>
@@ -4040,7 +4041,9 @@
         </p:nvSpPr>
         <p:spPr/>
         <p:txBody>
-          <a:bodyPr/>
+          <a:bodyPr>
+            <a:normAutofit fontScale="92500" lnSpcReduction="20000"/>
+          </a:bodyPr>
           <a:lstStyle/>
           <a:p>
             <a:r>
@@ -4105,8 +4108,55 @@
               </a:rPr>
               <a:t>(b)</a:t>
             </a:r>
+          </a:p>
+          <a:p>
             <a:endParaRPr lang="en-US" dirty="0">
               <a:latin typeface="Courier New" panose="02070309020205020404" pitchFamily="49" charset="0"/>
+              <a:cs typeface="Courier New" panose="02070309020205020404" pitchFamily="49" charset="0"/>
+            </a:endParaRPr>
+          </a:p>
+          <a:p>
+            <a:endParaRPr lang="en-US" dirty="0" smtClean="0">
+              <a:latin typeface="Courier New" panose="02070309020205020404" pitchFamily="49" charset="0"/>
+              <a:cs typeface="Courier New" panose="02070309020205020404" pitchFamily="49" charset="0"/>
+            </a:endParaRPr>
+          </a:p>
+          <a:p>
+            <a:endParaRPr lang="en-US" dirty="0">
+              <a:latin typeface="Courier New" panose="02070309020205020404" pitchFamily="49" charset="0"/>
+              <a:cs typeface="Courier New" panose="02070309020205020404" pitchFamily="49" charset="0"/>
+            </a:endParaRPr>
+          </a:p>
+          <a:p>
+            <a:r>
+              <a:rPr lang="en-US" dirty="0" err="1" smtClean="0">
+                <a:latin typeface="Courier New" panose="02070309020205020404" pitchFamily="49" charset="0"/>
+                <a:cs typeface="Courier New" panose="02070309020205020404" pitchFamily="49" charset="0"/>
+              </a:rPr>
+              <a:t>a.boundary</a:t>
+            </a:r>
+            <a:r>
+              <a:rPr lang="en-US" dirty="0" smtClean="0">
+                <a:cs typeface="Courier New" panose="02070309020205020404" pitchFamily="49" charset="0"/>
+              </a:rPr>
+              <a:t>: one dimension less</a:t>
+            </a:r>
+          </a:p>
+          <a:p>
+            <a:r>
+              <a:rPr lang="en-US" dirty="0" err="1" smtClean="0">
+                <a:latin typeface="Courier New" panose="02070309020205020404" pitchFamily="49" charset="0"/>
+                <a:cs typeface="Courier New" panose="02070309020205020404" pitchFamily="49" charset="0"/>
+              </a:rPr>
+              <a:t>a.centroid</a:t>
+            </a:r>
+            <a:r>
+              <a:rPr lang="en-US" dirty="0" smtClean="0">
+                <a:cs typeface="Courier New" panose="02070309020205020404" pitchFamily="49" charset="0"/>
+              </a:rPr>
+              <a:t>: "mean" position</a:t>
+            </a:r>
+            <a:endParaRPr lang="en-US" dirty="0">
               <a:cs typeface="Courier New" panose="02070309020205020404" pitchFamily="49" charset="0"/>
             </a:endParaRPr>
           </a:p>
@@ -4156,7 +4206,7 @@
         </p:nvSpPr>
         <p:spPr>
           <a:xfrm>
-            <a:off x="5947507" y="2104845"/>
+            <a:off x="5835364" y="1740928"/>
             <a:ext cx="2054793" cy="954107"/>
           </a:xfrm>
           <a:prstGeom prst="rect">
@@ -4198,7 +4248,7 @@
         </p:nvSpPr>
         <p:spPr>
           <a:xfrm>
-            <a:off x="397351" y="4287328"/>
+            <a:off x="397351" y="3536848"/>
             <a:ext cx="8289449" cy="400110"/>
           </a:xfrm>
           <a:prstGeom prst="rect">
@@ -4276,7 +4326,7 @@
         </p:nvSpPr>
         <p:spPr>
           <a:xfrm>
-            <a:off x="457200" y="5015731"/>
+            <a:off x="397351" y="3936958"/>
             <a:ext cx="7366119" cy="707886"/>
           </a:xfrm>
           <a:prstGeom prst="rect">
@@ -4370,6 +4420,52 @@
               <a:latin typeface="Courier New" panose="02070309020205020404" pitchFamily="49" charset="0"/>
               <a:cs typeface="Courier New" panose="02070309020205020404" pitchFamily="49" charset="0"/>
             </a:endParaRPr>
+          </a:p>
+        </p:txBody>
+      </p:sp>
+      <p:sp>
+        <p:nvSpPr>
+          <p:cNvPr id="8" name="TextBox 7"/>
+          <p:cNvSpPr txBox="1"/>
+          <p:nvPr/>
+        </p:nvSpPr>
+        <p:spPr>
+          <a:xfrm>
+            <a:off x="1017917" y="5895330"/>
+            <a:ext cx="6333529" cy="461665"/>
+          </a:xfrm>
+          <a:prstGeom prst="rect">
+            <a:avLst/>
+          </a:prstGeom>
+          <a:noFill/>
+          <a:ln>
+            <a:solidFill>
+              <a:schemeClr val="tx1"/>
+            </a:solidFill>
+          </a:ln>
+        </p:spPr>
+        <p:txBody>
+          <a:bodyPr wrap="none" rtlCol="0">
+            <a:spAutoFit/>
+          </a:bodyPr>
+          <a:lstStyle/>
+          <a:p>
+            <a:r>
+              <a:rPr lang="en-US" sz="2400" dirty="0" smtClean="0"/>
+              <a:t>Note: use </a:t>
+            </a:r>
+            <a:r>
+              <a:rPr lang="en-US" sz="2400" dirty="0" err="1" smtClean="0">
+                <a:latin typeface="Courier New" panose="02070309020205020404" pitchFamily="49" charset="0"/>
+                <a:cs typeface="Courier New" panose="02070309020205020404" pitchFamily="49" charset="0"/>
+              </a:rPr>
+              <a:t>cascading_union</a:t>
+            </a:r>
+            <a:r>
+              <a:rPr lang="en-US" sz="2400" dirty="0" smtClean="0"/>
+              <a:t> for performance</a:t>
+            </a:r>
+            <a:endParaRPr lang="en-US" sz="2400" dirty="0"/>
           </a:p>
         </p:txBody>
       </p:sp>
@@ -4613,7 +4709,11 @@
                                           </p:stCondLst>
                                         </p:cTn>
                                         <p:tgtEl>
-                                          <p:spTgt spid="6"/>
+                                          <p:spTgt spid="3">
+                                            <p:txEl>
+                                              <p:pRg st="7" end="7"/>
+                                            </p:txEl>
+                                          </p:spTgt>
                                         </p:tgtEl>
                                         <p:attrNameLst>
                                           <p:attrName>style.visibility</p:attrName>
@@ -4658,7 +4758,146 @@
                                           </p:stCondLst>
                                         </p:cTn>
                                         <p:tgtEl>
+                                          <p:spTgt spid="3">
+                                            <p:txEl>
+                                              <p:pRg st="8" end="8"/>
+                                            </p:txEl>
+                                          </p:spTgt>
+                                        </p:tgtEl>
+                                        <p:attrNameLst>
+                                          <p:attrName>style.visibility</p:attrName>
+                                        </p:attrNameLst>
+                                      </p:cBhvr>
+                                      <p:to>
+                                        <p:strVal val="visible"/>
+                                      </p:to>
+                                    </p:set>
+                                  </p:childTnLst>
+                                </p:cTn>
+                              </p:par>
+                            </p:childTnLst>
+                          </p:cTn>
+                        </p:par>
+                      </p:childTnLst>
+                    </p:cTn>
+                  </p:par>
+                  <p:par>
+                    <p:cTn id="27" fill="hold">
+                      <p:stCondLst>
+                        <p:cond delay="indefinite"/>
+                      </p:stCondLst>
+                      <p:childTnLst>
+                        <p:par>
+                          <p:cTn id="28" fill="hold">
+                            <p:stCondLst>
+                              <p:cond delay="0"/>
+                            </p:stCondLst>
+                            <p:childTnLst>
+                              <p:par>
+                                <p:cTn id="29" presetID="1" presetClass="entr" presetSubtype="0" fill="hold" grpId="0" nodeType="clickEffect">
+                                  <p:stCondLst>
+                                    <p:cond delay="0"/>
+                                  </p:stCondLst>
+                                  <p:childTnLst>
+                                    <p:set>
+                                      <p:cBhvr>
+                                        <p:cTn id="30" dur="1" fill="hold">
+                                          <p:stCondLst>
+                                            <p:cond delay="0"/>
+                                          </p:stCondLst>
+                                        </p:cTn>
+                                        <p:tgtEl>
+                                          <p:spTgt spid="6"/>
+                                        </p:tgtEl>
+                                        <p:attrNameLst>
+                                          <p:attrName>style.visibility</p:attrName>
+                                        </p:attrNameLst>
+                                      </p:cBhvr>
+                                      <p:to>
+                                        <p:strVal val="visible"/>
+                                      </p:to>
+                                    </p:set>
+                                  </p:childTnLst>
+                                </p:cTn>
+                              </p:par>
+                            </p:childTnLst>
+                          </p:cTn>
+                        </p:par>
+                      </p:childTnLst>
+                    </p:cTn>
+                  </p:par>
+                  <p:par>
+                    <p:cTn id="31" fill="hold">
+                      <p:stCondLst>
+                        <p:cond delay="indefinite"/>
+                      </p:stCondLst>
+                      <p:childTnLst>
+                        <p:par>
+                          <p:cTn id="32" fill="hold">
+                            <p:stCondLst>
+                              <p:cond delay="0"/>
+                            </p:stCondLst>
+                            <p:childTnLst>
+                              <p:par>
+                                <p:cTn id="33" presetID="1" presetClass="entr" presetSubtype="0" fill="hold" grpId="0" nodeType="clickEffect">
+                                  <p:stCondLst>
+                                    <p:cond delay="0"/>
+                                  </p:stCondLst>
+                                  <p:childTnLst>
+                                    <p:set>
+                                      <p:cBhvr>
+                                        <p:cTn id="34" dur="1" fill="hold">
+                                          <p:stCondLst>
+                                            <p:cond delay="0"/>
+                                          </p:stCondLst>
+                                        </p:cTn>
+                                        <p:tgtEl>
                                           <p:spTgt spid="7"/>
+                                        </p:tgtEl>
+                                        <p:attrNameLst>
+                                          <p:attrName>style.visibility</p:attrName>
+                                        </p:attrNameLst>
+                                      </p:cBhvr>
+                                      <p:to>
+                                        <p:strVal val="visible"/>
+                                      </p:to>
+                                    </p:set>
+                                  </p:childTnLst>
+                                </p:cTn>
+                              </p:par>
+                            </p:childTnLst>
+                          </p:cTn>
+                        </p:par>
+                      </p:childTnLst>
+                    </p:cTn>
+                  </p:par>
+                  <p:par>
+                    <p:cTn id="35" fill="hold">
+                      <p:stCondLst>
+                        <p:cond delay="indefinite"/>
+                      </p:stCondLst>
+                      <p:childTnLst>
+                        <p:par>
+                          <p:cTn id="36" fill="hold">
+                            <p:stCondLst>
+                              <p:cond delay="0"/>
+                            </p:stCondLst>
+                            <p:childTnLst>
+                              <p:par>
+                                <p:cTn id="37" presetID="1" presetClass="entr" presetSubtype="0" fill="hold" grpId="0" nodeType="clickEffect">
+                                  <p:stCondLst>
+                                    <p:cond delay="0"/>
+                                  </p:stCondLst>
+                                  <p:childTnLst>
+                                    <p:set>
+                                      <p:cBhvr>
+                                        <p:cTn id="38" dur="1" fill="hold">
+                                          <p:stCondLst>
+                                            <p:cond delay="0"/>
+                                          </p:stCondLst>
+                                        </p:cTn>
+                                        <p:tgtEl>
+                                          <p:spTgt spid="8"/>
                                         </p:tgtEl>
                                         <p:attrNameLst>
                                           <p:attrName>style.visibility</p:attrName>
@@ -4702,6 +4941,7 @@
       <p:bldP spid="3" grpId="0" uiExpand="1" build="p"/>
       <p:bldP spid="6" grpId="0"/>
       <p:bldP spid="7" grpId="0"/>
+      <p:bldP spid="8" grpId="0" animBg="1"/>
     </p:bldLst>
   </p:timing>
 </p:sld>
@@ -4741,7 +4981,7 @@
           <a:p>
             <a:r>
               <a:rPr lang="en-US" dirty="0" smtClean="0"/>
-              <a:t>Further reading</a:t>
+              <a:t>Shapely: buffer</a:t>
             </a:r>
             <a:endParaRPr lang="en-US" dirty="0"/>
           </a:p>
@@ -4763,80 +5003,45 @@
           <a:lstStyle/>
           <a:p>
             <a:r>
+              <a:rPr lang="en-US" dirty="0" smtClean="0">
+                <a:latin typeface="Courier New" panose="02070309020205020404" pitchFamily="49" charset="0"/>
+                <a:cs typeface="Courier New" panose="02070309020205020404" pitchFamily="49" charset="0"/>
+              </a:rPr>
+              <a:t>Point</a:t>
+            </a:r>
+            <a:r>
               <a:rPr lang="en-US" dirty="0" smtClean="0"/>
-              <a:t>Fiona manual</a:t>
-            </a:r>
-            <a:r>
-              <a:rPr lang="en-US" dirty="0"/>
-              <a:t/>
-            </a:r>
-            <a:br>
-              <a:rPr lang="en-US" dirty="0"/>
-            </a:br>
-            <a:r>
-              <a:rPr lang="en-US" sz="2000" dirty="0">
-                <a:hlinkClick r:id="rId2"/>
-              </a:rPr>
-              <a:t>http://</a:t>
-            </a:r>
-            <a:r>
-              <a:rPr lang="en-US" sz="2000" dirty="0" smtClean="0">
-                <a:hlinkClick r:id="rId2"/>
-              </a:rPr>
-              <a:t>toblerity.org/fiona/index.html</a:t>
-            </a:r>
-            <a:endParaRPr lang="en-US" sz="2000" dirty="0" smtClean="0"/>
-          </a:p>
-          <a:p>
-            <a:r>
-              <a:rPr lang="en-US" dirty="0"/>
-              <a:t>Folium manual</a:t>
-            </a:r>
-            <a:br>
-              <a:rPr lang="en-US" dirty="0"/>
-            </a:br>
-            <a:r>
-              <a:rPr lang="en-US" sz="2000" dirty="0">
-                <a:hlinkClick r:id="rId3"/>
-              </a:rPr>
-              <a:t>http://python-visualization.github.io/folium/docs-master</a:t>
-            </a:r>
-            <a:r>
-              <a:rPr lang="en-US" sz="2000" dirty="0" smtClean="0">
-                <a:hlinkClick r:id="rId3"/>
-              </a:rPr>
-              <a:t>/</a:t>
-            </a:r>
-            <a:r>
-              <a:rPr lang="en-US" sz="2000" dirty="0" smtClean="0"/>
-              <a:t> </a:t>
+              <a:t>: 0D, </a:t>
+            </a:r>
+            <a:r>
+              <a:rPr lang="en-US" dirty="0" err="1" smtClean="0">
+                <a:latin typeface="Courier New" panose="02070309020205020404" pitchFamily="49" charset="0"/>
+                <a:cs typeface="Courier New" panose="02070309020205020404" pitchFamily="49" charset="0"/>
+              </a:rPr>
+              <a:t>LineString</a:t>
+            </a:r>
+            <a:r>
+              <a:rPr lang="en-US" dirty="0" smtClean="0"/>
+              <a:t>: 1D</a:t>
+            </a:r>
+          </a:p>
+          <a:p>
+            <a:pPr lvl="1"/>
+            <a:r>
+              <a:rPr lang="en-US" dirty="0" smtClean="0"/>
+              <a:t>buffer operation </a:t>
+            </a:r>
+            <a:r>
+              <a:rPr lang="en-US" dirty="0" smtClean="0">
+                <a:sym typeface="Symbol" panose="05050102010706020507" pitchFamily="18" charset="2"/>
+              </a:rPr>
+              <a:t></a:t>
+            </a:r>
+            <a:r>
+              <a:rPr lang="en-US" dirty="0" smtClean="0"/>
+              <a:t> 2D</a:t>
             </a:r>
             <a:endParaRPr lang="en-US" dirty="0"/>
-          </a:p>
-          <a:p>
-            <a:r>
-              <a:rPr lang="en-US" dirty="0" smtClean="0"/>
-              <a:t>Shapely manual</a:t>
-            </a:r>
-            <a:br>
-              <a:rPr lang="en-US" dirty="0" smtClean="0"/>
-            </a:br>
-            <a:r>
-              <a:rPr lang="en-US" sz="2000" dirty="0">
-                <a:hlinkClick r:id="rId4"/>
-              </a:rPr>
-              <a:t>https://shapely.readthedocs.io/en/latest</a:t>
-            </a:r>
-            <a:r>
-              <a:rPr lang="en-US" sz="2000" dirty="0" smtClean="0">
-                <a:hlinkClick r:id="rId4"/>
-              </a:rPr>
-              <a:t>/</a:t>
-            </a:r>
-            <a:endParaRPr lang="en-US" sz="2000" dirty="0" smtClean="0"/>
-          </a:p>
-          <a:p>
-            <a:endParaRPr lang="en-US" dirty="0" smtClean="0"/>
           </a:p>
         </p:txBody>
       </p:sp>
@@ -4865,6 +5070,195 @@
               </a:rPr>
               <a:pPr/>
               <a:t>11</a:t>
+            </a:fld>
+            <a:endParaRPr lang="nl-BE">
+              <a:solidFill>
+                <a:prstClr val="black">
+                  <a:tint val="75000"/>
+                </a:prstClr>
+              </a:solidFill>
+            </a:endParaRPr>
+          </a:p>
+        </p:txBody>
+      </p:sp>
+    </p:spTree>
+    <p:extLst>
+      <p:ext uri="{BB962C8B-B14F-4D97-AF65-F5344CB8AC3E}">
+        <p14:creationId xmlns:p14="http://schemas.microsoft.com/office/powerpoint/2010/main" val="3929986609"/>
+      </p:ext>
+    </p:extLst>
+  </p:cSld>
+  <p:clrMapOvr>
+    <a:masterClrMapping/>
+  </p:clrMapOvr>
+  <p:timing>
+    <p:tnLst>
+      <p:par>
+        <p:cTn id="1" dur="indefinite" restart="never" nodeType="tmRoot"/>
+      </p:par>
+    </p:tnLst>
+  </p:timing>
+</p:sld>
+</file>
+
+<file path=ppt/slides/slide12.xml><?xml version="1.0" encoding="utf-8"?>
+<p:sld xmlns:a="http://schemas.openxmlformats.org/drawingml/2006/main" xmlns:r="http://schemas.openxmlformats.org/officeDocument/2006/relationships" xmlns:p="http://schemas.openxmlformats.org/presentationml/2006/main">
+  <p:cSld>
+    <p:spTree>
+      <p:nvGrpSpPr>
+        <p:cNvPr id="1" name=""/>
+        <p:cNvGrpSpPr/>
+        <p:nvPr/>
+      </p:nvGrpSpPr>
+      <p:grpSpPr>
+        <a:xfrm>
+          <a:off x="0" y="0"/>
+          <a:ext cx="0" cy="0"/>
+          <a:chOff x="0" y="0"/>
+          <a:chExt cx="0" cy="0"/>
+        </a:xfrm>
+      </p:grpSpPr>
+      <p:sp>
+        <p:nvSpPr>
+          <p:cNvPr id="2" name="Title 1"/>
+          <p:cNvSpPr>
+            <a:spLocks noGrp="1"/>
+          </p:cNvSpPr>
+          <p:nvPr>
+            <p:ph type="title"/>
+          </p:nvPr>
+        </p:nvSpPr>
+        <p:spPr/>
+        <p:txBody>
+          <a:bodyPr/>
+          <a:lstStyle/>
+          <a:p>
+            <a:r>
+              <a:rPr lang="en-US" dirty="0" smtClean="0"/>
+              <a:t>Further reading</a:t>
+            </a:r>
+            <a:endParaRPr lang="en-US" dirty="0"/>
+          </a:p>
+        </p:txBody>
+      </p:sp>
+      <p:sp>
+        <p:nvSpPr>
+          <p:cNvPr id="3" name="Content Placeholder 2"/>
+          <p:cNvSpPr>
+            <a:spLocks noGrp="1"/>
+          </p:cNvSpPr>
+          <p:nvPr>
+            <p:ph idx="1"/>
+          </p:nvPr>
+        </p:nvSpPr>
+        <p:spPr/>
+        <p:txBody>
+          <a:bodyPr/>
+          <a:lstStyle/>
+          <a:p>
+            <a:r>
+              <a:rPr lang="en-US" dirty="0" smtClean="0"/>
+              <a:t>Fiona manual</a:t>
+            </a:r>
+            <a:r>
+              <a:rPr lang="en-US" dirty="0"/>
+              <a:t/>
+            </a:r>
+            <a:br>
+              <a:rPr lang="en-US" dirty="0"/>
+            </a:br>
+            <a:r>
+              <a:rPr lang="en-US" sz="2000" dirty="0">
+                <a:hlinkClick r:id="rId2"/>
+              </a:rPr>
+              <a:t>http://</a:t>
+            </a:r>
+            <a:r>
+              <a:rPr lang="en-US" sz="2000" dirty="0" smtClean="0">
+                <a:hlinkClick r:id="rId2"/>
+              </a:rPr>
+              <a:t>toblerity.org/fiona/index.html</a:t>
+            </a:r>
+            <a:endParaRPr lang="en-US" sz="2000" dirty="0" smtClean="0"/>
+          </a:p>
+          <a:p>
+            <a:r>
+              <a:rPr lang="en-US" dirty="0"/>
+              <a:t>Folium manual</a:t>
+            </a:r>
+            <a:br>
+              <a:rPr lang="en-US" dirty="0"/>
+            </a:br>
+            <a:r>
+              <a:rPr lang="en-US" sz="2000" dirty="0">
+                <a:hlinkClick r:id="rId3"/>
+              </a:rPr>
+              <a:t>http://python-visualization.github.io/folium/docs-master</a:t>
+            </a:r>
+            <a:r>
+              <a:rPr lang="en-US" sz="2000" dirty="0" smtClean="0">
+                <a:hlinkClick r:id="rId3"/>
+              </a:rPr>
+              <a:t>/</a:t>
+            </a:r>
+            <a:r>
+              <a:rPr lang="en-US" sz="2000" dirty="0" smtClean="0"/>
+              <a:t> </a:t>
+            </a:r>
+            <a:endParaRPr lang="en-US" dirty="0"/>
+          </a:p>
+          <a:p>
+            <a:r>
+              <a:rPr lang="en-US" dirty="0" smtClean="0"/>
+              <a:t>Shapely manual</a:t>
+            </a:r>
+            <a:br>
+              <a:rPr lang="en-US" dirty="0" smtClean="0"/>
+            </a:br>
+            <a:r>
+              <a:rPr lang="en-US" sz="2000" dirty="0">
+                <a:hlinkClick r:id="rId4"/>
+              </a:rPr>
+              <a:t>https://shapely.readthedocs.io/en/latest</a:t>
+            </a:r>
+            <a:r>
+              <a:rPr lang="en-US" sz="2000" dirty="0" smtClean="0">
+                <a:hlinkClick r:id="rId4"/>
+              </a:rPr>
+              <a:t>/</a:t>
+            </a:r>
+            <a:endParaRPr lang="en-US" sz="2000" dirty="0" smtClean="0"/>
+          </a:p>
+          <a:p>
+            <a:endParaRPr lang="en-US" dirty="0" smtClean="0"/>
+          </a:p>
+        </p:txBody>
+      </p:sp>
+      <p:sp>
+        <p:nvSpPr>
+          <p:cNvPr id="4" name="Slide Number Placeholder 3"/>
+          <p:cNvSpPr>
+            <a:spLocks noGrp="1"/>
+          </p:cNvSpPr>
+          <p:nvPr>
+            <p:ph type="sldNum" sz="quarter" idx="12"/>
+          </p:nvPr>
+        </p:nvSpPr>
+        <p:spPr/>
+        <p:txBody>
+          <a:bodyPr/>
+          <a:lstStyle/>
+          <a:p>
+            <a:fld id="{5A209D72-2E9D-49B0-8977-41DCCC66C0BB}" type="slidenum">
+              <a:rPr lang="nl-BE" smtClean="0">
+                <a:solidFill>
+                  <a:prstClr val="black">
+                    <a:tint val="75000"/>
+                  </a:prstClr>
+                </a:solidFill>
+              </a:rPr>
+              <a:pPr/>
+              <a:t>12</a:t>
             </a:fld>
             <a:endParaRPr lang="nl-BE">
               <a:solidFill>
@@ -8853,7 +9247,11 @@
           <a:p>
             <a:r>
               <a:rPr lang="en-US" dirty="0" smtClean="0"/>
-              <a:t>Shapely geometric objects</a:t>
+              <a:t>Shapely: </a:t>
+            </a:r>
+            <a:r>
+              <a:rPr lang="en-US" dirty="0" smtClean="0"/>
+              <a:t>geometric objects</a:t>
             </a:r>
             <a:endParaRPr lang="en-US" dirty="0"/>
           </a:p>
@@ -8877,7 +9275,7 @@
         </p:spPr>
         <p:txBody>
           <a:bodyPr>
-            <a:normAutofit fontScale="85000" lnSpcReduction="10000"/>
+            <a:normAutofit fontScale="85000" lnSpcReduction="20000"/>
           </a:bodyPr>
           <a:lstStyle/>
           <a:p>
@@ -8890,8 +9288,26 @@
             </a:r>
             <a:r>
               <a:rPr lang="en-US" dirty="0" smtClean="0"/>
-              <a:t>: 2D or 3D</a:t>
-            </a:r>
+              <a:t>: 2D or </a:t>
+            </a:r>
+            <a:r>
+              <a:rPr lang="en-US" dirty="0" smtClean="0"/>
+              <a:t>3D</a:t>
+            </a:r>
+          </a:p>
+          <a:p>
+            <a:r>
+              <a:rPr lang="en-US" dirty="0" smtClean="0">
+                <a:latin typeface="Courier New" panose="02070309020205020404" pitchFamily="49" charset="0"/>
+                <a:cs typeface="Courier New" panose="02070309020205020404" pitchFamily="49" charset="0"/>
+              </a:rPr>
+              <a:t>MultiPoint</a:t>
+            </a:r>
+            <a:r>
+              <a:rPr lang="en-US" dirty="0" smtClean="0"/>
+              <a:t>: collection of Point</a:t>
+            </a:r>
+            <a:endParaRPr lang="en-US" dirty="0" smtClean="0"/>
           </a:p>
           <a:p>
             <a:r>
@@ -9098,7 +9514,7 @@
         </p:blipFill>
         <p:spPr>
           <a:xfrm>
-            <a:off x="6275717" y="1858758"/>
+            <a:off x="6236983" y="2108924"/>
             <a:ext cx="1033374" cy="555830"/>
           </a:xfrm>
           <a:prstGeom prst="rect">
@@ -9135,7 +9551,7 @@
         </p:blipFill>
         <p:spPr>
           <a:xfrm>
-            <a:off x="7669161" y="2414588"/>
+            <a:off x="7669161" y="2796381"/>
             <a:ext cx="1257300" cy="581025"/>
           </a:xfrm>
           <a:prstGeom prst="rect">
@@ -9337,15 +9753,64 @@
                                   </p:childTnLst>
                                 </p:cTn>
                               </p:par>
+                            </p:childTnLst>
+                          </p:cTn>
+                        </p:par>
+                      </p:childTnLst>
+                    </p:cTn>
+                  </p:par>
+                  <p:par>
+                    <p:cTn id="11" fill="hold">
+                      <p:stCondLst>
+                        <p:cond delay="indefinite"/>
+                      </p:stCondLst>
+                      <p:childTnLst>
+                        <p:par>
+                          <p:cTn id="12" fill="hold">
+                            <p:stCondLst>
+                              <p:cond delay="0"/>
+                            </p:stCondLst>
+                            <p:childTnLst>
                               <p:par>
-                                <p:cTn id="11" presetID="1" presetClass="entr" presetSubtype="0" fill="hold" nodeType="withEffect">
+                                <p:cTn id="13" presetID="1" presetClass="entr" presetSubtype="0" fill="hold" grpId="0" nodeType="clickEffect">
                                   <p:stCondLst>
                                     <p:cond delay="0"/>
                                   </p:stCondLst>
                                   <p:childTnLst>
                                     <p:set>
                                       <p:cBhvr>
-                                        <p:cTn id="12" dur="1" fill="hold">
+                                        <p:cTn id="14" dur="1" fill="hold">
+                                          <p:stCondLst>
+                                            <p:cond delay="0"/>
+                                          </p:stCondLst>
+                                        </p:cTn>
+                                        <p:tgtEl>
+                                          <p:spTgt spid="3">
+                                            <p:txEl>
+                                              <p:pRg st="2" end="2"/>
+                                            </p:txEl>
+                                          </p:spTgt>
+                                        </p:tgtEl>
+                                        <p:attrNameLst>
+                                          <p:attrName>style.visibility</p:attrName>
+                                        </p:attrNameLst>
+                                      </p:cBhvr>
+                                      <p:to>
+                                        <p:strVal val="visible"/>
+                                      </p:to>
+                                    </p:set>
+                                  </p:childTnLst>
+                                </p:cTn>
+                              </p:par>
+                              <p:par>
+                                <p:cTn id="15" presetID="1" presetClass="entr" presetSubtype="0" fill="hold" nodeType="withEffect">
+                                  <p:stCondLst>
+                                    <p:cond delay="0"/>
+                                  </p:stCondLst>
+                                  <p:childTnLst>
+                                    <p:set>
+                                      <p:cBhvr>
+                                        <p:cTn id="16" dur="1" fill="hold">
                                           <p:stCondLst>
                                             <p:cond delay="0"/>
                                           </p:stCondLst>
@@ -9371,26 +9836,26 @@
                     </p:cTn>
                   </p:par>
                   <p:par>
-                    <p:cTn id="13" fill="hold">
+                    <p:cTn id="17" fill="hold">
                       <p:stCondLst>
                         <p:cond delay="indefinite"/>
                       </p:stCondLst>
                       <p:childTnLst>
                         <p:par>
-                          <p:cTn id="14" fill="hold">
+                          <p:cTn id="18" fill="hold">
                             <p:stCondLst>
                               <p:cond delay="0"/>
                             </p:stCondLst>
                             <p:childTnLst>
                               <p:par>
-                                <p:cTn id="15" presetID="1" presetClass="entr" presetSubtype="0" fill="hold" grpId="0" nodeType="clickEffect">
+                                <p:cTn id="19" presetID="1" presetClass="entr" presetSubtype="0" fill="hold" grpId="0" nodeType="clickEffect">
                                   <p:stCondLst>
                                     <p:cond delay="0"/>
                                   </p:stCondLst>
                                   <p:childTnLst>
                                     <p:set>
                                       <p:cBhvr>
-                                        <p:cTn id="16" dur="1" fill="hold">
+                                        <p:cTn id="20" dur="1" fill="hold">
                                           <p:stCondLst>
                                             <p:cond delay="0"/>
                                           </p:stCondLst>
@@ -9398,7 +9863,7 @@
                                         <p:tgtEl>
                                           <p:spTgt spid="3">
                                             <p:txEl>
-                                              <p:pRg st="2" end="2"/>
+                                              <p:pRg st="3" end="3"/>
                                             </p:txEl>
                                           </p:spTgt>
                                         </p:tgtEl>
@@ -9414,14 +9879,14 @@
                                 </p:cTn>
                               </p:par>
                               <p:par>
-                                <p:cTn id="17" presetID="1" presetClass="entr" presetSubtype="0" fill="hold" nodeType="withEffect">
+                                <p:cTn id="21" presetID="1" presetClass="entr" presetSubtype="0" fill="hold" nodeType="withEffect">
                                   <p:stCondLst>
                                     <p:cond delay="0"/>
                                   </p:stCondLst>
                                   <p:childTnLst>
                                     <p:set>
                                       <p:cBhvr>
-                                        <p:cTn id="18" dur="1" fill="hold">
+                                        <p:cTn id="22" dur="1" fill="hold">
                                           <p:stCondLst>
                                             <p:cond delay="0"/>
                                           </p:stCondLst>
@@ -9447,57 +9912,26 @@
                     </p:cTn>
                   </p:par>
                   <p:par>
-                    <p:cTn id="19" fill="hold">
+                    <p:cTn id="23" fill="hold">
                       <p:stCondLst>
                         <p:cond delay="indefinite"/>
                       </p:stCondLst>
                       <p:childTnLst>
                         <p:par>
-                          <p:cTn id="20" fill="hold">
+                          <p:cTn id="24" fill="hold">
                             <p:stCondLst>
                               <p:cond delay="0"/>
                             </p:stCondLst>
                             <p:childTnLst>
                               <p:par>
-                                <p:cTn id="21" presetID="1" presetClass="entr" presetSubtype="0" fill="hold" grpId="0" nodeType="clickEffect">
+                                <p:cTn id="25" presetID="1" presetClass="entr" presetSubtype="0" fill="hold" grpId="0" nodeType="clickEffect">
                                   <p:stCondLst>
                                     <p:cond delay="0"/>
                                   </p:stCondLst>
                                   <p:childTnLst>
                                     <p:set>
                                       <p:cBhvr>
-                                        <p:cTn id="22" dur="1" fill="hold">
-                                          <p:stCondLst>
-                                            <p:cond delay="0"/>
-                                          </p:stCondLst>
-                                        </p:cTn>
-                                        <p:tgtEl>
-                                          <p:spTgt spid="3">
-                                            <p:txEl>
-                                              <p:pRg st="3" end="3"/>
-                                            </p:txEl>
-                                          </p:spTgt>
-                                        </p:tgtEl>
-                                        <p:attrNameLst>
-                                          <p:attrName>style.visibility</p:attrName>
-                                        </p:attrNameLst>
-                                      </p:cBhvr>
-                                      <p:to>
-                                        <p:strVal val="visible"/>
-                                      </p:to>
-                                    </p:set>
-                                  </p:childTnLst>
-                                </p:cTn>
-                              </p:par>
-                              <p:par>
-                                <p:cTn id="23" presetID="1" presetClass="entr" presetSubtype="0" fill="hold" grpId="0" nodeType="withEffect">
-                                  <p:stCondLst>
-                                    <p:cond delay="0"/>
-                                  </p:stCondLst>
-                                  <p:childTnLst>
-                                    <p:set>
-                                      <p:cBhvr>
-                                        <p:cTn id="24" dur="1" fill="hold">
+                                        <p:cTn id="26" dur="1" fill="hold">
                                           <p:stCondLst>
                                             <p:cond delay="0"/>
                                           </p:stCondLst>
@@ -9520,26 +9954,8 @@
                                   </p:childTnLst>
                                 </p:cTn>
                               </p:par>
-                            </p:childTnLst>
-                          </p:cTn>
-                        </p:par>
-                      </p:childTnLst>
-                    </p:cTn>
-                  </p:par>
-                  <p:par>
-                    <p:cTn id="25" fill="hold">
-                      <p:stCondLst>
-                        <p:cond delay="indefinite"/>
-                      </p:stCondLst>
-                      <p:childTnLst>
-                        <p:par>
-                          <p:cTn id="26" fill="hold">
-                            <p:stCondLst>
-                              <p:cond delay="0"/>
-                            </p:stCondLst>
-                            <p:childTnLst>
                               <p:par>
-                                <p:cTn id="27" presetID="1" presetClass="entr" presetSubtype="0" fill="hold" grpId="0" nodeType="clickEffect">
+                                <p:cTn id="27" presetID="1" presetClass="entr" presetSubtype="0" fill="hold" grpId="0" nodeType="withEffect">
                                   <p:stCondLst>
                                     <p:cond delay="0"/>
                                   </p:stCondLst>
@@ -9569,15 +9985,33 @@
                                   </p:childTnLst>
                                 </p:cTn>
                               </p:par>
+                            </p:childTnLst>
+                          </p:cTn>
+                        </p:par>
+                      </p:childTnLst>
+                    </p:cTn>
+                  </p:par>
+                  <p:par>
+                    <p:cTn id="29" fill="hold">
+                      <p:stCondLst>
+                        <p:cond delay="indefinite"/>
+                      </p:stCondLst>
+                      <p:childTnLst>
+                        <p:par>
+                          <p:cTn id="30" fill="hold">
+                            <p:stCondLst>
+                              <p:cond delay="0"/>
+                            </p:stCondLst>
+                            <p:childTnLst>
                               <p:par>
-                                <p:cTn id="29" presetID="1" presetClass="entr" presetSubtype="0" fill="hold" grpId="0" nodeType="withEffect">
+                                <p:cTn id="31" presetID="1" presetClass="entr" presetSubtype="0" fill="hold" grpId="0" nodeType="clickEffect">
                                   <p:stCondLst>
                                     <p:cond delay="0"/>
                                   </p:stCondLst>
                                   <p:childTnLst>
                                     <p:set>
                                       <p:cBhvr>
-                                        <p:cTn id="30" dur="1" fill="hold">
+                                        <p:cTn id="32" dur="1" fill="hold">
                                           <p:stCondLst>
                                             <p:cond delay="0"/>
                                           </p:stCondLst>
@@ -9601,14 +10035,45 @@
                                 </p:cTn>
                               </p:par>
                               <p:par>
-                                <p:cTn id="31" presetID="1" presetClass="entr" presetSubtype="0" fill="hold" nodeType="withEffect">
+                                <p:cTn id="33" presetID="1" presetClass="entr" presetSubtype="0" fill="hold" grpId="0" nodeType="withEffect">
                                   <p:stCondLst>
                                     <p:cond delay="0"/>
                                   </p:stCondLst>
                                   <p:childTnLst>
                                     <p:set>
                                       <p:cBhvr>
-                                        <p:cTn id="32" dur="1" fill="hold">
+                                        <p:cTn id="34" dur="1" fill="hold">
+                                          <p:stCondLst>
+                                            <p:cond delay="0"/>
+                                          </p:stCondLst>
+                                        </p:cTn>
+                                        <p:tgtEl>
+                                          <p:spTgt spid="3">
+                                            <p:txEl>
+                                              <p:pRg st="7" end="7"/>
+                                            </p:txEl>
+                                          </p:spTgt>
+                                        </p:tgtEl>
+                                        <p:attrNameLst>
+                                          <p:attrName>style.visibility</p:attrName>
+                                        </p:attrNameLst>
+                                      </p:cBhvr>
+                                      <p:to>
+                                        <p:strVal val="visible"/>
+                                      </p:to>
+                                    </p:set>
+                                  </p:childTnLst>
+                                </p:cTn>
+                              </p:par>
+                              <p:par>
+                                <p:cTn id="35" presetID="1" presetClass="entr" presetSubtype="0" fill="hold" nodeType="withEffect">
+                                  <p:stCondLst>
+                                    <p:cond delay="0"/>
+                                  </p:stCondLst>
+                                  <p:childTnLst>
+                                    <p:set>
+                                      <p:cBhvr>
+                                        <p:cTn id="36" dur="1" fill="hold">
                                           <p:stCondLst>
                                             <p:cond delay="0"/>
                                           </p:stCondLst>
@@ -9634,57 +10099,26 @@
                     </p:cTn>
                   </p:par>
                   <p:par>
-                    <p:cTn id="33" fill="hold">
+                    <p:cTn id="37" fill="hold">
                       <p:stCondLst>
                         <p:cond delay="indefinite"/>
                       </p:stCondLst>
                       <p:childTnLst>
                         <p:par>
-                          <p:cTn id="34" fill="hold">
+                          <p:cTn id="38" fill="hold">
                             <p:stCondLst>
                               <p:cond delay="0"/>
                             </p:stCondLst>
                             <p:childTnLst>
                               <p:par>
-                                <p:cTn id="35" presetID="1" presetClass="entr" presetSubtype="0" fill="hold" grpId="0" nodeType="clickEffect">
+                                <p:cTn id="39" presetID="1" presetClass="entr" presetSubtype="0" fill="hold" grpId="0" nodeType="clickEffect">
                                   <p:stCondLst>
                                     <p:cond delay="0"/>
                                   </p:stCondLst>
                                   <p:childTnLst>
                                     <p:set>
                                       <p:cBhvr>
-                                        <p:cTn id="36" dur="1" fill="hold">
-                                          <p:stCondLst>
-                                            <p:cond delay="0"/>
-                                          </p:stCondLst>
-                                        </p:cTn>
-                                        <p:tgtEl>
-                                          <p:spTgt spid="3">
-                                            <p:txEl>
-                                              <p:pRg st="7" end="7"/>
-                                            </p:txEl>
-                                          </p:spTgt>
-                                        </p:tgtEl>
-                                        <p:attrNameLst>
-                                          <p:attrName>style.visibility</p:attrName>
-                                        </p:attrNameLst>
-                                      </p:cBhvr>
-                                      <p:to>
-                                        <p:strVal val="visible"/>
-                                      </p:to>
-                                    </p:set>
-                                  </p:childTnLst>
-                                </p:cTn>
-                              </p:par>
-                              <p:par>
-                                <p:cTn id="37" presetID="1" presetClass="entr" presetSubtype="0" fill="hold" grpId="0" nodeType="withEffect">
-                                  <p:stCondLst>
-                                    <p:cond delay="0"/>
-                                  </p:stCondLst>
-                                  <p:childTnLst>
-                                    <p:set>
-                                      <p:cBhvr>
-                                        <p:cTn id="38" dur="1" fill="hold">
+                                        <p:cTn id="40" dur="1" fill="hold">
                                           <p:stCondLst>
                                             <p:cond delay="0"/>
                                           </p:stCondLst>
@@ -9708,14 +10142,45 @@
                                 </p:cTn>
                               </p:par>
                               <p:par>
-                                <p:cTn id="39" presetID="1" presetClass="entr" presetSubtype="0" fill="hold" nodeType="withEffect">
+                                <p:cTn id="41" presetID="1" presetClass="entr" presetSubtype="0" fill="hold" grpId="0" nodeType="withEffect">
                                   <p:stCondLst>
                                     <p:cond delay="0"/>
                                   </p:stCondLst>
                                   <p:childTnLst>
                                     <p:set>
                                       <p:cBhvr>
-                                        <p:cTn id="40" dur="1" fill="hold">
+                                        <p:cTn id="42" dur="1" fill="hold">
+                                          <p:stCondLst>
+                                            <p:cond delay="0"/>
+                                          </p:stCondLst>
+                                        </p:cTn>
+                                        <p:tgtEl>
+                                          <p:spTgt spid="3">
+                                            <p:txEl>
+                                              <p:pRg st="9" end="9"/>
+                                            </p:txEl>
+                                          </p:spTgt>
+                                        </p:tgtEl>
+                                        <p:attrNameLst>
+                                          <p:attrName>style.visibility</p:attrName>
+                                        </p:attrNameLst>
+                                      </p:cBhvr>
+                                      <p:to>
+                                        <p:strVal val="visible"/>
+                                      </p:to>
+                                    </p:set>
+                                  </p:childTnLst>
+                                </p:cTn>
+                              </p:par>
+                              <p:par>
+                                <p:cTn id="43" presetID="1" presetClass="entr" presetSubtype="0" fill="hold" nodeType="withEffect">
+                                  <p:stCondLst>
+                                    <p:cond delay="0"/>
+                                  </p:stCondLst>
+                                  <p:childTnLst>
+                                    <p:set>
+                                      <p:cBhvr>
+                                        <p:cTn id="44" dur="1" fill="hold">
                                           <p:stCondLst>
                                             <p:cond delay="0"/>
                                           </p:stCondLst>
@@ -9802,7 +10267,11 @@
           <a:p>
             <a:r>
               <a:rPr lang="en-US" dirty="0" smtClean="0"/>
-              <a:t>Shapely object examples</a:t>
+              <a:t>Shapely: </a:t>
+            </a:r>
+            <a:r>
+              <a:rPr lang="en-US" dirty="0" smtClean="0"/>
+              <a:t>object examples</a:t>
             </a:r>
             <a:endParaRPr lang="en-US" dirty="0"/>
           </a:p>
@@ -10776,11 +11245,7 @@
           <a:p>
             <a:r>
               <a:rPr lang="en-US" dirty="0" smtClean="0"/>
-              <a:t>Shapely </a:t>
-            </a:r>
-            <a:r>
-              <a:rPr lang="en-US" dirty="0" smtClean="0"/>
-              <a:t>predicates</a:t>
+              <a:t>Shapely: predicates</a:t>
             </a:r>
             <a:endParaRPr lang="en-US" dirty="0"/>
           </a:p>

</xml_diff>

<commit_message>
Add Shapely example slide
</commit_message>
<xml_diff>
--- a/Python/python_gis.pptx
+++ b/Python/python_gis.pptx
@@ -5,7 +5,7 @@
     <p:sldMasterId id="2147483672" r:id="rId1"/>
   </p:sldMasterIdLst>
   <p:notesMasterIdLst>
-    <p:notesMasterId r:id="rId14"/>
+    <p:notesMasterId r:id="rId15"/>
   </p:notesMasterIdLst>
   <p:sldIdLst>
     <p:sldId id="256" r:id="rId2"/>
@@ -19,7 +19,8 @@
     <p:sldId id="272" r:id="rId10"/>
     <p:sldId id="273" r:id="rId11"/>
     <p:sldId id="274" r:id="rId12"/>
-    <p:sldId id="265" r:id="rId13"/>
+    <p:sldId id="275" r:id="rId13"/>
+    <p:sldId id="265" r:id="rId14"/>
   </p:sldIdLst>
   <p:sldSz cx="9144000" cy="6858000" type="screen4x3"/>
   <p:notesSz cx="6858000" cy="9144000"/>
@@ -5135,6 +5136,1095 @@
           <a:p>
             <a:r>
               <a:rPr lang="en-US" dirty="0" smtClean="0"/>
+              <a:t>Shapely: example</a:t>
+            </a:r>
+            <a:endParaRPr lang="en-US" dirty="0"/>
+          </a:p>
+        </p:txBody>
+      </p:sp>
+      <p:sp>
+        <p:nvSpPr>
+          <p:cNvPr id="3" name="Content Placeholder 2"/>
+          <p:cNvSpPr>
+            <a:spLocks noGrp="1"/>
+          </p:cNvSpPr>
+          <p:nvPr>
+            <p:ph idx="1"/>
+          </p:nvPr>
+        </p:nvSpPr>
+        <p:spPr/>
+        <p:txBody>
+          <a:bodyPr>
+            <a:normAutofit fontScale="77500" lnSpcReduction="20000"/>
+          </a:bodyPr>
+          <a:lstStyle/>
+          <a:p>
+            <a:r>
+              <a:rPr lang="en-US" dirty="0" smtClean="0"/>
+              <a:t>Create island</a:t>
+            </a:r>
+          </a:p>
+          <a:p>
+            <a:pPr lvl="1"/>
+            <a:r>
+              <a:rPr lang="en-US" dirty="0" smtClean="0"/>
+              <a:t>create coast as </a:t>
+            </a:r>
+            <a:r>
+              <a:rPr lang="en-US" dirty="0" err="1" smtClean="0">
+                <a:latin typeface="Courier New" panose="02070309020205020404" pitchFamily="49" charset="0"/>
+                <a:cs typeface="Courier New" panose="02070309020205020404" pitchFamily="49" charset="0"/>
+              </a:rPr>
+              <a:t>LinearRing</a:t>
+            </a:r>
+            <a:endParaRPr lang="en-US" dirty="0" smtClean="0">
+              <a:latin typeface="Courier New" panose="02070309020205020404" pitchFamily="49" charset="0"/>
+              <a:cs typeface="Courier New" panose="02070309020205020404" pitchFamily="49" charset="0"/>
+            </a:endParaRPr>
+          </a:p>
+          <a:p>
+            <a:pPr lvl="1"/>
+            <a:r>
+              <a:rPr lang="en-US" dirty="0" smtClean="0"/>
+              <a:t>create lake contour as </a:t>
+            </a:r>
+            <a:r>
+              <a:rPr lang="en-US" dirty="0" err="1" smtClean="0">
+                <a:latin typeface="Courier New" panose="02070309020205020404" pitchFamily="49" charset="0"/>
+                <a:cs typeface="Courier New" panose="02070309020205020404" pitchFamily="49" charset="0"/>
+              </a:rPr>
+              <a:t>LinearRing</a:t>
+            </a:r>
+            <a:endParaRPr lang="en-US" dirty="0" smtClean="0">
+              <a:latin typeface="Courier New" panose="02070309020205020404" pitchFamily="49" charset="0"/>
+              <a:cs typeface="Courier New" panose="02070309020205020404" pitchFamily="49" charset="0"/>
+            </a:endParaRPr>
+          </a:p>
+          <a:p>
+            <a:pPr lvl="1"/>
+            <a:r>
+              <a:rPr lang="en-US" dirty="0" smtClean="0"/>
+              <a:t>check whether </a:t>
+            </a:r>
+            <a:r>
+              <a:rPr lang="en-US" dirty="0" err="1" smtClean="0">
+                <a:latin typeface="Courier New" panose="02070309020205020404" pitchFamily="49" charset="0"/>
+                <a:cs typeface="Courier New" panose="02070309020205020404" pitchFamily="49" charset="0"/>
+              </a:rPr>
+              <a:t>lake.within</a:t>
+            </a:r>
+            <a:r>
+              <a:rPr lang="en-US" dirty="0" smtClean="0">
+                <a:latin typeface="Courier New" panose="02070309020205020404" pitchFamily="49" charset="0"/>
+                <a:cs typeface="Courier New" panose="02070309020205020404" pitchFamily="49" charset="0"/>
+              </a:rPr>
+              <a:t>(coast)</a:t>
+            </a:r>
+          </a:p>
+          <a:p>
+            <a:pPr lvl="1"/>
+            <a:r>
+              <a:rPr lang="en-US" dirty="0" smtClean="0"/>
+              <a:t>create island as </a:t>
+            </a:r>
+            <a:r>
+              <a:rPr lang="en-US" dirty="0" smtClean="0">
+                <a:latin typeface="Courier New" panose="02070309020205020404" pitchFamily="49" charset="0"/>
+                <a:cs typeface="Courier New" panose="02070309020205020404" pitchFamily="49" charset="0"/>
+              </a:rPr>
+              <a:t>Polygon</a:t>
+            </a:r>
+            <a:r>
+              <a:rPr lang="en-US" dirty="0" smtClean="0">
+                <a:cs typeface="Courier New" panose="02070309020205020404" pitchFamily="49" charset="0"/>
+              </a:rPr>
+              <a:t>, coast as boundary, lake as hole</a:t>
+            </a:r>
+          </a:p>
+          <a:p>
+            <a:r>
+              <a:rPr lang="en-US" dirty="0" smtClean="0"/>
+              <a:t>Create cities</a:t>
+            </a:r>
+          </a:p>
+          <a:p>
+            <a:pPr lvl="1"/>
+            <a:r>
+              <a:rPr lang="en-US" dirty="0" smtClean="0"/>
+              <a:t>create city position as </a:t>
+            </a:r>
+            <a:r>
+              <a:rPr lang="en-US" dirty="0" smtClean="0">
+                <a:latin typeface="Courier New" panose="02070309020205020404" pitchFamily="49" charset="0"/>
+                <a:cs typeface="Courier New" panose="02070309020205020404" pitchFamily="49" charset="0"/>
+              </a:rPr>
+              <a:t>Point</a:t>
+            </a:r>
+          </a:p>
+          <a:p>
+            <a:pPr lvl="1"/>
+            <a:r>
+              <a:rPr lang="en-US" dirty="0" smtClean="0"/>
+              <a:t>extend proportional to size </a:t>
+            </a:r>
+            <a:r>
+              <a:rPr lang="en-US" dirty="0" smtClean="0">
+                <a:latin typeface="Courier New" panose="02070309020205020404" pitchFamily="49" charset="0"/>
+                <a:cs typeface="Courier New" panose="02070309020205020404" pitchFamily="49" charset="0"/>
+              </a:rPr>
+              <a:t>city = </a:t>
+            </a:r>
+            <a:r>
+              <a:rPr lang="en-US" dirty="0" err="1" smtClean="0">
+                <a:latin typeface="Courier New" panose="02070309020205020404" pitchFamily="49" charset="0"/>
+                <a:cs typeface="Courier New" panose="02070309020205020404" pitchFamily="49" charset="0"/>
+              </a:rPr>
+              <a:t>city.buffer</a:t>
+            </a:r>
+            <a:r>
+              <a:rPr lang="en-US" dirty="0" smtClean="0">
+                <a:latin typeface="Courier New" panose="02070309020205020404" pitchFamily="49" charset="0"/>
+                <a:cs typeface="Courier New" panose="02070309020205020404" pitchFamily="49" charset="0"/>
+              </a:rPr>
+              <a:t>(population)</a:t>
+            </a:r>
+          </a:p>
+          <a:p>
+            <a:pPr lvl="1"/>
+            <a:r>
+              <a:rPr lang="en-US" dirty="0" smtClean="0"/>
+              <a:t>retain if </a:t>
+            </a:r>
+            <a:r>
+              <a:rPr lang="en-US" dirty="0" err="1" smtClean="0">
+                <a:latin typeface="Courier New" panose="02070309020205020404" pitchFamily="49" charset="0"/>
+                <a:cs typeface="Courier New" panose="02070309020205020404" pitchFamily="49" charset="0"/>
+              </a:rPr>
+              <a:t>city.within</a:t>
+            </a:r>
+            <a:r>
+              <a:rPr lang="en-US" dirty="0" smtClean="0">
+                <a:latin typeface="Courier New" panose="02070309020205020404" pitchFamily="49" charset="0"/>
+                <a:cs typeface="Courier New" panose="02070309020205020404" pitchFamily="49" charset="0"/>
+              </a:rPr>
+              <a:t>(island)</a:t>
+            </a:r>
+          </a:p>
+          <a:p>
+            <a:r>
+              <a:rPr lang="en-US" dirty="0" smtClean="0"/>
+              <a:t>Create roads</a:t>
+            </a:r>
+          </a:p>
+          <a:p>
+            <a:pPr lvl="1"/>
+            <a:r>
+              <a:rPr lang="en-US" dirty="0" smtClean="0"/>
+              <a:t>create road as </a:t>
+            </a:r>
+            <a:r>
+              <a:rPr lang="en-US" dirty="0" err="1" smtClean="0">
+                <a:latin typeface="Courier New" panose="02070309020205020404" pitchFamily="49" charset="0"/>
+                <a:cs typeface="Courier New" panose="02070309020205020404" pitchFamily="49" charset="0"/>
+              </a:rPr>
+              <a:t>LineString</a:t>
+            </a:r>
+            <a:r>
+              <a:rPr lang="en-US" dirty="0" smtClean="0"/>
+              <a:t> between cities</a:t>
+            </a:r>
+          </a:p>
+          <a:p>
+            <a:pPr lvl="1"/>
+            <a:r>
+              <a:rPr lang="en-US" dirty="0" smtClean="0"/>
+              <a:t>retain if </a:t>
+            </a:r>
+            <a:r>
+              <a:rPr lang="en-US" dirty="0" err="1" smtClean="0">
+                <a:latin typeface="Courier New" panose="02070309020205020404" pitchFamily="49" charset="0"/>
+                <a:cs typeface="Courier New" panose="02070309020205020404" pitchFamily="49" charset="0"/>
+              </a:rPr>
+              <a:t>road.within</a:t>
+            </a:r>
+            <a:r>
+              <a:rPr lang="en-US" dirty="0" smtClean="0">
+                <a:latin typeface="Courier New" panose="02070309020205020404" pitchFamily="49" charset="0"/>
+                <a:cs typeface="Courier New" panose="02070309020205020404" pitchFamily="49" charset="0"/>
+              </a:rPr>
+              <a:t>(island)</a:t>
+            </a:r>
+            <a:endParaRPr lang="en-US" dirty="0">
+              <a:latin typeface="Courier New" panose="02070309020205020404" pitchFamily="49" charset="0"/>
+              <a:cs typeface="Courier New" panose="02070309020205020404" pitchFamily="49" charset="0"/>
+            </a:endParaRPr>
+          </a:p>
+        </p:txBody>
+      </p:sp>
+      <p:sp>
+        <p:nvSpPr>
+          <p:cNvPr id="4" name="Slide Number Placeholder 3"/>
+          <p:cNvSpPr>
+            <a:spLocks noGrp="1"/>
+          </p:cNvSpPr>
+          <p:nvPr>
+            <p:ph type="sldNum" sz="quarter" idx="12"/>
+          </p:nvPr>
+        </p:nvSpPr>
+        <p:spPr/>
+        <p:txBody>
+          <a:bodyPr/>
+          <a:lstStyle/>
+          <a:p>
+            <a:fld id="{5A209D72-2E9D-49B0-8977-41DCCC66C0BB}" type="slidenum">
+              <a:rPr lang="nl-BE" smtClean="0">
+                <a:solidFill>
+                  <a:prstClr val="black">
+                    <a:tint val="75000"/>
+                  </a:prstClr>
+                </a:solidFill>
+              </a:rPr>
+              <a:pPr/>
+              <a:t>12</a:t>
+            </a:fld>
+            <a:endParaRPr lang="nl-BE">
+              <a:solidFill>
+                <a:prstClr val="black">
+                  <a:tint val="75000"/>
+                </a:prstClr>
+              </a:solidFill>
+            </a:endParaRPr>
+          </a:p>
+        </p:txBody>
+      </p:sp>
+      <p:pic>
+        <p:nvPicPr>
+          <p:cNvPr id="5" name="Picture 4"/>
+          <p:cNvPicPr>
+            <a:picLocks noChangeAspect="1"/>
+          </p:cNvPicPr>
+          <p:nvPr/>
+        </p:nvPicPr>
+        <p:blipFill>
+          <a:blip r:embed="rId2">
+            <a:extLst>
+              <a:ext uri="{28A0092B-C50C-407E-A947-70E740481C1C}">
+                <a14:useLocalDpi xmlns:a14="http://schemas.microsoft.com/office/drawing/2010/main" val="0"/>
+              </a:ext>
+            </a:extLst>
+          </a:blip>
+          <a:stretch>
+            <a:fillRect/>
+          </a:stretch>
+        </p:blipFill>
+        <p:spPr>
+          <a:xfrm>
+            <a:off x="7234280" y="1600200"/>
+            <a:ext cx="1227376" cy="1155426"/>
+          </a:xfrm>
+          <a:prstGeom prst="rect">
+            <a:avLst/>
+          </a:prstGeom>
+          <a:effectLst>
+            <a:outerShdw blurRad="50800" dist="38100" dir="2700000" algn="tl" rotWithShape="0">
+              <a:prstClr val="black">
+                <a:alpha val="40000"/>
+              </a:prstClr>
+            </a:outerShdw>
+          </a:effectLst>
+        </p:spPr>
+      </p:pic>
+      <p:pic>
+        <p:nvPicPr>
+          <p:cNvPr id="6" name="Picture 5"/>
+          <p:cNvPicPr>
+            <a:picLocks noChangeAspect="1"/>
+          </p:cNvPicPr>
+          <p:nvPr/>
+        </p:nvPicPr>
+        <p:blipFill>
+          <a:blip r:embed="rId3">
+            <a:extLst>
+              <a:ext uri="{28A0092B-C50C-407E-A947-70E740481C1C}">
+                <a14:useLocalDpi xmlns:a14="http://schemas.microsoft.com/office/drawing/2010/main" val="0"/>
+              </a:ext>
+            </a:extLst>
+          </a:blip>
+          <a:stretch>
+            <a:fillRect/>
+          </a:stretch>
+        </p:blipFill>
+        <p:spPr>
+          <a:xfrm>
+            <a:off x="6684022" y="3701006"/>
+            <a:ext cx="2328390" cy="2336706"/>
+          </a:xfrm>
+          <a:prstGeom prst="rect">
+            <a:avLst/>
+          </a:prstGeom>
+        </p:spPr>
+      </p:pic>
+    </p:spTree>
+    <p:extLst>
+      <p:ext uri="{BB962C8B-B14F-4D97-AF65-F5344CB8AC3E}">
+        <p14:creationId xmlns:p14="http://schemas.microsoft.com/office/powerpoint/2010/main" val="309507373"/>
+      </p:ext>
+    </p:extLst>
+  </p:cSld>
+  <p:clrMapOvr>
+    <a:masterClrMapping/>
+  </p:clrMapOvr>
+  <p:timing>
+    <p:tnLst>
+      <p:par>
+        <p:cTn id="1" dur="indefinite" restart="never" nodeType="tmRoot">
+          <p:childTnLst>
+            <p:seq concurrent="1" nextAc="seek">
+              <p:cTn id="2" dur="indefinite" nodeType="mainSeq">
+                <p:childTnLst>
+                  <p:par>
+                    <p:cTn id="3" fill="hold">
+                      <p:stCondLst>
+                        <p:cond delay="indefinite"/>
+                        <p:cond evt="onBegin" delay="0">
+                          <p:tn val="2"/>
+                        </p:cond>
+                      </p:stCondLst>
+                      <p:childTnLst>
+                        <p:par>
+                          <p:cTn id="4" fill="hold">
+                            <p:stCondLst>
+                              <p:cond delay="0"/>
+                            </p:stCondLst>
+                            <p:childTnLst>
+                              <p:par>
+                                <p:cTn id="5" presetID="1" presetClass="entr" presetSubtype="0" fill="hold" grpId="0" nodeType="withEffect">
+                                  <p:stCondLst>
+                                    <p:cond delay="0"/>
+                                  </p:stCondLst>
+                                  <p:childTnLst>
+                                    <p:set>
+                                      <p:cBhvr>
+                                        <p:cTn id="6" dur="1" fill="hold">
+                                          <p:stCondLst>
+                                            <p:cond delay="0"/>
+                                          </p:stCondLst>
+                                        </p:cTn>
+                                        <p:tgtEl>
+                                          <p:spTgt spid="3">
+                                            <p:txEl>
+                                              <p:pRg st="0" end="0"/>
+                                            </p:txEl>
+                                          </p:spTgt>
+                                        </p:tgtEl>
+                                        <p:attrNameLst>
+                                          <p:attrName>style.visibility</p:attrName>
+                                        </p:attrNameLst>
+                                      </p:cBhvr>
+                                      <p:to>
+                                        <p:strVal val="visible"/>
+                                      </p:to>
+                                    </p:set>
+                                  </p:childTnLst>
+                                </p:cTn>
+                              </p:par>
+                            </p:childTnLst>
+                          </p:cTn>
+                        </p:par>
+                      </p:childTnLst>
+                    </p:cTn>
+                  </p:par>
+                  <p:par>
+                    <p:cTn id="7" fill="hold">
+                      <p:stCondLst>
+                        <p:cond delay="indefinite"/>
+                      </p:stCondLst>
+                      <p:childTnLst>
+                        <p:par>
+                          <p:cTn id="8" fill="hold">
+                            <p:stCondLst>
+                              <p:cond delay="0"/>
+                            </p:stCondLst>
+                            <p:childTnLst>
+                              <p:par>
+                                <p:cTn id="9" presetID="1" presetClass="entr" presetSubtype="0" fill="hold" grpId="0" nodeType="clickEffect">
+                                  <p:stCondLst>
+                                    <p:cond delay="0"/>
+                                  </p:stCondLst>
+                                  <p:childTnLst>
+                                    <p:set>
+                                      <p:cBhvr>
+                                        <p:cTn id="10" dur="1" fill="hold">
+                                          <p:stCondLst>
+                                            <p:cond delay="0"/>
+                                          </p:stCondLst>
+                                        </p:cTn>
+                                        <p:tgtEl>
+                                          <p:spTgt spid="3">
+                                            <p:txEl>
+                                              <p:pRg st="1" end="1"/>
+                                            </p:txEl>
+                                          </p:spTgt>
+                                        </p:tgtEl>
+                                        <p:attrNameLst>
+                                          <p:attrName>style.visibility</p:attrName>
+                                        </p:attrNameLst>
+                                      </p:cBhvr>
+                                      <p:to>
+                                        <p:strVal val="visible"/>
+                                      </p:to>
+                                    </p:set>
+                                  </p:childTnLst>
+                                </p:cTn>
+                              </p:par>
+                            </p:childTnLst>
+                          </p:cTn>
+                        </p:par>
+                      </p:childTnLst>
+                    </p:cTn>
+                  </p:par>
+                  <p:par>
+                    <p:cTn id="11" fill="hold">
+                      <p:stCondLst>
+                        <p:cond delay="indefinite"/>
+                      </p:stCondLst>
+                      <p:childTnLst>
+                        <p:par>
+                          <p:cTn id="12" fill="hold">
+                            <p:stCondLst>
+                              <p:cond delay="0"/>
+                            </p:stCondLst>
+                            <p:childTnLst>
+                              <p:par>
+                                <p:cTn id="13" presetID="1" presetClass="entr" presetSubtype="0" fill="hold" grpId="0" nodeType="clickEffect">
+                                  <p:stCondLst>
+                                    <p:cond delay="0"/>
+                                  </p:stCondLst>
+                                  <p:childTnLst>
+                                    <p:set>
+                                      <p:cBhvr>
+                                        <p:cTn id="14" dur="1" fill="hold">
+                                          <p:stCondLst>
+                                            <p:cond delay="0"/>
+                                          </p:stCondLst>
+                                        </p:cTn>
+                                        <p:tgtEl>
+                                          <p:spTgt spid="3">
+                                            <p:txEl>
+                                              <p:pRg st="2" end="2"/>
+                                            </p:txEl>
+                                          </p:spTgt>
+                                        </p:tgtEl>
+                                        <p:attrNameLst>
+                                          <p:attrName>style.visibility</p:attrName>
+                                        </p:attrNameLst>
+                                      </p:cBhvr>
+                                      <p:to>
+                                        <p:strVal val="visible"/>
+                                      </p:to>
+                                    </p:set>
+                                  </p:childTnLst>
+                                </p:cTn>
+                              </p:par>
+                            </p:childTnLst>
+                          </p:cTn>
+                        </p:par>
+                      </p:childTnLst>
+                    </p:cTn>
+                  </p:par>
+                  <p:par>
+                    <p:cTn id="15" fill="hold">
+                      <p:stCondLst>
+                        <p:cond delay="indefinite"/>
+                      </p:stCondLst>
+                      <p:childTnLst>
+                        <p:par>
+                          <p:cTn id="16" fill="hold">
+                            <p:stCondLst>
+                              <p:cond delay="0"/>
+                            </p:stCondLst>
+                            <p:childTnLst>
+                              <p:par>
+                                <p:cTn id="17" presetID="1" presetClass="entr" presetSubtype="0" fill="hold" grpId="0" nodeType="clickEffect">
+                                  <p:stCondLst>
+                                    <p:cond delay="0"/>
+                                  </p:stCondLst>
+                                  <p:childTnLst>
+                                    <p:set>
+                                      <p:cBhvr>
+                                        <p:cTn id="18" dur="1" fill="hold">
+                                          <p:stCondLst>
+                                            <p:cond delay="0"/>
+                                          </p:stCondLst>
+                                        </p:cTn>
+                                        <p:tgtEl>
+                                          <p:spTgt spid="3">
+                                            <p:txEl>
+                                              <p:pRg st="3" end="3"/>
+                                            </p:txEl>
+                                          </p:spTgt>
+                                        </p:tgtEl>
+                                        <p:attrNameLst>
+                                          <p:attrName>style.visibility</p:attrName>
+                                        </p:attrNameLst>
+                                      </p:cBhvr>
+                                      <p:to>
+                                        <p:strVal val="visible"/>
+                                      </p:to>
+                                    </p:set>
+                                  </p:childTnLst>
+                                </p:cTn>
+                              </p:par>
+                            </p:childTnLst>
+                          </p:cTn>
+                        </p:par>
+                      </p:childTnLst>
+                    </p:cTn>
+                  </p:par>
+                  <p:par>
+                    <p:cTn id="19" fill="hold">
+                      <p:stCondLst>
+                        <p:cond delay="indefinite"/>
+                      </p:stCondLst>
+                      <p:childTnLst>
+                        <p:par>
+                          <p:cTn id="20" fill="hold">
+                            <p:stCondLst>
+                              <p:cond delay="0"/>
+                            </p:stCondLst>
+                            <p:childTnLst>
+                              <p:par>
+                                <p:cTn id="21" presetID="1" presetClass="entr" presetSubtype="0" fill="hold" grpId="0" nodeType="clickEffect">
+                                  <p:stCondLst>
+                                    <p:cond delay="0"/>
+                                  </p:stCondLst>
+                                  <p:childTnLst>
+                                    <p:set>
+                                      <p:cBhvr>
+                                        <p:cTn id="22" dur="1" fill="hold">
+                                          <p:stCondLst>
+                                            <p:cond delay="0"/>
+                                          </p:stCondLst>
+                                        </p:cTn>
+                                        <p:tgtEl>
+                                          <p:spTgt spid="3">
+                                            <p:txEl>
+                                              <p:pRg st="4" end="4"/>
+                                            </p:txEl>
+                                          </p:spTgt>
+                                        </p:tgtEl>
+                                        <p:attrNameLst>
+                                          <p:attrName>style.visibility</p:attrName>
+                                        </p:attrNameLst>
+                                      </p:cBhvr>
+                                      <p:to>
+                                        <p:strVal val="visible"/>
+                                      </p:to>
+                                    </p:set>
+                                  </p:childTnLst>
+                                </p:cTn>
+                              </p:par>
+                            </p:childTnLst>
+                          </p:cTn>
+                        </p:par>
+                      </p:childTnLst>
+                    </p:cTn>
+                  </p:par>
+                  <p:par>
+                    <p:cTn id="23" fill="hold">
+                      <p:stCondLst>
+                        <p:cond delay="indefinite"/>
+                      </p:stCondLst>
+                      <p:childTnLst>
+                        <p:par>
+                          <p:cTn id="24" fill="hold">
+                            <p:stCondLst>
+                              <p:cond delay="0"/>
+                            </p:stCondLst>
+                            <p:childTnLst>
+                              <p:par>
+                                <p:cTn id="25" presetID="1" presetClass="entr" presetSubtype="0" fill="hold" nodeType="clickEffect">
+                                  <p:stCondLst>
+                                    <p:cond delay="0"/>
+                                  </p:stCondLst>
+                                  <p:childTnLst>
+                                    <p:set>
+                                      <p:cBhvr>
+                                        <p:cTn id="26" dur="1" fill="hold">
+                                          <p:stCondLst>
+                                            <p:cond delay="0"/>
+                                          </p:stCondLst>
+                                        </p:cTn>
+                                        <p:tgtEl>
+                                          <p:spTgt spid="5"/>
+                                        </p:tgtEl>
+                                        <p:attrNameLst>
+                                          <p:attrName>style.visibility</p:attrName>
+                                        </p:attrNameLst>
+                                      </p:cBhvr>
+                                      <p:to>
+                                        <p:strVal val="visible"/>
+                                      </p:to>
+                                    </p:set>
+                                  </p:childTnLst>
+                                </p:cTn>
+                              </p:par>
+                            </p:childTnLst>
+                          </p:cTn>
+                        </p:par>
+                      </p:childTnLst>
+                    </p:cTn>
+                  </p:par>
+                  <p:par>
+                    <p:cTn id="27" fill="hold">
+                      <p:stCondLst>
+                        <p:cond delay="indefinite"/>
+                      </p:stCondLst>
+                      <p:childTnLst>
+                        <p:par>
+                          <p:cTn id="28" fill="hold">
+                            <p:stCondLst>
+                              <p:cond delay="0"/>
+                            </p:stCondLst>
+                            <p:childTnLst>
+                              <p:par>
+                                <p:cTn id="29" presetID="1" presetClass="entr" presetSubtype="0" fill="hold" grpId="0" nodeType="clickEffect">
+                                  <p:stCondLst>
+                                    <p:cond delay="0"/>
+                                  </p:stCondLst>
+                                  <p:childTnLst>
+                                    <p:set>
+                                      <p:cBhvr>
+                                        <p:cTn id="30" dur="1" fill="hold">
+                                          <p:stCondLst>
+                                            <p:cond delay="0"/>
+                                          </p:stCondLst>
+                                        </p:cTn>
+                                        <p:tgtEl>
+                                          <p:spTgt spid="3">
+                                            <p:txEl>
+                                              <p:pRg st="5" end="5"/>
+                                            </p:txEl>
+                                          </p:spTgt>
+                                        </p:tgtEl>
+                                        <p:attrNameLst>
+                                          <p:attrName>style.visibility</p:attrName>
+                                        </p:attrNameLst>
+                                      </p:cBhvr>
+                                      <p:to>
+                                        <p:strVal val="visible"/>
+                                      </p:to>
+                                    </p:set>
+                                  </p:childTnLst>
+                                </p:cTn>
+                              </p:par>
+                            </p:childTnLst>
+                          </p:cTn>
+                        </p:par>
+                      </p:childTnLst>
+                    </p:cTn>
+                  </p:par>
+                  <p:par>
+                    <p:cTn id="31" fill="hold">
+                      <p:stCondLst>
+                        <p:cond delay="indefinite"/>
+                      </p:stCondLst>
+                      <p:childTnLst>
+                        <p:par>
+                          <p:cTn id="32" fill="hold">
+                            <p:stCondLst>
+                              <p:cond delay="0"/>
+                            </p:stCondLst>
+                            <p:childTnLst>
+                              <p:par>
+                                <p:cTn id="33" presetID="1" presetClass="entr" presetSubtype="0" fill="hold" grpId="0" nodeType="clickEffect">
+                                  <p:stCondLst>
+                                    <p:cond delay="0"/>
+                                  </p:stCondLst>
+                                  <p:childTnLst>
+                                    <p:set>
+                                      <p:cBhvr>
+                                        <p:cTn id="34" dur="1" fill="hold">
+                                          <p:stCondLst>
+                                            <p:cond delay="0"/>
+                                          </p:stCondLst>
+                                        </p:cTn>
+                                        <p:tgtEl>
+                                          <p:spTgt spid="3">
+                                            <p:txEl>
+                                              <p:pRg st="6" end="6"/>
+                                            </p:txEl>
+                                          </p:spTgt>
+                                        </p:tgtEl>
+                                        <p:attrNameLst>
+                                          <p:attrName>style.visibility</p:attrName>
+                                        </p:attrNameLst>
+                                      </p:cBhvr>
+                                      <p:to>
+                                        <p:strVal val="visible"/>
+                                      </p:to>
+                                    </p:set>
+                                  </p:childTnLst>
+                                </p:cTn>
+                              </p:par>
+                            </p:childTnLst>
+                          </p:cTn>
+                        </p:par>
+                      </p:childTnLst>
+                    </p:cTn>
+                  </p:par>
+                  <p:par>
+                    <p:cTn id="35" fill="hold">
+                      <p:stCondLst>
+                        <p:cond delay="indefinite"/>
+                      </p:stCondLst>
+                      <p:childTnLst>
+                        <p:par>
+                          <p:cTn id="36" fill="hold">
+                            <p:stCondLst>
+                              <p:cond delay="0"/>
+                            </p:stCondLst>
+                            <p:childTnLst>
+                              <p:par>
+                                <p:cTn id="37" presetID="1" presetClass="entr" presetSubtype="0" fill="hold" grpId="0" nodeType="clickEffect">
+                                  <p:stCondLst>
+                                    <p:cond delay="0"/>
+                                  </p:stCondLst>
+                                  <p:childTnLst>
+                                    <p:set>
+                                      <p:cBhvr>
+                                        <p:cTn id="38" dur="1" fill="hold">
+                                          <p:stCondLst>
+                                            <p:cond delay="0"/>
+                                          </p:stCondLst>
+                                        </p:cTn>
+                                        <p:tgtEl>
+                                          <p:spTgt spid="3">
+                                            <p:txEl>
+                                              <p:pRg st="7" end="7"/>
+                                            </p:txEl>
+                                          </p:spTgt>
+                                        </p:tgtEl>
+                                        <p:attrNameLst>
+                                          <p:attrName>style.visibility</p:attrName>
+                                        </p:attrNameLst>
+                                      </p:cBhvr>
+                                      <p:to>
+                                        <p:strVal val="visible"/>
+                                      </p:to>
+                                    </p:set>
+                                  </p:childTnLst>
+                                </p:cTn>
+                              </p:par>
+                            </p:childTnLst>
+                          </p:cTn>
+                        </p:par>
+                      </p:childTnLst>
+                    </p:cTn>
+                  </p:par>
+                  <p:par>
+                    <p:cTn id="39" fill="hold">
+                      <p:stCondLst>
+                        <p:cond delay="indefinite"/>
+                      </p:stCondLst>
+                      <p:childTnLst>
+                        <p:par>
+                          <p:cTn id="40" fill="hold">
+                            <p:stCondLst>
+                              <p:cond delay="0"/>
+                            </p:stCondLst>
+                            <p:childTnLst>
+                              <p:par>
+                                <p:cTn id="41" presetID="1" presetClass="entr" presetSubtype="0" fill="hold" grpId="0" nodeType="clickEffect">
+                                  <p:stCondLst>
+                                    <p:cond delay="0"/>
+                                  </p:stCondLst>
+                                  <p:childTnLst>
+                                    <p:set>
+                                      <p:cBhvr>
+                                        <p:cTn id="42" dur="1" fill="hold">
+                                          <p:stCondLst>
+                                            <p:cond delay="0"/>
+                                          </p:stCondLst>
+                                        </p:cTn>
+                                        <p:tgtEl>
+                                          <p:spTgt spid="3">
+                                            <p:txEl>
+                                              <p:pRg st="8" end="8"/>
+                                            </p:txEl>
+                                          </p:spTgt>
+                                        </p:tgtEl>
+                                        <p:attrNameLst>
+                                          <p:attrName>style.visibility</p:attrName>
+                                        </p:attrNameLst>
+                                      </p:cBhvr>
+                                      <p:to>
+                                        <p:strVal val="visible"/>
+                                      </p:to>
+                                    </p:set>
+                                  </p:childTnLst>
+                                </p:cTn>
+                              </p:par>
+                            </p:childTnLst>
+                          </p:cTn>
+                        </p:par>
+                      </p:childTnLst>
+                    </p:cTn>
+                  </p:par>
+                  <p:par>
+                    <p:cTn id="43" fill="hold">
+                      <p:stCondLst>
+                        <p:cond delay="indefinite"/>
+                      </p:stCondLst>
+                      <p:childTnLst>
+                        <p:par>
+                          <p:cTn id="44" fill="hold">
+                            <p:stCondLst>
+                              <p:cond delay="0"/>
+                            </p:stCondLst>
+                            <p:childTnLst>
+                              <p:par>
+                                <p:cTn id="45" presetID="1" presetClass="entr" presetSubtype="0" fill="hold" grpId="0" nodeType="clickEffect">
+                                  <p:stCondLst>
+                                    <p:cond delay="0"/>
+                                  </p:stCondLst>
+                                  <p:childTnLst>
+                                    <p:set>
+                                      <p:cBhvr>
+                                        <p:cTn id="46" dur="1" fill="hold">
+                                          <p:stCondLst>
+                                            <p:cond delay="0"/>
+                                          </p:stCondLst>
+                                        </p:cTn>
+                                        <p:tgtEl>
+                                          <p:spTgt spid="3">
+                                            <p:txEl>
+                                              <p:pRg st="9" end="9"/>
+                                            </p:txEl>
+                                          </p:spTgt>
+                                        </p:tgtEl>
+                                        <p:attrNameLst>
+                                          <p:attrName>style.visibility</p:attrName>
+                                        </p:attrNameLst>
+                                      </p:cBhvr>
+                                      <p:to>
+                                        <p:strVal val="visible"/>
+                                      </p:to>
+                                    </p:set>
+                                  </p:childTnLst>
+                                </p:cTn>
+                              </p:par>
+                            </p:childTnLst>
+                          </p:cTn>
+                        </p:par>
+                      </p:childTnLst>
+                    </p:cTn>
+                  </p:par>
+                  <p:par>
+                    <p:cTn id="47" fill="hold">
+                      <p:stCondLst>
+                        <p:cond delay="indefinite"/>
+                      </p:stCondLst>
+                      <p:childTnLst>
+                        <p:par>
+                          <p:cTn id="48" fill="hold">
+                            <p:stCondLst>
+                              <p:cond delay="0"/>
+                            </p:stCondLst>
+                            <p:childTnLst>
+                              <p:par>
+                                <p:cTn id="49" presetID="1" presetClass="entr" presetSubtype="0" fill="hold" grpId="0" nodeType="clickEffect">
+                                  <p:stCondLst>
+                                    <p:cond delay="0"/>
+                                  </p:stCondLst>
+                                  <p:childTnLst>
+                                    <p:set>
+                                      <p:cBhvr>
+                                        <p:cTn id="50" dur="1" fill="hold">
+                                          <p:stCondLst>
+                                            <p:cond delay="0"/>
+                                          </p:stCondLst>
+                                        </p:cTn>
+                                        <p:tgtEl>
+                                          <p:spTgt spid="3">
+                                            <p:txEl>
+                                              <p:pRg st="10" end="10"/>
+                                            </p:txEl>
+                                          </p:spTgt>
+                                        </p:tgtEl>
+                                        <p:attrNameLst>
+                                          <p:attrName>style.visibility</p:attrName>
+                                        </p:attrNameLst>
+                                      </p:cBhvr>
+                                      <p:to>
+                                        <p:strVal val="visible"/>
+                                      </p:to>
+                                    </p:set>
+                                  </p:childTnLst>
+                                </p:cTn>
+                              </p:par>
+                            </p:childTnLst>
+                          </p:cTn>
+                        </p:par>
+                      </p:childTnLst>
+                    </p:cTn>
+                  </p:par>
+                  <p:par>
+                    <p:cTn id="51" fill="hold">
+                      <p:stCondLst>
+                        <p:cond delay="indefinite"/>
+                      </p:stCondLst>
+                      <p:childTnLst>
+                        <p:par>
+                          <p:cTn id="52" fill="hold">
+                            <p:stCondLst>
+                              <p:cond delay="0"/>
+                            </p:stCondLst>
+                            <p:childTnLst>
+                              <p:par>
+                                <p:cTn id="53" presetID="1" presetClass="entr" presetSubtype="0" fill="hold" grpId="0" nodeType="clickEffect">
+                                  <p:stCondLst>
+                                    <p:cond delay="0"/>
+                                  </p:stCondLst>
+                                  <p:childTnLst>
+                                    <p:set>
+                                      <p:cBhvr>
+                                        <p:cTn id="54" dur="1" fill="hold">
+                                          <p:stCondLst>
+                                            <p:cond delay="0"/>
+                                          </p:stCondLst>
+                                        </p:cTn>
+                                        <p:tgtEl>
+                                          <p:spTgt spid="3">
+                                            <p:txEl>
+                                              <p:pRg st="11" end="11"/>
+                                            </p:txEl>
+                                          </p:spTgt>
+                                        </p:tgtEl>
+                                        <p:attrNameLst>
+                                          <p:attrName>style.visibility</p:attrName>
+                                        </p:attrNameLst>
+                                      </p:cBhvr>
+                                      <p:to>
+                                        <p:strVal val="visible"/>
+                                      </p:to>
+                                    </p:set>
+                                  </p:childTnLst>
+                                </p:cTn>
+                              </p:par>
+                            </p:childTnLst>
+                          </p:cTn>
+                        </p:par>
+                      </p:childTnLst>
+                    </p:cTn>
+                  </p:par>
+                  <p:par>
+                    <p:cTn id="55" fill="hold">
+                      <p:stCondLst>
+                        <p:cond delay="indefinite"/>
+                      </p:stCondLst>
+                      <p:childTnLst>
+                        <p:par>
+                          <p:cTn id="56" fill="hold">
+                            <p:stCondLst>
+                              <p:cond delay="0"/>
+                            </p:stCondLst>
+                            <p:childTnLst>
+                              <p:par>
+                                <p:cTn id="57" presetID="1" presetClass="entr" presetSubtype="0" fill="hold" nodeType="clickEffect">
+                                  <p:stCondLst>
+                                    <p:cond delay="0"/>
+                                  </p:stCondLst>
+                                  <p:childTnLst>
+                                    <p:set>
+                                      <p:cBhvr>
+                                        <p:cTn id="58" dur="1" fill="hold">
+                                          <p:stCondLst>
+                                            <p:cond delay="0"/>
+                                          </p:stCondLst>
+                                        </p:cTn>
+                                        <p:tgtEl>
+                                          <p:spTgt spid="6"/>
+                                        </p:tgtEl>
+                                        <p:attrNameLst>
+                                          <p:attrName>style.visibility</p:attrName>
+                                        </p:attrNameLst>
+                                      </p:cBhvr>
+                                      <p:to>
+                                        <p:strVal val="visible"/>
+                                      </p:to>
+                                    </p:set>
+                                  </p:childTnLst>
+                                </p:cTn>
+                              </p:par>
+                            </p:childTnLst>
+                          </p:cTn>
+                        </p:par>
+                      </p:childTnLst>
+                    </p:cTn>
+                  </p:par>
+                </p:childTnLst>
+              </p:cTn>
+              <p:prevCondLst>
+                <p:cond evt="onPrev" delay="0">
+                  <p:tgtEl>
+                    <p:sldTgt/>
+                  </p:tgtEl>
+                </p:cond>
+              </p:prevCondLst>
+              <p:nextCondLst>
+                <p:cond evt="onNext" delay="0">
+                  <p:tgtEl>
+                    <p:sldTgt/>
+                  </p:tgtEl>
+                </p:cond>
+              </p:nextCondLst>
+            </p:seq>
+          </p:childTnLst>
+        </p:cTn>
+      </p:par>
+    </p:tnLst>
+    <p:bldLst>
+      <p:bldP spid="3" grpId="0" uiExpand="1" build="p" bldLvl="2"/>
+    </p:bldLst>
+  </p:timing>
+</p:sld>
+</file>
+
+<file path=ppt/slides/slide13.xml><?xml version="1.0" encoding="utf-8"?>
+<p:sld xmlns:a="http://schemas.openxmlformats.org/drawingml/2006/main" xmlns:r="http://schemas.openxmlformats.org/officeDocument/2006/relationships" xmlns:p="http://schemas.openxmlformats.org/presentationml/2006/main">
+  <p:cSld>
+    <p:spTree>
+      <p:nvGrpSpPr>
+        <p:cNvPr id="1" name=""/>
+        <p:cNvGrpSpPr/>
+        <p:nvPr/>
+      </p:nvGrpSpPr>
+      <p:grpSpPr>
+        <a:xfrm>
+          <a:off x="0" y="0"/>
+          <a:ext cx="0" cy="0"/>
+          <a:chOff x="0" y="0"/>
+          <a:chExt cx="0" cy="0"/>
+        </a:xfrm>
+      </p:grpSpPr>
+      <p:sp>
+        <p:nvSpPr>
+          <p:cNvPr id="2" name="Title 1"/>
+          <p:cNvSpPr>
+            <a:spLocks noGrp="1"/>
+          </p:cNvSpPr>
+          <p:nvPr>
+            <p:ph type="title"/>
+          </p:nvPr>
+        </p:nvSpPr>
+        <p:spPr/>
+        <p:txBody>
+          <a:bodyPr/>
+          <a:lstStyle/>
+          <a:p>
+            <a:r>
+              <a:rPr lang="en-US" dirty="0" smtClean="0"/>
               <a:t>Further reading</a:t>
             </a:r>
             <a:endParaRPr lang="en-US" dirty="0"/>
@@ -5258,7 +6348,7 @@
                 </a:solidFill>
               </a:rPr>
               <a:pPr/>
-              <a:t>12</a:t>
+              <a:t>13</a:t>
             </a:fld>
             <a:endParaRPr lang="nl-BE">
               <a:solidFill>
@@ -9247,11 +10337,7 @@
           <a:p>
             <a:r>
               <a:rPr lang="en-US" dirty="0" smtClean="0"/>
-              <a:t>Shapely: </a:t>
-            </a:r>
-            <a:r>
-              <a:rPr lang="en-US" dirty="0" smtClean="0"/>
-              <a:t>geometric objects</a:t>
+              <a:t>Shapely: geometric objects</a:t>
             </a:r>
             <a:endParaRPr lang="en-US" dirty="0"/>
           </a:p>
@@ -9288,11 +10374,7 @@
             </a:r>
             <a:r>
               <a:rPr lang="en-US" dirty="0" smtClean="0"/>
-              <a:t>: 2D or </a:t>
-            </a:r>
-            <a:r>
-              <a:rPr lang="en-US" dirty="0" smtClean="0"/>
-              <a:t>3D</a:t>
+              <a:t>: 2D or 3D</a:t>
             </a:r>
           </a:p>
           <a:p>
@@ -9307,7 +10389,6 @@
               <a:rPr lang="en-US" dirty="0" smtClean="0"/>
               <a:t>: collection of Point</a:t>
             </a:r>
-            <a:endParaRPr lang="en-US" dirty="0" smtClean="0"/>
           </a:p>
           <a:p>
             <a:r>
@@ -10267,11 +11348,7 @@
           <a:p>
             <a:r>
               <a:rPr lang="en-US" dirty="0" smtClean="0"/>
-              <a:t>Shapely: </a:t>
-            </a:r>
-            <a:r>
-              <a:rPr lang="en-US" dirty="0" smtClean="0"/>
-              <a:t>object examples</a:t>
+              <a:t>Shapely: object examples</a:t>
             </a:r>
             <a:endParaRPr lang="en-US" dirty="0"/>
           </a:p>

</xml_diff>

<commit_message>
Add slide on Shapely buffers
</commit_message>
<xml_diff>
--- a/Python/python_gis.pptx
+++ b/Python/python_gis.pptx
@@ -5082,6 +5082,463 @@
           </a:p>
         </p:txBody>
       </p:sp>
+      <p:grpSp>
+        <p:nvGrpSpPr>
+          <p:cNvPr id="11" name="Group 10"/>
+          <p:cNvGrpSpPr/>
+          <p:nvPr/>
+        </p:nvGrpSpPr>
+        <p:grpSpPr>
+          <a:xfrm>
+            <a:off x="301922" y="2799091"/>
+            <a:ext cx="8437195" cy="1398699"/>
+            <a:chOff x="301922" y="2799091"/>
+            <a:chExt cx="8437195" cy="1398699"/>
+          </a:xfrm>
+        </p:grpSpPr>
+        <p:sp>
+          <p:nvSpPr>
+            <p:cNvPr id="5" name="TextBox 4"/>
+            <p:cNvSpPr txBox="1"/>
+            <p:nvPr/>
+          </p:nvSpPr>
+          <p:spPr>
+            <a:xfrm>
+              <a:off x="301922" y="2799091"/>
+              <a:ext cx="8437195" cy="923330"/>
+            </a:xfrm>
+            <a:prstGeom prst="rect">
+              <a:avLst/>
+            </a:prstGeom>
+            <a:solidFill>
+              <a:schemeClr val="accent4">
+                <a:lumMod val="40000"/>
+                <a:lumOff val="60000"/>
+              </a:schemeClr>
+            </a:solidFill>
+          </p:spPr>
+          <p:txBody>
+            <a:bodyPr wrap="square" rtlCol="0">
+              <a:spAutoFit/>
+            </a:bodyPr>
+            <a:lstStyle/>
+            <a:p>
+              <a:r>
+                <a:rPr lang="en-US" dirty="0">
+                  <a:latin typeface="Courier New" pitchFamily="49" charset="0"/>
+                  <a:cs typeface="Courier New" pitchFamily="49" charset="0"/>
+                </a:rPr>
+                <a:t>line1 = </a:t>
+              </a:r>
+              <a:r>
+                <a:rPr lang="en-US" dirty="0" err="1">
+                  <a:latin typeface="Courier New" pitchFamily="49" charset="0"/>
+                  <a:cs typeface="Courier New" pitchFamily="49" charset="0"/>
+                </a:rPr>
+                <a:t>LineString</a:t>
+              </a:r>
+              <a:r>
+                <a:rPr lang="en-US" dirty="0">
+                  <a:latin typeface="Courier New" pitchFamily="49" charset="0"/>
+                  <a:cs typeface="Courier New" pitchFamily="49" charset="0"/>
+                </a:rPr>
+                <a:t>([(0.0, 1.0), (1.0, 0.5), (2.0, 1.5)])</a:t>
+              </a:r>
+            </a:p>
+            <a:p>
+              <a:r>
+                <a:rPr lang="en-US" dirty="0">
+                  <a:latin typeface="Courier New" pitchFamily="49" charset="0"/>
+                  <a:cs typeface="Courier New" pitchFamily="49" charset="0"/>
+                </a:rPr>
+                <a:t>line2 = </a:t>
+              </a:r>
+              <a:r>
+                <a:rPr lang="en-US" dirty="0" err="1">
+                  <a:latin typeface="Courier New" pitchFamily="49" charset="0"/>
+                  <a:cs typeface="Courier New" pitchFamily="49" charset="0"/>
+                </a:rPr>
+                <a:t>LineString</a:t>
+              </a:r>
+              <a:r>
+                <a:rPr lang="en-US" dirty="0">
+                  <a:latin typeface="Courier New" pitchFamily="49" charset="0"/>
+                  <a:cs typeface="Courier New" pitchFamily="49" charset="0"/>
+                </a:rPr>
+                <a:t>([(1.0, 0.5), (0.0, 2.0), ((-1.5, 1.0))])</a:t>
+              </a:r>
+            </a:p>
+            <a:p>
+              <a:r>
+                <a:rPr lang="en-US" dirty="0" err="1">
+                  <a:latin typeface="Courier New" pitchFamily="49" charset="0"/>
+                  <a:cs typeface="Courier New" pitchFamily="49" charset="0"/>
+                </a:rPr>
+                <a:t>multi_line</a:t>
+              </a:r>
+              <a:r>
+                <a:rPr lang="en-US" dirty="0">
+                  <a:latin typeface="Courier New" pitchFamily="49" charset="0"/>
+                  <a:cs typeface="Courier New" pitchFamily="49" charset="0"/>
+                </a:rPr>
+                <a:t> = </a:t>
+              </a:r>
+              <a:r>
+                <a:rPr lang="en-US" dirty="0" err="1">
+                  <a:latin typeface="Courier New" pitchFamily="49" charset="0"/>
+                  <a:cs typeface="Courier New" pitchFamily="49" charset="0"/>
+                </a:rPr>
+                <a:t>MultiLineString</a:t>
+              </a:r>
+              <a:r>
+                <a:rPr lang="en-US" dirty="0">
+                  <a:latin typeface="Courier New" pitchFamily="49" charset="0"/>
+                  <a:cs typeface="Courier New" pitchFamily="49" charset="0"/>
+                </a:rPr>
+                <a:t>([line1, line2]</a:t>
+              </a:r>
+              <a:endParaRPr lang="en-US" dirty="0" smtClean="0">
+                <a:latin typeface="Courier New" pitchFamily="49" charset="0"/>
+                <a:cs typeface="Courier New" pitchFamily="49" charset="0"/>
+              </a:endParaRPr>
+            </a:p>
+          </p:txBody>
+        </p:sp>
+        <p:pic>
+          <p:nvPicPr>
+            <p:cNvPr id="6" name="Picture 5"/>
+            <p:cNvPicPr>
+              <a:picLocks noChangeAspect="1"/>
+            </p:cNvPicPr>
+            <p:nvPr/>
+          </p:nvPicPr>
+          <p:blipFill>
+            <a:blip r:embed="rId2">
+              <a:extLst>
+                <a:ext uri="{28A0092B-C50C-407E-A947-70E740481C1C}">
+                  <a14:useLocalDpi xmlns:a14="http://schemas.microsoft.com/office/drawing/2010/main" val="0"/>
+                </a:ext>
+              </a:extLst>
+            </a:blip>
+            <a:stretch>
+              <a:fillRect/>
+            </a:stretch>
+          </p:blipFill>
+          <p:spPr>
+            <a:xfrm>
+              <a:off x="6613315" y="3569140"/>
+              <a:ext cx="1285875" cy="628650"/>
+            </a:xfrm>
+            <a:prstGeom prst="rect">
+              <a:avLst/>
+            </a:prstGeom>
+            <a:effectLst>
+              <a:outerShdw blurRad="50800" dist="38100" dir="2700000" algn="tl" rotWithShape="0">
+                <a:prstClr val="black">
+                  <a:alpha val="40000"/>
+                </a:prstClr>
+              </a:outerShdw>
+            </a:effectLst>
+          </p:spPr>
+        </p:pic>
+      </p:grpSp>
+      <p:grpSp>
+        <p:nvGrpSpPr>
+          <p:cNvPr id="10" name="Group 9"/>
+          <p:cNvGrpSpPr/>
+          <p:nvPr/>
+        </p:nvGrpSpPr>
+        <p:grpSpPr>
+          <a:xfrm>
+            <a:off x="301921" y="4382354"/>
+            <a:ext cx="8437195" cy="744920"/>
+            <a:chOff x="301921" y="4382354"/>
+            <a:chExt cx="8437195" cy="744920"/>
+          </a:xfrm>
+        </p:grpSpPr>
+        <p:sp>
+          <p:nvSpPr>
+            <p:cNvPr id="7" name="TextBox 6"/>
+            <p:cNvSpPr txBox="1"/>
+            <p:nvPr/>
+          </p:nvSpPr>
+          <p:spPr>
+            <a:xfrm>
+              <a:off x="301921" y="4382354"/>
+              <a:ext cx="8437195" cy="369332"/>
+            </a:xfrm>
+            <a:prstGeom prst="rect">
+              <a:avLst/>
+            </a:prstGeom>
+            <a:solidFill>
+              <a:schemeClr val="accent4">
+                <a:lumMod val="40000"/>
+                <a:lumOff val="60000"/>
+              </a:schemeClr>
+            </a:solidFill>
+          </p:spPr>
+          <p:txBody>
+            <a:bodyPr wrap="square" rtlCol="0">
+              <a:spAutoFit/>
+            </a:bodyPr>
+            <a:lstStyle/>
+            <a:p>
+              <a:r>
+                <a:rPr lang="en-US" dirty="0" smtClean="0">
+                  <a:latin typeface="Courier New" pitchFamily="49" charset="0"/>
+                  <a:cs typeface="Courier New" pitchFamily="49" charset="0"/>
+                </a:rPr>
+                <a:t>buff1 </a:t>
+              </a:r>
+              <a:r>
+                <a:rPr lang="en-US" dirty="0">
+                  <a:latin typeface="Courier New" pitchFamily="49" charset="0"/>
+                  <a:cs typeface="Courier New" pitchFamily="49" charset="0"/>
+                </a:rPr>
+                <a:t>= </a:t>
+              </a:r>
+              <a:r>
+                <a:rPr lang="en-US" dirty="0" err="1">
+                  <a:latin typeface="Courier New" pitchFamily="49" charset="0"/>
+                  <a:cs typeface="Courier New" pitchFamily="49" charset="0"/>
+                </a:rPr>
+                <a:t>multi_line.buffer</a:t>
+              </a:r>
+              <a:r>
+                <a:rPr lang="en-US" dirty="0">
+                  <a:latin typeface="Courier New" pitchFamily="49" charset="0"/>
+                  <a:cs typeface="Courier New" pitchFamily="49" charset="0"/>
+                </a:rPr>
+                <a:t>(0.1)</a:t>
+              </a:r>
+              <a:endParaRPr lang="en-US" dirty="0" smtClean="0">
+                <a:latin typeface="Courier New" pitchFamily="49" charset="0"/>
+                <a:cs typeface="Courier New" pitchFamily="49" charset="0"/>
+              </a:endParaRPr>
+            </a:p>
+          </p:txBody>
+        </p:sp>
+        <p:pic>
+          <p:nvPicPr>
+            <p:cNvPr id="8" name="Picture 7"/>
+            <p:cNvPicPr>
+              <a:picLocks noChangeAspect="1"/>
+            </p:cNvPicPr>
+            <p:nvPr/>
+          </p:nvPicPr>
+          <p:blipFill>
+            <a:blip r:embed="rId3">
+              <a:extLst>
+                <a:ext uri="{28A0092B-C50C-407E-A947-70E740481C1C}">
+                  <a14:useLocalDpi xmlns:a14="http://schemas.microsoft.com/office/drawing/2010/main" val="0"/>
+                </a:ext>
+              </a:extLst>
+            </a:blip>
+            <a:stretch>
+              <a:fillRect/>
+            </a:stretch>
+          </p:blipFill>
+          <p:spPr>
+            <a:xfrm>
+              <a:off x="6689515" y="4517674"/>
+              <a:ext cx="1209675" cy="609600"/>
+            </a:xfrm>
+            <a:prstGeom prst="rect">
+              <a:avLst/>
+            </a:prstGeom>
+            <a:effectLst>
+              <a:outerShdw blurRad="50800" dist="38100" dir="2700000" algn="tl" rotWithShape="0">
+                <a:prstClr val="black">
+                  <a:alpha val="40000"/>
+                </a:prstClr>
+              </a:outerShdw>
+            </a:effectLst>
+          </p:spPr>
+        </p:pic>
+      </p:grpSp>
+      <p:grpSp>
+        <p:nvGrpSpPr>
+          <p:cNvPr id="13" name="Group 12"/>
+          <p:cNvGrpSpPr/>
+          <p:nvPr/>
+        </p:nvGrpSpPr>
+        <p:grpSpPr>
+          <a:xfrm>
+            <a:off x="301921" y="5322897"/>
+            <a:ext cx="8437195" cy="1257673"/>
+            <a:chOff x="301921" y="5322897"/>
+            <a:chExt cx="8437195" cy="1257673"/>
+          </a:xfrm>
+        </p:grpSpPr>
+        <p:sp>
+          <p:nvSpPr>
+            <p:cNvPr id="9" name="TextBox 8"/>
+            <p:cNvSpPr txBox="1"/>
+            <p:nvPr/>
+          </p:nvSpPr>
+          <p:spPr>
+            <a:xfrm>
+              <a:off x="301921" y="5322897"/>
+              <a:ext cx="8437195" cy="646331"/>
+            </a:xfrm>
+            <a:prstGeom prst="rect">
+              <a:avLst/>
+            </a:prstGeom>
+            <a:solidFill>
+              <a:schemeClr val="accent4">
+                <a:lumMod val="40000"/>
+                <a:lumOff val="60000"/>
+              </a:schemeClr>
+            </a:solidFill>
+          </p:spPr>
+          <p:txBody>
+            <a:bodyPr wrap="square" rtlCol="0">
+              <a:spAutoFit/>
+            </a:bodyPr>
+            <a:lstStyle/>
+            <a:p>
+              <a:r>
+                <a:rPr lang="en-US" dirty="0" smtClean="0">
+                  <a:latin typeface="Courier New" pitchFamily="49" charset="0"/>
+                  <a:cs typeface="Courier New" pitchFamily="49" charset="0"/>
+                </a:rPr>
+                <a:t>buff2 = </a:t>
+              </a:r>
+              <a:r>
+                <a:rPr lang="en-US" dirty="0" err="1" smtClean="0">
+                  <a:latin typeface="Courier New" pitchFamily="49" charset="0"/>
+                  <a:cs typeface="Courier New" pitchFamily="49" charset="0"/>
+                </a:rPr>
+                <a:t>multi_line.buffer</a:t>
+              </a:r>
+              <a:r>
+                <a:rPr lang="en-US" dirty="0" smtClean="0">
+                  <a:latin typeface="Courier New" pitchFamily="49" charset="0"/>
+                  <a:cs typeface="Courier New" pitchFamily="49" charset="0"/>
+                </a:rPr>
+                <a:t>(0.1</a:t>
+              </a:r>
+              <a:r>
+                <a:rPr lang="en-US" dirty="0">
+                  <a:latin typeface="Courier New" pitchFamily="49" charset="0"/>
+                  <a:cs typeface="Courier New" pitchFamily="49" charset="0"/>
+                </a:rPr>
+                <a:t>, </a:t>
+              </a:r>
+              <a:r>
+                <a:rPr lang="en-US" dirty="0" err="1">
+                  <a:latin typeface="Courier New" pitchFamily="49" charset="0"/>
+                  <a:cs typeface="Courier New" pitchFamily="49" charset="0"/>
+                </a:rPr>
+                <a:t>cap_style</a:t>
+              </a:r>
+              <a:r>
+                <a:rPr lang="en-US" dirty="0">
+                  <a:latin typeface="Courier New" pitchFamily="49" charset="0"/>
+                  <a:cs typeface="Courier New" pitchFamily="49" charset="0"/>
+                </a:rPr>
+                <a:t>=</a:t>
+              </a:r>
+              <a:r>
+                <a:rPr lang="en-US" dirty="0" err="1">
+                  <a:latin typeface="Courier New" pitchFamily="49" charset="0"/>
+                  <a:cs typeface="Courier New" pitchFamily="49" charset="0"/>
+                </a:rPr>
+                <a:t>CAP_STYLE.flat</a:t>
+              </a:r>
+              <a:r>
+                <a:rPr lang="en-US" dirty="0" smtClean="0">
+                  <a:latin typeface="Courier New" pitchFamily="49" charset="0"/>
+                  <a:cs typeface="Courier New" pitchFamily="49" charset="0"/>
+                </a:rPr>
+                <a:t>,</a:t>
+              </a:r>
+              <a:br>
+                <a:rPr lang="en-US" dirty="0" smtClean="0">
+                  <a:latin typeface="Courier New" pitchFamily="49" charset="0"/>
+                  <a:cs typeface="Courier New" pitchFamily="49" charset="0"/>
+                </a:rPr>
+              </a:br>
+              <a:r>
+                <a:rPr lang="en-US" dirty="0" smtClean="0">
+                  <a:latin typeface="Courier New" pitchFamily="49" charset="0"/>
+                  <a:cs typeface="Courier New" pitchFamily="49" charset="0"/>
+                </a:rPr>
+                <a:t>                               </a:t>
+              </a:r>
+              <a:r>
+                <a:rPr lang="en-US" dirty="0" err="1">
+                  <a:latin typeface="Courier New" pitchFamily="49" charset="0"/>
+                  <a:cs typeface="Courier New" pitchFamily="49" charset="0"/>
+                </a:rPr>
+                <a:t>join_style</a:t>
+              </a:r>
+              <a:r>
+                <a:rPr lang="en-US" dirty="0">
+                  <a:latin typeface="Courier New" pitchFamily="49" charset="0"/>
+                  <a:cs typeface="Courier New" pitchFamily="49" charset="0"/>
+                </a:rPr>
+                <a:t>=</a:t>
+              </a:r>
+              <a:r>
+                <a:rPr lang="en-US" dirty="0" err="1">
+                  <a:latin typeface="Courier New" pitchFamily="49" charset="0"/>
+                  <a:cs typeface="Courier New" pitchFamily="49" charset="0"/>
+                </a:rPr>
+                <a:t>JOIN_STYLE.mitre</a:t>
+              </a:r>
+              <a:r>
+                <a:rPr lang="en-US" dirty="0">
+                  <a:latin typeface="Courier New" pitchFamily="49" charset="0"/>
+                  <a:cs typeface="Courier New" pitchFamily="49" charset="0"/>
+                </a:rPr>
+                <a:t>)</a:t>
+              </a:r>
+              <a:endParaRPr lang="en-US" dirty="0" smtClean="0">
+                <a:latin typeface="Courier New" pitchFamily="49" charset="0"/>
+                <a:cs typeface="Courier New" pitchFamily="49" charset="0"/>
+              </a:endParaRPr>
+            </a:p>
+          </p:txBody>
+        </p:sp>
+        <p:pic>
+          <p:nvPicPr>
+            <p:cNvPr id="12" name="Picture 11"/>
+            <p:cNvPicPr>
+              <a:picLocks noChangeAspect="1"/>
+            </p:cNvPicPr>
+            <p:nvPr/>
+          </p:nvPicPr>
+          <p:blipFill>
+            <a:blip r:embed="rId4">
+              <a:extLst>
+                <a:ext uri="{28A0092B-C50C-407E-A947-70E740481C1C}">
+                  <a14:useLocalDpi xmlns:a14="http://schemas.microsoft.com/office/drawing/2010/main" val="0"/>
+                </a:ext>
+              </a:extLst>
+            </a:blip>
+            <a:stretch>
+              <a:fillRect/>
+            </a:stretch>
+          </p:blipFill>
+          <p:spPr>
+            <a:xfrm>
+              <a:off x="6689515" y="5942395"/>
+              <a:ext cx="1209675" cy="638175"/>
+            </a:xfrm>
+            <a:prstGeom prst="rect">
+              <a:avLst/>
+            </a:prstGeom>
+            <a:effectLst>
+              <a:outerShdw blurRad="50800" dist="38100" dir="2700000" algn="tl" rotWithShape="0">
+                <a:prstClr val="black">
+                  <a:alpha val="40000"/>
+                </a:prstClr>
+              </a:outerShdw>
+            </a:effectLst>
+          </p:spPr>
+        </p:pic>
+      </p:grpSp>
     </p:spTree>
     <p:extLst>
       <p:ext uri="{BB962C8B-B14F-4D97-AF65-F5344CB8AC3E}">
@@ -5095,7 +5552,165 @@
   <p:timing>
     <p:tnLst>
       <p:par>
-        <p:cTn id="1" dur="indefinite" restart="never" nodeType="tmRoot"/>
+        <p:cTn id="1" dur="indefinite" restart="never" nodeType="tmRoot">
+          <p:childTnLst>
+            <p:seq concurrent="1" nextAc="seek">
+              <p:cTn id="2" dur="indefinite" nodeType="mainSeq">
+                <p:childTnLst>
+                  <p:par>
+                    <p:cTn id="3" fill="hold">
+                      <p:stCondLst>
+                        <p:cond delay="indefinite"/>
+                      </p:stCondLst>
+                      <p:childTnLst>
+                        <p:par>
+                          <p:cTn id="4" fill="hold">
+                            <p:stCondLst>
+                              <p:cond delay="0"/>
+                            </p:stCondLst>
+                            <p:childTnLst>
+                              <p:par>
+                                <p:cTn id="5" presetID="1" presetClass="entr" presetSubtype="0" fill="hold" nodeType="clickEffect">
+                                  <p:stCondLst>
+                                    <p:cond delay="0"/>
+                                  </p:stCondLst>
+                                  <p:childTnLst>
+                                    <p:set>
+                                      <p:cBhvr>
+                                        <p:cTn id="6" dur="1" fill="hold">
+                                          <p:stCondLst>
+                                            <p:cond delay="0"/>
+                                          </p:stCondLst>
+                                        </p:cTn>
+                                        <p:tgtEl>
+                                          <p:spTgt spid="11"/>
+                                        </p:tgtEl>
+                                        <p:attrNameLst>
+                                          <p:attrName>style.visibility</p:attrName>
+                                        </p:attrNameLst>
+                                      </p:cBhvr>
+                                      <p:to>
+                                        <p:strVal val="visible"/>
+                                      </p:to>
+                                    </p:set>
+                                  </p:childTnLst>
+                                </p:cTn>
+                              </p:par>
+                            </p:childTnLst>
+                          </p:cTn>
+                        </p:par>
+                      </p:childTnLst>
+                    </p:cTn>
+                  </p:par>
+                  <p:par>
+                    <p:cTn id="7" fill="hold">
+                      <p:stCondLst>
+                        <p:cond delay="indefinite"/>
+                      </p:stCondLst>
+                      <p:childTnLst>
+                        <p:par>
+                          <p:cTn id="8" fill="hold">
+                            <p:stCondLst>
+                              <p:cond delay="0"/>
+                            </p:stCondLst>
+                            <p:childTnLst>
+                              <p:par>
+                                <p:cTn id="9" presetID="1" presetClass="entr" presetSubtype="0" fill="hold" nodeType="clickEffect">
+                                  <p:stCondLst>
+                                    <p:cond delay="0"/>
+                                  </p:stCondLst>
+                                  <p:childTnLst>
+                                    <p:set>
+                                      <p:cBhvr>
+                                        <p:cTn id="10" dur="1" fill="hold">
+                                          <p:stCondLst>
+                                            <p:cond delay="0"/>
+                                          </p:stCondLst>
+                                        </p:cTn>
+                                        <p:tgtEl>
+                                          <p:spTgt spid="10"/>
+                                        </p:tgtEl>
+                                        <p:attrNameLst>
+                                          <p:attrName>style.visibility</p:attrName>
+                                        </p:attrNameLst>
+                                      </p:cBhvr>
+                                      <p:to>
+                                        <p:strVal val="visible"/>
+                                      </p:to>
+                                    </p:set>
+                                  </p:childTnLst>
+                                </p:cTn>
+                              </p:par>
+                            </p:childTnLst>
+                          </p:cTn>
+                        </p:par>
+                      </p:childTnLst>
+                    </p:cTn>
+                  </p:par>
+                  <p:par>
+                    <p:cTn id="11" fill="hold">
+                      <p:stCondLst>
+                        <p:cond delay="indefinite"/>
+                      </p:stCondLst>
+                      <p:childTnLst>
+                        <p:par>
+                          <p:cTn id="12" fill="hold">
+                            <p:stCondLst>
+                              <p:cond delay="0"/>
+                            </p:stCondLst>
+                            <p:childTnLst>
+                              <p:par>
+                                <p:cTn id="13" presetID="1" presetClass="entr" presetSubtype="0" fill="hold" nodeType="clickEffect">
+                                  <p:stCondLst>
+                                    <p:cond delay="0"/>
+                                  </p:stCondLst>
+                                  <p:childTnLst>
+                                    <p:set>
+                                      <p:cBhvr>
+                                        <p:cTn id="14" dur="1" fill="hold">
+                                          <p:stCondLst>
+                                            <p:cond delay="0"/>
+                                          </p:stCondLst>
+                                        </p:cTn>
+                                        <p:tgtEl>
+                                          <p:spTgt spid="13"/>
+                                        </p:tgtEl>
+                                        <p:attrNameLst>
+                                          <p:attrName>style.visibility</p:attrName>
+                                        </p:attrNameLst>
+                                      </p:cBhvr>
+                                      <p:to>
+                                        <p:strVal val="visible"/>
+                                      </p:to>
+                                    </p:set>
+                                  </p:childTnLst>
+                                </p:cTn>
+                              </p:par>
+                            </p:childTnLst>
+                          </p:cTn>
+                        </p:par>
+                      </p:childTnLst>
+                    </p:cTn>
+                  </p:par>
+                </p:childTnLst>
+              </p:cTn>
+              <p:prevCondLst>
+                <p:cond evt="onPrev" delay="0">
+                  <p:tgtEl>
+                    <p:sldTgt/>
+                  </p:tgtEl>
+                </p:cond>
+              </p:prevCondLst>
+              <p:nextCondLst>
+                <p:cond evt="onNext" delay="0">
+                  <p:tgtEl>
+                    <p:sldTgt/>
+                  </p:tgtEl>
+                </p:cond>
+              </p:nextCondLst>
+            </p:seq>
+          </p:childTnLst>
+        </p:cTn>
       </p:par>
     </p:tnLst>
   </p:timing>

</xml_diff>

<commit_message>
Add slide on Shapely interpolation
</commit_message>
<xml_diff>
--- a/Python/python_gis.pptx
+++ b/Python/python_gis.pptx
@@ -5,7 +5,7 @@
     <p:sldMasterId id="2147483672" r:id="rId1"/>
   </p:sldMasterIdLst>
   <p:notesMasterIdLst>
-    <p:notesMasterId r:id="rId15"/>
+    <p:notesMasterId r:id="rId17"/>
   </p:notesMasterIdLst>
   <p:sldIdLst>
     <p:sldId id="256" r:id="rId2"/>
@@ -20,7 +20,9 @@
     <p:sldId id="273" r:id="rId11"/>
     <p:sldId id="274" r:id="rId12"/>
     <p:sldId id="275" r:id="rId13"/>
-    <p:sldId id="265" r:id="rId14"/>
+    <p:sldId id="276" r:id="rId14"/>
+    <p:sldId id="277" r:id="rId15"/>
+    <p:sldId id="265" r:id="rId16"/>
   </p:sldIdLst>
   <p:sldSz cx="9144000" cy="6858000" type="screen4x3"/>
   <p:notesSz cx="6858000" cy="9144000"/>
@@ -6840,7 +6842,7 @@
           <a:p>
             <a:r>
               <a:rPr lang="en-US" dirty="0" smtClean="0"/>
-              <a:t>Further reading</a:t>
+              <a:t>Shapely: other constructions</a:t>
             </a:r>
             <a:endParaRPr lang="en-US" dirty="0"/>
           </a:p>
@@ -6862,80 +6864,195 @@
           <a:lstStyle/>
           <a:p>
             <a:r>
+              <a:rPr lang="en-US" dirty="0" err="1" smtClean="0">
+                <a:latin typeface="Courier New" panose="02070309020205020404" pitchFamily="49" charset="0"/>
+                <a:cs typeface="Courier New" panose="02070309020205020404" pitchFamily="49" charset="0"/>
+              </a:rPr>
+              <a:t>shape.convex_hull</a:t>
+            </a:r>
+            <a:r>
               <a:rPr lang="en-US" dirty="0" smtClean="0"/>
-              <a:t>Fiona manual</a:t>
-            </a:r>
-            <a:r>
-              <a:rPr lang="en-US" dirty="0"/>
-              <a:t/>
-            </a:r>
-            <a:br>
-              <a:rPr lang="en-US" dirty="0"/>
-            </a:br>
-            <a:r>
-              <a:rPr lang="en-US" sz="2000" dirty="0">
-                <a:hlinkClick r:id="rId2"/>
-              </a:rPr>
-              <a:t>http://</a:t>
-            </a:r>
-            <a:r>
-              <a:rPr lang="en-US" sz="2000" dirty="0" smtClean="0">
-                <a:hlinkClick r:id="rId2"/>
-              </a:rPr>
-              <a:t>toblerity.org/fiona/index.html</a:t>
-            </a:r>
-            <a:endParaRPr lang="en-US" sz="2000" dirty="0" smtClean="0"/>
-          </a:p>
-          <a:p>
-            <a:r>
-              <a:rPr lang="en-US" dirty="0"/>
-              <a:t>Folium manual</a:t>
-            </a:r>
-            <a:br>
-              <a:rPr lang="en-US" dirty="0"/>
-            </a:br>
-            <a:r>
-              <a:rPr lang="en-US" sz="2000" dirty="0">
-                <a:hlinkClick r:id="rId3"/>
-              </a:rPr>
-              <a:t>http://python-visualization.github.io/folium/docs-master</a:t>
-            </a:r>
-            <a:r>
-              <a:rPr lang="en-US" sz="2000" dirty="0" smtClean="0">
-                <a:hlinkClick r:id="rId3"/>
-              </a:rPr>
-              <a:t>/</a:t>
-            </a:r>
-            <a:r>
-              <a:rPr lang="en-US" sz="2000" dirty="0" smtClean="0"/>
-              <a:t> </a:t>
-            </a:r>
-            <a:endParaRPr lang="en-US" dirty="0"/>
-          </a:p>
-          <a:p>
-            <a:r>
-              <a:rPr lang="en-US" dirty="0" smtClean="0"/>
-              <a:t>Shapely manual</a:t>
+              <a:t>:</a:t>
             </a:r>
             <a:br>
               <a:rPr lang="en-US" dirty="0" smtClean="0"/>
             </a:br>
             <a:r>
-              <a:rPr lang="en-US" sz="2000" dirty="0">
-                <a:hlinkClick r:id="rId4"/>
-              </a:rPr>
-              <a:t>https://shapely.readthedocs.io/en/latest</a:t>
-            </a:r>
-            <a:r>
-              <a:rPr lang="en-US" sz="2000" dirty="0" smtClean="0">
-                <a:hlinkClick r:id="rId4"/>
-              </a:rPr>
-              <a:t>/</a:t>
-            </a:r>
-            <a:endParaRPr lang="en-US" sz="2000" dirty="0" smtClean="0"/>
-          </a:p>
-          <a:p>
+              <a:rPr lang="en-US" dirty="0" smtClean="0"/>
+              <a:t>    </a:t>
+            </a:r>
+            <a:r>
+              <a:rPr lang="en-US" dirty="0" smtClean="0">
+                <a:latin typeface="Courier New" panose="02070309020205020404" pitchFamily="49" charset="0"/>
+                <a:cs typeface="Courier New" panose="02070309020205020404" pitchFamily="49" charset="0"/>
+              </a:rPr>
+              <a:t>shape</a:t>
+            </a:r>
+            <a:r>
+              <a:rPr lang="en-US" dirty="0" smtClean="0">
+                <a:cs typeface="Courier New" panose="02070309020205020404" pitchFamily="49" charset="0"/>
+              </a:rPr>
+              <a:t> </a:t>
+            </a:r>
+            <a:r>
+              <a:rPr lang="en-US" dirty="0" smtClean="0">
+                <a:sym typeface="Symbol" panose="05050102010706020507" pitchFamily="18" charset="2"/>
+              </a:rPr>
+              <a:t> </a:t>
+            </a:r>
+            <a:r>
+              <a:rPr lang="en-US" dirty="0" smtClean="0">
+                <a:latin typeface="Courier New" panose="02070309020205020404" pitchFamily="49" charset="0"/>
+                <a:cs typeface="Courier New" panose="02070309020205020404" pitchFamily="49" charset="0"/>
+              </a:rPr>
+              <a:t>Polygon</a:t>
+            </a:r>
+          </a:p>
+          <a:p>
+            <a:r>
+              <a:rPr lang="en-US" dirty="0" err="1" smtClean="0">
+                <a:latin typeface="Courier New" panose="02070309020205020404" pitchFamily="49" charset="0"/>
+                <a:cs typeface="Courier New" panose="02070309020205020404" pitchFamily="49" charset="0"/>
+              </a:rPr>
+              <a:t>shape.envelope</a:t>
+            </a:r>
+            <a:r>
+              <a:rPr lang="en-US" dirty="0" smtClean="0"/>
+              <a:t>: </a:t>
+            </a:r>
+            <a:r>
+              <a:rPr lang="en-US" dirty="0" smtClean="0">
+                <a:latin typeface="Courier New" panose="02070309020205020404" pitchFamily="49" charset="0"/>
+                <a:cs typeface="Courier New" panose="02070309020205020404" pitchFamily="49" charset="0"/>
+              </a:rPr>
+              <a:t>shape</a:t>
+            </a:r>
+            <a:r>
+              <a:rPr lang="en-US" dirty="0" smtClean="0">
+                <a:cs typeface="Courier New" panose="02070309020205020404" pitchFamily="49" charset="0"/>
+              </a:rPr>
+              <a:t> </a:t>
+            </a:r>
+            <a:r>
+              <a:rPr lang="en-US" dirty="0">
+                <a:sym typeface="Symbol" panose="05050102010706020507" pitchFamily="18" charset="2"/>
+              </a:rPr>
+              <a:t> </a:t>
+            </a:r>
+            <a:r>
+              <a:rPr lang="en-US" dirty="0">
+                <a:latin typeface="Courier New" panose="02070309020205020404" pitchFamily="49" charset="0"/>
+                <a:cs typeface="Courier New" panose="02070309020205020404" pitchFamily="49" charset="0"/>
+              </a:rPr>
+              <a:t>Polygon</a:t>
+            </a:r>
             <a:endParaRPr lang="en-US" dirty="0" smtClean="0"/>
+          </a:p>
+          <a:p>
+            <a:pPr lvl="1"/>
+            <a:r>
+              <a:rPr lang="en-US" dirty="0" smtClean="0"/>
+              <a:t>rectangle, sides parallel to axes</a:t>
+            </a:r>
+          </a:p>
+          <a:p>
+            <a:r>
+              <a:rPr lang="en-US" dirty="0" err="1" smtClean="0">
+                <a:latin typeface="Courier New" panose="02070309020205020404" pitchFamily="49" charset="0"/>
+                <a:cs typeface="Courier New" panose="02070309020205020404" pitchFamily="49" charset="0"/>
+              </a:rPr>
+              <a:t>shape.minimum_rotated_rectangle</a:t>
+            </a:r>
+            <a:r>
+              <a:rPr lang="en-US" dirty="0" smtClean="0"/>
+              <a:t>:</a:t>
+            </a:r>
+            <a:br>
+              <a:rPr lang="en-US" dirty="0" smtClean="0"/>
+            </a:br>
+            <a:r>
+              <a:rPr lang="en-US" dirty="0" smtClean="0"/>
+              <a:t>    </a:t>
+            </a:r>
+            <a:r>
+              <a:rPr lang="en-US" dirty="0" smtClean="0">
+                <a:latin typeface="Courier New" panose="02070309020205020404" pitchFamily="49" charset="0"/>
+                <a:cs typeface="Courier New" panose="02070309020205020404" pitchFamily="49" charset="0"/>
+              </a:rPr>
+              <a:t>shape</a:t>
+            </a:r>
+            <a:r>
+              <a:rPr lang="en-US" dirty="0">
+                <a:cs typeface="Courier New" panose="02070309020205020404" pitchFamily="49" charset="0"/>
+              </a:rPr>
+              <a:t> </a:t>
+            </a:r>
+            <a:r>
+              <a:rPr lang="en-US" dirty="0">
+                <a:sym typeface="Symbol" panose="05050102010706020507" pitchFamily="18" charset="2"/>
+              </a:rPr>
+              <a:t> </a:t>
+            </a:r>
+            <a:r>
+              <a:rPr lang="en-US" dirty="0">
+                <a:latin typeface="Courier New" panose="02070309020205020404" pitchFamily="49" charset="0"/>
+                <a:cs typeface="Courier New" panose="02070309020205020404" pitchFamily="49" charset="0"/>
+              </a:rPr>
+              <a:t>Polygon</a:t>
+            </a:r>
+            <a:endParaRPr lang="en-US" dirty="0" smtClean="0"/>
+          </a:p>
+          <a:p>
+            <a:r>
+              <a:rPr lang="en-US" dirty="0" err="1" smtClean="0">
+                <a:latin typeface="Courier New" panose="02070309020205020404" pitchFamily="49" charset="0"/>
+                <a:cs typeface="Courier New" panose="02070309020205020404" pitchFamily="49" charset="0"/>
+              </a:rPr>
+              <a:t>line.parallel_offset</a:t>
+            </a:r>
+            <a:r>
+              <a:rPr lang="en-US" dirty="0" smtClean="0">
+                <a:latin typeface="Courier New" panose="02070309020205020404" pitchFamily="49" charset="0"/>
+                <a:cs typeface="Courier New" panose="02070309020205020404" pitchFamily="49" charset="0"/>
+              </a:rPr>
+              <a:t>(…)</a:t>
+            </a:r>
+            <a:r>
+              <a:rPr lang="en-US" dirty="0" smtClean="0"/>
+              <a:t>:</a:t>
+            </a:r>
+            <a:br>
+              <a:rPr lang="en-US" dirty="0" smtClean="0"/>
+            </a:br>
+            <a:r>
+              <a:rPr lang="en-US" dirty="0" smtClean="0"/>
+              <a:t>    </a:t>
+            </a:r>
+            <a:r>
+              <a:rPr lang="en-US" dirty="0" smtClean="0">
+                <a:latin typeface="Courier New" panose="02070309020205020404" pitchFamily="49" charset="0"/>
+                <a:cs typeface="Courier New" panose="02070309020205020404" pitchFamily="49" charset="0"/>
+              </a:rPr>
+              <a:t>line</a:t>
+            </a:r>
+            <a:r>
+              <a:rPr lang="en-US" dirty="0" smtClean="0"/>
+              <a:t> </a:t>
+            </a:r>
+            <a:r>
+              <a:rPr lang="en-US" dirty="0">
+                <a:sym typeface="Symbol" panose="05050102010706020507" pitchFamily="18" charset="2"/>
+              </a:rPr>
+              <a:t> </a:t>
+            </a:r>
+            <a:r>
+              <a:rPr lang="en-US" dirty="0" err="1" smtClean="0">
+                <a:latin typeface="Courier New" panose="02070309020205020404" pitchFamily="49" charset="0"/>
+                <a:cs typeface="Courier New" panose="02070309020205020404" pitchFamily="49" charset="0"/>
+              </a:rPr>
+              <a:t>LineString</a:t>
+            </a:r>
+            <a:endParaRPr lang="en-US" dirty="0"/>
           </a:p>
         </p:txBody>
       </p:sp>
@@ -6964,6 +7081,1307 @@
               </a:rPr>
               <a:pPr/>
               <a:t>13</a:t>
+            </a:fld>
+            <a:endParaRPr lang="nl-BE">
+              <a:solidFill>
+                <a:prstClr val="black">
+                  <a:tint val="75000"/>
+                </a:prstClr>
+              </a:solidFill>
+            </a:endParaRPr>
+          </a:p>
+        </p:txBody>
+      </p:sp>
+      <p:grpSp>
+        <p:nvGrpSpPr>
+          <p:cNvPr id="9" name="Group 8"/>
+          <p:cNvGrpSpPr/>
+          <p:nvPr/>
+        </p:nvGrpSpPr>
+        <p:grpSpPr>
+          <a:xfrm>
+            <a:off x="154917" y="4781750"/>
+            <a:ext cx="8834166" cy="1850140"/>
+            <a:chOff x="154917" y="4781750"/>
+            <a:chExt cx="8834166" cy="1850140"/>
+          </a:xfrm>
+        </p:grpSpPr>
+        <p:sp>
+          <p:nvSpPr>
+            <p:cNvPr id="7" name="TextBox 6"/>
+            <p:cNvSpPr txBox="1"/>
+            <p:nvPr/>
+          </p:nvSpPr>
+          <p:spPr>
+            <a:xfrm>
+              <a:off x="154917" y="5985559"/>
+              <a:ext cx="8437195" cy="646331"/>
+            </a:xfrm>
+            <a:prstGeom prst="rect">
+              <a:avLst/>
+            </a:prstGeom>
+            <a:solidFill>
+              <a:schemeClr val="accent4">
+                <a:lumMod val="40000"/>
+                <a:lumOff val="60000"/>
+              </a:schemeClr>
+            </a:solidFill>
+          </p:spPr>
+          <p:txBody>
+            <a:bodyPr wrap="square" rtlCol="0">
+              <a:spAutoFit/>
+            </a:bodyPr>
+            <a:lstStyle/>
+            <a:p>
+              <a:r>
+                <a:rPr lang="en-US" dirty="0">
+                  <a:latin typeface="Courier New" pitchFamily="49" charset="0"/>
+                  <a:cs typeface="Courier New" pitchFamily="49" charset="0"/>
+                </a:rPr>
+                <a:t>parallel = </a:t>
+              </a:r>
+              <a:r>
+                <a:rPr lang="en-US" dirty="0" err="1">
+                  <a:latin typeface="Courier New" pitchFamily="49" charset="0"/>
+                  <a:cs typeface="Courier New" pitchFamily="49" charset="0"/>
+                </a:rPr>
+                <a:t>line.parallel_offset</a:t>
+              </a:r>
+              <a:r>
+                <a:rPr lang="en-US" dirty="0">
+                  <a:latin typeface="Courier New" pitchFamily="49" charset="0"/>
+                  <a:cs typeface="Courier New" pitchFamily="49" charset="0"/>
+                </a:rPr>
+                <a:t>(0.5, 'left</a:t>
+              </a:r>
+              <a:r>
+                <a:rPr lang="en-US" dirty="0" smtClean="0">
+                  <a:latin typeface="Courier New" pitchFamily="49" charset="0"/>
+                  <a:cs typeface="Courier New" pitchFamily="49" charset="0"/>
+                </a:rPr>
+                <a:t>',</a:t>
+              </a:r>
+              <a:br>
+                <a:rPr lang="en-US" dirty="0" smtClean="0">
+                  <a:latin typeface="Courier New" pitchFamily="49" charset="0"/>
+                  <a:cs typeface="Courier New" pitchFamily="49" charset="0"/>
+                </a:rPr>
+              </a:br>
+              <a:r>
+                <a:rPr lang="en-US" dirty="0" smtClean="0">
+                  <a:latin typeface="Courier New" pitchFamily="49" charset="0"/>
+                  <a:cs typeface="Courier New" pitchFamily="49" charset="0"/>
+                </a:rPr>
+                <a:t>                                </a:t>
+              </a:r>
+              <a:r>
+                <a:rPr lang="en-US" dirty="0" err="1">
+                  <a:latin typeface="Courier New" pitchFamily="49" charset="0"/>
+                  <a:cs typeface="Courier New" pitchFamily="49" charset="0"/>
+                </a:rPr>
+                <a:t>join_style</a:t>
+              </a:r>
+              <a:r>
+                <a:rPr lang="en-US" dirty="0">
+                  <a:latin typeface="Courier New" pitchFamily="49" charset="0"/>
+                  <a:cs typeface="Courier New" pitchFamily="49" charset="0"/>
+                </a:rPr>
+                <a:t>=</a:t>
+              </a:r>
+              <a:r>
+                <a:rPr lang="en-US" dirty="0" err="1">
+                  <a:latin typeface="Courier New" pitchFamily="49" charset="0"/>
+                  <a:cs typeface="Courier New" pitchFamily="49" charset="0"/>
+                </a:rPr>
+                <a:t>JOIN_STYLE.mitre</a:t>
+              </a:r>
+              <a:r>
+                <a:rPr lang="en-US" dirty="0">
+                  <a:latin typeface="Courier New" pitchFamily="49" charset="0"/>
+                  <a:cs typeface="Courier New" pitchFamily="49" charset="0"/>
+                </a:rPr>
+                <a:t>)</a:t>
+              </a:r>
+              <a:endParaRPr lang="en-US" dirty="0" smtClean="0">
+                <a:latin typeface="Courier New" pitchFamily="49" charset="0"/>
+                <a:cs typeface="Courier New" pitchFamily="49" charset="0"/>
+              </a:endParaRPr>
+            </a:p>
+          </p:txBody>
+        </p:sp>
+        <p:pic>
+          <p:nvPicPr>
+            <p:cNvPr id="5" name="Picture 4"/>
+            <p:cNvPicPr>
+              <a:picLocks noChangeAspect="1"/>
+            </p:cNvPicPr>
+            <p:nvPr/>
+          </p:nvPicPr>
+          <p:blipFill>
+            <a:blip r:embed="rId2">
+              <a:extLst>
+                <a:ext uri="{28A0092B-C50C-407E-A947-70E740481C1C}">
+                  <a14:useLocalDpi xmlns:a14="http://schemas.microsoft.com/office/drawing/2010/main" val="0"/>
+                </a:ext>
+              </a:extLst>
+            </a:blip>
+            <a:stretch>
+              <a:fillRect/>
+            </a:stretch>
+          </p:blipFill>
+          <p:spPr>
+            <a:xfrm>
+              <a:off x="6883878" y="4781750"/>
+              <a:ext cx="2105205" cy="1344413"/>
+            </a:xfrm>
+            <a:prstGeom prst="rect">
+              <a:avLst/>
+            </a:prstGeom>
+            <a:effectLst>
+              <a:outerShdw blurRad="50800" dist="38100" dir="2700000" algn="tl" rotWithShape="0">
+                <a:prstClr val="black">
+                  <a:alpha val="40000"/>
+                </a:prstClr>
+              </a:outerShdw>
+            </a:effectLst>
+          </p:spPr>
+        </p:pic>
+      </p:grpSp>
+    </p:spTree>
+    <p:extLst>
+      <p:ext uri="{BB962C8B-B14F-4D97-AF65-F5344CB8AC3E}">
+        <p14:creationId xmlns:p14="http://schemas.microsoft.com/office/powerpoint/2010/main" val="350369731"/>
+      </p:ext>
+    </p:extLst>
+  </p:cSld>
+  <p:clrMapOvr>
+    <a:masterClrMapping/>
+  </p:clrMapOvr>
+  <p:timing>
+    <p:tnLst>
+      <p:par>
+        <p:cTn id="1" dur="indefinite" restart="never" nodeType="tmRoot">
+          <p:childTnLst>
+            <p:seq concurrent="1" nextAc="seek">
+              <p:cTn id="2" dur="indefinite" nodeType="mainSeq">
+                <p:childTnLst>
+                  <p:par>
+                    <p:cTn id="3" fill="hold">
+                      <p:stCondLst>
+                        <p:cond delay="indefinite"/>
+                        <p:cond evt="onBegin" delay="0">
+                          <p:tn val="2"/>
+                        </p:cond>
+                      </p:stCondLst>
+                      <p:childTnLst>
+                        <p:par>
+                          <p:cTn id="4" fill="hold">
+                            <p:stCondLst>
+                              <p:cond delay="0"/>
+                            </p:stCondLst>
+                            <p:childTnLst>
+                              <p:par>
+                                <p:cTn id="5" presetID="1" presetClass="entr" presetSubtype="0" fill="hold" grpId="0" nodeType="withEffect">
+                                  <p:stCondLst>
+                                    <p:cond delay="0"/>
+                                  </p:stCondLst>
+                                  <p:childTnLst>
+                                    <p:set>
+                                      <p:cBhvr>
+                                        <p:cTn id="6" dur="1" fill="hold">
+                                          <p:stCondLst>
+                                            <p:cond delay="0"/>
+                                          </p:stCondLst>
+                                        </p:cTn>
+                                        <p:tgtEl>
+                                          <p:spTgt spid="3">
+                                            <p:txEl>
+                                              <p:pRg st="0" end="0"/>
+                                            </p:txEl>
+                                          </p:spTgt>
+                                        </p:tgtEl>
+                                        <p:attrNameLst>
+                                          <p:attrName>style.visibility</p:attrName>
+                                        </p:attrNameLst>
+                                      </p:cBhvr>
+                                      <p:to>
+                                        <p:strVal val="visible"/>
+                                      </p:to>
+                                    </p:set>
+                                  </p:childTnLst>
+                                </p:cTn>
+                              </p:par>
+                            </p:childTnLst>
+                          </p:cTn>
+                        </p:par>
+                      </p:childTnLst>
+                    </p:cTn>
+                  </p:par>
+                  <p:par>
+                    <p:cTn id="7" fill="hold">
+                      <p:stCondLst>
+                        <p:cond delay="indefinite"/>
+                      </p:stCondLst>
+                      <p:childTnLst>
+                        <p:par>
+                          <p:cTn id="8" fill="hold">
+                            <p:stCondLst>
+                              <p:cond delay="0"/>
+                            </p:stCondLst>
+                            <p:childTnLst>
+                              <p:par>
+                                <p:cTn id="9" presetID="1" presetClass="entr" presetSubtype="0" fill="hold" grpId="0" nodeType="clickEffect">
+                                  <p:stCondLst>
+                                    <p:cond delay="0"/>
+                                  </p:stCondLst>
+                                  <p:childTnLst>
+                                    <p:set>
+                                      <p:cBhvr>
+                                        <p:cTn id="10" dur="1" fill="hold">
+                                          <p:stCondLst>
+                                            <p:cond delay="0"/>
+                                          </p:stCondLst>
+                                        </p:cTn>
+                                        <p:tgtEl>
+                                          <p:spTgt spid="3">
+                                            <p:txEl>
+                                              <p:pRg st="1" end="1"/>
+                                            </p:txEl>
+                                          </p:spTgt>
+                                        </p:tgtEl>
+                                        <p:attrNameLst>
+                                          <p:attrName>style.visibility</p:attrName>
+                                        </p:attrNameLst>
+                                      </p:cBhvr>
+                                      <p:to>
+                                        <p:strVal val="visible"/>
+                                      </p:to>
+                                    </p:set>
+                                  </p:childTnLst>
+                                </p:cTn>
+                              </p:par>
+                              <p:par>
+                                <p:cTn id="11" presetID="1" presetClass="entr" presetSubtype="0" fill="hold" grpId="0" nodeType="withEffect">
+                                  <p:stCondLst>
+                                    <p:cond delay="0"/>
+                                  </p:stCondLst>
+                                  <p:childTnLst>
+                                    <p:set>
+                                      <p:cBhvr>
+                                        <p:cTn id="12" dur="1" fill="hold">
+                                          <p:stCondLst>
+                                            <p:cond delay="0"/>
+                                          </p:stCondLst>
+                                        </p:cTn>
+                                        <p:tgtEl>
+                                          <p:spTgt spid="3">
+                                            <p:txEl>
+                                              <p:pRg st="2" end="2"/>
+                                            </p:txEl>
+                                          </p:spTgt>
+                                        </p:tgtEl>
+                                        <p:attrNameLst>
+                                          <p:attrName>style.visibility</p:attrName>
+                                        </p:attrNameLst>
+                                      </p:cBhvr>
+                                      <p:to>
+                                        <p:strVal val="visible"/>
+                                      </p:to>
+                                    </p:set>
+                                  </p:childTnLst>
+                                </p:cTn>
+                              </p:par>
+                            </p:childTnLst>
+                          </p:cTn>
+                        </p:par>
+                      </p:childTnLst>
+                    </p:cTn>
+                  </p:par>
+                  <p:par>
+                    <p:cTn id="13" fill="hold">
+                      <p:stCondLst>
+                        <p:cond delay="indefinite"/>
+                      </p:stCondLst>
+                      <p:childTnLst>
+                        <p:par>
+                          <p:cTn id="14" fill="hold">
+                            <p:stCondLst>
+                              <p:cond delay="0"/>
+                            </p:stCondLst>
+                            <p:childTnLst>
+                              <p:par>
+                                <p:cTn id="15" presetID="1" presetClass="entr" presetSubtype="0" fill="hold" grpId="0" nodeType="clickEffect">
+                                  <p:stCondLst>
+                                    <p:cond delay="0"/>
+                                  </p:stCondLst>
+                                  <p:childTnLst>
+                                    <p:set>
+                                      <p:cBhvr>
+                                        <p:cTn id="16" dur="1" fill="hold">
+                                          <p:stCondLst>
+                                            <p:cond delay="0"/>
+                                          </p:stCondLst>
+                                        </p:cTn>
+                                        <p:tgtEl>
+                                          <p:spTgt spid="3">
+                                            <p:txEl>
+                                              <p:pRg st="3" end="3"/>
+                                            </p:txEl>
+                                          </p:spTgt>
+                                        </p:tgtEl>
+                                        <p:attrNameLst>
+                                          <p:attrName>style.visibility</p:attrName>
+                                        </p:attrNameLst>
+                                      </p:cBhvr>
+                                      <p:to>
+                                        <p:strVal val="visible"/>
+                                      </p:to>
+                                    </p:set>
+                                  </p:childTnLst>
+                                </p:cTn>
+                              </p:par>
+                            </p:childTnLst>
+                          </p:cTn>
+                        </p:par>
+                      </p:childTnLst>
+                    </p:cTn>
+                  </p:par>
+                  <p:par>
+                    <p:cTn id="17" fill="hold">
+                      <p:stCondLst>
+                        <p:cond delay="indefinite"/>
+                      </p:stCondLst>
+                      <p:childTnLst>
+                        <p:par>
+                          <p:cTn id="18" fill="hold">
+                            <p:stCondLst>
+                              <p:cond delay="0"/>
+                            </p:stCondLst>
+                            <p:childTnLst>
+                              <p:par>
+                                <p:cTn id="19" presetID="1" presetClass="entr" presetSubtype="0" fill="hold" grpId="0" nodeType="clickEffect">
+                                  <p:stCondLst>
+                                    <p:cond delay="0"/>
+                                  </p:stCondLst>
+                                  <p:childTnLst>
+                                    <p:set>
+                                      <p:cBhvr>
+                                        <p:cTn id="20" dur="1" fill="hold">
+                                          <p:stCondLst>
+                                            <p:cond delay="0"/>
+                                          </p:stCondLst>
+                                        </p:cTn>
+                                        <p:tgtEl>
+                                          <p:spTgt spid="3">
+                                            <p:txEl>
+                                              <p:pRg st="4" end="4"/>
+                                            </p:txEl>
+                                          </p:spTgt>
+                                        </p:tgtEl>
+                                        <p:attrNameLst>
+                                          <p:attrName>style.visibility</p:attrName>
+                                        </p:attrNameLst>
+                                      </p:cBhvr>
+                                      <p:to>
+                                        <p:strVal val="visible"/>
+                                      </p:to>
+                                    </p:set>
+                                  </p:childTnLst>
+                                </p:cTn>
+                              </p:par>
+                            </p:childTnLst>
+                          </p:cTn>
+                        </p:par>
+                      </p:childTnLst>
+                    </p:cTn>
+                  </p:par>
+                  <p:par>
+                    <p:cTn id="21" fill="hold">
+                      <p:stCondLst>
+                        <p:cond delay="indefinite"/>
+                      </p:stCondLst>
+                      <p:childTnLst>
+                        <p:par>
+                          <p:cTn id="22" fill="hold">
+                            <p:stCondLst>
+                              <p:cond delay="0"/>
+                            </p:stCondLst>
+                            <p:childTnLst>
+                              <p:par>
+                                <p:cTn id="23" presetID="1" presetClass="entr" presetSubtype="0" fill="hold" nodeType="clickEffect">
+                                  <p:stCondLst>
+                                    <p:cond delay="0"/>
+                                  </p:stCondLst>
+                                  <p:childTnLst>
+                                    <p:set>
+                                      <p:cBhvr>
+                                        <p:cTn id="24" dur="1" fill="hold">
+                                          <p:stCondLst>
+                                            <p:cond delay="0"/>
+                                          </p:stCondLst>
+                                        </p:cTn>
+                                        <p:tgtEl>
+                                          <p:spTgt spid="9"/>
+                                        </p:tgtEl>
+                                        <p:attrNameLst>
+                                          <p:attrName>style.visibility</p:attrName>
+                                        </p:attrNameLst>
+                                      </p:cBhvr>
+                                      <p:to>
+                                        <p:strVal val="visible"/>
+                                      </p:to>
+                                    </p:set>
+                                  </p:childTnLst>
+                                </p:cTn>
+                              </p:par>
+                            </p:childTnLst>
+                          </p:cTn>
+                        </p:par>
+                      </p:childTnLst>
+                    </p:cTn>
+                  </p:par>
+                </p:childTnLst>
+              </p:cTn>
+              <p:prevCondLst>
+                <p:cond evt="onPrev" delay="0">
+                  <p:tgtEl>
+                    <p:sldTgt/>
+                  </p:tgtEl>
+                </p:cond>
+              </p:prevCondLst>
+              <p:nextCondLst>
+                <p:cond evt="onNext" delay="0">
+                  <p:tgtEl>
+                    <p:sldTgt/>
+                  </p:tgtEl>
+                </p:cond>
+              </p:nextCondLst>
+            </p:seq>
+          </p:childTnLst>
+        </p:cTn>
+      </p:par>
+    </p:tnLst>
+    <p:bldLst>
+      <p:bldP spid="3" grpId="0" uiExpand="1" build="p"/>
+    </p:bldLst>
+  </p:timing>
+</p:sld>
+</file>
+
+<file path=ppt/slides/slide14.xml><?xml version="1.0" encoding="utf-8"?>
+<p:sld xmlns:a="http://schemas.openxmlformats.org/drawingml/2006/main" xmlns:r="http://schemas.openxmlformats.org/officeDocument/2006/relationships" xmlns:p="http://schemas.openxmlformats.org/presentationml/2006/main">
+  <p:cSld>
+    <p:spTree>
+      <p:nvGrpSpPr>
+        <p:cNvPr id="1" name=""/>
+        <p:cNvGrpSpPr/>
+        <p:nvPr/>
+      </p:nvGrpSpPr>
+      <p:grpSpPr>
+        <a:xfrm>
+          <a:off x="0" y="0"/>
+          <a:ext cx="0" cy="0"/>
+          <a:chOff x="0" y="0"/>
+          <a:chExt cx="0" cy="0"/>
+        </a:xfrm>
+      </p:grpSpPr>
+      <p:sp>
+        <p:nvSpPr>
+          <p:cNvPr id="2" name="Title 1"/>
+          <p:cNvSpPr>
+            <a:spLocks noGrp="1"/>
+          </p:cNvSpPr>
+          <p:nvPr>
+            <p:ph type="title"/>
+          </p:nvPr>
+        </p:nvSpPr>
+        <p:spPr/>
+        <p:txBody>
+          <a:bodyPr/>
+          <a:lstStyle/>
+          <a:p>
+            <a:r>
+              <a:rPr lang="en-US" dirty="0" smtClean="0"/>
+              <a:t>Shapely: interpolation</a:t>
+            </a:r>
+            <a:endParaRPr lang="en-US" dirty="0"/>
+          </a:p>
+        </p:txBody>
+      </p:sp>
+      <p:sp>
+        <p:nvSpPr>
+          <p:cNvPr id="3" name="Content Placeholder 2"/>
+          <p:cNvSpPr>
+            <a:spLocks noGrp="1"/>
+          </p:cNvSpPr>
+          <p:nvPr>
+            <p:ph idx="1"/>
+          </p:nvPr>
+        </p:nvSpPr>
+        <p:spPr/>
+        <p:txBody>
+          <a:bodyPr/>
+          <a:lstStyle/>
+          <a:p>
+            <a:r>
+              <a:rPr lang="en-US" dirty="0" smtClean="0"/>
+              <a:t>Compute point at given distance from point along a line</a:t>
+            </a:r>
+            <a:endParaRPr lang="en-US" dirty="0"/>
+          </a:p>
+        </p:txBody>
+      </p:sp>
+      <p:sp>
+        <p:nvSpPr>
+          <p:cNvPr id="4" name="Slide Number Placeholder 3"/>
+          <p:cNvSpPr>
+            <a:spLocks noGrp="1"/>
+          </p:cNvSpPr>
+          <p:nvPr>
+            <p:ph type="sldNum" sz="quarter" idx="12"/>
+          </p:nvPr>
+        </p:nvSpPr>
+        <p:spPr/>
+        <p:txBody>
+          <a:bodyPr/>
+          <a:lstStyle/>
+          <a:p>
+            <a:fld id="{5A209D72-2E9D-49B0-8977-41DCCC66C0BB}" type="slidenum">
+              <a:rPr lang="nl-BE" smtClean="0">
+                <a:solidFill>
+                  <a:prstClr val="black">
+                    <a:tint val="75000"/>
+                  </a:prstClr>
+                </a:solidFill>
+              </a:rPr>
+              <a:pPr/>
+              <a:t>14</a:t>
+            </a:fld>
+            <a:endParaRPr lang="nl-BE">
+              <a:solidFill>
+                <a:prstClr val="black">
+                  <a:tint val="75000"/>
+                </a:prstClr>
+              </a:solidFill>
+            </a:endParaRPr>
+          </a:p>
+        </p:txBody>
+      </p:sp>
+      <p:sp>
+        <p:nvSpPr>
+          <p:cNvPr id="5" name="TextBox 4"/>
+          <p:cNvSpPr txBox="1"/>
+          <p:nvPr/>
+        </p:nvSpPr>
+        <p:spPr>
+          <a:xfrm>
+            <a:off x="457200" y="2829888"/>
+            <a:ext cx="5089585" cy="1200329"/>
+          </a:xfrm>
+          <a:prstGeom prst="rect">
+            <a:avLst/>
+          </a:prstGeom>
+          <a:solidFill>
+            <a:schemeClr val="accent4">
+              <a:lumMod val="40000"/>
+              <a:lumOff val="60000"/>
+            </a:schemeClr>
+          </a:solidFill>
+        </p:spPr>
+        <p:txBody>
+          <a:bodyPr wrap="square" rtlCol="0">
+            <a:spAutoFit/>
+          </a:bodyPr>
+          <a:lstStyle/>
+          <a:p>
+            <a:r>
+              <a:rPr lang="en-US" dirty="0">
+                <a:latin typeface="Courier New" pitchFamily="49" charset="0"/>
+                <a:cs typeface="Courier New" pitchFamily="49" charset="0"/>
+              </a:rPr>
+              <a:t>point1 = Point((1.0, 1.0))</a:t>
+            </a:r>
+          </a:p>
+          <a:p>
+            <a:r>
+              <a:rPr lang="en-US" dirty="0">
+                <a:latin typeface="Courier New" pitchFamily="49" charset="0"/>
+                <a:cs typeface="Courier New" pitchFamily="49" charset="0"/>
+              </a:rPr>
+              <a:t>point2 = Point((3.0, 3.0))</a:t>
+            </a:r>
+          </a:p>
+          <a:p>
+            <a:r>
+              <a:rPr lang="en-US" dirty="0" smtClean="0">
+                <a:latin typeface="Courier New" pitchFamily="49" charset="0"/>
+                <a:cs typeface="Courier New" pitchFamily="49" charset="0"/>
+              </a:rPr>
+              <a:t>line </a:t>
+            </a:r>
+            <a:r>
+              <a:rPr lang="en-US" dirty="0">
+                <a:latin typeface="Courier New" pitchFamily="49" charset="0"/>
+                <a:cs typeface="Courier New" pitchFamily="49" charset="0"/>
+              </a:rPr>
+              <a:t>= </a:t>
+            </a:r>
+            <a:r>
+              <a:rPr lang="en-US" dirty="0" err="1">
+                <a:latin typeface="Courier New" pitchFamily="49" charset="0"/>
+                <a:cs typeface="Courier New" pitchFamily="49" charset="0"/>
+              </a:rPr>
+              <a:t>LineString</a:t>
+            </a:r>
+            <a:r>
+              <a:rPr lang="en-US" dirty="0">
+                <a:latin typeface="Courier New" pitchFamily="49" charset="0"/>
+                <a:cs typeface="Courier New" pitchFamily="49" charset="0"/>
+              </a:rPr>
+              <a:t>([point1, point2</a:t>
+            </a:r>
+            <a:r>
+              <a:rPr lang="en-US" dirty="0" smtClean="0">
+                <a:latin typeface="Courier New" pitchFamily="49" charset="0"/>
+                <a:cs typeface="Courier New" pitchFamily="49" charset="0"/>
+              </a:rPr>
+              <a:t>])</a:t>
+            </a:r>
+          </a:p>
+          <a:p>
+            <a:r>
+              <a:rPr lang="en-US" dirty="0">
+                <a:latin typeface="Courier New" pitchFamily="49" charset="0"/>
+                <a:cs typeface="Courier New" pitchFamily="49" charset="0"/>
+              </a:rPr>
+              <a:t>point3 = </a:t>
+            </a:r>
+            <a:r>
+              <a:rPr lang="en-US" dirty="0" err="1" smtClean="0">
+                <a:latin typeface="Courier New" pitchFamily="49" charset="0"/>
+                <a:cs typeface="Courier New" pitchFamily="49" charset="0"/>
+              </a:rPr>
+              <a:t>line.interpolate</a:t>
+            </a:r>
+            <a:r>
+              <a:rPr lang="en-US" dirty="0" smtClean="0">
+                <a:latin typeface="Courier New" pitchFamily="49" charset="0"/>
+                <a:cs typeface="Courier New" pitchFamily="49" charset="0"/>
+              </a:rPr>
+              <a:t>(1.0</a:t>
+            </a:r>
+            <a:r>
+              <a:rPr lang="en-US" dirty="0">
+                <a:latin typeface="Courier New" pitchFamily="49" charset="0"/>
+                <a:cs typeface="Courier New" pitchFamily="49" charset="0"/>
+              </a:rPr>
+              <a:t>)</a:t>
+            </a:r>
+            <a:endParaRPr lang="en-US" dirty="0" smtClean="0">
+              <a:latin typeface="Courier New" pitchFamily="49" charset="0"/>
+              <a:cs typeface="Courier New" pitchFamily="49" charset="0"/>
+            </a:endParaRPr>
+          </a:p>
+        </p:txBody>
+      </p:sp>
+      <p:pic>
+        <p:nvPicPr>
+          <p:cNvPr id="8" name="Picture 7"/>
+          <p:cNvPicPr>
+            <a:picLocks noChangeAspect="1"/>
+          </p:cNvPicPr>
+          <p:nvPr/>
+        </p:nvPicPr>
+        <p:blipFill>
+          <a:blip r:embed="rId2">
+            <a:extLst>
+              <a:ext uri="{28A0092B-C50C-407E-A947-70E740481C1C}">
+                <a14:useLocalDpi xmlns:a14="http://schemas.microsoft.com/office/drawing/2010/main" val="0"/>
+              </a:ext>
+            </a:extLst>
+          </a:blip>
+          <a:stretch>
+            <a:fillRect/>
+          </a:stretch>
+        </p:blipFill>
+        <p:spPr>
+          <a:xfrm>
+            <a:off x="5773909" y="2994390"/>
+            <a:ext cx="3209925" cy="2990850"/>
+          </a:xfrm>
+          <a:prstGeom prst="rect">
+            <a:avLst/>
+          </a:prstGeom>
+        </p:spPr>
+      </p:pic>
+      <p:grpSp>
+        <p:nvGrpSpPr>
+          <p:cNvPr id="10" name="Group 9"/>
+          <p:cNvGrpSpPr/>
+          <p:nvPr/>
+        </p:nvGrpSpPr>
+        <p:grpSpPr>
+          <a:xfrm>
+            <a:off x="6146098" y="4587351"/>
+            <a:ext cx="1147770" cy="556910"/>
+            <a:chOff x="5516369" y="5415487"/>
+            <a:chExt cx="1147770" cy="556910"/>
+          </a:xfrm>
+        </p:grpSpPr>
+        <p:sp>
+          <p:nvSpPr>
+            <p:cNvPr id="7" name="Left Brace 6"/>
+            <p:cNvSpPr/>
+            <p:nvPr/>
+          </p:nvSpPr>
+          <p:spPr>
+            <a:xfrm rot="2700000">
+              <a:off x="6001734" y="5309993"/>
+              <a:ext cx="177039" cy="1147770"/>
+            </a:xfrm>
+            <a:prstGeom prst="leftBrace">
+              <a:avLst/>
+            </a:prstGeom>
+            <a:ln>
+              <a:solidFill>
+                <a:schemeClr val="tx1"/>
+              </a:solidFill>
+            </a:ln>
+          </p:spPr>
+          <p:style>
+            <a:lnRef idx="1">
+              <a:schemeClr val="accent1"/>
+            </a:lnRef>
+            <a:fillRef idx="0">
+              <a:schemeClr val="accent1"/>
+            </a:fillRef>
+            <a:effectRef idx="0">
+              <a:schemeClr val="accent1"/>
+            </a:effectRef>
+            <a:fontRef idx="minor">
+              <a:schemeClr val="tx1"/>
+            </a:fontRef>
+          </p:style>
+          <p:txBody>
+            <a:bodyPr rtlCol="0" anchor="ctr"/>
+            <a:lstStyle/>
+            <a:p>
+              <a:pPr algn="ctr"/>
+              <a:endParaRPr lang="en-US"/>
+            </a:p>
+          </p:txBody>
+        </p:sp>
+        <p:sp>
+          <p:nvSpPr>
+            <p:cNvPr id="9" name="TextBox 8"/>
+            <p:cNvSpPr txBox="1"/>
+            <p:nvPr/>
+          </p:nvSpPr>
+          <p:spPr>
+            <a:xfrm>
+              <a:off x="5621862" y="5415487"/>
+              <a:ext cx="745717" cy="338554"/>
+            </a:xfrm>
+            <a:prstGeom prst="rect">
+              <a:avLst/>
+            </a:prstGeom>
+            <a:noFill/>
+          </p:spPr>
+          <p:txBody>
+            <a:bodyPr wrap="none" rtlCol="0">
+              <a:spAutoFit/>
+            </a:bodyPr>
+            <a:lstStyle/>
+            <a:p>
+              <a:r>
+                <a:rPr lang="en-US" sz="1600" i="1" dirty="0" smtClean="0"/>
+                <a:t>d</a:t>
+              </a:r>
+              <a:r>
+                <a:rPr lang="en-US" sz="1600" dirty="0" smtClean="0"/>
+                <a:t> = 1.0</a:t>
+              </a:r>
+              <a:endParaRPr lang="en-US" sz="1600" dirty="0"/>
+            </a:p>
+          </p:txBody>
+        </p:sp>
+      </p:grpSp>
+      <p:grpSp>
+        <p:nvGrpSpPr>
+          <p:cNvPr id="13" name="Group 12"/>
+          <p:cNvGrpSpPr/>
+          <p:nvPr/>
+        </p:nvGrpSpPr>
+        <p:grpSpPr>
+          <a:xfrm>
+            <a:off x="457200" y="4353520"/>
+            <a:ext cx="5089585" cy="738664"/>
+            <a:chOff x="457200" y="4353520"/>
+            <a:chExt cx="5089585" cy="738664"/>
+          </a:xfrm>
+        </p:grpSpPr>
+        <p:sp>
+          <p:nvSpPr>
+            <p:cNvPr id="11" name="TextBox 10"/>
+            <p:cNvSpPr txBox="1"/>
+            <p:nvPr/>
+          </p:nvSpPr>
+          <p:spPr>
+            <a:xfrm>
+              <a:off x="457200" y="4353520"/>
+              <a:ext cx="5089585" cy="369332"/>
+            </a:xfrm>
+            <a:prstGeom prst="rect">
+              <a:avLst/>
+            </a:prstGeom>
+            <a:solidFill>
+              <a:schemeClr val="accent4">
+                <a:lumMod val="40000"/>
+                <a:lumOff val="60000"/>
+              </a:schemeClr>
+            </a:solidFill>
+          </p:spPr>
+          <p:txBody>
+            <a:bodyPr wrap="square" rtlCol="0">
+              <a:spAutoFit/>
+            </a:bodyPr>
+            <a:lstStyle/>
+            <a:p>
+              <a:r>
+                <a:rPr lang="en-US" dirty="0" smtClean="0">
+                  <a:latin typeface="Courier New" pitchFamily="49" charset="0"/>
+                  <a:cs typeface="Courier New" pitchFamily="49" charset="0"/>
+                </a:rPr>
+                <a:t>point1.distance(point3)</a:t>
+              </a:r>
+              <a:endParaRPr lang="en-US" dirty="0" smtClean="0">
+                <a:latin typeface="Courier New" pitchFamily="49" charset="0"/>
+                <a:cs typeface="Courier New" pitchFamily="49" charset="0"/>
+              </a:endParaRPr>
+            </a:p>
+          </p:txBody>
+        </p:sp>
+        <p:sp>
+          <p:nvSpPr>
+            <p:cNvPr id="12" name="TextBox 11"/>
+            <p:cNvSpPr txBox="1"/>
+            <p:nvPr/>
+          </p:nvSpPr>
+          <p:spPr>
+            <a:xfrm>
+              <a:off x="2422221" y="4722852"/>
+              <a:ext cx="756938" cy="369332"/>
+            </a:xfrm>
+            <a:prstGeom prst="rect">
+              <a:avLst/>
+            </a:prstGeom>
+            <a:noFill/>
+          </p:spPr>
+          <p:txBody>
+            <a:bodyPr wrap="none" rtlCol="0">
+              <a:spAutoFit/>
+            </a:bodyPr>
+            <a:lstStyle/>
+            <a:p>
+              <a:r>
+                <a:rPr lang="en-US" dirty="0" smtClean="0">
+                  <a:sym typeface="Symbol" panose="05050102010706020507" pitchFamily="18" charset="2"/>
+                </a:rPr>
+                <a:t> </a:t>
+              </a:r>
+              <a:r>
+                <a:rPr lang="en-US" dirty="0" smtClean="0"/>
+                <a:t>1.0</a:t>
+              </a:r>
+              <a:endParaRPr lang="en-US" dirty="0"/>
+            </a:p>
+          </p:txBody>
+        </p:sp>
+      </p:grpSp>
+    </p:spTree>
+    <p:extLst>
+      <p:ext uri="{BB962C8B-B14F-4D97-AF65-F5344CB8AC3E}">
+        <p14:creationId xmlns:p14="http://schemas.microsoft.com/office/powerpoint/2010/main" val="2035376356"/>
+      </p:ext>
+    </p:extLst>
+  </p:cSld>
+  <p:clrMapOvr>
+    <a:masterClrMapping/>
+  </p:clrMapOvr>
+  <p:timing>
+    <p:tnLst>
+      <p:par>
+        <p:cTn id="1" dur="indefinite" restart="never" nodeType="tmRoot">
+          <p:childTnLst>
+            <p:seq concurrent="1" nextAc="seek">
+              <p:cTn id="2" dur="indefinite" nodeType="mainSeq">
+                <p:childTnLst>
+                  <p:par>
+                    <p:cTn id="3" fill="hold">
+                      <p:stCondLst>
+                        <p:cond delay="indefinite"/>
+                      </p:stCondLst>
+                      <p:childTnLst>
+                        <p:par>
+                          <p:cTn id="4" fill="hold">
+                            <p:stCondLst>
+                              <p:cond delay="0"/>
+                            </p:stCondLst>
+                            <p:childTnLst>
+                              <p:par>
+                                <p:cTn id="5" presetID="1" presetClass="entr" presetSubtype="0" fill="hold" grpId="0" nodeType="clickEffect">
+                                  <p:stCondLst>
+                                    <p:cond delay="0"/>
+                                  </p:stCondLst>
+                                  <p:childTnLst>
+                                    <p:set>
+                                      <p:cBhvr>
+                                        <p:cTn id="6" dur="1" fill="hold">
+                                          <p:stCondLst>
+                                            <p:cond delay="0"/>
+                                          </p:stCondLst>
+                                        </p:cTn>
+                                        <p:tgtEl>
+                                          <p:spTgt spid="5"/>
+                                        </p:tgtEl>
+                                        <p:attrNameLst>
+                                          <p:attrName>style.visibility</p:attrName>
+                                        </p:attrNameLst>
+                                      </p:cBhvr>
+                                      <p:to>
+                                        <p:strVal val="visible"/>
+                                      </p:to>
+                                    </p:set>
+                                  </p:childTnLst>
+                                </p:cTn>
+                              </p:par>
+                            </p:childTnLst>
+                          </p:cTn>
+                        </p:par>
+                      </p:childTnLst>
+                    </p:cTn>
+                  </p:par>
+                  <p:par>
+                    <p:cTn id="7" fill="hold">
+                      <p:stCondLst>
+                        <p:cond delay="indefinite"/>
+                      </p:stCondLst>
+                      <p:childTnLst>
+                        <p:par>
+                          <p:cTn id="8" fill="hold">
+                            <p:stCondLst>
+                              <p:cond delay="0"/>
+                            </p:stCondLst>
+                            <p:childTnLst>
+                              <p:par>
+                                <p:cTn id="9" presetID="1" presetClass="entr" presetSubtype="0" fill="hold" nodeType="clickEffect">
+                                  <p:stCondLst>
+                                    <p:cond delay="0"/>
+                                  </p:stCondLst>
+                                  <p:childTnLst>
+                                    <p:set>
+                                      <p:cBhvr>
+                                        <p:cTn id="10" dur="1" fill="hold">
+                                          <p:stCondLst>
+                                            <p:cond delay="0"/>
+                                          </p:stCondLst>
+                                        </p:cTn>
+                                        <p:tgtEl>
+                                          <p:spTgt spid="8"/>
+                                        </p:tgtEl>
+                                        <p:attrNameLst>
+                                          <p:attrName>style.visibility</p:attrName>
+                                        </p:attrNameLst>
+                                      </p:cBhvr>
+                                      <p:to>
+                                        <p:strVal val="visible"/>
+                                      </p:to>
+                                    </p:set>
+                                  </p:childTnLst>
+                                </p:cTn>
+                              </p:par>
+                            </p:childTnLst>
+                          </p:cTn>
+                        </p:par>
+                      </p:childTnLst>
+                    </p:cTn>
+                  </p:par>
+                  <p:par>
+                    <p:cTn id="11" fill="hold">
+                      <p:stCondLst>
+                        <p:cond delay="indefinite"/>
+                      </p:stCondLst>
+                      <p:childTnLst>
+                        <p:par>
+                          <p:cTn id="12" fill="hold">
+                            <p:stCondLst>
+                              <p:cond delay="0"/>
+                            </p:stCondLst>
+                            <p:childTnLst>
+                              <p:par>
+                                <p:cTn id="13" presetID="1" presetClass="entr" presetSubtype="0" fill="hold" nodeType="clickEffect">
+                                  <p:stCondLst>
+                                    <p:cond delay="0"/>
+                                  </p:stCondLst>
+                                  <p:childTnLst>
+                                    <p:set>
+                                      <p:cBhvr>
+                                        <p:cTn id="14" dur="1" fill="hold">
+                                          <p:stCondLst>
+                                            <p:cond delay="0"/>
+                                          </p:stCondLst>
+                                        </p:cTn>
+                                        <p:tgtEl>
+                                          <p:spTgt spid="10"/>
+                                        </p:tgtEl>
+                                        <p:attrNameLst>
+                                          <p:attrName>style.visibility</p:attrName>
+                                        </p:attrNameLst>
+                                      </p:cBhvr>
+                                      <p:to>
+                                        <p:strVal val="visible"/>
+                                      </p:to>
+                                    </p:set>
+                                  </p:childTnLst>
+                                </p:cTn>
+                              </p:par>
+                            </p:childTnLst>
+                          </p:cTn>
+                        </p:par>
+                      </p:childTnLst>
+                    </p:cTn>
+                  </p:par>
+                  <p:par>
+                    <p:cTn id="15" fill="hold">
+                      <p:stCondLst>
+                        <p:cond delay="indefinite"/>
+                      </p:stCondLst>
+                      <p:childTnLst>
+                        <p:par>
+                          <p:cTn id="16" fill="hold">
+                            <p:stCondLst>
+                              <p:cond delay="0"/>
+                            </p:stCondLst>
+                            <p:childTnLst>
+                              <p:par>
+                                <p:cTn id="17" presetID="1" presetClass="entr" presetSubtype="0" fill="hold" nodeType="clickEffect">
+                                  <p:stCondLst>
+                                    <p:cond delay="0"/>
+                                  </p:stCondLst>
+                                  <p:childTnLst>
+                                    <p:set>
+                                      <p:cBhvr>
+                                        <p:cTn id="18" dur="1" fill="hold">
+                                          <p:stCondLst>
+                                            <p:cond delay="0"/>
+                                          </p:stCondLst>
+                                        </p:cTn>
+                                        <p:tgtEl>
+                                          <p:spTgt spid="13"/>
+                                        </p:tgtEl>
+                                        <p:attrNameLst>
+                                          <p:attrName>style.visibility</p:attrName>
+                                        </p:attrNameLst>
+                                      </p:cBhvr>
+                                      <p:to>
+                                        <p:strVal val="visible"/>
+                                      </p:to>
+                                    </p:set>
+                                  </p:childTnLst>
+                                </p:cTn>
+                              </p:par>
+                            </p:childTnLst>
+                          </p:cTn>
+                        </p:par>
+                      </p:childTnLst>
+                    </p:cTn>
+                  </p:par>
+                </p:childTnLst>
+              </p:cTn>
+              <p:prevCondLst>
+                <p:cond evt="onPrev" delay="0">
+                  <p:tgtEl>
+                    <p:sldTgt/>
+                  </p:tgtEl>
+                </p:cond>
+              </p:prevCondLst>
+              <p:nextCondLst>
+                <p:cond evt="onNext" delay="0">
+                  <p:tgtEl>
+                    <p:sldTgt/>
+                  </p:tgtEl>
+                </p:cond>
+              </p:nextCondLst>
+            </p:seq>
+          </p:childTnLst>
+        </p:cTn>
+      </p:par>
+    </p:tnLst>
+    <p:bldLst>
+      <p:bldP spid="5" grpId="0" animBg="1"/>
+    </p:bldLst>
+  </p:timing>
+</p:sld>
+</file>
+
+<file path=ppt/slides/slide15.xml><?xml version="1.0" encoding="utf-8"?>
+<p:sld xmlns:a="http://schemas.openxmlformats.org/drawingml/2006/main" xmlns:r="http://schemas.openxmlformats.org/officeDocument/2006/relationships" xmlns:p="http://schemas.openxmlformats.org/presentationml/2006/main">
+  <p:cSld>
+    <p:spTree>
+      <p:nvGrpSpPr>
+        <p:cNvPr id="1" name=""/>
+        <p:cNvGrpSpPr/>
+        <p:nvPr/>
+      </p:nvGrpSpPr>
+      <p:grpSpPr>
+        <a:xfrm>
+          <a:off x="0" y="0"/>
+          <a:ext cx="0" cy="0"/>
+          <a:chOff x="0" y="0"/>
+          <a:chExt cx="0" cy="0"/>
+        </a:xfrm>
+      </p:grpSpPr>
+      <p:sp>
+        <p:nvSpPr>
+          <p:cNvPr id="2" name="Title 1"/>
+          <p:cNvSpPr>
+            <a:spLocks noGrp="1"/>
+          </p:cNvSpPr>
+          <p:nvPr>
+            <p:ph type="title"/>
+          </p:nvPr>
+        </p:nvSpPr>
+        <p:spPr/>
+        <p:txBody>
+          <a:bodyPr/>
+          <a:lstStyle/>
+          <a:p>
+            <a:r>
+              <a:rPr lang="en-US" dirty="0" smtClean="0"/>
+              <a:t>Further reading</a:t>
+            </a:r>
+            <a:endParaRPr lang="en-US" dirty="0"/>
+          </a:p>
+        </p:txBody>
+      </p:sp>
+      <p:sp>
+        <p:nvSpPr>
+          <p:cNvPr id="3" name="Content Placeholder 2"/>
+          <p:cNvSpPr>
+            <a:spLocks noGrp="1"/>
+          </p:cNvSpPr>
+          <p:nvPr>
+            <p:ph idx="1"/>
+          </p:nvPr>
+        </p:nvSpPr>
+        <p:spPr/>
+        <p:txBody>
+          <a:bodyPr/>
+          <a:lstStyle/>
+          <a:p>
+            <a:r>
+              <a:rPr lang="en-US" dirty="0" smtClean="0"/>
+              <a:t>Fiona manual</a:t>
+            </a:r>
+            <a:r>
+              <a:rPr lang="en-US" dirty="0"/>
+              <a:t/>
+            </a:r>
+            <a:br>
+              <a:rPr lang="en-US" dirty="0"/>
+            </a:br>
+            <a:r>
+              <a:rPr lang="en-US" sz="2000" dirty="0">
+                <a:hlinkClick r:id="rId2"/>
+              </a:rPr>
+              <a:t>http://</a:t>
+            </a:r>
+            <a:r>
+              <a:rPr lang="en-US" sz="2000" dirty="0" smtClean="0">
+                <a:hlinkClick r:id="rId2"/>
+              </a:rPr>
+              <a:t>toblerity.org/fiona/index.html</a:t>
+            </a:r>
+            <a:endParaRPr lang="en-US" sz="2000" dirty="0" smtClean="0"/>
+          </a:p>
+          <a:p>
+            <a:r>
+              <a:rPr lang="en-US" dirty="0"/>
+              <a:t>Folium manual</a:t>
+            </a:r>
+            <a:br>
+              <a:rPr lang="en-US" dirty="0"/>
+            </a:br>
+            <a:r>
+              <a:rPr lang="en-US" sz="2000" dirty="0">
+                <a:hlinkClick r:id="rId3"/>
+              </a:rPr>
+              <a:t>http://python-visualization.github.io/folium/docs-master</a:t>
+            </a:r>
+            <a:r>
+              <a:rPr lang="en-US" sz="2000" dirty="0" smtClean="0">
+                <a:hlinkClick r:id="rId3"/>
+              </a:rPr>
+              <a:t>/</a:t>
+            </a:r>
+            <a:r>
+              <a:rPr lang="en-US" sz="2000" dirty="0" smtClean="0"/>
+              <a:t> </a:t>
+            </a:r>
+            <a:endParaRPr lang="en-US" dirty="0"/>
+          </a:p>
+          <a:p>
+            <a:r>
+              <a:rPr lang="en-US" dirty="0" smtClean="0"/>
+              <a:t>Shapely manual</a:t>
+            </a:r>
+            <a:br>
+              <a:rPr lang="en-US" dirty="0" smtClean="0"/>
+            </a:br>
+            <a:r>
+              <a:rPr lang="en-US" sz="2000" dirty="0">
+                <a:hlinkClick r:id="rId4"/>
+              </a:rPr>
+              <a:t>https://shapely.readthedocs.io/en/latest</a:t>
+            </a:r>
+            <a:r>
+              <a:rPr lang="en-US" sz="2000" dirty="0" smtClean="0">
+                <a:hlinkClick r:id="rId4"/>
+              </a:rPr>
+              <a:t>/</a:t>
+            </a:r>
+            <a:endParaRPr lang="en-US" sz="2000" dirty="0" smtClean="0"/>
+          </a:p>
+          <a:p>
+            <a:endParaRPr lang="en-US" dirty="0" smtClean="0"/>
+          </a:p>
+        </p:txBody>
+      </p:sp>
+      <p:sp>
+        <p:nvSpPr>
+          <p:cNvPr id="4" name="Slide Number Placeholder 3"/>
+          <p:cNvSpPr>
+            <a:spLocks noGrp="1"/>
+          </p:cNvSpPr>
+          <p:nvPr>
+            <p:ph type="sldNum" sz="quarter" idx="12"/>
+          </p:nvPr>
+        </p:nvSpPr>
+        <p:spPr/>
+        <p:txBody>
+          <a:bodyPr/>
+          <a:lstStyle/>
+          <a:p>
+            <a:fld id="{5A209D72-2E9D-49B0-8977-41DCCC66C0BB}" type="slidenum">
+              <a:rPr lang="nl-BE" smtClean="0">
+                <a:solidFill>
+                  <a:prstClr val="black">
+                    <a:tint val="75000"/>
+                  </a:prstClr>
+                </a:solidFill>
+              </a:rPr>
+              <a:pPr/>
+              <a:t>15</a:t>
             </a:fld>
             <a:endParaRPr lang="nl-BE">
               <a:solidFill>
@@ -10047,7 +11465,7 @@
           <a:p>
             <a:r>
               <a:rPr lang="en-US" dirty="0" smtClean="0"/>
-              <a:t>Result in </a:t>
+              <a:t>Folium in </a:t>
             </a:r>
             <a:r>
               <a:rPr lang="en-US" dirty="0" err="1" smtClean="0"/>

</xml_diff>

<commit_message>
Add slides on GeoTIFF
</commit_message>
<xml_diff>
--- a/Python/python_gis.pptx
+++ b/Python/python_gis.pptx
@@ -5,7 +5,7 @@
     <p:sldMasterId id="2147483672" r:id="rId1"/>
   </p:sldMasterIdLst>
   <p:notesMasterIdLst>
-    <p:notesMasterId r:id="rId17"/>
+    <p:notesMasterId r:id="rId20"/>
   </p:notesMasterIdLst>
   <p:sldIdLst>
     <p:sldId id="256" r:id="rId2"/>
@@ -22,7 +22,10 @@
     <p:sldId id="275" r:id="rId13"/>
     <p:sldId id="276" r:id="rId14"/>
     <p:sldId id="277" r:id="rId15"/>
-    <p:sldId id="265" r:id="rId16"/>
+    <p:sldId id="278" r:id="rId16"/>
+    <p:sldId id="279" r:id="rId17"/>
+    <p:sldId id="280" r:id="rId18"/>
+    <p:sldId id="265" r:id="rId19"/>
   </p:sldIdLst>
   <p:sldSz cx="9144000" cy="6858000" type="screen4x3"/>
   <p:notesSz cx="6858000" cy="9144000"/>
@@ -211,7 +214,7 @@
           <a:p>
             <a:fld id="{794915E2-5A19-401A-AAB5-929FAFDC4B58}" type="datetimeFigureOut">
               <a:rPr lang="en-US" smtClean="0"/>
-              <a:t>2017-10-27</a:t>
+              <a:t>2017-10-29</a:t>
             </a:fld>
             <a:endParaRPr lang="en-US"/>
           </a:p>
@@ -667,7 +670,7 @@
                 </a:solidFill>
               </a:rPr>
               <a:pPr/>
-              <a:t>27/10/2017</a:t>
+              <a:t>29/10/2017</a:t>
             </a:fld>
             <a:endParaRPr lang="nl-BE">
               <a:solidFill>
@@ -869,7 +872,7 @@
                 </a:solidFill>
               </a:rPr>
               <a:pPr/>
-              <a:t>27/10/2017</a:t>
+              <a:t>29/10/2017</a:t>
             </a:fld>
             <a:endParaRPr lang="nl-BE">
               <a:solidFill>
@@ -1081,7 +1084,7 @@
                 </a:solidFill>
               </a:rPr>
               <a:pPr/>
-              <a:t>27/10/2017</a:t>
+              <a:t>29/10/2017</a:t>
             </a:fld>
             <a:endParaRPr lang="nl-BE">
               <a:solidFill>
@@ -1283,7 +1286,7 @@
                 </a:solidFill>
               </a:rPr>
               <a:pPr/>
-              <a:t>27/10/2017</a:t>
+              <a:t>29/10/2017</a:t>
             </a:fld>
             <a:endParaRPr lang="nl-BE">
               <a:solidFill>
@@ -1561,7 +1564,7 @@
                 </a:solidFill>
               </a:rPr>
               <a:pPr/>
-              <a:t>27/10/2017</a:t>
+              <a:t>29/10/2017</a:t>
             </a:fld>
             <a:endParaRPr lang="nl-BE">
               <a:solidFill>
@@ -1881,7 +1884,7 @@
                 </a:solidFill>
               </a:rPr>
               <a:pPr/>
-              <a:t>27/10/2017</a:t>
+              <a:t>29/10/2017</a:t>
             </a:fld>
             <a:endParaRPr lang="nl-BE">
               <a:solidFill>
@@ -2335,7 +2338,7 @@
                 </a:solidFill>
               </a:rPr>
               <a:pPr/>
-              <a:t>27/10/2017</a:t>
+              <a:t>29/10/2017</a:t>
             </a:fld>
             <a:endParaRPr lang="nl-BE">
               <a:solidFill>
@@ -2485,7 +2488,7 @@
                 </a:solidFill>
               </a:rPr>
               <a:pPr/>
-              <a:t>27/10/2017</a:t>
+              <a:t>29/10/2017</a:t>
             </a:fld>
             <a:endParaRPr lang="nl-BE">
               <a:solidFill>
@@ -2612,7 +2615,7 @@
                 </a:solidFill>
               </a:rPr>
               <a:pPr/>
-              <a:t>27/10/2017</a:t>
+              <a:t>29/10/2017</a:t>
             </a:fld>
             <a:endParaRPr lang="nl-BE">
               <a:solidFill>
@@ -2921,7 +2924,7 @@
                 </a:solidFill>
               </a:rPr>
               <a:pPr/>
-              <a:t>27/10/2017</a:t>
+              <a:t>29/10/2017</a:t>
             </a:fld>
             <a:endParaRPr lang="nl-BE">
               <a:solidFill>
@@ -3206,7 +3209,7 @@
                 </a:solidFill>
               </a:rPr>
               <a:pPr/>
-              <a:t>27/10/2017</a:t>
+              <a:t>29/10/2017</a:t>
             </a:fld>
             <a:endParaRPr lang="nl-BE">
               <a:solidFill>
@@ -3451,7 +3454,7 @@
                 </a:solidFill>
               </a:rPr>
               <a:pPr/>
-              <a:t>27/10/2017</a:t>
+              <a:t>29/10/2017</a:t>
             </a:fld>
             <a:endParaRPr lang="nl-BE">
               <a:solidFill>
@@ -8253,8 +8256,8 @@
           <a:lstStyle/>
           <a:p>
             <a:r>
-              <a:rPr lang="en-US" dirty="0" smtClean="0"/>
-              <a:t>Further reading</a:t>
+              <a:rPr lang="en-US" dirty="0" err="1" smtClean="0"/>
+              <a:t>GeoTIFF</a:t>
             </a:r>
             <a:endParaRPr lang="en-US" dirty="0"/>
           </a:p>
@@ -8272,151 +8275,56 @@
         </p:nvSpPr>
         <p:spPr/>
         <p:txBody>
-          <a:bodyPr>
-            <a:normAutofit/>
-          </a:bodyPr>
+          <a:bodyPr/>
           <a:lstStyle/>
           <a:p>
             <a:r>
               <a:rPr lang="en-US" dirty="0" smtClean="0"/>
-              <a:t>GIS &amp; </a:t>
-            </a:r>
-            <a:r>
-              <a:rPr lang="en-US" dirty="0"/>
-              <a:t>Python introduction</a:t>
-            </a:r>
-            <a:br>
-              <a:rPr lang="en-US" dirty="0"/>
-            </a:br>
-            <a:r>
-              <a:rPr lang="en-US" sz="2000" dirty="0">
-                <a:hlinkClick r:id="rId2"/>
-              </a:rPr>
-              <a:t>https://</a:t>
-            </a:r>
-            <a:r>
-              <a:rPr lang="en-US" sz="2000" dirty="0" smtClean="0">
-                <a:hlinkClick r:id="rId2"/>
-              </a:rPr>
-              <a:t>macwright.org/2012/10/31/gis-with-python-shapely-fiona.html</a:t>
-            </a:r>
-            <a:r>
-              <a:rPr lang="en-US" sz="2000" dirty="0" smtClean="0"/>
-              <a:t> </a:t>
+              <a:t>Raster data, e.g., satellite imagery</a:t>
+            </a:r>
+          </a:p>
+          <a:p>
+            <a:pPr lvl="1"/>
+            <a:r>
+              <a:rPr lang="en-US" dirty="0" smtClean="0"/>
+              <a:t>TIFF image file</a:t>
+            </a:r>
+          </a:p>
+          <a:p>
+            <a:pPr lvl="2"/>
+            <a:r>
+              <a:rPr lang="en-US" dirty="0" smtClean="0"/>
+              <a:t>1 or more raster bands</a:t>
+            </a:r>
+          </a:p>
+          <a:p>
+            <a:pPr lvl="1"/>
+            <a:r>
+              <a:rPr lang="en-US" dirty="0" smtClean="0"/>
+              <a:t>meta-data in tags</a:t>
+            </a:r>
+          </a:p>
+          <a:p>
+            <a:pPr lvl="2"/>
+            <a:r>
+              <a:rPr lang="en-US" dirty="0" smtClean="0"/>
+              <a:t>coordinate reference system</a:t>
+            </a:r>
+          </a:p>
+          <a:p>
+            <a:pPr lvl="2"/>
+            <a:r>
+              <a:rPr lang="en-US" dirty="0" err="1" smtClean="0"/>
+              <a:t>geotransform</a:t>
+            </a:r>
+            <a:endParaRPr lang="en-US" dirty="0" smtClean="0"/>
+          </a:p>
+          <a:p>
+            <a:r>
+              <a:rPr lang="en-US" dirty="0" smtClean="0"/>
+              <a:t>I/O: GDAL library with Python wrapper</a:t>
             </a:r>
             <a:endParaRPr lang="en-US" dirty="0"/>
-          </a:p>
-          <a:p>
-            <a:r>
-              <a:rPr lang="en-US" dirty="0" smtClean="0"/>
-              <a:t>Fiona </a:t>
-            </a:r>
-            <a:r>
-              <a:rPr lang="en-US" dirty="0" smtClean="0"/>
-              <a:t>manual</a:t>
-            </a:r>
-            <a:r>
-              <a:rPr lang="en-US" dirty="0"/>
-              <a:t/>
-            </a:r>
-            <a:br>
-              <a:rPr lang="en-US" dirty="0"/>
-            </a:br>
-            <a:r>
-              <a:rPr lang="en-US" sz="2000" dirty="0">
-                <a:hlinkClick r:id="rId3"/>
-              </a:rPr>
-              <a:t>http://</a:t>
-            </a:r>
-            <a:r>
-              <a:rPr lang="en-US" sz="2000" dirty="0" smtClean="0">
-                <a:hlinkClick r:id="rId3"/>
-              </a:rPr>
-              <a:t>toblerity.org/fiona/index.html</a:t>
-            </a:r>
-            <a:endParaRPr lang="en-US" sz="2000" dirty="0" smtClean="0"/>
-          </a:p>
-          <a:p>
-            <a:r>
-              <a:rPr lang="en-US" dirty="0" smtClean="0"/>
-              <a:t>Editing/displaying </a:t>
-            </a:r>
-            <a:r>
-              <a:rPr lang="en-US" dirty="0" err="1" smtClean="0"/>
-              <a:t>GeoJSON</a:t>
-            </a:r>
-            <a:r>
-              <a:rPr lang="en-US" dirty="0" smtClean="0"/>
-              <a:t/>
-            </a:r>
-            <a:br>
-              <a:rPr lang="en-US" dirty="0" smtClean="0"/>
-            </a:br>
-            <a:r>
-              <a:rPr lang="en-US" sz="2000" dirty="0" smtClean="0">
-                <a:hlinkClick r:id="rId4"/>
-              </a:rPr>
-              <a:t>http://geojson.io/</a:t>
-            </a:r>
-            <a:r>
-              <a:rPr lang="en-US" sz="2000" dirty="0" smtClean="0"/>
-              <a:t> </a:t>
-            </a:r>
-          </a:p>
-          <a:p>
-            <a:r>
-              <a:rPr lang="en-US" dirty="0" smtClean="0"/>
-              <a:t>Folium </a:t>
-            </a:r>
-            <a:r>
-              <a:rPr lang="en-US" dirty="0"/>
-              <a:t>manual</a:t>
-            </a:r>
-            <a:br>
-              <a:rPr lang="en-US" dirty="0"/>
-            </a:br>
-            <a:r>
-              <a:rPr lang="en-US" sz="2000" dirty="0">
-                <a:hlinkClick r:id="rId5"/>
-              </a:rPr>
-              <a:t>http://python-visualization.github.io/folium/docs-master</a:t>
-            </a:r>
-            <a:r>
-              <a:rPr lang="en-US" sz="2000" dirty="0" smtClean="0">
-                <a:hlinkClick r:id="rId5"/>
-              </a:rPr>
-              <a:t>/</a:t>
-            </a:r>
-            <a:r>
-              <a:rPr lang="en-US" sz="2000" dirty="0" smtClean="0"/>
-              <a:t> </a:t>
-            </a:r>
-            <a:endParaRPr lang="en-US" dirty="0"/>
-          </a:p>
-          <a:p>
-            <a:r>
-              <a:rPr lang="en-US" dirty="0" smtClean="0"/>
-              <a:t>Shapely manual</a:t>
-            </a:r>
-            <a:br>
-              <a:rPr lang="en-US" dirty="0" smtClean="0"/>
-            </a:br>
-            <a:r>
-              <a:rPr lang="en-US" sz="2000" dirty="0">
-                <a:hlinkClick r:id="rId6"/>
-              </a:rPr>
-              <a:t>https://shapely.readthedocs.io/en/latest</a:t>
-            </a:r>
-            <a:r>
-              <a:rPr lang="en-US" sz="2000" dirty="0" smtClean="0">
-                <a:hlinkClick r:id="rId6"/>
-              </a:rPr>
-              <a:t>/</a:t>
-            </a:r>
-            <a:endParaRPr lang="en-US" sz="2000" dirty="0" smtClean="0"/>
-          </a:p>
-          <a:p>
-            <a:endParaRPr lang="en-US" dirty="0" smtClean="0"/>
           </a:p>
         </p:txBody>
       </p:sp>
@@ -8445,6 +8353,2135 @@
               </a:rPr>
               <a:pPr/>
               <a:t>15</a:t>
+            </a:fld>
+            <a:endParaRPr lang="nl-BE">
+              <a:solidFill>
+                <a:prstClr val="black">
+                  <a:tint val="75000"/>
+                </a:prstClr>
+              </a:solidFill>
+            </a:endParaRPr>
+          </a:p>
+        </p:txBody>
+      </p:sp>
+    </p:spTree>
+    <p:extLst>
+      <p:ext uri="{BB962C8B-B14F-4D97-AF65-F5344CB8AC3E}">
+        <p14:creationId xmlns:p14="http://schemas.microsoft.com/office/powerpoint/2010/main" val="2949198633"/>
+      </p:ext>
+    </p:extLst>
+  </p:cSld>
+  <p:clrMapOvr>
+    <a:masterClrMapping/>
+  </p:clrMapOvr>
+  <p:timing>
+    <p:tnLst>
+      <p:par>
+        <p:cTn id="1" dur="indefinite" restart="never" nodeType="tmRoot">
+          <p:childTnLst>
+            <p:seq concurrent="1" nextAc="seek">
+              <p:cTn id="2" dur="indefinite" nodeType="mainSeq">
+                <p:childTnLst>
+                  <p:par>
+                    <p:cTn id="3" fill="hold">
+                      <p:stCondLst>
+                        <p:cond delay="indefinite"/>
+                        <p:cond evt="onBegin" delay="0">
+                          <p:tn val="2"/>
+                        </p:cond>
+                      </p:stCondLst>
+                      <p:childTnLst>
+                        <p:par>
+                          <p:cTn id="4" fill="hold">
+                            <p:stCondLst>
+                              <p:cond delay="0"/>
+                            </p:stCondLst>
+                            <p:childTnLst>
+                              <p:par>
+                                <p:cTn id="5" presetID="1" presetClass="entr" presetSubtype="0" fill="hold" grpId="0" nodeType="withEffect">
+                                  <p:stCondLst>
+                                    <p:cond delay="0"/>
+                                  </p:stCondLst>
+                                  <p:childTnLst>
+                                    <p:set>
+                                      <p:cBhvr>
+                                        <p:cTn id="6" dur="1" fill="hold">
+                                          <p:stCondLst>
+                                            <p:cond delay="0"/>
+                                          </p:stCondLst>
+                                        </p:cTn>
+                                        <p:tgtEl>
+                                          <p:spTgt spid="3">
+                                            <p:txEl>
+                                              <p:pRg st="0" end="0"/>
+                                            </p:txEl>
+                                          </p:spTgt>
+                                        </p:tgtEl>
+                                        <p:attrNameLst>
+                                          <p:attrName>style.visibility</p:attrName>
+                                        </p:attrNameLst>
+                                      </p:cBhvr>
+                                      <p:to>
+                                        <p:strVal val="visible"/>
+                                      </p:to>
+                                    </p:set>
+                                  </p:childTnLst>
+                                </p:cTn>
+                              </p:par>
+                              <p:par>
+                                <p:cTn id="7" presetID="1" presetClass="entr" presetSubtype="0" fill="hold" grpId="0" nodeType="withEffect">
+                                  <p:stCondLst>
+                                    <p:cond delay="0"/>
+                                  </p:stCondLst>
+                                  <p:childTnLst>
+                                    <p:set>
+                                      <p:cBhvr>
+                                        <p:cTn id="8" dur="1" fill="hold">
+                                          <p:stCondLst>
+                                            <p:cond delay="0"/>
+                                          </p:stCondLst>
+                                        </p:cTn>
+                                        <p:tgtEl>
+                                          <p:spTgt spid="3">
+                                            <p:txEl>
+                                              <p:pRg st="1" end="1"/>
+                                            </p:txEl>
+                                          </p:spTgt>
+                                        </p:tgtEl>
+                                        <p:attrNameLst>
+                                          <p:attrName>style.visibility</p:attrName>
+                                        </p:attrNameLst>
+                                      </p:cBhvr>
+                                      <p:to>
+                                        <p:strVal val="visible"/>
+                                      </p:to>
+                                    </p:set>
+                                  </p:childTnLst>
+                                </p:cTn>
+                              </p:par>
+                              <p:par>
+                                <p:cTn id="9" presetID="1" presetClass="entr" presetSubtype="0" fill="hold" grpId="0" nodeType="withEffect">
+                                  <p:stCondLst>
+                                    <p:cond delay="0"/>
+                                  </p:stCondLst>
+                                  <p:childTnLst>
+                                    <p:set>
+                                      <p:cBhvr>
+                                        <p:cTn id="10" dur="1" fill="hold">
+                                          <p:stCondLst>
+                                            <p:cond delay="0"/>
+                                          </p:stCondLst>
+                                        </p:cTn>
+                                        <p:tgtEl>
+                                          <p:spTgt spid="3">
+                                            <p:txEl>
+                                              <p:pRg st="2" end="2"/>
+                                            </p:txEl>
+                                          </p:spTgt>
+                                        </p:tgtEl>
+                                        <p:attrNameLst>
+                                          <p:attrName>style.visibility</p:attrName>
+                                        </p:attrNameLst>
+                                      </p:cBhvr>
+                                      <p:to>
+                                        <p:strVal val="visible"/>
+                                      </p:to>
+                                    </p:set>
+                                  </p:childTnLst>
+                                </p:cTn>
+                              </p:par>
+                            </p:childTnLst>
+                          </p:cTn>
+                        </p:par>
+                      </p:childTnLst>
+                    </p:cTn>
+                  </p:par>
+                  <p:par>
+                    <p:cTn id="11" fill="hold">
+                      <p:stCondLst>
+                        <p:cond delay="indefinite"/>
+                      </p:stCondLst>
+                      <p:childTnLst>
+                        <p:par>
+                          <p:cTn id="12" fill="hold">
+                            <p:stCondLst>
+                              <p:cond delay="0"/>
+                            </p:stCondLst>
+                            <p:childTnLst>
+                              <p:par>
+                                <p:cTn id="13" presetID="1" presetClass="entr" presetSubtype="0" fill="hold" grpId="0" nodeType="clickEffect">
+                                  <p:stCondLst>
+                                    <p:cond delay="0"/>
+                                  </p:stCondLst>
+                                  <p:childTnLst>
+                                    <p:set>
+                                      <p:cBhvr>
+                                        <p:cTn id="14" dur="1" fill="hold">
+                                          <p:stCondLst>
+                                            <p:cond delay="0"/>
+                                          </p:stCondLst>
+                                        </p:cTn>
+                                        <p:tgtEl>
+                                          <p:spTgt spid="3">
+                                            <p:txEl>
+                                              <p:pRg st="3" end="3"/>
+                                            </p:txEl>
+                                          </p:spTgt>
+                                        </p:tgtEl>
+                                        <p:attrNameLst>
+                                          <p:attrName>style.visibility</p:attrName>
+                                        </p:attrNameLst>
+                                      </p:cBhvr>
+                                      <p:to>
+                                        <p:strVal val="visible"/>
+                                      </p:to>
+                                    </p:set>
+                                  </p:childTnLst>
+                                </p:cTn>
+                              </p:par>
+                              <p:par>
+                                <p:cTn id="15" presetID="1" presetClass="entr" presetSubtype="0" fill="hold" grpId="0" nodeType="withEffect">
+                                  <p:stCondLst>
+                                    <p:cond delay="0"/>
+                                  </p:stCondLst>
+                                  <p:childTnLst>
+                                    <p:set>
+                                      <p:cBhvr>
+                                        <p:cTn id="16" dur="1" fill="hold">
+                                          <p:stCondLst>
+                                            <p:cond delay="0"/>
+                                          </p:stCondLst>
+                                        </p:cTn>
+                                        <p:tgtEl>
+                                          <p:spTgt spid="3">
+                                            <p:txEl>
+                                              <p:pRg st="4" end="4"/>
+                                            </p:txEl>
+                                          </p:spTgt>
+                                        </p:tgtEl>
+                                        <p:attrNameLst>
+                                          <p:attrName>style.visibility</p:attrName>
+                                        </p:attrNameLst>
+                                      </p:cBhvr>
+                                      <p:to>
+                                        <p:strVal val="visible"/>
+                                      </p:to>
+                                    </p:set>
+                                  </p:childTnLst>
+                                </p:cTn>
+                              </p:par>
+                              <p:par>
+                                <p:cTn id="17" presetID="1" presetClass="entr" presetSubtype="0" fill="hold" grpId="0" nodeType="withEffect">
+                                  <p:stCondLst>
+                                    <p:cond delay="0"/>
+                                  </p:stCondLst>
+                                  <p:childTnLst>
+                                    <p:set>
+                                      <p:cBhvr>
+                                        <p:cTn id="18" dur="1" fill="hold">
+                                          <p:stCondLst>
+                                            <p:cond delay="0"/>
+                                          </p:stCondLst>
+                                        </p:cTn>
+                                        <p:tgtEl>
+                                          <p:spTgt spid="3">
+                                            <p:txEl>
+                                              <p:pRg st="5" end="5"/>
+                                            </p:txEl>
+                                          </p:spTgt>
+                                        </p:tgtEl>
+                                        <p:attrNameLst>
+                                          <p:attrName>style.visibility</p:attrName>
+                                        </p:attrNameLst>
+                                      </p:cBhvr>
+                                      <p:to>
+                                        <p:strVal val="visible"/>
+                                      </p:to>
+                                    </p:set>
+                                  </p:childTnLst>
+                                </p:cTn>
+                              </p:par>
+                            </p:childTnLst>
+                          </p:cTn>
+                        </p:par>
+                      </p:childTnLst>
+                    </p:cTn>
+                  </p:par>
+                  <p:par>
+                    <p:cTn id="19" fill="hold">
+                      <p:stCondLst>
+                        <p:cond delay="indefinite"/>
+                      </p:stCondLst>
+                      <p:childTnLst>
+                        <p:par>
+                          <p:cTn id="20" fill="hold">
+                            <p:stCondLst>
+                              <p:cond delay="0"/>
+                            </p:stCondLst>
+                            <p:childTnLst>
+                              <p:par>
+                                <p:cTn id="21" presetID="1" presetClass="entr" presetSubtype="0" fill="hold" grpId="0" nodeType="clickEffect">
+                                  <p:stCondLst>
+                                    <p:cond delay="0"/>
+                                  </p:stCondLst>
+                                  <p:childTnLst>
+                                    <p:set>
+                                      <p:cBhvr>
+                                        <p:cTn id="22" dur="1" fill="hold">
+                                          <p:stCondLst>
+                                            <p:cond delay="0"/>
+                                          </p:stCondLst>
+                                        </p:cTn>
+                                        <p:tgtEl>
+                                          <p:spTgt spid="3">
+                                            <p:txEl>
+                                              <p:pRg st="6" end="6"/>
+                                            </p:txEl>
+                                          </p:spTgt>
+                                        </p:tgtEl>
+                                        <p:attrNameLst>
+                                          <p:attrName>style.visibility</p:attrName>
+                                        </p:attrNameLst>
+                                      </p:cBhvr>
+                                      <p:to>
+                                        <p:strVal val="visible"/>
+                                      </p:to>
+                                    </p:set>
+                                  </p:childTnLst>
+                                </p:cTn>
+                              </p:par>
+                            </p:childTnLst>
+                          </p:cTn>
+                        </p:par>
+                      </p:childTnLst>
+                    </p:cTn>
+                  </p:par>
+                </p:childTnLst>
+              </p:cTn>
+              <p:prevCondLst>
+                <p:cond evt="onPrev" delay="0">
+                  <p:tgtEl>
+                    <p:sldTgt/>
+                  </p:tgtEl>
+                </p:cond>
+              </p:prevCondLst>
+              <p:nextCondLst>
+                <p:cond evt="onNext" delay="0">
+                  <p:tgtEl>
+                    <p:sldTgt/>
+                  </p:tgtEl>
+                </p:cond>
+              </p:nextCondLst>
+            </p:seq>
+          </p:childTnLst>
+        </p:cTn>
+      </p:par>
+    </p:tnLst>
+    <p:bldLst>
+      <p:bldP spid="3" grpId="0" uiExpand="1" build="p" bldLvl="2"/>
+    </p:bldLst>
+  </p:timing>
+</p:sld>
+</file>
+
+<file path=ppt/slides/slide16.xml><?xml version="1.0" encoding="utf-8"?>
+<p:sld xmlns:a="http://schemas.openxmlformats.org/drawingml/2006/main" xmlns:r="http://schemas.openxmlformats.org/officeDocument/2006/relationships" xmlns:p="http://schemas.openxmlformats.org/presentationml/2006/main">
+  <p:cSld>
+    <p:spTree>
+      <p:nvGrpSpPr>
+        <p:cNvPr id="1" name=""/>
+        <p:cNvGrpSpPr/>
+        <p:nvPr/>
+      </p:nvGrpSpPr>
+      <p:grpSpPr>
+        <a:xfrm>
+          <a:off x="0" y="0"/>
+          <a:ext cx="0" cy="0"/>
+          <a:chOff x="0" y="0"/>
+          <a:chExt cx="0" cy="0"/>
+        </a:xfrm>
+      </p:grpSpPr>
+      <p:sp>
+        <p:nvSpPr>
+          <p:cNvPr id="2" name="Title 1"/>
+          <p:cNvSpPr>
+            <a:spLocks noGrp="1"/>
+          </p:cNvSpPr>
+          <p:nvPr>
+            <p:ph type="title"/>
+          </p:nvPr>
+        </p:nvSpPr>
+        <p:spPr/>
+        <p:txBody>
+          <a:bodyPr/>
+          <a:lstStyle/>
+          <a:p>
+            <a:r>
+              <a:rPr lang="en-US" dirty="0" smtClean="0"/>
+              <a:t>Reading </a:t>
+            </a:r>
+            <a:r>
+              <a:rPr lang="en-US" dirty="0" err="1" smtClean="0"/>
+              <a:t>GeoTIFF</a:t>
+            </a:r>
+            <a:endParaRPr lang="en-US" dirty="0"/>
+          </a:p>
+        </p:txBody>
+      </p:sp>
+      <p:sp>
+        <p:nvSpPr>
+          <p:cNvPr id="3" name="Content Placeholder 2"/>
+          <p:cNvSpPr>
+            <a:spLocks noGrp="1"/>
+          </p:cNvSpPr>
+          <p:nvPr>
+            <p:ph idx="1"/>
+          </p:nvPr>
+        </p:nvSpPr>
+        <p:spPr/>
+        <p:txBody>
+          <a:bodyPr>
+            <a:normAutofit lnSpcReduction="10000"/>
+          </a:bodyPr>
+          <a:lstStyle/>
+          <a:p>
+            <a:r>
+              <a:rPr lang="en-US" dirty="0" smtClean="0"/>
+              <a:t>Open &amp; read </a:t>
+            </a:r>
+            <a:r>
+              <a:rPr lang="en-US" dirty="0" err="1" smtClean="0"/>
+              <a:t>GeoTIFF</a:t>
+            </a:r>
+            <a:endParaRPr lang="en-US" dirty="0" smtClean="0"/>
+          </a:p>
+          <a:p>
+            <a:endParaRPr lang="en-US" dirty="0"/>
+          </a:p>
+          <a:p>
+            <a:r>
+              <a:rPr lang="en-US" dirty="0" smtClean="0"/>
+              <a:t>Number raster bands: </a:t>
+            </a:r>
+            <a:r>
+              <a:rPr lang="en-US" dirty="0" err="1" smtClean="0">
+                <a:latin typeface="Courier New" panose="02070309020205020404" pitchFamily="49" charset="0"/>
+                <a:cs typeface="Courier New" panose="02070309020205020404" pitchFamily="49" charset="0"/>
+              </a:rPr>
+              <a:t>data.RasterCount</a:t>
+            </a:r>
+            <a:endParaRPr lang="en-US" dirty="0" smtClean="0">
+              <a:latin typeface="Courier New" panose="02070309020205020404" pitchFamily="49" charset="0"/>
+              <a:cs typeface="Courier New" panose="02070309020205020404" pitchFamily="49" charset="0"/>
+            </a:endParaRPr>
+          </a:p>
+          <a:p>
+            <a:r>
+              <a:rPr lang="en-US" dirty="0" smtClean="0">
+                <a:cs typeface="Courier New" panose="02070309020205020404" pitchFamily="49" charset="0"/>
+              </a:rPr>
+              <a:t>Raster band as </a:t>
+            </a:r>
+            <a:r>
+              <a:rPr lang="en-US" dirty="0" err="1" smtClean="0">
+                <a:cs typeface="Courier New" panose="02070309020205020404" pitchFamily="49" charset="0"/>
+              </a:rPr>
+              <a:t>numpy</a:t>
+            </a:r>
+            <a:r>
+              <a:rPr lang="en-US" dirty="0" smtClean="0">
+                <a:cs typeface="Courier New" panose="02070309020205020404" pitchFamily="49" charset="0"/>
+              </a:rPr>
+              <a:t> array</a:t>
+            </a:r>
+          </a:p>
+          <a:p>
+            <a:endParaRPr lang="en-US" dirty="0">
+              <a:cs typeface="Courier New" panose="02070309020205020404" pitchFamily="49" charset="0"/>
+            </a:endParaRPr>
+          </a:p>
+          <a:p>
+            <a:r>
+              <a:rPr lang="en-US" dirty="0"/>
+              <a:t>Projection: </a:t>
+            </a:r>
+            <a:r>
+              <a:rPr lang="en-US" dirty="0" err="1">
+                <a:latin typeface="Courier New" panose="02070309020205020404" pitchFamily="49" charset="0"/>
+                <a:cs typeface="Courier New" panose="02070309020205020404" pitchFamily="49" charset="0"/>
+              </a:rPr>
+              <a:t>data.GetProjection</a:t>
+            </a:r>
+            <a:r>
+              <a:rPr lang="en-US" dirty="0">
+                <a:latin typeface="Courier New" panose="02070309020205020404" pitchFamily="49" charset="0"/>
+                <a:cs typeface="Courier New" panose="02070309020205020404" pitchFamily="49" charset="0"/>
+              </a:rPr>
+              <a:t>()</a:t>
+            </a:r>
+          </a:p>
+          <a:p>
+            <a:r>
+              <a:rPr lang="en-US" dirty="0" err="1"/>
+              <a:t>GeoTransform</a:t>
+            </a:r>
+            <a:r>
+              <a:rPr lang="en-US" dirty="0"/>
+              <a:t>: </a:t>
+            </a:r>
+            <a:r>
+              <a:rPr lang="en-US" dirty="0" err="1">
+                <a:latin typeface="Courier New" panose="02070309020205020404" pitchFamily="49" charset="0"/>
+                <a:cs typeface="Courier New" panose="02070309020205020404" pitchFamily="49" charset="0"/>
+              </a:rPr>
+              <a:t>data.GetGeoTransform</a:t>
+            </a:r>
+            <a:r>
+              <a:rPr lang="en-US" dirty="0">
+                <a:latin typeface="Courier New" panose="02070309020205020404" pitchFamily="49" charset="0"/>
+                <a:cs typeface="Courier New" panose="02070309020205020404" pitchFamily="49" charset="0"/>
+              </a:rPr>
+              <a:t>()</a:t>
+            </a:r>
+          </a:p>
+          <a:p>
+            <a:endParaRPr lang="en-US" dirty="0">
+              <a:cs typeface="Courier New" panose="02070309020205020404" pitchFamily="49" charset="0"/>
+            </a:endParaRPr>
+          </a:p>
+        </p:txBody>
+      </p:sp>
+      <p:sp>
+        <p:nvSpPr>
+          <p:cNvPr id="4" name="Slide Number Placeholder 3"/>
+          <p:cNvSpPr>
+            <a:spLocks noGrp="1"/>
+          </p:cNvSpPr>
+          <p:nvPr>
+            <p:ph type="sldNum" sz="quarter" idx="12"/>
+          </p:nvPr>
+        </p:nvSpPr>
+        <p:spPr/>
+        <p:txBody>
+          <a:bodyPr/>
+          <a:lstStyle/>
+          <a:p>
+            <a:fld id="{5A209D72-2E9D-49B0-8977-41DCCC66C0BB}" type="slidenum">
+              <a:rPr lang="nl-BE" smtClean="0">
+                <a:solidFill>
+                  <a:prstClr val="black">
+                    <a:tint val="75000"/>
+                  </a:prstClr>
+                </a:solidFill>
+              </a:rPr>
+              <a:pPr/>
+              <a:t>16</a:t>
+            </a:fld>
+            <a:endParaRPr lang="nl-BE">
+              <a:solidFill>
+                <a:prstClr val="black">
+                  <a:tint val="75000"/>
+                </a:prstClr>
+              </a:solidFill>
+            </a:endParaRPr>
+          </a:p>
+        </p:txBody>
+      </p:sp>
+      <p:sp>
+        <p:nvSpPr>
+          <p:cNvPr id="5" name="TextBox 4"/>
+          <p:cNvSpPr txBox="1"/>
+          <p:nvPr/>
+        </p:nvSpPr>
+        <p:spPr>
+          <a:xfrm>
+            <a:off x="534838" y="2079397"/>
+            <a:ext cx="5089585" cy="646331"/>
+          </a:xfrm>
+          <a:prstGeom prst="rect">
+            <a:avLst/>
+          </a:prstGeom>
+          <a:solidFill>
+            <a:schemeClr val="accent4">
+              <a:lumMod val="40000"/>
+              <a:lumOff val="60000"/>
+            </a:schemeClr>
+          </a:solidFill>
+        </p:spPr>
+        <p:txBody>
+          <a:bodyPr wrap="square" rtlCol="0">
+            <a:spAutoFit/>
+          </a:bodyPr>
+          <a:lstStyle/>
+          <a:p>
+            <a:r>
+              <a:rPr lang="en-US" dirty="0" smtClean="0">
+                <a:latin typeface="Courier New" pitchFamily="49" charset="0"/>
+                <a:cs typeface="Courier New" pitchFamily="49" charset="0"/>
+              </a:rPr>
+              <a:t>import </a:t>
+            </a:r>
+            <a:r>
+              <a:rPr lang="en-US" dirty="0" err="1" smtClean="0">
+                <a:latin typeface="Courier New" pitchFamily="49" charset="0"/>
+                <a:cs typeface="Courier New" pitchFamily="49" charset="0"/>
+              </a:rPr>
+              <a:t>gdal</a:t>
+            </a:r>
+            <a:endParaRPr lang="en-US" dirty="0" smtClean="0">
+              <a:latin typeface="Courier New" pitchFamily="49" charset="0"/>
+              <a:cs typeface="Courier New" pitchFamily="49" charset="0"/>
+            </a:endParaRPr>
+          </a:p>
+          <a:p>
+            <a:r>
+              <a:rPr lang="en-US" dirty="0" smtClean="0">
+                <a:latin typeface="Courier New" pitchFamily="49" charset="0"/>
+                <a:cs typeface="Courier New" pitchFamily="49" charset="0"/>
+              </a:rPr>
+              <a:t>data = </a:t>
+            </a:r>
+            <a:r>
+              <a:rPr lang="en-US" dirty="0" err="1" smtClean="0">
+                <a:latin typeface="Courier New" pitchFamily="49" charset="0"/>
+                <a:cs typeface="Courier New" pitchFamily="49" charset="0"/>
+              </a:rPr>
+              <a:t>gdal.Open</a:t>
+            </a:r>
+            <a:r>
+              <a:rPr lang="en-US" dirty="0" smtClean="0">
+                <a:latin typeface="Courier New" pitchFamily="49" charset="0"/>
+                <a:cs typeface="Courier New" pitchFamily="49" charset="0"/>
+              </a:rPr>
+              <a:t>(</a:t>
+            </a:r>
+            <a:r>
+              <a:rPr lang="en-US" dirty="0" err="1" smtClean="0">
+                <a:latin typeface="Courier New" pitchFamily="49" charset="0"/>
+                <a:cs typeface="Courier New" pitchFamily="49" charset="0"/>
+              </a:rPr>
+              <a:t>file_name</a:t>
+            </a:r>
+            <a:r>
+              <a:rPr lang="en-US" dirty="0" smtClean="0">
+                <a:latin typeface="Courier New" pitchFamily="49" charset="0"/>
+                <a:cs typeface="Courier New" pitchFamily="49" charset="0"/>
+              </a:rPr>
+              <a:t>)</a:t>
+            </a:r>
+            <a:endParaRPr lang="en-US" dirty="0" smtClean="0">
+              <a:latin typeface="Courier New" pitchFamily="49" charset="0"/>
+              <a:cs typeface="Courier New" pitchFamily="49" charset="0"/>
+            </a:endParaRPr>
+          </a:p>
+        </p:txBody>
+      </p:sp>
+      <p:sp>
+        <p:nvSpPr>
+          <p:cNvPr id="7" name="TextBox 6"/>
+          <p:cNvSpPr txBox="1"/>
+          <p:nvPr/>
+        </p:nvSpPr>
+        <p:spPr>
+          <a:xfrm>
+            <a:off x="534838" y="3732789"/>
+            <a:ext cx="7168551" cy="369332"/>
+          </a:xfrm>
+          <a:prstGeom prst="rect">
+            <a:avLst/>
+          </a:prstGeom>
+          <a:solidFill>
+            <a:schemeClr val="accent4">
+              <a:lumMod val="40000"/>
+              <a:lumOff val="60000"/>
+            </a:schemeClr>
+          </a:solidFill>
+        </p:spPr>
+        <p:txBody>
+          <a:bodyPr wrap="square" rtlCol="0">
+            <a:spAutoFit/>
+          </a:bodyPr>
+          <a:lstStyle/>
+          <a:p>
+            <a:r>
+              <a:rPr lang="en-US" dirty="0" err="1" smtClean="0">
+                <a:latin typeface="Courier New" pitchFamily="49" charset="0"/>
+                <a:cs typeface="Courier New" pitchFamily="49" charset="0"/>
+              </a:rPr>
+              <a:t>raster_band</a:t>
+            </a:r>
+            <a:r>
+              <a:rPr lang="en-US" dirty="0" smtClean="0">
+                <a:latin typeface="Courier New" pitchFamily="49" charset="0"/>
+                <a:cs typeface="Courier New" pitchFamily="49" charset="0"/>
+              </a:rPr>
+              <a:t> = </a:t>
+            </a:r>
+            <a:r>
+              <a:rPr lang="en-US" dirty="0" err="1" smtClean="0">
+                <a:latin typeface="Courier New" pitchFamily="49" charset="0"/>
+                <a:cs typeface="Courier New" pitchFamily="49" charset="0"/>
+              </a:rPr>
+              <a:t>data.GetRasterBand</a:t>
+            </a:r>
+            <a:r>
+              <a:rPr lang="en-US" dirty="0" smtClean="0">
+                <a:latin typeface="Courier New" pitchFamily="49" charset="0"/>
+                <a:cs typeface="Courier New" pitchFamily="49" charset="0"/>
+              </a:rPr>
+              <a:t>(1).</a:t>
+            </a:r>
+            <a:r>
+              <a:rPr lang="en-US" dirty="0" err="1" smtClean="0">
+                <a:latin typeface="Courier New" pitchFamily="49" charset="0"/>
+                <a:cs typeface="Courier New" pitchFamily="49" charset="0"/>
+              </a:rPr>
+              <a:t>ReadAsArray</a:t>
+            </a:r>
+            <a:r>
+              <a:rPr lang="en-US" dirty="0" smtClean="0">
+                <a:latin typeface="Courier New" pitchFamily="49" charset="0"/>
+                <a:cs typeface="Courier New" pitchFamily="49" charset="0"/>
+              </a:rPr>
+              <a:t>()</a:t>
+            </a:r>
+            <a:endParaRPr lang="en-US" dirty="0" smtClean="0">
+              <a:latin typeface="Courier New" pitchFamily="49" charset="0"/>
+              <a:cs typeface="Courier New" pitchFamily="49" charset="0"/>
+            </a:endParaRPr>
+          </a:p>
+        </p:txBody>
+      </p:sp>
+      <p:grpSp>
+        <p:nvGrpSpPr>
+          <p:cNvPr id="8" name="Group 7"/>
+          <p:cNvGrpSpPr/>
+          <p:nvPr/>
+        </p:nvGrpSpPr>
+        <p:grpSpPr>
+          <a:xfrm>
+            <a:off x="5119916" y="3226035"/>
+            <a:ext cx="2919327" cy="835436"/>
+            <a:chOff x="4999197" y="3383033"/>
+            <a:chExt cx="2919327" cy="835436"/>
+          </a:xfrm>
+        </p:grpSpPr>
+        <p:sp>
+          <p:nvSpPr>
+            <p:cNvPr id="9" name="Rectangle 8"/>
+            <p:cNvSpPr/>
+            <p:nvPr/>
+          </p:nvSpPr>
+          <p:spPr>
+            <a:xfrm>
+              <a:off x="4999197" y="3930437"/>
+              <a:ext cx="156709" cy="288032"/>
+            </a:xfrm>
+            <a:prstGeom prst="rect">
+              <a:avLst/>
+            </a:prstGeom>
+            <a:noFill/>
+            <a:ln>
+              <a:solidFill>
+                <a:srgbClr val="C00000"/>
+              </a:solidFill>
+            </a:ln>
+          </p:spPr>
+          <p:style>
+            <a:lnRef idx="2">
+              <a:schemeClr val="accent1">
+                <a:shade val="50000"/>
+              </a:schemeClr>
+            </a:lnRef>
+            <a:fillRef idx="1">
+              <a:schemeClr val="accent1"/>
+            </a:fillRef>
+            <a:effectRef idx="0">
+              <a:schemeClr val="accent1"/>
+            </a:effectRef>
+            <a:fontRef idx="minor">
+              <a:schemeClr val="lt1"/>
+            </a:fontRef>
+          </p:style>
+          <p:txBody>
+            <a:bodyPr rtlCol="0" anchor="ctr"/>
+            <a:lstStyle/>
+            <a:p>
+              <a:pPr algn="ctr"/>
+              <a:endParaRPr lang="nl-BE"/>
+            </a:p>
+          </p:txBody>
+        </p:sp>
+        <p:sp>
+          <p:nvSpPr>
+            <p:cNvPr id="10" name="TextBox 9"/>
+            <p:cNvSpPr txBox="1"/>
+            <p:nvPr/>
+          </p:nvSpPr>
+          <p:spPr>
+            <a:xfrm>
+              <a:off x="6446390" y="3383033"/>
+              <a:ext cx="1472134" cy="369332"/>
+            </a:xfrm>
+            <a:prstGeom prst="rect">
+              <a:avLst/>
+            </a:prstGeom>
+            <a:solidFill>
+              <a:schemeClr val="bg1"/>
+            </a:solidFill>
+            <a:ln>
+              <a:solidFill>
+                <a:srgbClr val="C00000"/>
+              </a:solidFill>
+            </a:ln>
+          </p:spPr>
+          <p:txBody>
+            <a:bodyPr wrap="none" rtlCol="0">
+              <a:spAutoFit/>
+            </a:bodyPr>
+            <a:lstStyle/>
+            <a:p>
+              <a:r>
+                <a:rPr lang="en-US" dirty="0" smtClean="0">
+                  <a:solidFill>
+                    <a:srgbClr val="C00000"/>
+                  </a:solidFill>
+                </a:rPr>
+                <a:t>count from 1!</a:t>
+              </a:r>
+              <a:endParaRPr lang="nl-BE" dirty="0">
+                <a:solidFill>
+                  <a:srgbClr val="C00000"/>
+                </a:solidFill>
+              </a:endParaRPr>
+            </a:p>
+          </p:txBody>
+        </p:sp>
+        <p:cxnSp>
+          <p:nvCxnSpPr>
+            <p:cNvPr id="11" name="Straight Arrow Connector 10"/>
+            <p:cNvCxnSpPr>
+              <a:stCxn id="10" idx="1"/>
+              <a:endCxn id="9" idx="3"/>
+            </p:cNvCxnSpPr>
+            <p:nvPr/>
+          </p:nvCxnSpPr>
+          <p:spPr>
+            <a:xfrm flipH="1">
+              <a:off x="5155906" y="3567699"/>
+              <a:ext cx="1290484" cy="506754"/>
+            </a:xfrm>
+            <a:prstGeom prst="straightConnector1">
+              <a:avLst/>
+            </a:prstGeom>
+            <a:ln w="19050">
+              <a:solidFill>
+                <a:srgbClr val="C00000"/>
+              </a:solidFill>
+              <a:tailEnd type="stealth" w="lg" len="lg"/>
+            </a:ln>
+          </p:spPr>
+          <p:style>
+            <a:lnRef idx="1">
+              <a:schemeClr val="accent1"/>
+            </a:lnRef>
+            <a:fillRef idx="0">
+              <a:schemeClr val="accent1"/>
+            </a:fillRef>
+            <a:effectRef idx="0">
+              <a:schemeClr val="accent1"/>
+            </a:effectRef>
+            <a:fontRef idx="minor">
+              <a:schemeClr val="tx1"/>
+            </a:fontRef>
+          </p:style>
+        </p:cxnSp>
+      </p:grpSp>
+      <p:pic>
+        <p:nvPicPr>
+          <p:cNvPr id="14" name="Picture 13"/>
+          <p:cNvPicPr>
+            <a:picLocks noChangeAspect="1"/>
+          </p:cNvPicPr>
+          <p:nvPr/>
+        </p:nvPicPr>
+        <p:blipFill rotWithShape="1">
+          <a:blip r:embed="rId2">
+            <a:extLst>
+              <a:ext uri="{28A0092B-C50C-407E-A947-70E740481C1C}">
+                <a14:useLocalDpi xmlns:a14="http://schemas.microsoft.com/office/drawing/2010/main" val="0"/>
+              </a:ext>
+            </a:extLst>
+          </a:blip>
+          <a:srcRect l="14493" t="2200" r="2331" b="8702"/>
+          <a:stretch/>
+        </p:blipFill>
+        <p:spPr>
+          <a:xfrm>
+            <a:off x="6573328" y="4770407"/>
+            <a:ext cx="2035834" cy="2054861"/>
+          </a:xfrm>
+          <a:prstGeom prst="rect">
+            <a:avLst/>
+          </a:prstGeom>
+        </p:spPr>
+      </p:pic>
+    </p:spTree>
+    <p:extLst>
+      <p:ext uri="{BB962C8B-B14F-4D97-AF65-F5344CB8AC3E}">
+        <p14:creationId xmlns:p14="http://schemas.microsoft.com/office/powerpoint/2010/main" val="3850822376"/>
+      </p:ext>
+    </p:extLst>
+  </p:cSld>
+  <p:clrMapOvr>
+    <a:masterClrMapping/>
+  </p:clrMapOvr>
+  <p:timing>
+    <p:tnLst>
+      <p:par>
+        <p:cTn id="1" dur="indefinite" restart="never" nodeType="tmRoot">
+          <p:childTnLst>
+            <p:seq concurrent="1" nextAc="seek">
+              <p:cTn id="2" dur="indefinite" nodeType="mainSeq">
+                <p:childTnLst>
+                  <p:par>
+                    <p:cTn id="3" fill="hold">
+                      <p:stCondLst>
+                        <p:cond delay="indefinite"/>
+                      </p:stCondLst>
+                      <p:childTnLst>
+                        <p:par>
+                          <p:cTn id="4" fill="hold">
+                            <p:stCondLst>
+                              <p:cond delay="0"/>
+                            </p:stCondLst>
+                            <p:childTnLst>
+                              <p:par>
+                                <p:cTn id="5" presetID="1" presetClass="entr" presetSubtype="0" fill="hold" grpId="0" nodeType="clickEffect">
+                                  <p:stCondLst>
+                                    <p:cond delay="0"/>
+                                  </p:stCondLst>
+                                  <p:childTnLst>
+                                    <p:set>
+                                      <p:cBhvr>
+                                        <p:cTn id="6" dur="1" fill="hold">
+                                          <p:stCondLst>
+                                            <p:cond delay="0"/>
+                                          </p:stCondLst>
+                                        </p:cTn>
+                                        <p:tgtEl>
+                                          <p:spTgt spid="3">
+                                            <p:txEl>
+                                              <p:pRg st="0" end="0"/>
+                                            </p:txEl>
+                                          </p:spTgt>
+                                        </p:tgtEl>
+                                        <p:attrNameLst>
+                                          <p:attrName>style.visibility</p:attrName>
+                                        </p:attrNameLst>
+                                      </p:cBhvr>
+                                      <p:to>
+                                        <p:strVal val="visible"/>
+                                      </p:to>
+                                    </p:set>
+                                  </p:childTnLst>
+                                </p:cTn>
+                              </p:par>
+                              <p:par>
+                                <p:cTn id="7" presetID="1" presetClass="entr" presetSubtype="0" fill="hold" grpId="0" nodeType="withEffect">
+                                  <p:stCondLst>
+                                    <p:cond delay="0"/>
+                                  </p:stCondLst>
+                                  <p:childTnLst>
+                                    <p:set>
+                                      <p:cBhvr>
+                                        <p:cTn id="8" dur="1" fill="hold">
+                                          <p:stCondLst>
+                                            <p:cond delay="0"/>
+                                          </p:stCondLst>
+                                        </p:cTn>
+                                        <p:tgtEl>
+                                          <p:spTgt spid="5"/>
+                                        </p:tgtEl>
+                                        <p:attrNameLst>
+                                          <p:attrName>style.visibility</p:attrName>
+                                        </p:attrNameLst>
+                                      </p:cBhvr>
+                                      <p:to>
+                                        <p:strVal val="visible"/>
+                                      </p:to>
+                                    </p:set>
+                                  </p:childTnLst>
+                                </p:cTn>
+                              </p:par>
+                            </p:childTnLst>
+                          </p:cTn>
+                        </p:par>
+                      </p:childTnLst>
+                    </p:cTn>
+                  </p:par>
+                  <p:par>
+                    <p:cTn id="9" fill="hold">
+                      <p:stCondLst>
+                        <p:cond delay="indefinite"/>
+                      </p:stCondLst>
+                      <p:childTnLst>
+                        <p:par>
+                          <p:cTn id="10" fill="hold">
+                            <p:stCondLst>
+                              <p:cond delay="0"/>
+                            </p:stCondLst>
+                            <p:childTnLst>
+                              <p:par>
+                                <p:cTn id="11" presetID="1" presetClass="entr" presetSubtype="0" fill="hold" grpId="0" nodeType="clickEffect">
+                                  <p:stCondLst>
+                                    <p:cond delay="0"/>
+                                  </p:stCondLst>
+                                  <p:childTnLst>
+                                    <p:set>
+                                      <p:cBhvr>
+                                        <p:cTn id="12" dur="1" fill="hold">
+                                          <p:stCondLst>
+                                            <p:cond delay="0"/>
+                                          </p:stCondLst>
+                                        </p:cTn>
+                                        <p:tgtEl>
+                                          <p:spTgt spid="3">
+                                            <p:txEl>
+                                              <p:pRg st="2" end="2"/>
+                                            </p:txEl>
+                                          </p:spTgt>
+                                        </p:tgtEl>
+                                        <p:attrNameLst>
+                                          <p:attrName>style.visibility</p:attrName>
+                                        </p:attrNameLst>
+                                      </p:cBhvr>
+                                      <p:to>
+                                        <p:strVal val="visible"/>
+                                      </p:to>
+                                    </p:set>
+                                  </p:childTnLst>
+                                </p:cTn>
+                              </p:par>
+                            </p:childTnLst>
+                          </p:cTn>
+                        </p:par>
+                      </p:childTnLst>
+                    </p:cTn>
+                  </p:par>
+                  <p:par>
+                    <p:cTn id="13" fill="hold">
+                      <p:stCondLst>
+                        <p:cond delay="indefinite"/>
+                      </p:stCondLst>
+                      <p:childTnLst>
+                        <p:par>
+                          <p:cTn id="14" fill="hold">
+                            <p:stCondLst>
+                              <p:cond delay="0"/>
+                            </p:stCondLst>
+                            <p:childTnLst>
+                              <p:par>
+                                <p:cTn id="15" presetID="1" presetClass="entr" presetSubtype="0" fill="hold" grpId="0" nodeType="clickEffect">
+                                  <p:stCondLst>
+                                    <p:cond delay="0"/>
+                                  </p:stCondLst>
+                                  <p:childTnLst>
+                                    <p:set>
+                                      <p:cBhvr>
+                                        <p:cTn id="16" dur="1" fill="hold">
+                                          <p:stCondLst>
+                                            <p:cond delay="0"/>
+                                          </p:stCondLst>
+                                        </p:cTn>
+                                        <p:tgtEl>
+                                          <p:spTgt spid="3">
+                                            <p:txEl>
+                                              <p:pRg st="3" end="3"/>
+                                            </p:txEl>
+                                          </p:spTgt>
+                                        </p:tgtEl>
+                                        <p:attrNameLst>
+                                          <p:attrName>style.visibility</p:attrName>
+                                        </p:attrNameLst>
+                                      </p:cBhvr>
+                                      <p:to>
+                                        <p:strVal val="visible"/>
+                                      </p:to>
+                                    </p:set>
+                                  </p:childTnLst>
+                                </p:cTn>
+                              </p:par>
+                              <p:par>
+                                <p:cTn id="17" presetID="1" presetClass="entr" presetSubtype="0" fill="hold" grpId="0" nodeType="withEffect">
+                                  <p:stCondLst>
+                                    <p:cond delay="0"/>
+                                  </p:stCondLst>
+                                  <p:childTnLst>
+                                    <p:set>
+                                      <p:cBhvr>
+                                        <p:cTn id="18" dur="1" fill="hold">
+                                          <p:stCondLst>
+                                            <p:cond delay="0"/>
+                                          </p:stCondLst>
+                                        </p:cTn>
+                                        <p:tgtEl>
+                                          <p:spTgt spid="7"/>
+                                        </p:tgtEl>
+                                        <p:attrNameLst>
+                                          <p:attrName>style.visibility</p:attrName>
+                                        </p:attrNameLst>
+                                      </p:cBhvr>
+                                      <p:to>
+                                        <p:strVal val="visible"/>
+                                      </p:to>
+                                    </p:set>
+                                  </p:childTnLst>
+                                </p:cTn>
+                              </p:par>
+                            </p:childTnLst>
+                          </p:cTn>
+                        </p:par>
+                      </p:childTnLst>
+                    </p:cTn>
+                  </p:par>
+                  <p:par>
+                    <p:cTn id="19" fill="hold">
+                      <p:stCondLst>
+                        <p:cond delay="indefinite"/>
+                      </p:stCondLst>
+                      <p:childTnLst>
+                        <p:par>
+                          <p:cTn id="20" fill="hold">
+                            <p:stCondLst>
+                              <p:cond delay="0"/>
+                            </p:stCondLst>
+                            <p:childTnLst>
+                              <p:par>
+                                <p:cTn id="21" presetID="1" presetClass="entr" presetSubtype="0" fill="hold" nodeType="clickEffect">
+                                  <p:stCondLst>
+                                    <p:cond delay="0"/>
+                                  </p:stCondLst>
+                                  <p:childTnLst>
+                                    <p:set>
+                                      <p:cBhvr>
+                                        <p:cTn id="22" dur="1" fill="hold">
+                                          <p:stCondLst>
+                                            <p:cond delay="0"/>
+                                          </p:stCondLst>
+                                        </p:cTn>
+                                        <p:tgtEl>
+                                          <p:spTgt spid="8"/>
+                                        </p:tgtEl>
+                                        <p:attrNameLst>
+                                          <p:attrName>style.visibility</p:attrName>
+                                        </p:attrNameLst>
+                                      </p:cBhvr>
+                                      <p:to>
+                                        <p:strVal val="visible"/>
+                                      </p:to>
+                                    </p:set>
+                                  </p:childTnLst>
+                                </p:cTn>
+                              </p:par>
+                            </p:childTnLst>
+                          </p:cTn>
+                        </p:par>
+                      </p:childTnLst>
+                    </p:cTn>
+                  </p:par>
+                  <p:par>
+                    <p:cTn id="23" fill="hold">
+                      <p:stCondLst>
+                        <p:cond delay="indefinite"/>
+                      </p:stCondLst>
+                      <p:childTnLst>
+                        <p:par>
+                          <p:cTn id="24" fill="hold">
+                            <p:stCondLst>
+                              <p:cond delay="0"/>
+                            </p:stCondLst>
+                            <p:childTnLst>
+                              <p:par>
+                                <p:cTn id="25" presetID="1" presetClass="entr" presetSubtype="0" fill="hold" nodeType="clickEffect">
+                                  <p:stCondLst>
+                                    <p:cond delay="0"/>
+                                  </p:stCondLst>
+                                  <p:childTnLst>
+                                    <p:set>
+                                      <p:cBhvr>
+                                        <p:cTn id="26" dur="1" fill="hold">
+                                          <p:stCondLst>
+                                            <p:cond delay="0"/>
+                                          </p:stCondLst>
+                                        </p:cTn>
+                                        <p:tgtEl>
+                                          <p:spTgt spid="14"/>
+                                        </p:tgtEl>
+                                        <p:attrNameLst>
+                                          <p:attrName>style.visibility</p:attrName>
+                                        </p:attrNameLst>
+                                      </p:cBhvr>
+                                      <p:to>
+                                        <p:strVal val="visible"/>
+                                      </p:to>
+                                    </p:set>
+                                  </p:childTnLst>
+                                </p:cTn>
+                              </p:par>
+                            </p:childTnLst>
+                          </p:cTn>
+                        </p:par>
+                      </p:childTnLst>
+                    </p:cTn>
+                  </p:par>
+                  <p:par>
+                    <p:cTn id="27" fill="hold">
+                      <p:stCondLst>
+                        <p:cond delay="indefinite"/>
+                      </p:stCondLst>
+                      <p:childTnLst>
+                        <p:par>
+                          <p:cTn id="28" fill="hold">
+                            <p:stCondLst>
+                              <p:cond delay="0"/>
+                            </p:stCondLst>
+                            <p:childTnLst>
+                              <p:par>
+                                <p:cTn id="29" presetID="1" presetClass="entr" presetSubtype="0" fill="hold" grpId="0" nodeType="clickEffect">
+                                  <p:stCondLst>
+                                    <p:cond delay="0"/>
+                                  </p:stCondLst>
+                                  <p:childTnLst>
+                                    <p:set>
+                                      <p:cBhvr>
+                                        <p:cTn id="30" dur="1" fill="hold">
+                                          <p:stCondLst>
+                                            <p:cond delay="0"/>
+                                          </p:stCondLst>
+                                        </p:cTn>
+                                        <p:tgtEl>
+                                          <p:spTgt spid="3">
+                                            <p:txEl>
+                                              <p:pRg st="5" end="5"/>
+                                            </p:txEl>
+                                          </p:spTgt>
+                                        </p:tgtEl>
+                                        <p:attrNameLst>
+                                          <p:attrName>style.visibility</p:attrName>
+                                        </p:attrNameLst>
+                                      </p:cBhvr>
+                                      <p:to>
+                                        <p:strVal val="visible"/>
+                                      </p:to>
+                                    </p:set>
+                                  </p:childTnLst>
+                                </p:cTn>
+                              </p:par>
+                            </p:childTnLst>
+                          </p:cTn>
+                        </p:par>
+                      </p:childTnLst>
+                    </p:cTn>
+                  </p:par>
+                  <p:par>
+                    <p:cTn id="31" fill="hold">
+                      <p:stCondLst>
+                        <p:cond delay="indefinite"/>
+                      </p:stCondLst>
+                      <p:childTnLst>
+                        <p:par>
+                          <p:cTn id="32" fill="hold">
+                            <p:stCondLst>
+                              <p:cond delay="0"/>
+                            </p:stCondLst>
+                            <p:childTnLst>
+                              <p:par>
+                                <p:cTn id="33" presetID="1" presetClass="entr" presetSubtype="0" fill="hold" grpId="0" nodeType="clickEffect">
+                                  <p:stCondLst>
+                                    <p:cond delay="0"/>
+                                  </p:stCondLst>
+                                  <p:childTnLst>
+                                    <p:set>
+                                      <p:cBhvr>
+                                        <p:cTn id="34" dur="1" fill="hold">
+                                          <p:stCondLst>
+                                            <p:cond delay="0"/>
+                                          </p:stCondLst>
+                                        </p:cTn>
+                                        <p:tgtEl>
+                                          <p:spTgt spid="3">
+                                            <p:txEl>
+                                              <p:pRg st="6" end="6"/>
+                                            </p:txEl>
+                                          </p:spTgt>
+                                        </p:tgtEl>
+                                        <p:attrNameLst>
+                                          <p:attrName>style.visibility</p:attrName>
+                                        </p:attrNameLst>
+                                      </p:cBhvr>
+                                      <p:to>
+                                        <p:strVal val="visible"/>
+                                      </p:to>
+                                    </p:set>
+                                  </p:childTnLst>
+                                </p:cTn>
+                              </p:par>
+                            </p:childTnLst>
+                          </p:cTn>
+                        </p:par>
+                      </p:childTnLst>
+                    </p:cTn>
+                  </p:par>
+                </p:childTnLst>
+              </p:cTn>
+              <p:prevCondLst>
+                <p:cond evt="onPrev" delay="0">
+                  <p:tgtEl>
+                    <p:sldTgt/>
+                  </p:tgtEl>
+                </p:cond>
+              </p:prevCondLst>
+              <p:nextCondLst>
+                <p:cond evt="onNext" delay="0">
+                  <p:tgtEl>
+                    <p:sldTgt/>
+                  </p:tgtEl>
+                </p:cond>
+              </p:nextCondLst>
+            </p:seq>
+          </p:childTnLst>
+        </p:cTn>
+      </p:par>
+    </p:tnLst>
+    <p:bldLst>
+      <p:bldP spid="3" grpId="0" uiExpand="1" build="p"/>
+      <p:bldP spid="5" grpId="0" animBg="1"/>
+      <p:bldP spid="7" grpId="0" animBg="1"/>
+    </p:bldLst>
+  </p:timing>
+</p:sld>
+</file>
+
+<file path=ppt/slides/slide17.xml><?xml version="1.0" encoding="utf-8"?>
+<p:sld xmlns:a="http://schemas.openxmlformats.org/drawingml/2006/main" xmlns:r="http://schemas.openxmlformats.org/officeDocument/2006/relationships" xmlns:p="http://schemas.openxmlformats.org/presentationml/2006/main">
+  <p:cSld>
+    <p:spTree>
+      <p:nvGrpSpPr>
+        <p:cNvPr id="1" name=""/>
+        <p:cNvGrpSpPr/>
+        <p:nvPr/>
+      </p:nvGrpSpPr>
+      <p:grpSpPr>
+        <a:xfrm>
+          <a:off x="0" y="0"/>
+          <a:ext cx="0" cy="0"/>
+          <a:chOff x="0" y="0"/>
+          <a:chExt cx="0" cy="0"/>
+        </a:xfrm>
+      </p:grpSpPr>
+      <p:sp>
+        <p:nvSpPr>
+          <p:cNvPr id="2" name="Title 1"/>
+          <p:cNvSpPr>
+            <a:spLocks noGrp="1"/>
+          </p:cNvSpPr>
+          <p:nvPr>
+            <p:ph type="title"/>
+          </p:nvPr>
+        </p:nvSpPr>
+        <p:spPr/>
+        <p:txBody>
+          <a:bodyPr/>
+          <a:lstStyle/>
+          <a:p>
+            <a:r>
+              <a:rPr lang="en-US" dirty="0" smtClean="0"/>
+              <a:t>Writing </a:t>
+            </a:r>
+            <a:r>
+              <a:rPr lang="en-US" dirty="0" err="1" smtClean="0"/>
+              <a:t>GeoTIFF</a:t>
+            </a:r>
+            <a:endParaRPr lang="en-US" dirty="0"/>
+          </a:p>
+        </p:txBody>
+      </p:sp>
+      <p:sp>
+        <p:nvSpPr>
+          <p:cNvPr id="3" name="Content Placeholder 2"/>
+          <p:cNvSpPr>
+            <a:spLocks noGrp="1"/>
+          </p:cNvSpPr>
+          <p:nvPr>
+            <p:ph idx="1"/>
+          </p:nvPr>
+        </p:nvSpPr>
+        <p:spPr/>
+        <p:txBody>
+          <a:bodyPr/>
+          <a:lstStyle/>
+          <a:p>
+            <a:r>
+              <a:rPr lang="en-US" dirty="0" smtClean="0"/>
+              <a:t>Create file</a:t>
+            </a:r>
+            <a:endParaRPr lang="en-US" dirty="0"/>
+          </a:p>
+        </p:txBody>
+      </p:sp>
+      <p:sp>
+        <p:nvSpPr>
+          <p:cNvPr id="4" name="Slide Number Placeholder 3"/>
+          <p:cNvSpPr>
+            <a:spLocks noGrp="1"/>
+          </p:cNvSpPr>
+          <p:nvPr>
+            <p:ph type="sldNum" sz="quarter" idx="12"/>
+          </p:nvPr>
+        </p:nvSpPr>
+        <p:spPr/>
+        <p:txBody>
+          <a:bodyPr/>
+          <a:lstStyle/>
+          <a:p>
+            <a:fld id="{5A209D72-2E9D-49B0-8977-41DCCC66C0BB}" type="slidenum">
+              <a:rPr lang="nl-BE" smtClean="0">
+                <a:solidFill>
+                  <a:prstClr val="black">
+                    <a:tint val="75000"/>
+                  </a:prstClr>
+                </a:solidFill>
+              </a:rPr>
+              <a:pPr/>
+              <a:t>17</a:t>
+            </a:fld>
+            <a:endParaRPr lang="nl-BE">
+              <a:solidFill>
+                <a:prstClr val="black">
+                  <a:tint val="75000"/>
+                </a:prstClr>
+              </a:solidFill>
+            </a:endParaRPr>
+          </a:p>
+        </p:txBody>
+      </p:sp>
+      <p:sp>
+        <p:nvSpPr>
+          <p:cNvPr id="5" name="TextBox 4"/>
+          <p:cNvSpPr txBox="1"/>
+          <p:nvPr/>
+        </p:nvSpPr>
+        <p:spPr>
+          <a:xfrm>
+            <a:off x="534838" y="2079397"/>
+            <a:ext cx="8376249" cy="1200329"/>
+          </a:xfrm>
+          <a:prstGeom prst="rect">
+            <a:avLst/>
+          </a:prstGeom>
+          <a:solidFill>
+            <a:schemeClr val="accent4">
+              <a:lumMod val="40000"/>
+              <a:lumOff val="60000"/>
+            </a:schemeClr>
+          </a:solidFill>
+        </p:spPr>
+        <p:txBody>
+          <a:bodyPr wrap="square" rtlCol="0">
+            <a:spAutoFit/>
+          </a:bodyPr>
+          <a:lstStyle/>
+          <a:p>
+            <a:r>
+              <a:rPr lang="en-US" dirty="0" smtClean="0">
+                <a:latin typeface="Courier New" pitchFamily="49" charset="0"/>
+                <a:cs typeface="Courier New" pitchFamily="49" charset="0"/>
+              </a:rPr>
+              <a:t>driver = </a:t>
+            </a:r>
+            <a:r>
+              <a:rPr lang="en-US" dirty="0" err="1" smtClean="0">
+                <a:latin typeface="Courier New" pitchFamily="49" charset="0"/>
+                <a:cs typeface="Courier New" pitchFamily="49" charset="0"/>
+              </a:rPr>
+              <a:t>gdal.GetDriverByName</a:t>
+            </a:r>
+            <a:r>
+              <a:rPr lang="en-US" dirty="0" smtClean="0">
+                <a:latin typeface="Courier New" pitchFamily="49" charset="0"/>
+                <a:cs typeface="Courier New" pitchFamily="49" charset="0"/>
+              </a:rPr>
+              <a:t>('GTIFF')</a:t>
+            </a:r>
+          </a:p>
+          <a:p>
+            <a:r>
+              <a:rPr lang="en-US" dirty="0" err="1" smtClean="0">
+                <a:latin typeface="Courier New" pitchFamily="49" charset="0"/>
+                <a:cs typeface="Courier New" pitchFamily="49" charset="0"/>
+              </a:rPr>
+              <a:t>new_data</a:t>
+            </a:r>
+            <a:r>
+              <a:rPr lang="en-US" dirty="0" smtClean="0">
+                <a:latin typeface="Courier New" pitchFamily="49" charset="0"/>
+                <a:cs typeface="Courier New" pitchFamily="49" charset="0"/>
+              </a:rPr>
+              <a:t> = </a:t>
+            </a:r>
+            <a:r>
+              <a:rPr lang="en-US" dirty="0" err="1" smtClean="0">
+                <a:latin typeface="Courier New" pitchFamily="49" charset="0"/>
+                <a:cs typeface="Courier New" pitchFamily="49" charset="0"/>
+              </a:rPr>
+              <a:t>driver.Create</a:t>
+            </a:r>
+            <a:r>
+              <a:rPr lang="en-US" dirty="0" smtClean="0">
+                <a:latin typeface="Courier New" pitchFamily="49" charset="0"/>
+                <a:cs typeface="Courier New" pitchFamily="49" charset="0"/>
+              </a:rPr>
+              <a:t>(</a:t>
+            </a:r>
+            <a:r>
+              <a:rPr lang="en-US" dirty="0" err="1" smtClean="0">
+                <a:latin typeface="Courier New" pitchFamily="49" charset="0"/>
+                <a:cs typeface="Courier New" pitchFamily="49" charset="0"/>
+              </a:rPr>
+              <a:t>new_file_name</a:t>
+            </a:r>
+            <a:r>
+              <a:rPr lang="en-US" dirty="0" smtClean="0">
+                <a:latin typeface="Courier New" pitchFamily="49" charset="0"/>
+                <a:cs typeface="Courier New" pitchFamily="49" charset="0"/>
+              </a:rPr>
+              <a:t>,</a:t>
+            </a:r>
+          </a:p>
+          <a:p>
+            <a:r>
+              <a:rPr lang="en-US" dirty="0">
+                <a:latin typeface="Courier New" pitchFamily="49" charset="0"/>
+                <a:cs typeface="Courier New" pitchFamily="49" charset="0"/>
+              </a:rPr>
+              <a:t> </a:t>
+            </a:r>
+            <a:r>
+              <a:rPr lang="en-US" dirty="0" smtClean="0">
+                <a:latin typeface="Courier New" pitchFamily="49" charset="0"/>
+                <a:cs typeface="Courier New" pitchFamily="49" charset="0"/>
+              </a:rPr>
+              <a:t>                        </a:t>
+            </a:r>
+            <a:r>
+              <a:rPr lang="en-US" dirty="0" err="1" smtClean="0">
+                <a:latin typeface="Courier New" pitchFamily="49" charset="0"/>
+                <a:cs typeface="Courier New" pitchFamily="49" charset="0"/>
+              </a:rPr>
+              <a:t>data.RasterXSize</a:t>
+            </a:r>
+            <a:r>
+              <a:rPr lang="en-US" dirty="0" smtClean="0">
+                <a:latin typeface="Courier New" pitchFamily="49" charset="0"/>
+                <a:cs typeface="Courier New" pitchFamily="49" charset="0"/>
+              </a:rPr>
+              <a:t>, </a:t>
+            </a:r>
+            <a:r>
+              <a:rPr lang="en-US" dirty="0" err="1" smtClean="0">
+                <a:latin typeface="Courier New" pitchFamily="49" charset="0"/>
+                <a:cs typeface="Courier New" pitchFamily="49" charset="0"/>
+              </a:rPr>
+              <a:t>data.RasterYSize</a:t>
+            </a:r>
+            <a:r>
+              <a:rPr lang="en-US" dirty="0" smtClean="0">
+                <a:latin typeface="Courier New" pitchFamily="49" charset="0"/>
+                <a:cs typeface="Courier New" pitchFamily="49" charset="0"/>
+              </a:rPr>
+              <a:t>,</a:t>
+            </a:r>
+          </a:p>
+          <a:p>
+            <a:r>
+              <a:rPr lang="en-US" dirty="0">
+                <a:latin typeface="Courier New" pitchFamily="49" charset="0"/>
+                <a:cs typeface="Courier New" pitchFamily="49" charset="0"/>
+              </a:rPr>
+              <a:t> </a:t>
+            </a:r>
+            <a:r>
+              <a:rPr lang="en-US" dirty="0" smtClean="0">
+                <a:latin typeface="Courier New" pitchFamily="49" charset="0"/>
+                <a:cs typeface="Courier New" pitchFamily="49" charset="0"/>
+              </a:rPr>
+              <a:t>                      1, </a:t>
+            </a:r>
+            <a:r>
+              <a:rPr lang="en-US" dirty="0" err="1" smtClean="0">
+                <a:latin typeface="Courier New" pitchFamily="49" charset="0"/>
+                <a:cs typeface="Courier New" pitchFamily="49" charset="0"/>
+              </a:rPr>
+              <a:t>gdal.GDT_Byte</a:t>
+            </a:r>
+            <a:r>
+              <a:rPr lang="en-US" dirty="0" smtClean="0">
+                <a:latin typeface="Courier New" pitchFamily="49" charset="0"/>
+                <a:cs typeface="Courier New" pitchFamily="49" charset="0"/>
+              </a:rPr>
+              <a:t>)</a:t>
+            </a:r>
+            <a:endParaRPr lang="en-US" dirty="0" smtClean="0">
+              <a:latin typeface="Courier New" pitchFamily="49" charset="0"/>
+              <a:cs typeface="Courier New" pitchFamily="49" charset="0"/>
+            </a:endParaRPr>
+          </a:p>
+        </p:txBody>
+      </p:sp>
+      <p:grpSp>
+        <p:nvGrpSpPr>
+          <p:cNvPr id="6" name="Group 5"/>
+          <p:cNvGrpSpPr/>
+          <p:nvPr/>
+        </p:nvGrpSpPr>
+        <p:grpSpPr>
+          <a:xfrm>
+            <a:off x="3739686" y="2927097"/>
+            <a:ext cx="1938723" cy="595573"/>
+            <a:chOff x="3618970" y="2839331"/>
+            <a:chExt cx="1938723" cy="595573"/>
+          </a:xfrm>
+        </p:grpSpPr>
+        <p:sp>
+          <p:nvSpPr>
+            <p:cNvPr id="7" name="Rectangle 6"/>
+            <p:cNvSpPr/>
+            <p:nvPr/>
+          </p:nvSpPr>
+          <p:spPr>
+            <a:xfrm>
+              <a:off x="3618970" y="2839331"/>
+              <a:ext cx="156709" cy="288032"/>
+            </a:xfrm>
+            <a:prstGeom prst="rect">
+              <a:avLst/>
+            </a:prstGeom>
+            <a:noFill/>
+            <a:ln>
+              <a:solidFill>
+                <a:srgbClr val="C00000"/>
+              </a:solidFill>
+            </a:ln>
+          </p:spPr>
+          <p:style>
+            <a:lnRef idx="2">
+              <a:schemeClr val="accent1">
+                <a:shade val="50000"/>
+              </a:schemeClr>
+            </a:lnRef>
+            <a:fillRef idx="1">
+              <a:schemeClr val="accent1"/>
+            </a:fillRef>
+            <a:effectRef idx="0">
+              <a:schemeClr val="accent1"/>
+            </a:effectRef>
+            <a:fontRef idx="minor">
+              <a:schemeClr val="lt1"/>
+            </a:fontRef>
+          </p:style>
+          <p:txBody>
+            <a:bodyPr rtlCol="0" anchor="ctr"/>
+            <a:lstStyle/>
+            <a:p>
+              <a:pPr algn="ctr"/>
+              <a:endParaRPr lang="nl-BE"/>
+            </a:p>
+          </p:txBody>
+        </p:sp>
+        <p:sp>
+          <p:nvSpPr>
+            <p:cNvPr id="8" name="TextBox 7"/>
+            <p:cNvSpPr txBox="1"/>
+            <p:nvPr/>
+          </p:nvSpPr>
+          <p:spPr>
+            <a:xfrm>
+              <a:off x="4272533" y="3129671"/>
+              <a:ext cx="1285160" cy="305233"/>
+            </a:xfrm>
+            <a:prstGeom prst="rect">
+              <a:avLst/>
+            </a:prstGeom>
+            <a:solidFill>
+              <a:schemeClr val="bg1"/>
+            </a:solidFill>
+            <a:ln>
+              <a:solidFill>
+                <a:srgbClr val="C00000"/>
+              </a:solidFill>
+            </a:ln>
+          </p:spPr>
+          <p:txBody>
+            <a:bodyPr wrap="none" rtlCol="0">
+              <a:spAutoFit/>
+            </a:bodyPr>
+            <a:lstStyle/>
+            <a:p>
+              <a:r>
+                <a:rPr lang="en-US" dirty="0" err="1" smtClean="0">
+                  <a:solidFill>
+                    <a:srgbClr val="C00000"/>
+                  </a:solidFill>
+                </a:rPr>
+                <a:t>nr</a:t>
+              </a:r>
+              <a:r>
+                <a:rPr lang="en-US" dirty="0" smtClean="0">
+                  <a:solidFill>
+                    <a:srgbClr val="C00000"/>
+                  </a:solidFill>
+                </a:rPr>
+                <a:t>. of bands</a:t>
+              </a:r>
+              <a:endParaRPr lang="nl-BE" dirty="0">
+                <a:solidFill>
+                  <a:srgbClr val="C00000"/>
+                </a:solidFill>
+              </a:endParaRPr>
+            </a:p>
+          </p:txBody>
+        </p:sp>
+        <p:cxnSp>
+          <p:nvCxnSpPr>
+            <p:cNvPr id="9" name="Straight Arrow Connector 8"/>
+            <p:cNvCxnSpPr>
+              <a:stCxn id="8" idx="1"/>
+              <a:endCxn id="7" idx="3"/>
+            </p:cNvCxnSpPr>
+            <p:nvPr/>
+          </p:nvCxnSpPr>
+          <p:spPr>
+            <a:xfrm flipH="1" flipV="1">
+              <a:off x="3775679" y="2983347"/>
+              <a:ext cx="496854" cy="298941"/>
+            </a:xfrm>
+            <a:prstGeom prst="straightConnector1">
+              <a:avLst/>
+            </a:prstGeom>
+            <a:ln w="19050">
+              <a:solidFill>
+                <a:srgbClr val="C00000"/>
+              </a:solidFill>
+              <a:tailEnd type="stealth" w="lg" len="lg"/>
+            </a:ln>
+          </p:spPr>
+          <p:style>
+            <a:lnRef idx="1">
+              <a:schemeClr val="accent1"/>
+            </a:lnRef>
+            <a:fillRef idx="0">
+              <a:schemeClr val="accent1"/>
+            </a:fillRef>
+            <a:effectRef idx="0">
+              <a:schemeClr val="accent1"/>
+            </a:effectRef>
+            <a:fontRef idx="minor">
+              <a:schemeClr val="tx1"/>
+            </a:fontRef>
+          </p:style>
+        </p:cxnSp>
+      </p:grpSp>
+    </p:spTree>
+    <p:extLst>
+      <p:ext uri="{BB962C8B-B14F-4D97-AF65-F5344CB8AC3E}">
+        <p14:creationId xmlns:p14="http://schemas.microsoft.com/office/powerpoint/2010/main" val="2305820479"/>
+      </p:ext>
+    </p:extLst>
+  </p:cSld>
+  <p:clrMapOvr>
+    <a:masterClrMapping/>
+  </p:clrMapOvr>
+  <p:timing>
+    <p:tnLst>
+      <p:par>
+        <p:cTn id="1" dur="indefinite" restart="never" nodeType="tmRoot">
+          <p:childTnLst>
+            <p:seq concurrent="1" nextAc="seek">
+              <p:cTn id="2" dur="indefinite" nodeType="mainSeq">
+                <p:childTnLst>
+                  <p:par>
+                    <p:cTn id="3" fill="hold">
+                      <p:stCondLst>
+                        <p:cond delay="indefinite"/>
+                        <p:cond evt="onBegin" delay="0">
+                          <p:tn val="2"/>
+                        </p:cond>
+                      </p:stCondLst>
+                      <p:childTnLst>
+                        <p:par>
+                          <p:cTn id="4" fill="hold">
+                            <p:stCondLst>
+                              <p:cond delay="0"/>
+                            </p:stCondLst>
+                            <p:childTnLst>
+                              <p:par>
+                                <p:cTn id="5" presetID="1" presetClass="entr" presetSubtype="0" fill="hold" grpId="0" nodeType="withEffect">
+                                  <p:stCondLst>
+                                    <p:cond delay="0"/>
+                                  </p:stCondLst>
+                                  <p:childTnLst>
+                                    <p:set>
+                                      <p:cBhvr>
+                                        <p:cTn id="6" dur="1" fill="hold">
+                                          <p:stCondLst>
+                                            <p:cond delay="0"/>
+                                          </p:stCondLst>
+                                        </p:cTn>
+                                        <p:tgtEl>
+                                          <p:spTgt spid="5"/>
+                                        </p:tgtEl>
+                                        <p:attrNameLst>
+                                          <p:attrName>style.visibility</p:attrName>
+                                        </p:attrNameLst>
+                                      </p:cBhvr>
+                                      <p:to>
+                                        <p:strVal val="visible"/>
+                                      </p:to>
+                                    </p:set>
+                                  </p:childTnLst>
+                                </p:cTn>
+                              </p:par>
+                            </p:childTnLst>
+                          </p:cTn>
+                        </p:par>
+                      </p:childTnLst>
+                    </p:cTn>
+                  </p:par>
+                  <p:par>
+                    <p:cTn id="7" fill="hold">
+                      <p:stCondLst>
+                        <p:cond delay="indefinite"/>
+                      </p:stCondLst>
+                      <p:childTnLst>
+                        <p:par>
+                          <p:cTn id="8" fill="hold">
+                            <p:stCondLst>
+                              <p:cond delay="0"/>
+                            </p:stCondLst>
+                            <p:childTnLst>
+                              <p:par>
+                                <p:cTn id="9" presetID="1" presetClass="entr" presetSubtype="0" fill="hold" nodeType="clickEffect">
+                                  <p:stCondLst>
+                                    <p:cond delay="0"/>
+                                  </p:stCondLst>
+                                  <p:childTnLst>
+                                    <p:set>
+                                      <p:cBhvr>
+                                        <p:cTn id="10" dur="1" fill="hold">
+                                          <p:stCondLst>
+                                            <p:cond delay="0"/>
+                                          </p:stCondLst>
+                                        </p:cTn>
+                                        <p:tgtEl>
+                                          <p:spTgt spid="6"/>
+                                        </p:tgtEl>
+                                        <p:attrNameLst>
+                                          <p:attrName>style.visibility</p:attrName>
+                                        </p:attrNameLst>
+                                      </p:cBhvr>
+                                      <p:to>
+                                        <p:strVal val="visible"/>
+                                      </p:to>
+                                    </p:set>
+                                  </p:childTnLst>
+                                </p:cTn>
+                              </p:par>
+                            </p:childTnLst>
+                          </p:cTn>
+                        </p:par>
+                      </p:childTnLst>
+                    </p:cTn>
+                  </p:par>
+                </p:childTnLst>
+              </p:cTn>
+              <p:prevCondLst>
+                <p:cond evt="onPrev" delay="0">
+                  <p:tgtEl>
+                    <p:sldTgt/>
+                  </p:tgtEl>
+                </p:cond>
+              </p:prevCondLst>
+              <p:nextCondLst>
+                <p:cond evt="onNext" delay="0">
+                  <p:tgtEl>
+                    <p:sldTgt/>
+                  </p:tgtEl>
+                </p:cond>
+              </p:nextCondLst>
+            </p:seq>
+          </p:childTnLst>
+        </p:cTn>
+      </p:par>
+    </p:tnLst>
+    <p:bldLst>
+      <p:bldP spid="5" grpId="0" animBg="1"/>
+    </p:bldLst>
+  </p:timing>
+</p:sld>
+</file>
+
+<file path=ppt/slides/slide18.xml><?xml version="1.0" encoding="utf-8"?>
+<p:sld xmlns:a="http://schemas.openxmlformats.org/drawingml/2006/main" xmlns:r="http://schemas.openxmlformats.org/officeDocument/2006/relationships" xmlns:p="http://schemas.openxmlformats.org/presentationml/2006/main">
+  <p:cSld>
+    <p:spTree>
+      <p:nvGrpSpPr>
+        <p:cNvPr id="1" name=""/>
+        <p:cNvGrpSpPr/>
+        <p:nvPr/>
+      </p:nvGrpSpPr>
+      <p:grpSpPr>
+        <a:xfrm>
+          <a:off x="0" y="0"/>
+          <a:ext cx="0" cy="0"/>
+          <a:chOff x="0" y="0"/>
+          <a:chExt cx="0" cy="0"/>
+        </a:xfrm>
+      </p:grpSpPr>
+      <p:sp>
+        <p:nvSpPr>
+          <p:cNvPr id="2" name="Title 1"/>
+          <p:cNvSpPr>
+            <a:spLocks noGrp="1"/>
+          </p:cNvSpPr>
+          <p:nvPr>
+            <p:ph type="title"/>
+          </p:nvPr>
+        </p:nvSpPr>
+        <p:spPr/>
+        <p:txBody>
+          <a:bodyPr/>
+          <a:lstStyle/>
+          <a:p>
+            <a:r>
+              <a:rPr lang="en-US" dirty="0" smtClean="0"/>
+              <a:t>Further reading</a:t>
+            </a:r>
+            <a:endParaRPr lang="en-US" dirty="0"/>
+          </a:p>
+        </p:txBody>
+      </p:sp>
+      <p:sp>
+        <p:nvSpPr>
+          <p:cNvPr id="3" name="Content Placeholder 2"/>
+          <p:cNvSpPr>
+            <a:spLocks noGrp="1"/>
+          </p:cNvSpPr>
+          <p:nvPr>
+            <p:ph idx="1"/>
+          </p:nvPr>
+        </p:nvSpPr>
+        <p:spPr/>
+        <p:txBody>
+          <a:bodyPr>
+            <a:normAutofit fontScale="92500" lnSpcReduction="20000"/>
+          </a:bodyPr>
+          <a:lstStyle/>
+          <a:p>
+            <a:r>
+              <a:rPr lang="en-US" dirty="0" smtClean="0"/>
+              <a:t>GIS &amp; </a:t>
+            </a:r>
+            <a:r>
+              <a:rPr lang="en-US" dirty="0"/>
+              <a:t>Python introduction</a:t>
+            </a:r>
+            <a:br>
+              <a:rPr lang="en-US" dirty="0"/>
+            </a:br>
+            <a:r>
+              <a:rPr lang="en-US" sz="2000" dirty="0">
+                <a:hlinkClick r:id="rId2"/>
+              </a:rPr>
+              <a:t>https://</a:t>
+            </a:r>
+            <a:r>
+              <a:rPr lang="en-US" sz="2000" dirty="0" smtClean="0">
+                <a:hlinkClick r:id="rId2"/>
+              </a:rPr>
+              <a:t>macwright.org/2012/10/31/gis-with-python-shapely-fiona.html</a:t>
+            </a:r>
+            <a:r>
+              <a:rPr lang="en-US" sz="2000" dirty="0" smtClean="0"/>
+              <a:t> </a:t>
+            </a:r>
+            <a:endParaRPr lang="en-US" dirty="0"/>
+          </a:p>
+          <a:p>
+            <a:r>
+              <a:rPr lang="en-US" dirty="0" smtClean="0"/>
+              <a:t>Fiona manual</a:t>
+            </a:r>
+            <a:r>
+              <a:rPr lang="en-US" dirty="0"/>
+              <a:t/>
+            </a:r>
+            <a:br>
+              <a:rPr lang="en-US" dirty="0"/>
+            </a:br>
+            <a:r>
+              <a:rPr lang="en-US" sz="2000" dirty="0">
+                <a:hlinkClick r:id="rId3"/>
+              </a:rPr>
+              <a:t>http://</a:t>
+            </a:r>
+            <a:r>
+              <a:rPr lang="en-US" sz="2000" dirty="0" smtClean="0">
+                <a:hlinkClick r:id="rId3"/>
+              </a:rPr>
+              <a:t>toblerity.org/fiona/index.html</a:t>
+            </a:r>
+            <a:endParaRPr lang="en-US" sz="2000" dirty="0" smtClean="0"/>
+          </a:p>
+          <a:p>
+            <a:r>
+              <a:rPr lang="en-US" dirty="0" smtClean="0"/>
+              <a:t>Editing/displaying </a:t>
+            </a:r>
+            <a:r>
+              <a:rPr lang="en-US" dirty="0" err="1" smtClean="0"/>
+              <a:t>GeoJSON</a:t>
+            </a:r>
+            <a:r>
+              <a:rPr lang="en-US" dirty="0" smtClean="0"/>
+              <a:t/>
+            </a:r>
+            <a:br>
+              <a:rPr lang="en-US" dirty="0" smtClean="0"/>
+            </a:br>
+            <a:r>
+              <a:rPr lang="en-US" sz="2000" dirty="0" smtClean="0">
+                <a:hlinkClick r:id="rId4"/>
+              </a:rPr>
+              <a:t>http://geojson.io/</a:t>
+            </a:r>
+            <a:r>
+              <a:rPr lang="en-US" sz="2000" dirty="0" smtClean="0"/>
+              <a:t> </a:t>
+            </a:r>
+          </a:p>
+          <a:p>
+            <a:r>
+              <a:rPr lang="en-US" dirty="0" smtClean="0"/>
+              <a:t>Folium </a:t>
+            </a:r>
+            <a:r>
+              <a:rPr lang="en-US" dirty="0"/>
+              <a:t>manual</a:t>
+            </a:r>
+            <a:br>
+              <a:rPr lang="en-US" dirty="0"/>
+            </a:br>
+            <a:r>
+              <a:rPr lang="en-US" sz="2000" dirty="0">
+                <a:hlinkClick r:id="rId5"/>
+              </a:rPr>
+              <a:t>http://python-visualization.github.io/folium/docs-master</a:t>
+            </a:r>
+            <a:r>
+              <a:rPr lang="en-US" sz="2000" dirty="0" smtClean="0">
+                <a:hlinkClick r:id="rId5"/>
+              </a:rPr>
+              <a:t>/</a:t>
+            </a:r>
+            <a:r>
+              <a:rPr lang="en-US" sz="2000" dirty="0" smtClean="0"/>
+              <a:t> </a:t>
+            </a:r>
+            <a:endParaRPr lang="en-US" dirty="0"/>
+          </a:p>
+          <a:p>
+            <a:r>
+              <a:rPr lang="en-US" dirty="0" smtClean="0"/>
+              <a:t>Shapely manual</a:t>
+            </a:r>
+            <a:br>
+              <a:rPr lang="en-US" dirty="0" smtClean="0"/>
+            </a:br>
+            <a:r>
+              <a:rPr lang="en-US" sz="2000" dirty="0">
+                <a:hlinkClick r:id="rId6"/>
+              </a:rPr>
+              <a:t>https://shapely.readthedocs.io/en/latest</a:t>
+            </a:r>
+            <a:r>
+              <a:rPr lang="en-US" sz="2000" dirty="0" smtClean="0">
+                <a:hlinkClick r:id="rId6"/>
+              </a:rPr>
+              <a:t>/</a:t>
+            </a:r>
+            <a:endParaRPr lang="en-US" sz="2000" dirty="0" smtClean="0"/>
+          </a:p>
+          <a:p>
+            <a:r>
+              <a:rPr lang="en-US" dirty="0" smtClean="0"/>
+              <a:t>GIS data sources</a:t>
+            </a:r>
+            <a:r>
+              <a:rPr lang="en-US" sz="2000" dirty="0"/>
+              <a:t/>
+            </a:r>
+            <a:br>
+              <a:rPr lang="en-US" sz="2000" dirty="0"/>
+            </a:br>
+            <a:r>
+              <a:rPr lang="en-US" sz="2000" dirty="0">
+                <a:hlinkClick r:id="rId7"/>
+              </a:rPr>
+              <a:t>http://gisgeography.com/best-free-gis-data-sources-raster-vector</a:t>
+            </a:r>
+            <a:r>
+              <a:rPr lang="en-US" sz="2000" dirty="0" smtClean="0">
+                <a:hlinkClick r:id="rId7"/>
+              </a:rPr>
+              <a:t>/</a:t>
+            </a:r>
+            <a:r>
+              <a:rPr lang="en-US" sz="2000" dirty="0" smtClean="0"/>
+              <a:t> </a:t>
+            </a:r>
+            <a:endParaRPr lang="en-US" sz="2000" dirty="0" smtClean="0"/>
+          </a:p>
+          <a:p>
+            <a:endParaRPr lang="en-US" dirty="0" smtClean="0"/>
+          </a:p>
+        </p:txBody>
+      </p:sp>
+      <p:sp>
+        <p:nvSpPr>
+          <p:cNvPr id="4" name="Slide Number Placeholder 3"/>
+          <p:cNvSpPr>
+            <a:spLocks noGrp="1"/>
+          </p:cNvSpPr>
+          <p:nvPr>
+            <p:ph type="sldNum" sz="quarter" idx="12"/>
+          </p:nvPr>
+        </p:nvSpPr>
+        <p:spPr/>
+        <p:txBody>
+          <a:bodyPr/>
+          <a:lstStyle/>
+          <a:p>
+            <a:fld id="{5A209D72-2E9D-49B0-8977-41DCCC66C0BB}" type="slidenum">
+              <a:rPr lang="nl-BE" smtClean="0">
+                <a:solidFill>
+                  <a:prstClr val="black">
+                    <a:tint val="75000"/>
+                  </a:prstClr>
+                </a:solidFill>
+              </a:rPr>
+              <a:pPr/>
+              <a:t>18</a:t>
             </a:fld>
             <a:endParaRPr lang="nl-BE">
               <a:solidFill>
@@ -8702,6 +10739,55 @@
                                           <p:spTgt spid="3">
                                             <p:txEl>
                                               <p:pRg st="4" end="4"/>
+                                            </p:txEl>
+                                          </p:spTgt>
+                                        </p:tgtEl>
+                                        <p:attrNameLst>
+                                          <p:attrName>style.visibility</p:attrName>
+                                        </p:attrNameLst>
+                                      </p:cBhvr>
+                                      <p:to>
+                                        <p:strVal val="visible"/>
+                                      </p:to>
+                                    </p:set>
+                                  </p:childTnLst>
+                                </p:cTn>
+                              </p:par>
+                            </p:childTnLst>
+                          </p:cTn>
+                        </p:par>
+                      </p:childTnLst>
+                    </p:cTn>
+                  </p:par>
+                  <p:par>
+                    <p:cTn id="23" fill="hold">
+                      <p:stCondLst>
+                        <p:cond delay="indefinite"/>
+                      </p:stCondLst>
+                      <p:childTnLst>
+                        <p:par>
+                          <p:cTn id="24" fill="hold">
+                            <p:stCondLst>
+                              <p:cond delay="0"/>
+                            </p:stCondLst>
+                            <p:childTnLst>
+                              <p:par>
+                                <p:cTn id="25" presetID="1" presetClass="entr" presetSubtype="0" fill="hold" grpId="0" nodeType="clickEffect">
+                                  <p:stCondLst>
+                                    <p:cond delay="0"/>
+                                  </p:stCondLst>
+                                  <p:childTnLst>
+                                    <p:set>
+                                      <p:cBhvr>
+                                        <p:cTn id="26" dur="1" fill="hold">
+                                          <p:stCondLst>
+                                            <p:cond delay="0"/>
+                                          </p:stCondLst>
+                                        </p:cTn>
+                                        <p:tgtEl>
+                                          <p:spTgt spid="3">
+                                            <p:txEl>
+                                              <p:pRg st="5" end="5"/>
                                             </p:txEl>
                                           </p:spTgt>
                                         </p:tgtEl>

</xml_diff>

<commit_message>
Add slide on writing GeoTIFF
</commit_message>
<xml_diff>
--- a/Python/python_gis.pptx
+++ b/Python/python_gis.pptx
@@ -8822,8 +8822,8 @@
           </a:p>
           <a:p>
             <a:r>
-              <a:rPr lang="en-US" dirty="0" err="1"/>
-              <a:t>GeoTransform</a:t>
+              <a:rPr lang="en-US" dirty="0" smtClean="0"/>
+              <a:t>Geo-transform</a:t>
             </a:r>
             <a:r>
               <a:rPr lang="en-US" dirty="0"/>
@@ -9719,12 +9719,52 @@
         </p:nvSpPr>
         <p:spPr/>
         <p:txBody>
-          <a:bodyPr/>
+          <a:bodyPr>
+            <a:normAutofit lnSpcReduction="10000"/>
+          </a:bodyPr>
           <a:lstStyle/>
           <a:p>
             <a:r>
               <a:rPr lang="en-US" dirty="0" smtClean="0"/>
               <a:t>Create file</a:t>
+            </a:r>
+          </a:p>
+          <a:p>
+            <a:endParaRPr lang="en-US" dirty="0"/>
+          </a:p>
+          <a:p>
+            <a:endParaRPr lang="en-US" dirty="0" smtClean="0"/>
+          </a:p>
+          <a:p>
+            <a:r>
+              <a:rPr lang="en-US" dirty="0" smtClean="0"/>
+              <a:t>Set projection/geo-transform</a:t>
+            </a:r>
+          </a:p>
+          <a:p>
+            <a:endParaRPr lang="en-US" dirty="0"/>
+          </a:p>
+          <a:p>
+            <a:r>
+              <a:rPr lang="en-US" dirty="0" smtClean="0"/>
+              <a:t>Write </a:t>
+            </a:r>
+            <a:r>
+              <a:rPr lang="en-US" dirty="0" err="1" smtClean="0"/>
+              <a:t>numpy</a:t>
+            </a:r>
+            <a:r>
+              <a:rPr lang="en-US" dirty="0" smtClean="0"/>
+              <a:t> array data</a:t>
+            </a:r>
+          </a:p>
+          <a:p>
+            <a:endParaRPr lang="en-US" dirty="0"/>
+          </a:p>
+          <a:p>
+            <a:r>
+              <a:rPr lang="en-US" dirty="0" smtClean="0"/>
+              <a:t>Flush cache</a:t>
             </a:r>
             <a:endParaRPr lang="en-US" dirty="0"/>
           </a:p>
@@ -9947,10 +9987,10 @@
         </p:nvGrpSpPr>
         <p:grpSpPr>
           <a:xfrm>
-            <a:off x="3739686" y="2927097"/>
-            <a:ext cx="1938723" cy="595573"/>
-            <a:chOff x="3618970" y="2839331"/>
-            <a:chExt cx="1938723" cy="595573"/>
+            <a:off x="1667302" y="2838134"/>
+            <a:ext cx="2229093" cy="376995"/>
+            <a:chOff x="1546586" y="2750368"/>
+            <a:chExt cx="2229093" cy="376995"/>
           </a:xfrm>
         </p:grpSpPr>
         <p:sp>
@@ -10007,7 +10047,7 @@
           </p:nvSpPr>
           <p:spPr>
             <a:xfrm>
-              <a:off x="4272533" y="3129671"/>
+              <a:off x="1546586" y="2750368"/>
               <a:ext cx="1285160" cy="305233"/>
             </a:xfrm>
             <a:prstGeom prst="rect">
@@ -10056,15 +10096,15 @@
           <p:nvCxnSpPr>
             <p:cNvPr id="9" name="Straight Arrow Connector 8"/>
             <p:cNvCxnSpPr>
-              <a:stCxn id="8" idx="1"/>
-              <a:endCxn id="7" idx="3"/>
+              <a:stCxn id="8" idx="3"/>
+              <a:endCxn id="7" idx="1"/>
             </p:cNvCxnSpPr>
             <p:nvPr/>
           </p:nvCxnSpPr>
           <p:spPr>
-            <a:xfrm flipH="1" flipV="1">
-              <a:off x="3775679" y="2983347"/>
-              <a:ext cx="496854" cy="298941"/>
+            <a:xfrm>
+              <a:off x="2831746" y="2947466"/>
+              <a:ext cx="787224" cy="35881"/>
             </a:xfrm>
             <a:prstGeom prst="straightConnector1">
               <a:avLst/>
@@ -10072,6 +10112,413 @@
             <a:ln w="19050">
               <a:solidFill>
                 <a:srgbClr val="C00000"/>
+              </a:solidFill>
+              <a:tailEnd type="stealth" w="lg" len="lg"/>
+            </a:ln>
+          </p:spPr>
+          <p:style>
+            <a:lnRef idx="1">
+              <a:schemeClr val="accent1"/>
+            </a:lnRef>
+            <a:fillRef idx="0">
+              <a:schemeClr val="accent1"/>
+            </a:fillRef>
+            <a:effectRef idx="0">
+              <a:schemeClr val="accent1"/>
+            </a:effectRef>
+            <a:fontRef idx="minor">
+              <a:schemeClr val="tx1"/>
+            </a:fontRef>
+          </p:style>
+        </p:cxnSp>
+      </p:grpSp>
+      <p:sp>
+        <p:nvSpPr>
+          <p:cNvPr id="12" name="TextBox 11"/>
+          <p:cNvSpPr txBox="1"/>
+          <p:nvPr/>
+        </p:nvSpPr>
+        <p:spPr>
+          <a:xfrm>
+            <a:off x="534837" y="3699167"/>
+            <a:ext cx="8376249" cy="646331"/>
+          </a:xfrm>
+          <a:prstGeom prst="rect">
+            <a:avLst/>
+          </a:prstGeom>
+          <a:solidFill>
+            <a:schemeClr val="accent4">
+              <a:lumMod val="40000"/>
+              <a:lumOff val="60000"/>
+            </a:schemeClr>
+          </a:solidFill>
+        </p:spPr>
+        <p:txBody>
+          <a:bodyPr wrap="square" rtlCol="0">
+            <a:spAutoFit/>
+          </a:bodyPr>
+          <a:lstStyle/>
+          <a:p>
+            <a:r>
+              <a:rPr lang="en-US" dirty="0" err="1" smtClean="0">
+                <a:latin typeface="Courier New" pitchFamily="49" charset="0"/>
+                <a:cs typeface="Courier New" pitchFamily="49" charset="0"/>
+              </a:rPr>
+              <a:t>new_data.SetProjection</a:t>
+            </a:r>
+            <a:r>
+              <a:rPr lang="en-US" dirty="0" smtClean="0">
+                <a:latin typeface="Courier New" pitchFamily="49" charset="0"/>
+                <a:cs typeface="Courier New" pitchFamily="49" charset="0"/>
+              </a:rPr>
+              <a:t>(</a:t>
+            </a:r>
+            <a:r>
+              <a:rPr lang="en-US" dirty="0" err="1" smtClean="0">
+                <a:latin typeface="Courier New" pitchFamily="49" charset="0"/>
+                <a:cs typeface="Courier New" pitchFamily="49" charset="0"/>
+              </a:rPr>
+              <a:t>data.GetProjection</a:t>
+            </a:r>
+            <a:r>
+              <a:rPr lang="en-US" dirty="0" smtClean="0">
+                <a:latin typeface="Courier New" pitchFamily="49" charset="0"/>
+                <a:cs typeface="Courier New" pitchFamily="49" charset="0"/>
+              </a:rPr>
+              <a:t>())</a:t>
+            </a:r>
+          </a:p>
+          <a:p>
+            <a:r>
+              <a:rPr lang="en-US" dirty="0" err="1" smtClean="0">
+                <a:latin typeface="Courier New" pitchFamily="49" charset="0"/>
+                <a:cs typeface="Courier New" pitchFamily="49" charset="0"/>
+              </a:rPr>
+              <a:t>new_data.SetGeoTransform</a:t>
+            </a:r>
+            <a:r>
+              <a:rPr lang="en-US" dirty="0" smtClean="0">
+                <a:latin typeface="Courier New" pitchFamily="49" charset="0"/>
+                <a:cs typeface="Courier New" pitchFamily="49" charset="0"/>
+              </a:rPr>
+              <a:t>(</a:t>
+            </a:r>
+            <a:r>
+              <a:rPr lang="en-US" dirty="0" err="1" smtClean="0">
+                <a:latin typeface="Courier New" pitchFamily="49" charset="0"/>
+                <a:cs typeface="Courier New" pitchFamily="49" charset="0"/>
+              </a:rPr>
+              <a:t>data.GetGeoTransform</a:t>
+            </a:r>
+            <a:r>
+              <a:rPr lang="en-US" dirty="0" smtClean="0">
+                <a:latin typeface="Courier New" pitchFamily="49" charset="0"/>
+                <a:cs typeface="Courier New" pitchFamily="49" charset="0"/>
+              </a:rPr>
+              <a:t>())</a:t>
+            </a:r>
+            <a:endParaRPr lang="en-US" dirty="0" smtClean="0">
+              <a:latin typeface="Courier New" pitchFamily="49" charset="0"/>
+              <a:cs typeface="Courier New" pitchFamily="49" charset="0"/>
+            </a:endParaRPr>
+          </a:p>
+        </p:txBody>
+      </p:sp>
+      <p:sp>
+        <p:nvSpPr>
+          <p:cNvPr id="13" name="TextBox 12"/>
+          <p:cNvSpPr txBox="1"/>
+          <p:nvPr/>
+        </p:nvSpPr>
+        <p:spPr>
+          <a:xfrm>
+            <a:off x="534836" y="4765807"/>
+            <a:ext cx="8376249" cy="369332"/>
+          </a:xfrm>
+          <a:prstGeom prst="rect">
+            <a:avLst/>
+          </a:prstGeom>
+          <a:solidFill>
+            <a:schemeClr val="accent4">
+              <a:lumMod val="40000"/>
+              <a:lumOff val="60000"/>
+            </a:schemeClr>
+          </a:solidFill>
+        </p:spPr>
+        <p:txBody>
+          <a:bodyPr wrap="square" rtlCol="0">
+            <a:spAutoFit/>
+          </a:bodyPr>
+          <a:lstStyle/>
+          <a:p>
+            <a:r>
+              <a:rPr lang="en-US" dirty="0" err="1" smtClean="0">
+                <a:latin typeface="Courier New" pitchFamily="49" charset="0"/>
+                <a:cs typeface="Courier New" pitchFamily="49" charset="0"/>
+              </a:rPr>
+              <a:t>new_data.GetRasterBand</a:t>
+            </a:r>
+            <a:r>
+              <a:rPr lang="en-US" dirty="0" smtClean="0">
+                <a:latin typeface="Courier New" pitchFamily="49" charset="0"/>
+                <a:cs typeface="Courier New" pitchFamily="49" charset="0"/>
+              </a:rPr>
+              <a:t>(1).</a:t>
+            </a:r>
+            <a:r>
+              <a:rPr lang="en-US" dirty="0" err="1" smtClean="0">
+                <a:latin typeface="Courier New" pitchFamily="49" charset="0"/>
+                <a:cs typeface="Courier New" pitchFamily="49" charset="0"/>
+              </a:rPr>
+              <a:t>WriteArray</a:t>
+            </a:r>
+            <a:r>
+              <a:rPr lang="en-US" dirty="0" smtClean="0">
+                <a:latin typeface="Courier New" pitchFamily="49" charset="0"/>
+                <a:cs typeface="Courier New" pitchFamily="49" charset="0"/>
+              </a:rPr>
+              <a:t>(</a:t>
+            </a:r>
+            <a:r>
+              <a:rPr lang="en-US" dirty="0" err="1" smtClean="0">
+                <a:latin typeface="Courier New" pitchFamily="49" charset="0"/>
+                <a:cs typeface="Courier New" pitchFamily="49" charset="0"/>
+              </a:rPr>
+              <a:t>new_raster_band</a:t>
+            </a:r>
+            <a:r>
+              <a:rPr lang="en-US" dirty="0" smtClean="0">
+                <a:latin typeface="Courier New" pitchFamily="49" charset="0"/>
+                <a:cs typeface="Courier New" pitchFamily="49" charset="0"/>
+              </a:rPr>
+              <a:t>)</a:t>
+            </a:r>
+          </a:p>
+        </p:txBody>
+      </p:sp>
+      <p:sp>
+        <p:nvSpPr>
+          <p:cNvPr id="17" name="TextBox 16"/>
+          <p:cNvSpPr txBox="1"/>
+          <p:nvPr/>
+        </p:nvSpPr>
+        <p:spPr>
+          <a:xfrm>
+            <a:off x="534835" y="5884187"/>
+            <a:ext cx="8376249" cy="369332"/>
+          </a:xfrm>
+          <a:prstGeom prst="rect">
+            <a:avLst/>
+          </a:prstGeom>
+          <a:solidFill>
+            <a:schemeClr val="accent4">
+              <a:lumMod val="40000"/>
+              <a:lumOff val="60000"/>
+            </a:schemeClr>
+          </a:solidFill>
+        </p:spPr>
+        <p:txBody>
+          <a:bodyPr wrap="square" rtlCol="0">
+            <a:spAutoFit/>
+          </a:bodyPr>
+          <a:lstStyle/>
+          <a:p>
+            <a:r>
+              <a:rPr lang="en-US" dirty="0" err="1" smtClean="0">
+                <a:latin typeface="Courier New" pitchFamily="49" charset="0"/>
+                <a:cs typeface="Courier New" pitchFamily="49" charset="0"/>
+              </a:rPr>
+              <a:t>new_data.GetRasterBand</a:t>
+            </a:r>
+            <a:r>
+              <a:rPr lang="en-US" dirty="0" smtClean="0">
+                <a:latin typeface="Courier New" pitchFamily="49" charset="0"/>
+                <a:cs typeface="Courier New" pitchFamily="49" charset="0"/>
+              </a:rPr>
+              <a:t>(1).</a:t>
+            </a:r>
+            <a:r>
+              <a:rPr lang="en-US" dirty="0" err="1" smtClean="0">
+                <a:latin typeface="Courier New" pitchFamily="49" charset="0"/>
+                <a:cs typeface="Courier New" pitchFamily="49" charset="0"/>
+              </a:rPr>
+              <a:t>WriteArray</a:t>
+            </a:r>
+            <a:r>
+              <a:rPr lang="en-US" dirty="0" smtClean="0">
+                <a:latin typeface="Courier New" pitchFamily="49" charset="0"/>
+                <a:cs typeface="Courier New" pitchFamily="49" charset="0"/>
+              </a:rPr>
+              <a:t>(</a:t>
+            </a:r>
+            <a:r>
+              <a:rPr lang="en-US" dirty="0" err="1" smtClean="0">
+                <a:latin typeface="Courier New" pitchFamily="49" charset="0"/>
+                <a:cs typeface="Courier New" pitchFamily="49" charset="0"/>
+              </a:rPr>
+              <a:t>new_raster_band</a:t>
+            </a:r>
+            <a:r>
+              <a:rPr lang="en-US" dirty="0" smtClean="0">
+                <a:latin typeface="Courier New" pitchFamily="49" charset="0"/>
+                <a:cs typeface="Courier New" pitchFamily="49" charset="0"/>
+              </a:rPr>
+              <a:t>)</a:t>
+            </a:r>
+          </a:p>
+        </p:txBody>
+      </p:sp>
+      <p:grpSp>
+        <p:nvGrpSpPr>
+          <p:cNvPr id="19" name="Group 18"/>
+          <p:cNvGrpSpPr/>
+          <p:nvPr/>
+        </p:nvGrpSpPr>
+        <p:grpSpPr>
+          <a:xfrm>
+            <a:off x="4830793" y="2938003"/>
+            <a:ext cx="4080291" cy="1056440"/>
+            <a:chOff x="4710074" y="3095001"/>
+            <a:chExt cx="4080291" cy="1056440"/>
+          </a:xfrm>
+        </p:grpSpPr>
+        <p:sp>
+          <p:nvSpPr>
+            <p:cNvPr id="20" name="Rectangle 19"/>
+            <p:cNvSpPr/>
+            <p:nvPr/>
+          </p:nvSpPr>
+          <p:spPr>
+            <a:xfrm>
+              <a:off x="4710074" y="3095001"/>
+              <a:ext cx="1167114" cy="288032"/>
+            </a:xfrm>
+            <a:prstGeom prst="rect">
+              <a:avLst/>
+            </a:prstGeom>
+            <a:noFill/>
+            <a:ln>
+              <a:solidFill>
+                <a:srgbClr val="0070C0"/>
+              </a:solidFill>
+            </a:ln>
+          </p:spPr>
+          <p:style>
+            <a:lnRef idx="2">
+              <a:schemeClr val="accent1">
+                <a:shade val="50000"/>
+              </a:schemeClr>
+            </a:lnRef>
+            <a:fillRef idx="1">
+              <a:schemeClr val="accent1"/>
+            </a:fillRef>
+            <a:effectRef idx="0">
+              <a:schemeClr val="accent1"/>
+            </a:effectRef>
+            <a:fontRef idx="minor">
+              <a:schemeClr val="lt1"/>
+            </a:fontRef>
+          </p:style>
+          <p:txBody>
+            <a:bodyPr rtlCol="0" anchor="ctr"/>
+            <a:lstStyle/>
+            <a:p>
+              <a:pPr algn="ctr"/>
+              <a:endParaRPr lang="nl-BE"/>
+            </a:p>
+          </p:txBody>
+        </p:sp>
+        <p:sp>
+          <p:nvSpPr>
+            <p:cNvPr id="21" name="TextBox 20"/>
+            <p:cNvSpPr txBox="1"/>
+            <p:nvPr/>
+          </p:nvSpPr>
+          <p:spPr>
+            <a:xfrm>
+              <a:off x="7017316" y="3228111"/>
+              <a:ext cx="1773049" cy="923330"/>
+            </a:xfrm>
+            <a:prstGeom prst="rect">
+              <a:avLst/>
+            </a:prstGeom>
+            <a:solidFill>
+              <a:schemeClr val="bg1"/>
+            </a:solidFill>
+            <a:ln>
+              <a:solidFill>
+                <a:srgbClr val="0070C0"/>
+              </a:solidFill>
+            </a:ln>
+          </p:spPr>
+          <p:txBody>
+            <a:bodyPr wrap="none" rtlCol="0">
+              <a:spAutoFit/>
+            </a:bodyPr>
+            <a:lstStyle/>
+            <a:p>
+              <a:r>
+                <a:rPr lang="en-US" dirty="0" smtClean="0">
+                  <a:solidFill>
+                    <a:srgbClr val="0070C0"/>
+                  </a:solidFill>
+                </a:rPr>
+                <a:t>many types, e.g.,</a:t>
+              </a:r>
+            </a:p>
+            <a:p>
+              <a:r>
+                <a:rPr lang="en-US" dirty="0" smtClean="0">
+                  <a:solidFill>
+                    <a:srgbClr val="0070C0"/>
+                  </a:solidFill>
+                  <a:latin typeface="Courier New" panose="02070309020205020404" pitchFamily="49" charset="0"/>
+                  <a:cs typeface="Courier New" panose="02070309020205020404" pitchFamily="49" charset="0"/>
+                </a:rPr>
+                <a:t>GDT_Float32</a:t>
+              </a:r>
+            </a:p>
+            <a:p>
+              <a:r>
+                <a:rPr lang="en-US" dirty="0" smtClean="0">
+                  <a:solidFill>
+                    <a:srgbClr val="0070C0"/>
+                  </a:solidFill>
+                  <a:latin typeface="Courier New" panose="02070309020205020404" pitchFamily="49" charset="0"/>
+                  <a:cs typeface="Courier New" panose="02070309020205020404" pitchFamily="49" charset="0"/>
+                </a:rPr>
+                <a:t>GDT_Int16</a:t>
+              </a:r>
+              <a:endParaRPr lang="nl-BE" dirty="0">
+                <a:solidFill>
+                  <a:srgbClr val="0070C0"/>
+                </a:solidFill>
+                <a:latin typeface="Courier New" panose="02070309020205020404" pitchFamily="49" charset="0"/>
+                <a:cs typeface="Courier New" panose="02070309020205020404" pitchFamily="49" charset="0"/>
+              </a:endParaRPr>
+            </a:p>
+          </p:txBody>
+        </p:sp>
+        <p:cxnSp>
+          <p:nvCxnSpPr>
+            <p:cNvPr id="22" name="Straight Arrow Connector 21"/>
+            <p:cNvCxnSpPr>
+              <a:stCxn id="21" idx="1"/>
+              <a:endCxn id="20" idx="3"/>
+            </p:cNvCxnSpPr>
+            <p:nvPr/>
+          </p:nvCxnSpPr>
+          <p:spPr>
+            <a:xfrm flipH="1" flipV="1">
+              <a:off x="5877188" y="3239017"/>
+              <a:ext cx="1140128" cy="450759"/>
+            </a:xfrm>
+            <a:prstGeom prst="straightConnector1">
+              <a:avLst/>
+            </a:prstGeom>
+            <a:ln w="19050">
+              <a:solidFill>
+                <a:srgbClr val="0070C0"/>
               </a:solidFill>
               <a:tailEnd type="stealth" w="lg" len="lg"/>
             </a:ln>
@@ -10139,6 +10586,37 @@
                                           </p:stCondLst>
                                         </p:cTn>
                                         <p:tgtEl>
+                                          <p:spTgt spid="3">
+                                            <p:txEl>
+                                              <p:pRg st="0" end="0"/>
+                                            </p:txEl>
+                                          </p:spTgt>
+                                        </p:tgtEl>
+                                        <p:attrNameLst>
+                                          <p:attrName>style.visibility</p:attrName>
+                                        </p:attrNameLst>
+                                      </p:cBhvr>
+                                      <p:to>
+                                        <p:strVal val="visible"/>
+                                      </p:to>
+                                    </p:set>
+                                  </p:childTnLst>
+                                </p:cTn>
+                              </p:par>
+                              <p:par>
+                                <p:cTn id="7" presetID="1" presetClass="entr" presetSubtype="0" fill="hold" grpId="0" nodeType="withEffect">
+                                  <p:stCondLst>
+                                    <p:cond delay="0"/>
+                                  </p:stCondLst>
+                                  <p:childTnLst>
+                                    <p:set>
+                                      <p:cBhvr>
+                                        <p:cTn id="8" dur="1" fill="hold">
+                                          <p:stCondLst>
+                                            <p:cond delay="0"/>
+                                          </p:stCondLst>
+                                        </p:cTn>
+                                        <p:tgtEl>
                                           <p:spTgt spid="5"/>
                                         </p:tgtEl>
                                         <p:attrNameLst>
@@ -10159,32 +10637,305 @@
                     </p:cTn>
                   </p:par>
                   <p:par>
-                    <p:cTn id="7" fill="hold">
+                    <p:cTn id="9" fill="hold">
                       <p:stCondLst>
                         <p:cond delay="indefinite"/>
                       </p:stCondLst>
                       <p:childTnLst>
                         <p:par>
-                          <p:cTn id="8" fill="hold">
+                          <p:cTn id="10" fill="hold">
                             <p:stCondLst>
                               <p:cond delay="0"/>
                             </p:stCondLst>
                             <p:childTnLst>
                               <p:par>
-                                <p:cTn id="9" presetID="1" presetClass="entr" presetSubtype="0" fill="hold" nodeType="clickEffect">
+                                <p:cTn id="11" presetID="1" presetClass="entr" presetSubtype="0" fill="hold" nodeType="clickEffect">
                                   <p:stCondLst>
                                     <p:cond delay="0"/>
                                   </p:stCondLst>
                                   <p:childTnLst>
                                     <p:set>
                                       <p:cBhvr>
-                                        <p:cTn id="10" dur="1" fill="hold">
+                                        <p:cTn id="12" dur="1" fill="hold">
                                           <p:stCondLst>
                                             <p:cond delay="0"/>
                                           </p:stCondLst>
                                         </p:cTn>
                                         <p:tgtEl>
                                           <p:spTgt spid="6"/>
+                                        </p:tgtEl>
+                                        <p:attrNameLst>
+                                          <p:attrName>style.visibility</p:attrName>
+                                        </p:attrNameLst>
+                                      </p:cBhvr>
+                                      <p:to>
+                                        <p:strVal val="visible"/>
+                                      </p:to>
+                                    </p:set>
+                                  </p:childTnLst>
+                                </p:cTn>
+                              </p:par>
+                            </p:childTnLst>
+                          </p:cTn>
+                        </p:par>
+                      </p:childTnLst>
+                    </p:cTn>
+                  </p:par>
+                  <p:par>
+                    <p:cTn id="13" fill="hold">
+                      <p:stCondLst>
+                        <p:cond delay="indefinite"/>
+                      </p:stCondLst>
+                      <p:childTnLst>
+                        <p:par>
+                          <p:cTn id="14" fill="hold">
+                            <p:stCondLst>
+                              <p:cond delay="0"/>
+                            </p:stCondLst>
+                            <p:childTnLst>
+                              <p:par>
+                                <p:cTn id="15" presetID="1" presetClass="entr" presetSubtype="0" fill="hold" nodeType="clickEffect">
+                                  <p:stCondLst>
+                                    <p:cond delay="0"/>
+                                  </p:stCondLst>
+                                  <p:childTnLst>
+                                    <p:set>
+                                      <p:cBhvr>
+                                        <p:cTn id="16" dur="1" fill="hold">
+                                          <p:stCondLst>
+                                            <p:cond delay="0"/>
+                                          </p:stCondLst>
+                                        </p:cTn>
+                                        <p:tgtEl>
+                                          <p:spTgt spid="19"/>
+                                        </p:tgtEl>
+                                        <p:attrNameLst>
+                                          <p:attrName>style.visibility</p:attrName>
+                                        </p:attrNameLst>
+                                      </p:cBhvr>
+                                      <p:to>
+                                        <p:strVal val="visible"/>
+                                      </p:to>
+                                    </p:set>
+                                  </p:childTnLst>
+                                </p:cTn>
+                              </p:par>
+                            </p:childTnLst>
+                          </p:cTn>
+                        </p:par>
+                      </p:childTnLst>
+                    </p:cTn>
+                  </p:par>
+                  <p:par>
+                    <p:cTn id="17" fill="hold">
+                      <p:stCondLst>
+                        <p:cond delay="indefinite"/>
+                      </p:stCondLst>
+                      <p:childTnLst>
+                        <p:par>
+                          <p:cTn id="18" fill="hold">
+                            <p:stCondLst>
+                              <p:cond delay="0"/>
+                            </p:stCondLst>
+                            <p:childTnLst>
+                              <p:par>
+                                <p:cTn id="19" presetID="1" presetClass="entr" presetSubtype="0" fill="hold" grpId="0" nodeType="clickEffect">
+                                  <p:stCondLst>
+                                    <p:cond delay="0"/>
+                                  </p:stCondLst>
+                                  <p:childTnLst>
+                                    <p:set>
+                                      <p:cBhvr>
+                                        <p:cTn id="20" dur="1" fill="hold">
+                                          <p:stCondLst>
+                                            <p:cond delay="0"/>
+                                          </p:stCondLst>
+                                        </p:cTn>
+                                        <p:tgtEl>
+                                          <p:spTgt spid="3">
+                                            <p:txEl>
+                                              <p:pRg st="3" end="3"/>
+                                            </p:txEl>
+                                          </p:spTgt>
+                                        </p:tgtEl>
+                                        <p:attrNameLst>
+                                          <p:attrName>style.visibility</p:attrName>
+                                        </p:attrNameLst>
+                                      </p:cBhvr>
+                                      <p:to>
+                                        <p:strVal val="visible"/>
+                                      </p:to>
+                                    </p:set>
+                                  </p:childTnLst>
+                                </p:cTn>
+                              </p:par>
+                              <p:par>
+                                <p:cTn id="21" presetID="1" presetClass="entr" presetSubtype="0" fill="hold" grpId="0" nodeType="withEffect">
+                                  <p:stCondLst>
+                                    <p:cond delay="0"/>
+                                  </p:stCondLst>
+                                  <p:childTnLst>
+                                    <p:set>
+                                      <p:cBhvr>
+                                        <p:cTn id="22" dur="1" fill="hold">
+                                          <p:stCondLst>
+                                            <p:cond delay="0"/>
+                                          </p:stCondLst>
+                                        </p:cTn>
+                                        <p:tgtEl>
+                                          <p:spTgt spid="12"/>
+                                        </p:tgtEl>
+                                        <p:attrNameLst>
+                                          <p:attrName>style.visibility</p:attrName>
+                                        </p:attrNameLst>
+                                      </p:cBhvr>
+                                      <p:to>
+                                        <p:strVal val="visible"/>
+                                      </p:to>
+                                    </p:set>
+                                  </p:childTnLst>
+                                </p:cTn>
+                              </p:par>
+                            </p:childTnLst>
+                          </p:cTn>
+                        </p:par>
+                      </p:childTnLst>
+                    </p:cTn>
+                  </p:par>
+                  <p:par>
+                    <p:cTn id="23" fill="hold">
+                      <p:stCondLst>
+                        <p:cond delay="indefinite"/>
+                      </p:stCondLst>
+                      <p:childTnLst>
+                        <p:par>
+                          <p:cTn id="24" fill="hold">
+                            <p:stCondLst>
+                              <p:cond delay="0"/>
+                            </p:stCondLst>
+                            <p:childTnLst>
+                              <p:par>
+                                <p:cTn id="25" presetID="1" presetClass="entr" presetSubtype="0" fill="hold" grpId="0" nodeType="clickEffect">
+                                  <p:stCondLst>
+                                    <p:cond delay="0"/>
+                                  </p:stCondLst>
+                                  <p:childTnLst>
+                                    <p:set>
+                                      <p:cBhvr>
+                                        <p:cTn id="26" dur="1" fill="hold">
+                                          <p:stCondLst>
+                                            <p:cond delay="0"/>
+                                          </p:stCondLst>
+                                        </p:cTn>
+                                        <p:tgtEl>
+                                          <p:spTgt spid="3">
+                                            <p:txEl>
+                                              <p:pRg st="5" end="5"/>
+                                            </p:txEl>
+                                          </p:spTgt>
+                                        </p:tgtEl>
+                                        <p:attrNameLst>
+                                          <p:attrName>style.visibility</p:attrName>
+                                        </p:attrNameLst>
+                                      </p:cBhvr>
+                                      <p:to>
+                                        <p:strVal val="visible"/>
+                                      </p:to>
+                                    </p:set>
+                                  </p:childTnLst>
+                                </p:cTn>
+                              </p:par>
+                              <p:par>
+                                <p:cTn id="27" presetID="1" presetClass="entr" presetSubtype="0" fill="hold" grpId="0" nodeType="withEffect">
+                                  <p:stCondLst>
+                                    <p:cond delay="0"/>
+                                  </p:stCondLst>
+                                  <p:childTnLst>
+                                    <p:set>
+                                      <p:cBhvr>
+                                        <p:cTn id="28" dur="1" fill="hold">
+                                          <p:stCondLst>
+                                            <p:cond delay="0"/>
+                                          </p:stCondLst>
+                                        </p:cTn>
+                                        <p:tgtEl>
+                                          <p:spTgt spid="13"/>
+                                        </p:tgtEl>
+                                        <p:attrNameLst>
+                                          <p:attrName>style.visibility</p:attrName>
+                                        </p:attrNameLst>
+                                      </p:cBhvr>
+                                      <p:to>
+                                        <p:strVal val="visible"/>
+                                      </p:to>
+                                    </p:set>
+                                  </p:childTnLst>
+                                </p:cTn>
+                              </p:par>
+                            </p:childTnLst>
+                          </p:cTn>
+                        </p:par>
+                      </p:childTnLst>
+                    </p:cTn>
+                  </p:par>
+                  <p:par>
+                    <p:cTn id="29" fill="hold">
+                      <p:stCondLst>
+                        <p:cond delay="indefinite"/>
+                      </p:stCondLst>
+                      <p:childTnLst>
+                        <p:par>
+                          <p:cTn id="30" fill="hold">
+                            <p:stCondLst>
+                              <p:cond delay="0"/>
+                            </p:stCondLst>
+                            <p:childTnLst>
+                              <p:par>
+                                <p:cTn id="31" presetID="1" presetClass="entr" presetSubtype="0" fill="hold" grpId="0" nodeType="clickEffect">
+                                  <p:stCondLst>
+                                    <p:cond delay="0"/>
+                                  </p:stCondLst>
+                                  <p:childTnLst>
+                                    <p:set>
+                                      <p:cBhvr>
+                                        <p:cTn id="32" dur="1" fill="hold">
+                                          <p:stCondLst>
+                                            <p:cond delay="0"/>
+                                          </p:stCondLst>
+                                        </p:cTn>
+                                        <p:tgtEl>
+                                          <p:spTgt spid="3">
+                                            <p:txEl>
+                                              <p:pRg st="7" end="7"/>
+                                            </p:txEl>
+                                          </p:spTgt>
+                                        </p:tgtEl>
+                                        <p:attrNameLst>
+                                          <p:attrName>style.visibility</p:attrName>
+                                        </p:attrNameLst>
+                                      </p:cBhvr>
+                                      <p:to>
+                                        <p:strVal val="visible"/>
+                                      </p:to>
+                                    </p:set>
+                                  </p:childTnLst>
+                                </p:cTn>
+                              </p:par>
+                              <p:par>
+                                <p:cTn id="33" presetID="1" presetClass="entr" presetSubtype="0" fill="hold" grpId="0" nodeType="withEffect">
+                                  <p:stCondLst>
+                                    <p:cond delay="0"/>
+                                  </p:stCondLst>
+                                  <p:childTnLst>
+                                    <p:set>
+                                      <p:cBhvr>
+                                        <p:cTn id="34" dur="1" fill="hold">
+                                          <p:stCondLst>
+                                            <p:cond delay="0"/>
+                                          </p:stCondLst>
+                                        </p:cTn>
+                                        <p:tgtEl>
+                                          <p:spTgt spid="17"/>
                                         </p:tgtEl>
                                         <p:attrNameLst>
                                           <p:attrName>style.visibility</p:attrName>
@@ -10225,7 +10976,11 @@
       </p:par>
     </p:tnLst>
     <p:bldLst>
+      <p:bldP spid="3" grpId="0" uiExpand="1" build="p"/>
       <p:bldP spid="5" grpId="0" animBg="1"/>
+      <p:bldP spid="12" grpId="0" animBg="1"/>
+      <p:bldP spid="13" grpId="0" animBg="1"/>
+      <p:bldP spid="17" grpId="0" animBg="1"/>
     </p:bldLst>
   </p:timing>
 </p:sld>

</xml_diff>

<commit_message>
Add slide on GeoTIFF transform
</commit_message>
<xml_diff>
--- a/Python/python_gis.pptx
+++ b/Python/python_gis.pptx
@@ -9084,16 +9084,39 @@
                 <a:latin typeface="Courier New" pitchFamily="49" charset="0"/>
                 <a:cs typeface="Courier New" pitchFamily="49" charset="0"/>
               </a:rPr>
-              <a:t>= gdf.cx[0:10, 50:55</a:t>
-            </a:r>
-            <a:r>
-              <a:rPr lang="en-US" dirty="0" smtClean="0">
+              <a:t>= gdf.</a:t>
+            </a:r>
+            <a:r>
+              <a:rPr lang="en-US" b="1" dirty="0">
+                <a:solidFill>
+                  <a:srgbClr val="C00000"/>
+                </a:solidFill>
                 <a:latin typeface="Courier New" pitchFamily="49" charset="0"/>
                 <a:cs typeface="Courier New" pitchFamily="49" charset="0"/>
               </a:rPr>
+              <a:t>cx[</a:t>
+            </a:r>
+            <a:r>
+              <a:rPr lang="en-US" dirty="0">
+                <a:latin typeface="Courier New" pitchFamily="49" charset="0"/>
+                <a:cs typeface="Courier New" pitchFamily="49" charset="0"/>
+              </a:rPr>
+              <a:t>0:10, 50:55</a:t>
+            </a:r>
+            <a:r>
+              <a:rPr lang="en-US" b="1" dirty="0" smtClean="0">
+                <a:solidFill>
+                  <a:srgbClr val="C00000"/>
+                </a:solidFill>
+                <a:latin typeface="Courier New" pitchFamily="49" charset="0"/>
+                <a:cs typeface="Courier New" pitchFamily="49" charset="0"/>
+              </a:rPr>
               <a:t>]</a:t>
             </a:r>
-            <a:endParaRPr lang="en-US" dirty="0" smtClean="0">
+            <a:endParaRPr lang="en-US" b="1" dirty="0" smtClean="0">
+              <a:solidFill>
+                <a:srgbClr val="C00000"/>
+              </a:solidFill>
               <a:latin typeface="Courier New" pitchFamily="49" charset="0"/>
               <a:cs typeface="Courier New" pitchFamily="49" charset="0"/>
             </a:endParaRPr>
@@ -9372,10 +9395,23 @@
                   <a:latin typeface="Courier New" pitchFamily="49" charset="0"/>
                   <a:cs typeface="Courier New" pitchFamily="49" charset="0"/>
                 </a:rPr>
-                <a:t>western_Europe.plot</a:t>
+                <a:t>western_Europe</a:t>
               </a:r>
               <a:r>
-                <a:rPr lang="en-US" dirty="0" smtClean="0">
+                <a:rPr lang="en-US" b="1" dirty="0" err="1" smtClean="0">
+                  <a:solidFill>
+                    <a:srgbClr val="C00000"/>
+                  </a:solidFill>
+                  <a:latin typeface="Courier New" pitchFamily="49" charset="0"/>
+                  <a:cs typeface="Courier New" pitchFamily="49" charset="0"/>
+                </a:rPr>
+                <a:t>.plot</a:t>
+              </a:r>
+              <a:r>
+                <a:rPr lang="en-US" b="1" dirty="0" smtClean="0">
+                  <a:solidFill>
+                    <a:srgbClr val="C00000"/>
+                  </a:solidFill>
                   <a:latin typeface="Courier New" pitchFamily="49" charset="0"/>
                   <a:cs typeface="Courier New" pitchFamily="49" charset="0"/>
                 </a:rPr>
@@ -10525,7 +10561,24 @@
                 <a:latin typeface="Courier New" pitchFamily="49" charset="0"/>
                 <a:cs typeface="Courier New" pitchFamily="49" charset="0"/>
               </a:rPr>
-              <a:t>                           how='intersection)</a:t>
+              <a:t>                           </a:t>
+            </a:r>
+            <a:r>
+              <a:rPr lang="en-US" b="1" dirty="0" smtClean="0">
+                <a:solidFill>
+                  <a:srgbClr val="C00000"/>
+                </a:solidFill>
+                <a:latin typeface="Courier New" pitchFamily="49" charset="0"/>
+                <a:cs typeface="Courier New" pitchFamily="49" charset="0"/>
+              </a:rPr>
+              <a:t>how='intersection'</a:t>
+            </a:r>
+            <a:r>
+              <a:rPr lang="en-US" dirty="0" smtClean="0">
+                <a:latin typeface="Courier New" pitchFamily="49" charset="0"/>
+                <a:cs typeface="Courier New" pitchFamily="49" charset="0"/>
+              </a:rPr>
+              <a:t>)</a:t>
             </a:r>
             <a:endParaRPr lang="en-US" dirty="0" smtClean="0">
               <a:latin typeface="Courier New" pitchFamily="49" charset="0"/>
@@ -14420,7 +14473,7 @@
           <p:nvPr>
             <p:extLst>
               <p:ext uri="{D42A27DB-BD31-4B8C-83A1-F6EECF244321}">
-                <p14:modId xmlns:p14="http://schemas.microsoft.com/office/powerpoint/2010/main" val="2720657124"/>
+                <p14:modId xmlns:p14="http://schemas.microsoft.com/office/powerpoint/2010/main" val="1514278658"/>
               </p:ext>
             </p:extLst>
           </p:nvPr>
@@ -14433,7 +14486,7 @@
           <a:graphicData uri="http://schemas.openxmlformats.org/presentationml/2006/ole">
             <mc:AlternateContent xmlns:mc="http://schemas.openxmlformats.org/markup-compatibility/2006">
               <mc:Choice xmlns:v="urn:schemas-microsoft-com:vml" Requires="v">
-                <p:oleObj spid="_x0000_s1033" name="Equation" r:id="rId3" imgW="2082600" imgH="609480" progId="Equation.3">
+                <p:oleObj spid="_x0000_s1036" name="Equation" r:id="rId3" imgW="2082600" imgH="609480" progId="Equation.3">
                   <p:embed/>
                 </p:oleObj>
               </mc:Choice>
@@ -14477,7 +14530,7 @@
           <p:nvPr>
             <p:extLst>
               <p:ext uri="{D42A27DB-BD31-4B8C-83A1-F6EECF244321}">
-                <p14:modId xmlns:p14="http://schemas.microsoft.com/office/powerpoint/2010/main" val="3559136140"/>
+                <p14:modId xmlns:p14="http://schemas.microsoft.com/office/powerpoint/2010/main" val="2690915964"/>
               </p:ext>
             </p:extLst>
           </p:nvPr>
@@ -14490,7 +14543,7 @@
           <a:graphicData uri="http://schemas.openxmlformats.org/presentationml/2006/ole">
             <mc:AlternateContent xmlns:mc="http://schemas.openxmlformats.org/markup-compatibility/2006">
               <mc:Choice xmlns:v="urn:schemas-microsoft-com:vml" Requires="v">
-                <p:oleObj spid="_x0000_s1034" name="Equation" r:id="rId5" imgW="3466800" imgH="634680" progId="Equation.3">
+                <p:oleObj spid="_x0000_s1037" name="Equation" r:id="rId5" imgW="3466800" imgH="634680" progId="Equation.3">
                   <p:embed/>
                 </p:oleObj>
               </mc:Choice>
@@ -14534,7 +14587,7 @@
           <p:nvPr>
             <p:extLst>
               <p:ext uri="{D42A27DB-BD31-4B8C-83A1-F6EECF244321}">
-                <p14:modId xmlns:p14="http://schemas.microsoft.com/office/powerpoint/2010/main" val="2140056479"/>
+                <p14:modId xmlns:p14="http://schemas.microsoft.com/office/powerpoint/2010/main" val="2980594061"/>
               </p:ext>
             </p:extLst>
           </p:nvPr>
@@ -14547,7 +14600,7 @@
           <a:graphicData uri="http://schemas.openxmlformats.org/presentationml/2006/ole">
             <mc:AlternateContent xmlns:mc="http://schemas.openxmlformats.org/markup-compatibility/2006">
               <mc:Choice xmlns:v="urn:schemas-microsoft-com:vml" Requires="v">
-                <p:oleObj spid="_x0000_s1035" name="Equation" r:id="rId7" imgW="2717640" imgH="228600" progId="Equation.3">
+                <p:oleObj spid="_x0000_s1038" name="Equation" r:id="rId7" imgW="2717640" imgH="228600" progId="Equation.3">
                   <p:embed/>
                 </p:oleObj>
               </mc:Choice>

</xml_diff>

<commit_message>
Add GeoPandas merge and dissolve slides
</commit_message>
<xml_diff>
--- a/Python/python_gis.pptx
+++ b/Python/python_gis.pptx
@@ -5,7 +5,7 @@
     <p:sldMasterId id="2147483672" r:id="rId1"/>
   </p:sldMasterIdLst>
   <p:notesMasterIdLst>
-    <p:notesMasterId r:id="rId24"/>
+    <p:notesMasterId r:id="rId26"/>
   </p:notesMasterIdLst>
   <p:sldIdLst>
     <p:sldId id="256" r:id="rId2"/>
@@ -25,11 +25,13 @@
     <p:sldId id="281" r:id="rId16"/>
     <p:sldId id="285" r:id="rId17"/>
     <p:sldId id="282" r:id="rId18"/>
-    <p:sldId id="278" r:id="rId19"/>
-    <p:sldId id="279" r:id="rId20"/>
-    <p:sldId id="280" r:id="rId21"/>
-    <p:sldId id="283" r:id="rId22"/>
-    <p:sldId id="265" r:id="rId23"/>
+    <p:sldId id="286" r:id="rId19"/>
+    <p:sldId id="287" r:id="rId20"/>
+    <p:sldId id="278" r:id="rId21"/>
+    <p:sldId id="279" r:id="rId22"/>
+    <p:sldId id="280" r:id="rId23"/>
+    <p:sldId id="283" r:id="rId24"/>
+    <p:sldId id="265" r:id="rId25"/>
   </p:sldIdLst>
   <p:sldSz cx="9144000" cy="6858000" type="screen4x3"/>
   <p:notesSz cx="6858000" cy="9144000"/>
@@ -10982,7 +10984,11 @@
           <a:p>
             <a:r>
               <a:rPr lang="en-US" dirty="0" err="1" smtClean="0"/>
-              <a:t>GeoTIFF</a:t>
+              <a:t>GeoPandas</a:t>
+            </a:r>
+            <a:r>
+              <a:rPr lang="en-US" dirty="0" smtClean="0"/>
+              <a:t> merge</a:t>
             </a:r>
             <a:endParaRPr lang="en-US" dirty="0"/>
           </a:p>
@@ -11005,49 +11011,11 @@
           <a:p>
             <a:r>
               <a:rPr lang="en-US" dirty="0" smtClean="0"/>
-              <a:t>Raster data, e.g., satellite imagery</a:t>
-            </a:r>
-          </a:p>
-          <a:p>
-            <a:pPr lvl="1"/>
-            <a:r>
-              <a:rPr lang="en-US" dirty="0" smtClean="0"/>
-              <a:t>TIFF image file</a:t>
-            </a:r>
-          </a:p>
-          <a:p>
-            <a:pPr lvl="2"/>
-            <a:r>
-              <a:rPr lang="en-US" dirty="0" smtClean="0"/>
-              <a:t>1 or more raster bands</a:t>
-            </a:r>
-          </a:p>
-          <a:p>
-            <a:pPr lvl="1"/>
-            <a:r>
-              <a:rPr lang="en-US" dirty="0" smtClean="0"/>
-              <a:t>meta-data in tags</a:t>
-            </a:r>
-          </a:p>
-          <a:p>
-            <a:pPr lvl="2"/>
-            <a:r>
-              <a:rPr lang="en-US" dirty="0" smtClean="0"/>
-              <a:t>coordinate reference system</a:t>
-            </a:r>
-          </a:p>
-          <a:p>
-            <a:pPr lvl="2"/>
+              <a:t>Merging </a:t>
+            </a:r>
             <a:r>
               <a:rPr lang="en-US" dirty="0" err="1" smtClean="0"/>
-              <a:t>geotransform</a:t>
-            </a:r>
-            <a:endParaRPr lang="en-US" dirty="0" smtClean="0"/>
-          </a:p>
-          <a:p>
-            <a:r>
-              <a:rPr lang="en-US" dirty="0" smtClean="0"/>
-              <a:t>I/O: GDAL library with Python wrapper</a:t>
+              <a:t>dataframes</a:t>
             </a:r>
             <a:endParaRPr lang="en-US" dirty="0"/>
           </a:p>
@@ -11078,6 +11046,1744 @@
               </a:rPr>
               <a:pPr/>
               <a:t>18</a:t>
+            </a:fld>
+            <a:endParaRPr lang="nl-BE">
+              <a:solidFill>
+                <a:prstClr val="black">
+                  <a:tint val="75000"/>
+                </a:prstClr>
+              </a:solidFill>
+            </a:endParaRPr>
+          </a:p>
+        </p:txBody>
+      </p:sp>
+      <p:sp>
+        <p:nvSpPr>
+          <p:cNvPr id="5" name="TextBox 4"/>
+          <p:cNvSpPr txBox="1"/>
+          <p:nvPr/>
+        </p:nvSpPr>
+        <p:spPr>
+          <a:xfrm>
+            <a:off x="726934" y="2212687"/>
+            <a:ext cx="5649590" cy="1477328"/>
+          </a:xfrm>
+          <a:prstGeom prst="rect">
+            <a:avLst/>
+          </a:prstGeom>
+          <a:solidFill>
+            <a:schemeClr val="accent4">
+              <a:lumMod val="40000"/>
+              <a:lumOff val="60000"/>
+            </a:schemeClr>
+          </a:solidFill>
+        </p:spPr>
+        <p:txBody>
+          <a:bodyPr wrap="square" rtlCol="0">
+            <a:spAutoFit/>
+          </a:bodyPr>
+          <a:lstStyle/>
+          <a:p>
+            <a:r>
+              <a:rPr lang="en-US" dirty="0" err="1" smtClean="0">
+                <a:latin typeface="Courier New" pitchFamily="49" charset="0"/>
+                <a:cs typeface="Courier New" pitchFamily="49" charset="0"/>
+              </a:rPr>
+              <a:t>df</a:t>
+            </a:r>
+            <a:r>
+              <a:rPr lang="en-US" dirty="0" smtClean="0">
+                <a:latin typeface="Courier New" pitchFamily="49" charset="0"/>
+                <a:cs typeface="Courier New" pitchFamily="49" charset="0"/>
+              </a:rPr>
+              <a:t> = </a:t>
+            </a:r>
+            <a:r>
+              <a:rPr lang="en-US" dirty="0" err="1" smtClean="0">
+                <a:latin typeface="Courier New" pitchFamily="49" charset="0"/>
+                <a:cs typeface="Courier New" pitchFamily="49" charset="0"/>
+              </a:rPr>
+              <a:t>pd.read_csv</a:t>
+            </a:r>
+            <a:r>
+              <a:rPr lang="en-US" dirty="0" smtClean="0">
+                <a:latin typeface="Courier New" pitchFamily="49" charset="0"/>
+                <a:cs typeface="Courier New" pitchFamily="49" charset="0"/>
+              </a:rPr>
+              <a:t>(</a:t>
+            </a:r>
+            <a:r>
+              <a:rPr lang="en-US" dirty="0" err="1" smtClean="0">
+                <a:latin typeface="Courier New" pitchFamily="49" charset="0"/>
+                <a:cs typeface="Courier New" pitchFamily="49" charset="0"/>
+              </a:rPr>
+              <a:t>csv_filename</a:t>
+            </a:r>
+            <a:r>
+              <a:rPr lang="en-US" dirty="0" smtClean="0">
+                <a:latin typeface="Courier New" pitchFamily="49" charset="0"/>
+                <a:cs typeface="Courier New" pitchFamily="49" charset="0"/>
+              </a:rPr>
+              <a:t>)</a:t>
+            </a:r>
+          </a:p>
+          <a:p>
+            <a:r>
+              <a:rPr lang="en-US" dirty="0" err="1" smtClean="0">
+                <a:latin typeface="Courier New" pitchFamily="49" charset="0"/>
+                <a:cs typeface="Courier New" pitchFamily="49" charset="0"/>
+              </a:rPr>
+              <a:t>df.rename</a:t>
+            </a:r>
+            <a:r>
+              <a:rPr lang="en-US" dirty="0" smtClean="0">
+                <a:latin typeface="Courier New" pitchFamily="49" charset="0"/>
+                <a:cs typeface="Courier New" pitchFamily="49" charset="0"/>
+              </a:rPr>
+              <a:t>(columns={'Country': 'name'})</a:t>
+            </a:r>
+          </a:p>
+          <a:p>
+            <a:r>
+              <a:rPr lang="en-US" dirty="0" err="1" smtClean="0">
+                <a:latin typeface="Courier New" pitchFamily="49" charset="0"/>
+                <a:cs typeface="Courier New" pitchFamily="49" charset="0"/>
+              </a:rPr>
+              <a:t>df_merged</a:t>
+            </a:r>
+            <a:r>
+              <a:rPr lang="en-US" dirty="0" smtClean="0">
+                <a:latin typeface="Courier New" pitchFamily="49" charset="0"/>
+                <a:cs typeface="Courier New" pitchFamily="49" charset="0"/>
+              </a:rPr>
+              <a:t> = </a:t>
+            </a:r>
+            <a:r>
+              <a:rPr lang="en-US" dirty="0" err="1" smtClean="0">
+                <a:latin typeface="Courier New" pitchFamily="49" charset="0"/>
+                <a:cs typeface="Courier New" pitchFamily="49" charset="0"/>
+              </a:rPr>
+              <a:t>gdf.merge</a:t>
+            </a:r>
+            <a:r>
+              <a:rPr lang="en-US" dirty="0" smtClean="0">
+                <a:latin typeface="Courier New" pitchFamily="49" charset="0"/>
+                <a:cs typeface="Courier New" pitchFamily="49" charset="0"/>
+              </a:rPr>
+              <a:t>(</a:t>
+            </a:r>
+            <a:r>
+              <a:rPr lang="en-US" dirty="0" err="1" smtClean="0">
+                <a:latin typeface="Courier New" pitchFamily="49" charset="0"/>
+                <a:cs typeface="Courier New" pitchFamily="49" charset="0"/>
+              </a:rPr>
+              <a:t>df</a:t>
+            </a:r>
+            <a:r>
+              <a:rPr lang="en-US" dirty="0" smtClean="0">
+                <a:latin typeface="Courier New" pitchFamily="49" charset="0"/>
+                <a:cs typeface="Courier New" pitchFamily="49" charset="0"/>
+              </a:rPr>
+              <a:t>, on='name')</a:t>
+            </a:r>
+          </a:p>
+          <a:p>
+            <a:r>
+              <a:rPr lang="en-US" dirty="0" err="1" smtClean="0">
+                <a:latin typeface="Courier New" pitchFamily="49" charset="0"/>
+                <a:cs typeface="Courier New" pitchFamily="49" charset="0"/>
+              </a:rPr>
+              <a:t>df_merged</a:t>
+            </a:r>
+            <a:r>
+              <a:rPr lang="en-US" dirty="0" err="1" smtClean="0">
+                <a:latin typeface="Courier New" pitchFamily="49" charset="0"/>
+                <a:cs typeface="Courier New" pitchFamily="49" charset="0"/>
+              </a:rPr>
+              <a:t>.plot</a:t>
+            </a:r>
+            <a:r>
+              <a:rPr lang="en-US" dirty="0" smtClean="0">
+                <a:latin typeface="Courier New" pitchFamily="49" charset="0"/>
+                <a:cs typeface="Courier New" pitchFamily="49" charset="0"/>
+              </a:rPr>
+              <a:t>(column</a:t>
+            </a:r>
+            <a:r>
+              <a:rPr lang="en-US" dirty="0">
+                <a:latin typeface="Courier New" pitchFamily="49" charset="0"/>
+                <a:cs typeface="Courier New" pitchFamily="49" charset="0"/>
+              </a:rPr>
+              <a:t>='Happiness Score</a:t>
+            </a:r>
+            <a:r>
+              <a:rPr lang="en-US" dirty="0" smtClean="0">
+                <a:latin typeface="Courier New" pitchFamily="49" charset="0"/>
+                <a:cs typeface="Courier New" pitchFamily="49" charset="0"/>
+              </a:rPr>
+              <a:t>',</a:t>
+            </a:r>
+            <a:br>
+              <a:rPr lang="en-US" dirty="0" smtClean="0">
+                <a:latin typeface="Courier New" pitchFamily="49" charset="0"/>
+                <a:cs typeface="Courier New" pitchFamily="49" charset="0"/>
+              </a:rPr>
+            </a:br>
+            <a:r>
+              <a:rPr lang="en-US" dirty="0" smtClean="0">
+                <a:latin typeface="Courier New" pitchFamily="49" charset="0"/>
+                <a:cs typeface="Courier New" pitchFamily="49" charset="0"/>
+              </a:rPr>
+              <a:t>               </a:t>
+            </a:r>
+            <a:r>
+              <a:rPr lang="en-US" dirty="0" err="1">
+                <a:latin typeface="Courier New" pitchFamily="49" charset="0"/>
+                <a:cs typeface="Courier New" pitchFamily="49" charset="0"/>
+              </a:rPr>
+              <a:t>cmap</a:t>
+            </a:r>
+            <a:r>
+              <a:rPr lang="en-US" dirty="0">
+                <a:latin typeface="Courier New" pitchFamily="49" charset="0"/>
+                <a:cs typeface="Courier New" pitchFamily="49" charset="0"/>
+              </a:rPr>
+              <a:t>='</a:t>
+            </a:r>
+            <a:r>
+              <a:rPr lang="en-US" dirty="0" err="1">
+                <a:latin typeface="Courier New" pitchFamily="49" charset="0"/>
+                <a:cs typeface="Courier New" pitchFamily="49" charset="0"/>
+              </a:rPr>
+              <a:t>OrRd</a:t>
+            </a:r>
+            <a:r>
+              <a:rPr lang="en-US" dirty="0">
+                <a:latin typeface="Courier New" pitchFamily="49" charset="0"/>
+                <a:cs typeface="Courier New" pitchFamily="49" charset="0"/>
+              </a:rPr>
+              <a:t>')</a:t>
+            </a:r>
+            <a:endParaRPr lang="en-US" dirty="0" smtClean="0">
+              <a:latin typeface="Courier New" pitchFamily="49" charset="0"/>
+              <a:cs typeface="Courier New" pitchFamily="49" charset="0"/>
+            </a:endParaRPr>
+          </a:p>
+        </p:txBody>
+      </p:sp>
+      <p:grpSp>
+        <p:nvGrpSpPr>
+          <p:cNvPr id="7" name="Group 6"/>
+          <p:cNvGrpSpPr/>
+          <p:nvPr/>
+        </p:nvGrpSpPr>
+        <p:grpSpPr>
+          <a:xfrm>
+            <a:off x="5538158" y="1752074"/>
+            <a:ext cx="3489735" cy="820244"/>
+            <a:chOff x="5195773" y="3040395"/>
+            <a:chExt cx="3489735" cy="820244"/>
+          </a:xfrm>
+        </p:grpSpPr>
+        <p:sp>
+          <p:nvSpPr>
+            <p:cNvPr id="9" name="TextBox 8"/>
+            <p:cNvSpPr txBox="1"/>
+            <p:nvPr/>
+          </p:nvSpPr>
+          <p:spPr>
+            <a:xfrm>
+              <a:off x="6118587" y="3040395"/>
+              <a:ext cx="2566921" cy="369332"/>
+            </a:xfrm>
+            <a:prstGeom prst="rect">
+              <a:avLst/>
+            </a:prstGeom>
+            <a:solidFill>
+              <a:schemeClr val="bg1"/>
+            </a:solidFill>
+            <a:ln>
+              <a:solidFill>
+                <a:srgbClr val="00B050"/>
+              </a:solidFill>
+            </a:ln>
+          </p:spPr>
+          <p:txBody>
+            <a:bodyPr wrap="none" rtlCol="0">
+              <a:spAutoFit/>
+            </a:bodyPr>
+            <a:lstStyle/>
+            <a:p>
+              <a:r>
+                <a:rPr lang="en-US" dirty="0" smtClean="0">
+                  <a:solidFill>
+                    <a:srgbClr val="00B050"/>
+                  </a:solidFill>
+                </a:rPr>
+                <a:t>consistent column names</a:t>
+              </a:r>
+              <a:endParaRPr lang="nl-BE" dirty="0">
+                <a:solidFill>
+                  <a:srgbClr val="00B050"/>
+                </a:solidFill>
+              </a:endParaRPr>
+            </a:p>
+          </p:txBody>
+        </p:sp>
+        <p:cxnSp>
+          <p:nvCxnSpPr>
+            <p:cNvPr id="10" name="Straight Arrow Connector 9"/>
+            <p:cNvCxnSpPr>
+              <a:stCxn id="9" idx="1"/>
+            </p:cNvCxnSpPr>
+            <p:nvPr/>
+          </p:nvCxnSpPr>
+          <p:spPr>
+            <a:xfrm flipH="1">
+              <a:off x="5195773" y="3225061"/>
+              <a:ext cx="922814" cy="635578"/>
+            </a:xfrm>
+            <a:prstGeom prst="straightConnector1">
+              <a:avLst/>
+            </a:prstGeom>
+            <a:ln w="19050">
+              <a:solidFill>
+                <a:srgbClr val="00B050"/>
+              </a:solidFill>
+              <a:tailEnd type="stealth" w="lg" len="lg"/>
+            </a:ln>
+          </p:spPr>
+          <p:style>
+            <a:lnRef idx="1">
+              <a:schemeClr val="accent1"/>
+            </a:lnRef>
+            <a:fillRef idx="0">
+              <a:schemeClr val="accent1"/>
+            </a:fillRef>
+            <a:effectRef idx="0">
+              <a:schemeClr val="accent1"/>
+            </a:effectRef>
+            <a:fontRef idx="minor">
+              <a:schemeClr val="tx1"/>
+            </a:fontRef>
+          </p:style>
+        </p:cxnSp>
+      </p:grpSp>
+      <p:grpSp>
+        <p:nvGrpSpPr>
+          <p:cNvPr id="16" name="Group 15"/>
+          <p:cNvGrpSpPr/>
+          <p:nvPr/>
+        </p:nvGrpSpPr>
+        <p:grpSpPr>
+          <a:xfrm>
+            <a:off x="5840083" y="2932954"/>
+            <a:ext cx="3187810" cy="369332"/>
+            <a:chOff x="5370932" y="3040395"/>
+            <a:chExt cx="3187810" cy="369332"/>
+          </a:xfrm>
+        </p:grpSpPr>
+        <p:sp>
+          <p:nvSpPr>
+            <p:cNvPr id="17" name="TextBox 16"/>
+            <p:cNvSpPr txBox="1"/>
+            <p:nvPr/>
+          </p:nvSpPr>
+          <p:spPr>
+            <a:xfrm>
+              <a:off x="6118587" y="3040395"/>
+              <a:ext cx="2440155" cy="369332"/>
+            </a:xfrm>
+            <a:prstGeom prst="rect">
+              <a:avLst/>
+            </a:prstGeom>
+            <a:solidFill>
+              <a:schemeClr val="bg1"/>
+            </a:solidFill>
+            <a:ln>
+              <a:solidFill>
+                <a:srgbClr val="00B050"/>
+              </a:solidFill>
+            </a:ln>
+          </p:spPr>
+          <p:txBody>
+            <a:bodyPr wrap="none" rtlCol="0">
+              <a:spAutoFit/>
+            </a:bodyPr>
+            <a:lstStyle/>
+            <a:p>
+              <a:r>
+                <a:rPr lang="en-US" dirty="0" smtClean="0">
+                  <a:solidFill>
+                    <a:srgbClr val="00B050"/>
+                  </a:solidFill>
+                </a:rPr>
+                <a:t>merge on country name</a:t>
+              </a:r>
+              <a:endParaRPr lang="nl-BE" dirty="0">
+                <a:solidFill>
+                  <a:srgbClr val="00B050"/>
+                </a:solidFill>
+              </a:endParaRPr>
+            </a:p>
+          </p:txBody>
+        </p:sp>
+        <p:cxnSp>
+          <p:nvCxnSpPr>
+            <p:cNvPr id="18" name="Straight Arrow Connector 17"/>
+            <p:cNvCxnSpPr>
+              <a:stCxn id="17" idx="1"/>
+            </p:cNvCxnSpPr>
+            <p:nvPr/>
+          </p:nvCxnSpPr>
+          <p:spPr>
+            <a:xfrm flipH="1" flipV="1">
+              <a:off x="5370932" y="3129132"/>
+              <a:ext cx="747655" cy="95929"/>
+            </a:xfrm>
+            <a:prstGeom prst="straightConnector1">
+              <a:avLst/>
+            </a:prstGeom>
+            <a:ln w="19050">
+              <a:solidFill>
+                <a:srgbClr val="00B050"/>
+              </a:solidFill>
+              <a:tailEnd type="stealth" w="lg" len="lg"/>
+            </a:ln>
+          </p:spPr>
+          <p:style>
+            <a:lnRef idx="1">
+              <a:schemeClr val="accent1"/>
+            </a:lnRef>
+            <a:fillRef idx="0">
+              <a:schemeClr val="accent1"/>
+            </a:fillRef>
+            <a:effectRef idx="0">
+              <a:schemeClr val="accent1"/>
+            </a:effectRef>
+            <a:fontRef idx="minor">
+              <a:schemeClr val="tx1"/>
+            </a:fontRef>
+          </p:style>
+        </p:cxnSp>
+      </p:grpSp>
+      <p:grpSp>
+        <p:nvGrpSpPr>
+          <p:cNvPr id="21" name="Group 20"/>
+          <p:cNvGrpSpPr/>
+          <p:nvPr/>
+        </p:nvGrpSpPr>
+        <p:grpSpPr>
+          <a:xfrm>
+            <a:off x="457200" y="4045646"/>
+            <a:ext cx="7949085" cy="2356464"/>
+            <a:chOff x="524775" y="3863181"/>
+            <a:chExt cx="7949085" cy="2356464"/>
+          </a:xfrm>
+        </p:grpSpPr>
+        <p:pic>
+          <p:nvPicPr>
+            <p:cNvPr id="6" name="Picture 5"/>
+            <p:cNvPicPr>
+              <a:picLocks noChangeAspect="1"/>
+            </p:cNvPicPr>
+            <p:nvPr/>
+          </p:nvPicPr>
+          <p:blipFill>
+            <a:blip r:embed="rId2">
+              <a:extLst>
+                <a:ext uri="{28A0092B-C50C-407E-A947-70E740481C1C}">
+                  <a14:useLocalDpi xmlns:a14="http://schemas.microsoft.com/office/drawing/2010/main" val="0"/>
+                </a:ext>
+              </a:extLst>
+            </a:blip>
+            <a:stretch>
+              <a:fillRect/>
+            </a:stretch>
+          </p:blipFill>
+          <p:spPr>
+            <a:xfrm>
+              <a:off x="524775" y="3863181"/>
+              <a:ext cx="5578568" cy="2356464"/>
+            </a:xfrm>
+            <a:prstGeom prst="rect">
+              <a:avLst/>
+            </a:prstGeom>
+          </p:spPr>
+        </p:pic>
+        <p:sp>
+          <p:nvSpPr>
+            <p:cNvPr id="20" name="TextBox 19"/>
+            <p:cNvSpPr txBox="1"/>
+            <p:nvPr/>
+          </p:nvSpPr>
+          <p:spPr>
+            <a:xfrm>
+              <a:off x="6316282" y="4555111"/>
+              <a:ext cx="2157578" cy="707886"/>
+            </a:xfrm>
+            <a:prstGeom prst="rect">
+              <a:avLst/>
+            </a:prstGeom>
+            <a:noFill/>
+            <a:ln>
+              <a:solidFill>
+                <a:schemeClr val="tx1"/>
+              </a:solidFill>
+            </a:ln>
+          </p:spPr>
+          <p:txBody>
+            <a:bodyPr wrap="none" rtlCol="0">
+              <a:spAutoFit/>
+            </a:bodyPr>
+            <a:lstStyle/>
+            <a:p>
+              <a:r>
+                <a:rPr lang="en-US" sz="2000" dirty="0" err="1" smtClean="0"/>
+                <a:t>Cholopleth</a:t>
+              </a:r>
+              <a:r>
+                <a:rPr lang="en-US" sz="2000" dirty="0" smtClean="0"/>
+                <a:t> plot</a:t>
+              </a:r>
+            </a:p>
+            <a:p>
+              <a:r>
+                <a:rPr lang="en-US" sz="2000" dirty="0" smtClean="0"/>
+                <a:t>by happiness score</a:t>
+              </a:r>
+              <a:endParaRPr lang="en-US" sz="2000" dirty="0"/>
+            </a:p>
+          </p:txBody>
+        </p:sp>
+      </p:grpSp>
+    </p:spTree>
+    <p:extLst>
+      <p:ext uri="{BB962C8B-B14F-4D97-AF65-F5344CB8AC3E}">
+        <p14:creationId xmlns:p14="http://schemas.microsoft.com/office/powerpoint/2010/main" val="4033664810"/>
+      </p:ext>
+    </p:extLst>
+  </p:cSld>
+  <p:clrMapOvr>
+    <a:masterClrMapping/>
+  </p:clrMapOvr>
+  <p:timing>
+    <p:tnLst>
+      <p:par>
+        <p:cTn id="1" dur="indefinite" restart="never" nodeType="tmRoot">
+          <p:childTnLst>
+            <p:seq concurrent="1" nextAc="seek">
+              <p:cTn id="2" dur="indefinite" nodeType="mainSeq">
+                <p:childTnLst>
+                  <p:par>
+                    <p:cTn id="3" fill="hold">
+                      <p:stCondLst>
+                        <p:cond delay="indefinite"/>
+                      </p:stCondLst>
+                      <p:childTnLst>
+                        <p:par>
+                          <p:cTn id="4" fill="hold">
+                            <p:stCondLst>
+                              <p:cond delay="0"/>
+                            </p:stCondLst>
+                            <p:childTnLst>
+                              <p:par>
+                                <p:cTn id="5" presetID="1" presetClass="entr" presetSubtype="0" fill="hold" nodeType="clickEffect">
+                                  <p:stCondLst>
+                                    <p:cond delay="0"/>
+                                  </p:stCondLst>
+                                  <p:childTnLst>
+                                    <p:set>
+                                      <p:cBhvr>
+                                        <p:cTn id="6" dur="1" fill="hold">
+                                          <p:stCondLst>
+                                            <p:cond delay="0"/>
+                                          </p:stCondLst>
+                                        </p:cTn>
+                                        <p:tgtEl>
+                                          <p:spTgt spid="7"/>
+                                        </p:tgtEl>
+                                        <p:attrNameLst>
+                                          <p:attrName>style.visibility</p:attrName>
+                                        </p:attrNameLst>
+                                      </p:cBhvr>
+                                      <p:to>
+                                        <p:strVal val="visible"/>
+                                      </p:to>
+                                    </p:set>
+                                  </p:childTnLst>
+                                </p:cTn>
+                              </p:par>
+                            </p:childTnLst>
+                          </p:cTn>
+                        </p:par>
+                      </p:childTnLst>
+                    </p:cTn>
+                  </p:par>
+                  <p:par>
+                    <p:cTn id="7" fill="hold">
+                      <p:stCondLst>
+                        <p:cond delay="indefinite"/>
+                      </p:stCondLst>
+                      <p:childTnLst>
+                        <p:par>
+                          <p:cTn id="8" fill="hold">
+                            <p:stCondLst>
+                              <p:cond delay="0"/>
+                            </p:stCondLst>
+                            <p:childTnLst>
+                              <p:par>
+                                <p:cTn id="9" presetID="1" presetClass="entr" presetSubtype="0" fill="hold" nodeType="clickEffect">
+                                  <p:stCondLst>
+                                    <p:cond delay="0"/>
+                                  </p:stCondLst>
+                                  <p:childTnLst>
+                                    <p:set>
+                                      <p:cBhvr>
+                                        <p:cTn id="10" dur="1" fill="hold">
+                                          <p:stCondLst>
+                                            <p:cond delay="0"/>
+                                          </p:stCondLst>
+                                        </p:cTn>
+                                        <p:tgtEl>
+                                          <p:spTgt spid="16"/>
+                                        </p:tgtEl>
+                                        <p:attrNameLst>
+                                          <p:attrName>style.visibility</p:attrName>
+                                        </p:attrNameLst>
+                                      </p:cBhvr>
+                                      <p:to>
+                                        <p:strVal val="visible"/>
+                                      </p:to>
+                                    </p:set>
+                                  </p:childTnLst>
+                                </p:cTn>
+                              </p:par>
+                            </p:childTnLst>
+                          </p:cTn>
+                        </p:par>
+                      </p:childTnLst>
+                    </p:cTn>
+                  </p:par>
+                  <p:par>
+                    <p:cTn id="11" fill="hold">
+                      <p:stCondLst>
+                        <p:cond delay="indefinite"/>
+                      </p:stCondLst>
+                      <p:childTnLst>
+                        <p:par>
+                          <p:cTn id="12" fill="hold">
+                            <p:stCondLst>
+                              <p:cond delay="0"/>
+                            </p:stCondLst>
+                            <p:childTnLst>
+                              <p:par>
+                                <p:cTn id="13" presetID="1" presetClass="entr" presetSubtype="0" fill="hold" nodeType="clickEffect">
+                                  <p:stCondLst>
+                                    <p:cond delay="0"/>
+                                  </p:stCondLst>
+                                  <p:childTnLst>
+                                    <p:set>
+                                      <p:cBhvr>
+                                        <p:cTn id="14" dur="1" fill="hold">
+                                          <p:stCondLst>
+                                            <p:cond delay="0"/>
+                                          </p:stCondLst>
+                                        </p:cTn>
+                                        <p:tgtEl>
+                                          <p:spTgt spid="21"/>
+                                        </p:tgtEl>
+                                        <p:attrNameLst>
+                                          <p:attrName>style.visibility</p:attrName>
+                                        </p:attrNameLst>
+                                      </p:cBhvr>
+                                      <p:to>
+                                        <p:strVal val="visible"/>
+                                      </p:to>
+                                    </p:set>
+                                  </p:childTnLst>
+                                </p:cTn>
+                              </p:par>
+                            </p:childTnLst>
+                          </p:cTn>
+                        </p:par>
+                      </p:childTnLst>
+                    </p:cTn>
+                  </p:par>
+                </p:childTnLst>
+              </p:cTn>
+              <p:prevCondLst>
+                <p:cond evt="onPrev" delay="0">
+                  <p:tgtEl>
+                    <p:sldTgt/>
+                  </p:tgtEl>
+                </p:cond>
+              </p:prevCondLst>
+              <p:nextCondLst>
+                <p:cond evt="onNext" delay="0">
+                  <p:tgtEl>
+                    <p:sldTgt/>
+                  </p:tgtEl>
+                </p:cond>
+              </p:nextCondLst>
+            </p:seq>
+          </p:childTnLst>
+        </p:cTn>
+      </p:par>
+    </p:tnLst>
+  </p:timing>
+</p:sld>
+</file>
+
+<file path=ppt/slides/slide19.xml><?xml version="1.0" encoding="utf-8"?>
+<p:sld xmlns:a="http://schemas.openxmlformats.org/drawingml/2006/main" xmlns:r="http://schemas.openxmlformats.org/officeDocument/2006/relationships" xmlns:p="http://schemas.openxmlformats.org/presentationml/2006/main">
+  <p:cSld>
+    <p:spTree>
+      <p:nvGrpSpPr>
+        <p:cNvPr id="1" name=""/>
+        <p:cNvGrpSpPr/>
+        <p:nvPr/>
+      </p:nvGrpSpPr>
+      <p:grpSpPr>
+        <a:xfrm>
+          <a:off x="0" y="0"/>
+          <a:ext cx="0" cy="0"/>
+          <a:chOff x="0" y="0"/>
+          <a:chExt cx="0" cy="0"/>
+        </a:xfrm>
+      </p:grpSpPr>
+      <p:sp>
+        <p:nvSpPr>
+          <p:cNvPr id="2" name="Title 1"/>
+          <p:cNvSpPr>
+            <a:spLocks noGrp="1"/>
+          </p:cNvSpPr>
+          <p:nvPr>
+            <p:ph type="title"/>
+          </p:nvPr>
+        </p:nvSpPr>
+        <p:spPr/>
+        <p:txBody>
+          <a:bodyPr/>
+          <a:lstStyle/>
+          <a:p>
+            <a:r>
+              <a:rPr lang="en-US" dirty="0" err="1" smtClean="0"/>
+              <a:t>GeoPandas</a:t>
+            </a:r>
+            <a:r>
+              <a:rPr lang="en-US" dirty="0" smtClean="0"/>
+              <a:t> dissolve</a:t>
+            </a:r>
+            <a:endParaRPr lang="en-US" dirty="0"/>
+          </a:p>
+        </p:txBody>
+      </p:sp>
+      <p:sp>
+        <p:nvSpPr>
+          <p:cNvPr id="3" name="Content Placeholder 2"/>
+          <p:cNvSpPr>
+            <a:spLocks noGrp="1"/>
+          </p:cNvSpPr>
+          <p:nvPr>
+            <p:ph idx="1"/>
+          </p:nvPr>
+        </p:nvSpPr>
+        <p:spPr/>
+        <p:txBody>
+          <a:bodyPr/>
+          <a:lstStyle/>
+          <a:p>
+            <a:r>
+              <a:rPr lang="en-US" dirty="0" smtClean="0"/>
+              <a:t>Aggregate GIS information based attributes</a:t>
+            </a:r>
+            <a:endParaRPr lang="en-US" dirty="0"/>
+          </a:p>
+        </p:txBody>
+      </p:sp>
+      <p:sp>
+        <p:nvSpPr>
+          <p:cNvPr id="4" name="Slide Number Placeholder 3"/>
+          <p:cNvSpPr>
+            <a:spLocks noGrp="1"/>
+          </p:cNvSpPr>
+          <p:nvPr>
+            <p:ph type="sldNum" sz="quarter" idx="12"/>
+          </p:nvPr>
+        </p:nvSpPr>
+        <p:spPr/>
+        <p:txBody>
+          <a:bodyPr/>
+          <a:lstStyle/>
+          <a:p>
+            <a:fld id="{5A209D72-2E9D-49B0-8977-41DCCC66C0BB}" type="slidenum">
+              <a:rPr lang="nl-BE" smtClean="0">
+                <a:solidFill>
+                  <a:prstClr val="black">
+                    <a:tint val="75000"/>
+                  </a:prstClr>
+                </a:solidFill>
+              </a:rPr>
+              <a:pPr/>
+              <a:t>19</a:t>
+            </a:fld>
+            <a:endParaRPr lang="nl-BE">
+              <a:solidFill>
+                <a:prstClr val="black">
+                  <a:tint val="75000"/>
+                </a:prstClr>
+              </a:solidFill>
+            </a:endParaRPr>
+          </a:p>
+        </p:txBody>
+      </p:sp>
+      <p:sp>
+        <p:nvSpPr>
+          <p:cNvPr id="5" name="TextBox 4"/>
+          <p:cNvSpPr txBox="1"/>
+          <p:nvPr/>
+        </p:nvSpPr>
+        <p:spPr>
+          <a:xfrm>
+            <a:off x="726933" y="2212687"/>
+            <a:ext cx="7701075" cy="1200329"/>
+          </a:xfrm>
+          <a:prstGeom prst="rect">
+            <a:avLst/>
+          </a:prstGeom>
+          <a:solidFill>
+            <a:schemeClr val="accent4">
+              <a:lumMod val="40000"/>
+              <a:lumOff val="60000"/>
+            </a:schemeClr>
+          </a:solidFill>
+        </p:spPr>
+        <p:txBody>
+          <a:bodyPr wrap="square" rtlCol="0">
+            <a:spAutoFit/>
+          </a:bodyPr>
+          <a:lstStyle/>
+          <a:p>
+            <a:r>
+              <a:rPr lang="en-US" dirty="0" smtClean="0">
+                <a:latin typeface="Courier New" pitchFamily="49" charset="0"/>
+                <a:cs typeface="Courier New" pitchFamily="49" charset="0"/>
+              </a:rPr>
+              <a:t>world = </a:t>
+            </a:r>
+            <a:r>
+              <a:rPr lang="en-US" dirty="0" err="1" smtClean="0">
+                <a:latin typeface="Courier New" pitchFamily="49" charset="0"/>
+                <a:cs typeface="Courier New" pitchFamily="49" charset="0"/>
+              </a:rPr>
+              <a:t>df_merged</a:t>
+            </a:r>
+            <a:r>
+              <a:rPr lang="en-US" dirty="0" smtClean="0">
+                <a:latin typeface="Courier New" pitchFamily="49" charset="0"/>
+                <a:cs typeface="Courier New" pitchFamily="49" charset="0"/>
+              </a:rPr>
+              <a:t>[['name', 'Region', 'geometry']]</a:t>
+            </a:r>
+          </a:p>
+          <a:p>
+            <a:r>
+              <a:rPr lang="en-US" dirty="0" smtClean="0">
+                <a:latin typeface="Courier New" pitchFamily="49" charset="0"/>
+                <a:cs typeface="Courier New" pitchFamily="49" charset="0"/>
+              </a:rPr>
+              <a:t>regions = </a:t>
+            </a:r>
+            <a:r>
+              <a:rPr lang="en-US" dirty="0" err="1" smtClean="0">
+                <a:latin typeface="Courier New" pitchFamily="49" charset="0"/>
+                <a:cs typeface="Courier New" pitchFamily="49" charset="0"/>
+              </a:rPr>
+              <a:t>world.dissolve</a:t>
+            </a:r>
+            <a:r>
+              <a:rPr lang="en-US" dirty="0" smtClean="0">
+                <a:latin typeface="Courier New" pitchFamily="49" charset="0"/>
+                <a:cs typeface="Courier New" pitchFamily="49" charset="0"/>
+              </a:rPr>
+              <a:t>(by='Region')</a:t>
+            </a:r>
+          </a:p>
+          <a:p>
+            <a:r>
+              <a:rPr lang="en-US" dirty="0" err="1" smtClean="0">
+                <a:latin typeface="Courier New" pitchFamily="49" charset="0"/>
+                <a:cs typeface="Courier New" pitchFamily="49" charset="0"/>
+              </a:rPr>
+              <a:t>western_Europe_shape</a:t>
+            </a:r>
+            <a:r>
+              <a:rPr lang="en-US" dirty="0" smtClean="0">
+                <a:latin typeface="Courier New" pitchFamily="49" charset="0"/>
+                <a:cs typeface="Courier New" pitchFamily="49" charset="0"/>
+              </a:rPr>
+              <a:t> = regions.at['Western Europe',</a:t>
+            </a:r>
+            <a:br>
+              <a:rPr lang="en-US" dirty="0" smtClean="0">
+                <a:latin typeface="Courier New" pitchFamily="49" charset="0"/>
+                <a:cs typeface="Courier New" pitchFamily="49" charset="0"/>
+              </a:rPr>
+            </a:br>
+            <a:r>
+              <a:rPr lang="en-US" dirty="0" smtClean="0">
+                <a:latin typeface="Courier New" pitchFamily="49" charset="0"/>
+                <a:cs typeface="Courier New" pitchFamily="49" charset="0"/>
+              </a:rPr>
+              <a:t>                                  'geometry']</a:t>
+            </a:r>
+          </a:p>
+        </p:txBody>
+      </p:sp>
+      <p:pic>
+        <p:nvPicPr>
+          <p:cNvPr id="6" name="Picture 5"/>
+          <p:cNvPicPr>
+            <a:picLocks noChangeAspect="1"/>
+          </p:cNvPicPr>
+          <p:nvPr/>
+        </p:nvPicPr>
+        <p:blipFill>
+          <a:blip r:embed="rId2">
+            <a:extLst>
+              <a:ext uri="{28A0092B-C50C-407E-A947-70E740481C1C}">
+                <a14:useLocalDpi xmlns:a14="http://schemas.microsoft.com/office/drawing/2010/main" val="0"/>
+              </a:ext>
+            </a:extLst>
+          </a:blip>
+          <a:stretch>
+            <a:fillRect/>
+          </a:stretch>
+        </p:blipFill>
+        <p:spPr>
+          <a:xfrm>
+            <a:off x="2626204" y="3255114"/>
+            <a:ext cx="1200150" cy="1009650"/>
+          </a:xfrm>
+          <a:prstGeom prst="rect">
+            <a:avLst/>
+          </a:prstGeom>
+          <a:effectLst>
+            <a:outerShdw blurRad="50800" dist="38100" dir="2700000" algn="tl" rotWithShape="0">
+              <a:prstClr val="black">
+                <a:alpha val="40000"/>
+              </a:prstClr>
+            </a:outerShdw>
+          </a:effectLst>
+        </p:spPr>
+      </p:pic>
+    </p:spTree>
+    <p:extLst>
+      <p:ext uri="{BB962C8B-B14F-4D97-AF65-F5344CB8AC3E}">
+        <p14:creationId xmlns:p14="http://schemas.microsoft.com/office/powerpoint/2010/main" val="2364405821"/>
+      </p:ext>
+    </p:extLst>
+  </p:cSld>
+  <p:clrMapOvr>
+    <a:masterClrMapping/>
+  </p:clrMapOvr>
+  <p:timing>
+    <p:tnLst>
+      <p:par>
+        <p:cTn id="1" dur="indefinite" restart="never" nodeType="tmRoot"/>
+      </p:par>
+    </p:tnLst>
+  </p:timing>
+</p:sld>
+</file>
+
+<file path=ppt/slides/slide2.xml><?xml version="1.0" encoding="utf-8"?>
+<p:sld xmlns:a="http://schemas.openxmlformats.org/drawingml/2006/main" xmlns:r="http://schemas.openxmlformats.org/officeDocument/2006/relationships" xmlns:p="http://schemas.openxmlformats.org/presentationml/2006/main">
+  <p:cSld>
+    <p:spTree>
+      <p:nvGrpSpPr>
+        <p:cNvPr id="1" name=""/>
+        <p:cNvGrpSpPr/>
+        <p:nvPr/>
+      </p:nvGrpSpPr>
+      <p:grpSpPr>
+        <a:xfrm>
+          <a:off x="0" y="0"/>
+          <a:ext cx="0" cy="0"/>
+          <a:chOff x="0" y="0"/>
+          <a:chExt cx="0" cy="0"/>
+        </a:xfrm>
+      </p:grpSpPr>
+      <p:sp>
+        <p:nvSpPr>
+          <p:cNvPr id="2" name="Title 1"/>
+          <p:cNvSpPr>
+            <a:spLocks noGrp="1"/>
+          </p:cNvSpPr>
+          <p:nvPr>
+            <p:ph type="title"/>
+          </p:nvPr>
+        </p:nvSpPr>
+        <p:spPr/>
+        <p:txBody>
+          <a:bodyPr/>
+          <a:lstStyle/>
+          <a:p>
+            <a:r>
+              <a:rPr lang="en-US" dirty="0" smtClean="0"/>
+              <a:t>Introduction</a:t>
+            </a:r>
+            <a:endParaRPr lang="en-US" dirty="0"/>
+          </a:p>
+        </p:txBody>
+      </p:sp>
+      <p:sp>
+        <p:nvSpPr>
+          <p:cNvPr id="3" name="Content Placeholder 2"/>
+          <p:cNvSpPr>
+            <a:spLocks noGrp="1"/>
+          </p:cNvSpPr>
+          <p:nvPr>
+            <p:ph idx="1"/>
+          </p:nvPr>
+        </p:nvSpPr>
+        <p:spPr/>
+        <p:txBody>
+          <a:bodyPr>
+            <a:normAutofit fontScale="92500" lnSpcReduction="20000"/>
+          </a:bodyPr>
+          <a:lstStyle/>
+          <a:p>
+            <a:r>
+              <a:rPr lang="en-US" dirty="0" smtClean="0"/>
+              <a:t>Graphical Information System (GIS), e.g.,</a:t>
+            </a:r>
+          </a:p>
+          <a:p>
+            <a:pPr lvl="1"/>
+            <a:r>
+              <a:rPr lang="en-US" dirty="0" smtClean="0"/>
+              <a:t>ArcGIS</a:t>
+            </a:r>
+          </a:p>
+          <a:p>
+            <a:pPr lvl="1"/>
+            <a:r>
+              <a:rPr lang="en-US" dirty="0" smtClean="0"/>
+              <a:t>QGIS</a:t>
+            </a:r>
+          </a:p>
+          <a:p>
+            <a:r>
+              <a:rPr lang="en-US" dirty="0" smtClean="0"/>
+              <a:t>Many data formats, e.g.,</a:t>
+            </a:r>
+          </a:p>
+          <a:p>
+            <a:pPr lvl="1"/>
+            <a:r>
+              <a:rPr lang="en-US" dirty="0" smtClean="0"/>
+              <a:t>shape files</a:t>
+            </a:r>
+          </a:p>
+          <a:p>
+            <a:pPr lvl="1"/>
+            <a:r>
+              <a:rPr lang="en-US" dirty="0" err="1" smtClean="0"/>
+              <a:t>GeoJSON</a:t>
+            </a:r>
+            <a:endParaRPr lang="en-US" dirty="0" smtClean="0"/>
+          </a:p>
+          <a:p>
+            <a:r>
+              <a:rPr lang="en-US" dirty="0" smtClean="0"/>
+              <a:t>Python &amp; GIS</a:t>
+            </a:r>
+          </a:p>
+          <a:p>
+            <a:pPr lvl="1"/>
+            <a:r>
+              <a:rPr lang="en-US" dirty="0" smtClean="0"/>
+              <a:t>I/O library: Fiona</a:t>
+            </a:r>
+          </a:p>
+          <a:p>
+            <a:pPr lvl="1"/>
+            <a:r>
+              <a:rPr lang="en-US" dirty="0" smtClean="0"/>
+              <a:t>visualization: Folium</a:t>
+            </a:r>
+          </a:p>
+          <a:p>
+            <a:pPr lvl="1"/>
+            <a:r>
+              <a:rPr lang="en-US" dirty="0" smtClean="0"/>
+              <a:t>data processing/modeling: Shapely</a:t>
+            </a:r>
+          </a:p>
+        </p:txBody>
+      </p:sp>
+      <p:sp>
+        <p:nvSpPr>
+          <p:cNvPr id="4" name="Slide Number Placeholder 3"/>
+          <p:cNvSpPr>
+            <a:spLocks noGrp="1"/>
+          </p:cNvSpPr>
+          <p:nvPr>
+            <p:ph type="sldNum" sz="quarter" idx="12"/>
+          </p:nvPr>
+        </p:nvSpPr>
+        <p:spPr/>
+        <p:txBody>
+          <a:bodyPr/>
+          <a:lstStyle/>
+          <a:p>
+            <a:fld id="{5A209D72-2E9D-49B0-8977-41DCCC66C0BB}" type="slidenum">
+              <a:rPr lang="nl-BE" smtClean="0">
+                <a:solidFill>
+                  <a:prstClr val="black">
+                    <a:tint val="75000"/>
+                  </a:prstClr>
+                </a:solidFill>
+              </a:rPr>
+              <a:pPr/>
+              <a:t>2</a:t>
+            </a:fld>
+            <a:endParaRPr lang="nl-BE">
+              <a:solidFill>
+                <a:prstClr val="black">
+                  <a:tint val="75000"/>
+                </a:prstClr>
+              </a:solidFill>
+            </a:endParaRPr>
+          </a:p>
+        </p:txBody>
+      </p:sp>
+      <p:sp>
+        <p:nvSpPr>
+          <p:cNvPr id="5" name="TextBox 4"/>
+          <p:cNvSpPr txBox="1"/>
+          <p:nvPr/>
+        </p:nvSpPr>
+        <p:spPr>
+          <a:xfrm>
+            <a:off x="3042606" y="2160573"/>
+            <a:ext cx="3697038" cy="461665"/>
+          </a:xfrm>
+          <a:prstGeom prst="rect">
+            <a:avLst/>
+          </a:prstGeom>
+          <a:noFill/>
+          <a:ln>
+            <a:solidFill>
+              <a:schemeClr val="tx1"/>
+            </a:solidFill>
+          </a:ln>
+        </p:spPr>
+        <p:txBody>
+          <a:bodyPr wrap="none" rtlCol="0">
+            <a:spAutoFit/>
+          </a:bodyPr>
+          <a:lstStyle/>
+          <a:p>
+            <a:r>
+              <a:rPr lang="en-US" sz="2400" dirty="0" smtClean="0"/>
+              <a:t>Can be scripted with Python</a:t>
+            </a:r>
+            <a:endParaRPr lang="en-US" sz="2400" dirty="0"/>
+          </a:p>
+        </p:txBody>
+      </p:sp>
+    </p:spTree>
+    <p:extLst>
+      <p:ext uri="{BB962C8B-B14F-4D97-AF65-F5344CB8AC3E}">
+        <p14:creationId xmlns:p14="http://schemas.microsoft.com/office/powerpoint/2010/main" val="2682687549"/>
+      </p:ext>
+    </p:extLst>
+  </p:cSld>
+  <p:clrMapOvr>
+    <a:masterClrMapping/>
+  </p:clrMapOvr>
+  <p:timing>
+    <p:tnLst>
+      <p:par>
+        <p:cTn id="1" dur="indefinite" restart="never" nodeType="tmRoot">
+          <p:childTnLst>
+            <p:seq concurrent="1" nextAc="seek">
+              <p:cTn id="2" dur="indefinite" nodeType="mainSeq">
+                <p:childTnLst>
+                  <p:par>
+                    <p:cTn id="3" fill="hold">
+                      <p:stCondLst>
+                        <p:cond delay="indefinite"/>
+                        <p:cond evt="onBegin" delay="0">
+                          <p:tn val="2"/>
+                        </p:cond>
+                      </p:stCondLst>
+                      <p:childTnLst>
+                        <p:par>
+                          <p:cTn id="4" fill="hold">
+                            <p:stCondLst>
+                              <p:cond delay="0"/>
+                            </p:stCondLst>
+                            <p:childTnLst>
+                              <p:par>
+                                <p:cTn id="5" presetID="1" presetClass="entr" presetSubtype="0" fill="hold" grpId="0" nodeType="withEffect">
+                                  <p:stCondLst>
+                                    <p:cond delay="0"/>
+                                  </p:stCondLst>
+                                  <p:childTnLst>
+                                    <p:set>
+                                      <p:cBhvr>
+                                        <p:cTn id="6" dur="1" fill="hold">
+                                          <p:stCondLst>
+                                            <p:cond delay="0"/>
+                                          </p:stCondLst>
+                                        </p:cTn>
+                                        <p:tgtEl>
+                                          <p:spTgt spid="3">
+                                            <p:txEl>
+                                              <p:pRg st="0" end="0"/>
+                                            </p:txEl>
+                                          </p:spTgt>
+                                        </p:tgtEl>
+                                        <p:attrNameLst>
+                                          <p:attrName>style.visibility</p:attrName>
+                                        </p:attrNameLst>
+                                      </p:cBhvr>
+                                      <p:to>
+                                        <p:strVal val="visible"/>
+                                      </p:to>
+                                    </p:set>
+                                  </p:childTnLst>
+                                </p:cTn>
+                              </p:par>
+                              <p:par>
+                                <p:cTn id="7" presetID="1" presetClass="entr" presetSubtype="0" fill="hold" grpId="0" nodeType="withEffect">
+                                  <p:stCondLst>
+                                    <p:cond delay="0"/>
+                                  </p:stCondLst>
+                                  <p:childTnLst>
+                                    <p:set>
+                                      <p:cBhvr>
+                                        <p:cTn id="8" dur="1" fill="hold">
+                                          <p:stCondLst>
+                                            <p:cond delay="0"/>
+                                          </p:stCondLst>
+                                        </p:cTn>
+                                        <p:tgtEl>
+                                          <p:spTgt spid="3">
+                                            <p:txEl>
+                                              <p:pRg st="1" end="1"/>
+                                            </p:txEl>
+                                          </p:spTgt>
+                                        </p:tgtEl>
+                                        <p:attrNameLst>
+                                          <p:attrName>style.visibility</p:attrName>
+                                        </p:attrNameLst>
+                                      </p:cBhvr>
+                                      <p:to>
+                                        <p:strVal val="visible"/>
+                                      </p:to>
+                                    </p:set>
+                                  </p:childTnLst>
+                                </p:cTn>
+                              </p:par>
+                              <p:par>
+                                <p:cTn id="9" presetID="1" presetClass="entr" presetSubtype="0" fill="hold" grpId="0" nodeType="withEffect">
+                                  <p:stCondLst>
+                                    <p:cond delay="0"/>
+                                  </p:stCondLst>
+                                  <p:childTnLst>
+                                    <p:set>
+                                      <p:cBhvr>
+                                        <p:cTn id="10" dur="1" fill="hold">
+                                          <p:stCondLst>
+                                            <p:cond delay="0"/>
+                                          </p:stCondLst>
+                                        </p:cTn>
+                                        <p:tgtEl>
+                                          <p:spTgt spid="3">
+                                            <p:txEl>
+                                              <p:pRg st="2" end="2"/>
+                                            </p:txEl>
+                                          </p:spTgt>
+                                        </p:tgtEl>
+                                        <p:attrNameLst>
+                                          <p:attrName>style.visibility</p:attrName>
+                                        </p:attrNameLst>
+                                      </p:cBhvr>
+                                      <p:to>
+                                        <p:strVal val="visible"/>
+                                      </p:to>
+                                    </p:set>
+                                  </p:childTnLst>
+                                </p:cTn>
+                              </p:par>
+                            </p:childTnLst>
+                          </p:cTn>
+                        </p:par>
+                      </p:childTnLst>
+                    </p:cTn>
+                  </p:par>
+                  <p:par>
+                    <p:cTn id="11" fill="hold">
+                      <p:stCondLst>
+                        <p:cond delay="indefinite"/>
+                      </p:stCondLst>
+                      <p:childTnLst>
+                        <p:par>
+                          <p:cTn id="12" fill="hold">
+                            <p:stCondLst>
+                              <p:cond delay="0"/>
+                            </p:stCondLst>
+                            <p:childTnLst>
+                              <p:par>
+                                <p:cTn id="13" presetID="1" presetClass="entr" presetSubtype="0" fill="hold" grpId="0" nodeType="clickEffect">
+                                  <p:stCondLst>
+                                    <p:cond delay="0"/>
+                                  </p:stCondLst>
+                                  <p:childTnLst>
+                                    <p:set>
+                                      <p:cBhvr>
+                                        <p:cTn id="14" dur="1" fill="hold">
+                                          <p:stCondLst>
+                                            <p:cond delay="0"/>
+                                          </p:stCondLst>
+                                        </p:cTn>
+                                        <p:tgtEl>
+                                          <p:spTgt spid="5"/>
+                                        </p:tgtEl>
+                                        <p:attrNameLst>
+                                          <p:attrName>style.visibility</p:attrName>
+                                        </p:attrNameLst>
+                                      </p:cBhvr>
+                                      <p:to>
+                                        <p:strVal val="visible"/>
+                                      </p:to>
+                                    </p:set>
+                                  </p:childTnLst>
+                                </p:cTn>
+                              </p:par>
+                            </p:childTnLst>
+                          </p:cTn>
+                        </p:par>
+                      </p:childTnLst>
+                    </p:cTn>
+                  </p:par>
+                  <p:par>
+                    <p:cTn id="15" fill="hold">
+                      <p:stCondLst>
+                        <p:cond delay="indefinite"/>
+                      </p:stCondLst>
+                      <p:childTnLst>
+                        <p:par>
+                          <p:cTn id="16" fill="hold">
+                            <p:stCondLst>
+                              <p:cond delay="0"/>
+                            </p:stCondLst>
+                            <p:childTnLst>
+                              <p:par>
+                                <p:cTn id="17" presetID="1" presetClass="entr" presetSubtype="0" fill="hold" grpId="0" nodeType="clickEffect">
+                                  <p:stCondLst>
+                                    <p:cond delay="0"/>
+                                  </p:stCondLst>
+                                  <p:childTnLst>
+                                    <p:set>
+                                      <p:cBhvr>
+                                        <p:cTn id="18" dur="1" fill="hold">
+                                          <p:stCondLst>
+                                            <p:cond delay="0"/>
+                                          </p:stCondLst>
+                                        </p:cTn>
+                                        <p:tgtEl>
+                                          <p:spTgt spid="3">
+                                            <p:txEl>
+                                              <p:pRg st="3" end="3"/>
+                                            </p:txEl>
+                                          </p:spTgt>
+                                        </p:tgtEl>
+                                        <p:attrNameLst>
+                                          <p:attrName>style.visibility</p:attrName>
+                                        </p:attrNameLst>
+                                      </p:cBhvr>
+                                      <p:to>
+                                        <p:strVal val="visible"/>
+                                      </p:to>
+                                    </p:set>
+                                  </p:childTnLst>
+                                </p:cTn>
+                              </p:par>
+                              <p:par>
+                                <p:cTn id="19" presetID="1" presetClass="entr" presetSubtype="0" fill="hold" grpId="0" nodeType="withEffect">
+                                  <p:stCondLst>
+                                    <p:cond delay="0"/>
+                                  </p:stCondLst>
+                                  <p:childTnLst>
+                                    <p:set>
+                                      <p:cBhvr>
+                                        <p:cTn id="20" dur="1" fill="hold">
+                                          <p:stCondLst>
+                                            <p:cond delay="0"/>
+                                          </p:stCondLst>
+                                        </p:cTn>
+                                        <p:tgtEl>
+                                          <p:spTgt spid="3">
+                                            <p:txEl>
+                                              <p:pRg st="4" end="4"/>
+                                            </p:txEl>
+                                          </p:spTgt>
+                                        </p:tgtEl>
+                                        <p:attrNameLst>
+                                          <p:attrName>style.visibility</p:attrName>
+                                        </p:attrNameLst>
+                                      </p:cBhvr>
+                                      <p:to>
+                                        <p:strVal val="visible"/>
+                                      </p:to>
+                                    </p:set>
+                                  </p:childTnLst>
+                                </p:cTn>
+                              </p:par>
+                              <p:par>
+                                <p:cTn id="21" presetID="1" presetClass="entr" presetSubtype="0" fill="hold" grpId="0" nodeType="withEffect">
+                                  <p:stCondLst>
+                                    <p:cond delay="0"/>
+                                  </p:stCondLst>
+                                  <p:childTnLst>
+                                    <p:set>
+                                      <p:cBhvr>
+                                        <p:cTn id="22" dur="1" fill="hold">
+                                          <p:stCondLst>
+                                            <p:cond delay="0"/>
+                                          </p:stCondLst>
+                                        </p:cTn>
+                                        <p:tgtEl>
+                                          <p:spTgt spid="3">
+                                            <p:txEl>
+                                              <p:pRg st="5" end="5"/>
+                                            </p:txEl>
+                                          </p:spTgt>
+                                        </p:tgtEl>
+                                        <p:attrNameLst>
+                                          <p:attrName>style.visibility</p:attrName>
+                                        </p:attrNameLst>
+                                      </p:cBhvr>
+                                      <p:to>
+                                        <p:strVal val="visible"/>
+                                      </p:to>
+                                    </p:set>
+                                  </p:childTnLst>
+                                </p:cTn>
+                              </p:par>
+                            </p:childTnLst>
+                          </p:cTn>
+                        </p:par>
+                      </p:childTnLst>
+                    </p:cTn>
+                  </p:par>
+                  <p:par>
+                    <p:cTn id="23" fill="hold">
+                      <p:stCondLst>
+                        <p:cond delay="indefinite"/>
+                      </p:stCondLst>
+                      <p:childTnLst>
+                        <p:par>
+                          <p:cTn id="24" fill="hold">
+                            <p:stCondLst>
+                              <p:cond delay="0"/>
+                            </p:stCondLst>
+                            <p:childTnLst>
+                              <p:par>
+                                <p:cTn id="25" presetID="1" presetClass="entr" presetSubtype="0" fill="hold" grpId="0" nodeType="clickEffect">
+                                  <p:stCondLst>
+                                    <p:cond delay="0"/>
+                                  </p:stCondLst>
+                                  <p:childTnLst>
+                                    <p:set>
+                                      <p:cBhvr>
+                                        <p:cTn id="26" dur="1" fill="hold">
+                                          <p:stCondLst>
+                                            <p:cond delay="0"/>
+                                          </p:stCondLst>
+                                        </p:cTn>
+                                        <p:tgtEl>
+                                          <p:spTgt spid="3">
+                                            <p:txEl>
+                                              <p:pRg st="6" end="6"/>
+                                            </p:txEl>
+                                          </p:spTgt>
+                                        </p:tgtEl>
+                                        <p:attrNameLst>
+                                          <p:attrName>style.visibility</p:attrName>
+                                        </p:attrNameLst>
+                                      </p:cBhvr>
+                                      <p:to>
+                                        <p:strVal val="visible"/>
+                                      </p:to>
+                                    </p:set>
+                                  </p:childTnLst>
+                                </p:cTn>
+                              </p:par>
+                              <p:par>
+                                <p:cTn id="27" presetID="1" presetClass="entr" presetSubtype="0" fill="hold" grpId="0" nodeType="withEffect">
+                                  <p:stCondLst>
+                                    <p:cond delay="0"/>
+                                  </p:stCondLst>
+                                  <p:childTnLst>
+                                    <p:set>
+                                      <p:cBhvr>
+                                        <p:cTn id="28" dur="1" fill="hold">
+                                          <p:stCondLst>
+                                            <p:cond delay="0"/>
+                                          </p:stCondLst>
+                                        </p:cTn>
+                                        <p:tgtEl>
+                                          <p:spTgt spid="3">
+                                            <p:txEl>
+                                              <p:pRg st="7" end="7"/>
+                                            </p:txEl>
+                                          </p:spTgt>
+                                        </p:tgtEl>
+                                        <p:attrNameLst>
+                                          <p:attrName>style.visibility</p:attrName>
+                                        </p:attrNameLst>
+                                      </p:cBhvr>
+                                      <p:to>
+                                        <p:strVal val="visible"/>
+                                      </p:to>
+                                    </p:set>
+                                  </p:childTnLst>
+                                </p:cTn>
+                              </p:par>
+                              <p:par>
+                                <p:cTn id="29" presetID="1" presetClass="entr" presetSubtype="0" fill="hold" grpId="0" nodeType="withEffect">
+                                  <p:stCondLst>
+                                    <p:cond delay="0"/>
+                                  </p:stCondLst>
+                                  <p:childTnLst>
+                                    <p:set>
+                                      <p:cBhvr>
+                                        <p:cTn id="30" dur="1" fill="hold">
+                                          <p:stCondLst>
+                                            <p:cond delay="0"/>
+                                          </p:stCondLst>
+                                        </p:cTn>
+                                        <p:tgtEl>
+                                          <p:spTgt spid="3">
+                                            <p:txEl>
+                                              <p:pRg st="8" end="8"/>
+                                            </p:txEl>
+                                          </p:spTgt>
+                                        </p:tgtEl>
+                                        <p:attrNameLst>
+                                          <p:attrName>style.visibility</p:attrName>
+                                        </p:attrNameLst>
+                                      </p:cBhvr>
+                                      <p:to>
+                                        <p:strVal val="visible"/>
+                                      </p:to>
+                                    </p:set>
+                                  </p:childTnLst>
+                                </p:cTn>
+                              </p:par>
+                              <p:par>
+                                <p:cTn id="31" presetID="1" presetClass="entr" presetSubtype="0" fill="hold" grpId="0" nodeType="withEffect">
+                                  <p:stCondLst>
+                                    <p:cond delay="0"/>
+                                  </p:stCondLst>
+                                  <p:childTnLst>
+                                    <p:set>
+                                      <p:cBhvr>
+                                        <p:cTn id="32" dur="1" fill="hold">
+                                          <p:stCondLst>
+                                            <p:cond delay="0"/>
+                                          </p:stCondLst>
+                                        </p:cTn>
+                                        <p:tgtEl>
+                                          <p:spTgt spid="3">
+                                            <p:txEl>
+                                              <p:pRg st="9" end="9"/>
+                                            </p:txEl>
+                                          </p:spTgt>
+                                        </p:tgtEl>
+                                        <p:attrNameLst>
+                                          <p:attrName>style.visibility</p:attrName>
+                                        </p:attrNameLst>
+                                      </p:cBhvr>
+                                      <p:to>
+                                        <p:strVal val="visible"/>
+                                      </p:to>
+                                    </p:set>
+                                  </p:childTnLst>
+                                </p:cTn>
+                              </p:par>
+                            </p:childTnLst>
+                          </p:cTn>
+                        </p:par>
+                      </p:childTnLst>
+                    </p:cTn>
+                  </p:par>
+                </p:childTnLst>
+              </p:cTn>
+              <p:prevCondLst>
+                <p:cond evt="onPrev" delay="0">
+                  <p:tgtEl>
+                    <p:sldTgt/>
+                  </p:tgtEl>
+                </p:cond>
+              </p:prevCondLst>
+              <p:nextCondLst>
+                <p:cond evt="onNext" delay="0">
+                  <p:tgtEl>
+                    <p:sldTgt/>
+                  </p:tgtEl>
+                </p:cond>
+              </p:nextCondLst>
+            </p:seq>
+          </p:childTnLst>
+        </p:cTn>
+      </p:par>
+    </p:tnLst>
+    <p:bldLst>
+      <p:bldP spid="3" grpId="0" uiExpand="1" build="p"/>
+      <p:bldP spid="5" grpId="0" animBg="1"/>
+    </p:bldLst>
+  </p:timing>
+</p:sld>
+</file>
+
+<file path=ppt/slides/slide20.xml><?xml version="1.0" encoding="utf-8"?>
+<p:sld xmlns:a="http://schemas.openxmlformats.org/drawingml/2006/main" xmlns:r="http://schemas.openxmlformats.org/officeDocument/2006/relationships" xmlns:p="http://schemas.openxmlformats.org/presentationml/2006/main">
+  <p:cSld>
+    <p:spTree>
+      <p:nvGrpSpPr>
+        <p:cNvPr id="1" name=""/>
+        <p:cNvGrpSpPr/>
+        <p:nvPr/>
+      </p:nvGrpSpPr>
+      <p:grpSpPr>
+        <a:xfrm>
+          <a:off x="0" y="0"/>
+          <a:ext cx="0" cy="0"/>
+          <a:chOff x="0" y="0"/>
+          <a:chExt cx="0" cy="0"/>
+        </a:xfrm>
+      </p:grpSpPr>
+      <p:sp>
+        <p:nvSpPr>
+          <p:cNvPr id="2" name="Title 1"/>
+          <p:cNvSpPr>
+            <a:spLocks noGrp="1"/>
+          </p:cNvSpPr>
+          <p:nvPr>
+            <p:ph type="title"/>
+          </p:nvPr>
+        </p:nvSpPr>
+        <p:spPr/>
+        <p:txBody>
+          <a:bodyPr/>
+          <a:lstStyle/>
+          <a:p>
+            <a:r>
+              <a:rPr lang="en-US" dirty="0" err="1" smtClean="0"/>
+              <a:t>GeoTIFF</a:t>
+            </a:r>
+            <a:endParaRPr lang="en-US" dirty="0"/>
+          </a:p>
+        </p:txBody>
+      </p:sp>
+      <p:sp>
+        <p:nvSpPr>
+          <p:cNvPr id="3" name="Content Placeholder 2"/>
+          <p:cNvSpPr>
+            <a:spLocks noGrp="1"/>
+          </p:cNvSpPr>
+          <p:nvPr>
+            <p:ph idx="1"/>
+          </p:nvPr>
+        </p:nvSpPr>
+        <p:spPr/>
+        <p:txBody>
+          <a:bodyPr/>
+          <a:lstStyle/>
+          <a:p>
+            <a:r>
+              <a:rPr lang="en-US" dirty="0" smtClean="0"/>
+              <a:t>Raster data, e.g., satellite imagery</a:t>
+            </a:r>
+          </a:p>
+          <a:p>
+            <a:pPr lvl="1"/>
+            <a:r>
+              <a:rPr lang="en-US" dirty="0" smtClean="0"/>
+              <a:t>TIFF image file</a:t>
+            </a:r>
+          </a:p>
+          <a:p>
+            <a:pPr lvl="2"/>
+            <a:r>
+              <a:rPr lang="en-US" dirty="0" smtClean="0"/>
+              <a:t>1 or more raster bands</a:t>
+            </a:r>
+          </a:p>
+          <a:p>
+            <a:pPr lvl="1"/>
+            <a:r>
+              <a:rPr lang="en-US" dirty="0" smtClean="0"/>
+              <a:t>meta-data in tags</a:t>
+            </a:r>
+          </a:p>
+          <a:p>
+            <a:pPr lvl="2"/>
+            <a:r>
+              <a:rPr lang="en-US" dirty="0" smtClean="0"/>
+              <a:t>coordinate reference system</a:t>
+            </a:r>
+          </a:p>
+          <a:p>
+            <a:pPr lvl="2"/>
+            <a:r>
+              <a:rPr lang="en-US" dirty="0" err="1" smtClean="0"/>
+              <a:t>geotransform</a:t>
+            </a:r>
+            <a:endParaRPr lang="en-US" dirty="0" smtClean="0"/>
+          </a:p>
+          <a:p>
+            <a:r>
+              <a:rPr lang="en-US" dirty="0" smtClean="0"/>
+              <a:t>I/O: GDAL library with Python wrapper</a:t>
+            </a:r>
+            <a:endParaRPr lang="en-US" dirty="0"/>
+          </a:p>
+        </p:txBody>
+      </p:sp>
+      <p:sp>
+        <p:nvSpPr>
+          <p:cNvPr id="4" name="Slide Number Placeholder 3"/>
+          <p:cNvSpPr>
+            <a:spLocks noGrp="1"/>
+          </p:cNvSpPr>
+          <p:nvPr>
+            <p:ph type="sldNum" sz="quarter" idx="12"/>
+          </p:nvPr>
+        </p:nvSpPr>
+        <p:spPr/>
+        <p:txBody>
+          <a:bodyPr/>
+          <a:lstStyle/>
+          <a:p>
+            <a:fld id="{5A209D72-2E9D-49B0-8977-41DCCC66C0BB}" type="slidenum">
+              <a:rPr lang="nl-BE" smtClean="0">
+                <a:solidFill>
+                  <a:prstClr val="black">
+                    <a:tint val="75000"/>
+                  </a:prstClr>
+                </a:solidFill>
+              </a:rPr>
+              <a:pPr/>
+              <a:t>20</a:t>
             </a:fld>
             <a:endParaRPr lang="nl-BE">
               <a:solidFill>
@@ -11409,7 +13115,7 @@
 </p:sld>
 </file>
 
-<file path=ppt/slides/slide19.xml><?xml version="1.0" encoding="utf-8"?>
+<file path=ppt/slides/slide21.xml><?xml version="1.0" encoding="utf-8"?>
 <p:sld xmlns:a="http://schemas.openxmlformats.org/drawingml/2006/main" xmlns:r="http://schemas.openxmlformats.org/officeDocument/2006/relationships" xmlns:p="http://schemas.openxmlformats.org/presentationml/2006/main">
   <p:cSld>
     <p:spTree>
@@ -11600,7 +13306,7 @@
                 </a:solidFill>
               </a:rPr>
               <a:pPr/>
-              <a:t>19</a:t>
+              <a:t>21</a:t>
             </a:fld>
             <a:endParaRPr lang="nl-BE">
               <a:solidFill>
@@ -12380,7 +14086,7 @@
 </p:sld>
 </file>
 
-<file path=ppt/slides/slide2.xml><?xml version="1.0" encoding="utf-8"?>
+<file path=ppt/slides/slide22.xml><?xml version="1.0" encoding="utf-8"?>
 <p:sld xmlns:a="http://schemas.openxmlformats.org/drawingml/2006/main" xmlns:r="http://schemas.openxmlformats.org/officeDocument/2006/relationships" xmlns:p="http://schemas.openxmlformats.org/presentationml/2006/main">
   <p:cSld>
     <p:spTree>
@@ -12414,662 +14120,6 @@
           <a:p>
             <a:r>
               <a:rPr lang="en-US" dirty="0" smtClean="0"/>
-              <a:t>Introduction</a:t>
-            </a:r>
-            <a:endParaRPr lang="en-US" dirty="0"/>
-          </a:p>
-        </p:txBody>
-      </p:sp>
-      <p:sp>
-        <p:nvSpPr>
-          <p:cNvPr id="3" name="Content Placeholder 2"/>
-          <p:cNvSpPr>
-            <a:spLocks noGrp="1"/>
-          </p:cNvSpPr>
-          <p:nvPr>
-            <p:ph idx="1"/>
-          </p:nvPr>
-        </p:nvSpPr>
-        <p:spPr/>
-        <p:txBody>
-          <a:bodyPr>
-            <a:normAutofit fontScale="92500" lnSpcReduction="20000"/>
-          </a:bodyPr>
-          <a:lstStyle/>
-          <a:p>
-            <a:r>
-              <a:rPr lang="en-US" dirty="0" smtClean="0"/>
-              <a:t>Graphical Information System (GIS), e.g.,</a:t>
-            </a:r>
-          </a:p>
-          <a:p>
-            <a:pPr lvl="1"/>
-            <a:r>
-              <a:rPr lang="en-US" dirty="0" smtClean="0"/>
-              <a:t>ArcGIS</a:t>
-            </a:r>
-          </a:p>
-          <a:p>
-            <a:pPr lvl="1"/>
-            <a:r>
-              <a:rPr lang="en-US" dirty="0" smtClean="0"/>
-              <a:t>QGIS</a:t>
-            </a:r>
-          </a:p>
-          <a:p>
-            <a:r>
-              <a:rPr lang="en-US" dirty="0" smtClean="0"/>
-              <a:t>Many data formats, e.g.,</a:t>
-            </a:r>
-          </a:p>
-          <a:p>
-            <a:pPr lvl="1"/>
-            <a:r>
-              <a:rPr lang="en-US" dirty="0" smtClean="0"/>
-              <a:t>shape files</a:t>
-            </a:r>
-          </a:p>
-          <a:p>
-            <a:pPr lvl="1"/>
-            <a:r>
-              <a:rPr lang="en-US" dirty="0" err="1" smtClean="0"/>
-              <a:t>GeoJSON</a:t>
-            </a:r>
-            <a:endParaRPr lang="en-US" dirty="0" smtClean="0"/>
-          </a:p>
-          <a:p>
-            <a:r>
-              <a:rPr lang="en-US" dirty="0" smtClean="0"/>
-              <a:t>Python &amp; GIS</a:t>
-            </a:r>
-          </a:p>
-          <a:p>
-            <a:pPr lvl="1"/>
-            <a:r>
-              <a:rPr lang="en-US" dirty="0" smtClean="0"/>
-              <a:t>I/O library: Fiona</a:t>
-            </a:r>
-          </a:p>
-          <a:p>
-            <a:pPr lvl="1"/>
-            <a:r>
-              <a:rPr lang="en-US" dirty="0" smtClean="0"/>
-              <a:t>visualization: Folium</a:t>
-            </a:r>
-          </a:p>
-          <a:p>
-            <a:pPr lvl="1"/>
-            <a:r>
-              <a:rPr lang="en-US" dirty="0" smtClean="0"/>
-              <a:t>data processing/modeling: Shapely</a:t>
-            </a:r>
-          </a:p>
-        </p:txBody>
-      </p:sp>
-      <p:sp>
-        <p:nvSpPr>
-          <p:cNvPr id="4" name="Slide Number Placeholder 3"/>
-          <p:cNvSpPr>
-            <a:spLocks noGrp="1"/>
-          </p:cNvSpPr>
-          <p:nvPr>
-            <p:ph type="sldNum" sz="quarter" idx="12"/>
-          </p:nvPr>
-        </p:nvSpPr>
-        <p:spPr/>
-        <p:txBody>
-          <a:bodyPr/>
-          <a:lstStyle/>
-          <a:p>
-            <a:fld id="{5A209D72-2E9D-49B0-8977-41DCCC66C0BB}" type="slidenum">
-              <a:rPr lang="nl-BE" smtClean="0">
-                <a:solidFill>
-                  <a:prstClr val="black">
-                    <a:tint val="75000"/>
-                  </a:prstClr>
-                </a:solidFill>
-              </a:rPr>
-              <a:pPr/>
-              <a:t>2</a:t>
-            </a:fld>
-            <a:endParaRPr lang="nl-BE">
-              <a:solidFill>
-                <a:prstClr val="black">
-                  <a:tint val="75000"/>
-                </a:prstClr>
-              </a:solidFill>
-            </a:endParaRPr>
-          </a:p>
-        </p:txBody>
-      </p:sp>
-      <p:sp>
-        <p:nvSpPr>
-          <p:cNvPr id="5" name="TextBox 4"/>
-          <p:cNvSpPr txBox="1"/>
-          <p:nvPr/>
-        </p:nvSpPr>
-        <p:spPr>
-          <a:xfrm>
-            <a:off x="3042606" y="2160573"/>
-            <a:ext cx="3697038" cy="461665"/>
-          </a:xfrm>
-          <a:prstGeom prst="rect">
-            <a:avLst/>
-          </a:prstGeom>
-          <a:noFill/>
-          <a:ln>
-            <a:solidFill>
-              <a:schemeClr val="tx1"/>
-            </a:solidFill>
-          </a:ln>
-        </p:spPr>
-        <p:txBody>
-          <a:bodyPr wrap="none" rtlCol="0">
-            <a:spAutoFit/>
-          </a:bodyPr>
-          <a:lstStyle/>
-          <a:p>
-            <a:r>
-              <a:rPr lang="en-US" sz="2400" dirty="0" smtClean="0"/>
-              <a:t>Can be scripted with Python</a:t>
-            </a:r>
-            <a:endParaRPr lang="en-US" sz="2400" dirty="0"/>
-          </a:p>
-        </p:txBody>
-      </p:sp>
-    </p:spTree>
-    <p:extLst>
-      <p:ext uri="{BB962C8B-B14F-4D97-AF65-F5344CB8AC3E}">
-        <p14:creationId xmlns:p14="http://schemas.microsoft.com/office/powerpoint/2010/main" val="2682687549"/>
-      </p:ext>
-    </p:extLst>
-  </p:cSld>
-  <p:clrMapOvr>
-    <a:masterClrMapping/>
-  </p:clrMapOvr>
-  <p:timing>
-    <p:tnLst>
-      <p:par>
-        <p:cTn id="1" dur="indefinite" restart="never" nodeType="tmRoot">
-          <p:childTnLst>
-            <p:seq concurrent="1" nextAc="seek">
-              <p:cTn id="2" dur="indefinite" nodeType="mainSeq">
-                <p:childTnLst>
-                  <p:par>
-                    <p:cTn id="3" fill="hold">
-                      <p:stCondLst>
-                        <p:cond delay="indefinite"/>
-                        <p:cond evt="onBegin" delay="0">
-                          <p:tn val="2"/>
-                        </p:cond>
-                      </p:stCondLst>
-                      <p:childTnLst>
-                        <p:par>
-                          <p:cTn id="4" fill="hold">
-                            <p:stCondLst>
-                              <p:cond delay="0"/>
-                            </p:stCondLst>
-                            <p:childTnLst>
-                              <p:par>
-                                <p:cTn id="5" presetID="1" presetClass="entr" presetSubtype="0" fill="hold" grpId="0" nodeType="withEffect">
-                                  <p:stCondLst>
-                                    <p:cond delay="0"/>
-                                  </p:stCondLst>
-                                  <p:childTnLst>
-                                    <p:set>
-                                      <p:cBhvr>
-                                        <p:cTn id="6" dur="1" fill="hold">
-                                          <p:stCondLst>
-                                            <p:cond delay="0"/>
-                                          </p:stCondLst>
-                                        </p:cTn>
-                                        <p:tgtEl>
-                                          <p:spTgt spid="3">
-                                            <p:txEl>
-                                              <p:pRg st="0" end="0"/>
-                                            </p:txEl>
-                                          </p:spTgt>
-                                        </p:tgtEl>
-                                        <p:attrNameLst>
-                                          <p:attrName>style.visibility</p:attrName>
-                                        </p:attrNameLst>
-                                      </p:cBhvr>
-                                      <p:to>
-                                        <p:strVal val="visible"/>
-                                      </p:to>
-                                    </p:set>
-                                  </p:childTnLst>
-                                </p:cTn>
-                              </p:par>
-                              <p:par>
-                                <p:cTn id="7" presetID="1" presetClass="entr" presetSubtype="0" fill="hold" grpId="0" nodeType="withEffect">
-                                  <p:stCondLst>
-                                    <p:cond delay="0"/>
-                                  </p:stCondLst>
-                                  <p:childTnLst>
-                                    <p:set>
-                                      <p:cBhvr>
-                                        <p:cTn id="8" dur="1" fill="hold">
-                                          <p:stCondLst>
-                                            <p:cond delay="0"/>
-                                          </p:stCondLst>
-                                        </p:cTn>
-                                        <p:tgtEl>
-                                          <p:spTgt spid="3">
-                                            <p:txEl>
-                                              <p:pRg st="1" end="1"/>
-                                            </p:txEl>
-                                          </p:spTgt>
-                                        </p:tgtEl>
-                                        <p:attrNameLst>
-                                          <p:attrName>style.visibility</p:attrName>
-                                        </p:attrNameLst>
-                                      </p:cBhvr>
-                                      <p:to>
-                                        <p:strVal val="visible"/>
-                                      </p:to>
-                                    </p:set>
-                                  </p:childTnLst>
-                                </p:cTn>
-                              </p:par>
-                              <p:par>
-                                <p:cTn id="9" presetID="1" presetClass="entr" presetSubtype="0" fill="hold" grpId="0" nodeType="withEffect">
-                                  <p:stCondLst>
-                                    <p:cond delay="0"/>
-                                  </p:stCondLst>
-                                  <p:childTnLst>
-                                    <p:set>
-                                      <p:cBhvr>
-                                        <p:cTn id="10" dur="1" fill="hold">
-                                          <p:stCondLst>
-                                            <p:cond delay="0"/>
-                                          </p:stCondLst>
-                                        </p:cTn>
-                                        <p:tgtEl>
-                                          <p:spTgt spid="3">
-                                            <p:txEl>
-                                              <p:pRg st="2" end="2"/>
-                                            </p:txEl>
-                                          </p:spTgt>
-                                        </p:tgtEl>
-                                        <p:attrNameLst>
-                                          <p:attrName>style.visibility</p:attrName>
-                                        </p:attrNameLst>
-                                      </p:cBhvr>
-                                      <p:to>
-                                        <p:strVal val="visible"/>
-                                      </p:to>
-                                    </p:set>
-                                  </p:childTnLst>
-                                </p:cTn>
-                              </p:par>
-                            </p:childTnLst>
-                          </p:cTn>
-                        </p:par>
-                      </p:childTnLst>
-                    </p:cTn>
-                  </p:par>
-                  <p:par>
-                    <p:cTn id="11" fill="hold">
-                      <p:stCondLst>
-                        <p:cond delay="indefinite"/>
-                      </p:stCondLst>
-                      <p:childTnLst>
-                        <p:par>
-                          <p:cTn id="12" fill="hold">
-                            <p:stCondLst>
-                              <p:cond delay="0"/>
-                            </p:stCondLst>
-                            <p:childTnLst>
-                              <p:par>
-                                <p:cTn id="13" presetID="1" presetClass="entr" presetSubtype="0" fill="hold" grpId="0" nodeType="clickEffect">
-                                  <p:stCondLst>
-                                    <p:cond delay="0"/>
-                                  </p:stCondLst>
-                                  <p:childTnLst>
-                                    <p:set>
-                                      <p:cBhvr>
-                                        <p:cTn id="14" dur="1" fill="hold">
-                                          <p:stCondLst>
-                                            <p:cond delay="0"/>
-                                          </p:stCondLst>
-                                        </p:cTn>
-                                        <p:tgtEl>
-                                          <p:spTgt spid="5"/>
-                                        </p:tgtEl>
-                                        <p:attrNameLst>
-                                          <p:attrName>style.visibility</p:attrName>
-                                        </p:attrNameLst>
-                                      </p:cBhvr>
-                                      <p:to>
-                                        <p:strVal val="visible"/>
-                                      </p:to>
-                                    </p:set>
-                                  </p:childTnLst>
-                                </p:cTn>
-                              </p:par>
-                            </p:childTnLst>
-                          </p:cTn>
-                        </p:par>
-                      </p:childTnLst>
-                    </p:cTn>
-                  </p:par>
-                  <p:par>
-                    <p:cTn id="15" fill="hold">
-                      <p:stCondLst>
-                        <p:cond delay="indefinite"/>
-                      </p:stCondLst>
-                      <p:childTnLst>
-                        <p:par>
-                          <p:cTn id="16" fill="hold">
-                            <p:stCondLst>
-                              <p:cond delay="0"/>
-                            </p:stCondLst>
-                            <p:childTnLst>
-                              <p:par>
-                                <p:cTn id="17" presetID="1" presetClass="entr" presetSubtype="0" fill="hold" grpId="0" nodeType="clickEffect">
-                                  <p:stCondLst>
-                                    <p:cond delay="0"/>
-                                  </p:stCondLst>
-                                  <p:childTnLst>
-                                    <p:set>
-                                      <p:cBhvr>
-                                        <p:cTn id="18" dur="1" fill="hold">
-                                          <p:stCondLst>
-                                            <p:cond delay="0"/>
-                                          </p:stCondLst>
-                                        </p:cTn>
-                                        <p:tgtEl>
-                                          <p:spTgt spid="3">
-                                            <p:txEl>
-                                              <p:pRg st="3" end="3"/>
-                                            </p:txEl>
-                                          </p:spTgt>
-                                        </p:tgtEl>
-                                        <p:attrNameLst>
-                                          <p:attrName>style.visibility</p:attrName>
-                                        </p:attrNameLst>
-                                      </p:cBhvr>
-                                      <p:to>
-                                        <p:strVal val="visible"/>
-                                      </p:to>
-                                    </p:set>
-                                  </p:childTnLst>
-                                </p:cTn>
-                              </p:par>
-                              <p:par>
-                                <p:cTn id="19" presetID="1" presetClass="entr" presetSubtype="0" fill="hold" grpId="0" nodeType="withEffect">
-                                  <p:stCondLst>
-                                    <p:cond delay="0"/>
-                                  </p:stCondLst>
-                                  <p:childTnLst>
-                                    <p:set>
-                                      <p:cBhvr>
-                                        <p:cTn id="20" dur="1" fill="hold">
-                                          <p:stCondLst>
-                                            <p:cond delay="0"/>
-                                          </p:stCondLst>
-                                        </p:cTn>
-                                        <p:tgtEl>
-                                          <p:spTgt spid="3">
-                                            <p:txEl>
-                                              <p:pRg st="4" end="4"/>
-                                            </p:txEl>
-                                          </p:spTgt>
-                                        </p:tgtEl>
-                                        <p:attrNameLst>
-                                          <p:attrName>style.visibility</p:attrName>
-                                        </p:attrNameLst>
-                                      </p:cBhvr>
-                                      <p:to>
-                                        <p:strVal val="visible"/>
-                                      </p:to>
-                                    </p:set>
-                                  </p:childTnLst>
-                                </p:cTn>
-                              </p:par>
-                              <p:par>
-                                <p:cTn id="21" presetID="1" presetClass="entr" presetSubtype="0" fill="hold" grpId="0" nodeType="withEffect">
-                                  <p:stCondLst>
-                                    <p:cond delay="0"/>
-                                  </p:stCondLst>
-                                  <p:childTnLst>
-                                    <p:set>
-                                      <p:cBhvr>
-                                        <p:cTn id="22" dur="1" fill="hold">
-                                          <p:stCondLst>
-                                            <p:cond delay="0"/>
-                                          </p:stCondLst>
-                                        </p:cTn>
-                                        <p:tgtEl>
-                                          <p:spTgt spid="3">
-                                            <p:txEl>
-                                              <p:pRg st="5" end="5"/>
-                                            </p:txEl>
-                                          </p:spTgt>
-                                        </p:tgtEl>
-                                        <p:attrNameLst>
-                                          <p:attrName>style.visibility</p:attrName>
-                                        </p:attrNameLst>
-                                      </p:cBhvr>
-                                      <p:to>
-                                        <p:strVal val="visible"/>
-                                      </p:to>
-                                    </p:set>
-                                  </p:childTnLst>
-                                </p:cTn>
-                              </p:par>
-                            </p:childTnLst>
-                          </p:cTn>
-                        </p:par>
-                      </p:childTnLst>
-                    </p:cTn>
-                  </p:par>
-                  <p:par>
-                    <p:cTn id="23" fill="hold">
-                      <p:stCondLst>
-                        <p:cond delay="indefinite"/>
-                      </p:stCondLst>
-                      <p:childTnLst>
-                        <p:par>
-                          <p:cTn id="24" fill="hold">
-                            <p:stCondLst>
-                              <p:cond delay="0"/>
-                            </p:stCondLst>
-                            <p:childTnLst>
-                              <p:par>
-                                <p:cTn id="25" presetID="1" presetClass="entr" presetSubtype="0" fill="hold" grpId="0" nodeType="clickEffect">
-                                  <p:stCondLst>
-                                    <p:cond delay="0"/>
-                                  </p:stCondLst>
-                                  <p:childTnLst>
-                                    <p:set>
-                                      <p:cBhvr>
-                                        <p:cTn id="26" dur="1" fill="hold">
-                                          <p:stCondLst>
-                                            <p:cond delay="0"/>
-                                          </p:stCondLst>
-                                        </p:cTn>
-                                        <p:tgtEl>
-                                          <p:spTgt spid="3">
-                                            <p:txEl>
-                                              <p:pRg st="6" end="6"/>
-                                            </p:txEl>
-                                          </p:spTgt>
-                                        </p:tgtEl>
-                                        <p:attrNameLst>
-                                          <p:attrName>style.visibility</p:attrName>
-                                        </p:attrNameLst>
-                                      </p:cBhvr>
-                                      <p:to>
-                                        <p:strVal val="visible"/>
-                                      </p:to>
-                                    </p:set>
-                                  </p:childTnLst>
-                                </p:cTn>
-                              </p:par>
-                              <p:par>
-                                <p:cTn id="27" presetID="1" presetClass="entr" presetSubtype="0" fill="hold" grpId="0" nodeType="withEffect">
-                                  <p:stCondLst>
-                                    <p:cond delay="0"/>
-                                  </p:stCondLst>
-                                  <p:childTnLst>
-                                    <p:set>
-                                      <p:cBhvr>
-                                        <p:cTn id="28" dur="1" fill="hold">
-                                          <p:stCondLst>
-                                            <p:cond delay="0"/>
-                                          </p:stCondLst>
-                                        </p:cTn>
-                                        <p:tgtEl>
-                                          <p:spTgt spid="3">
-                                            <p:txEl>
-                                              <p:pRg st="7" end="7"/>
-                                            </p:txEl>
-                                          </p:spTgt>
-                                        </p:tgtEl>
-                                        <p:attrNameLst>
-                                          <p:attrName>style.visibility</p:attrName>
-                                        </p:attrNameLst>
-                                      </p:cBhvr>
-                                      <p:to>
-                                        <p:strVal val="visible"/>
-                                      </p:to>
-                                    </p:set>
-                                  </p:childTnLst>
-                                </p:cTn>
-                              </p:par>
-                              <p:par>
-                                <p:cTn id="29" presetID="1" presetClass="entr" presetSubtype="0" fill="hold" grpId="0" nodeType="withEffect">
-                                  <p:stCondLst>
-                                    <p:cond delay="0"/>
-                                  </p:stCondLst>
-                                  <p:childTnLst>
-                                    <p:set>
-                                      <p:cBhvr>
-                                        <p:cTn id="30" dur="1" fill="hold">
-                                          <p:stCondLst>
-                                            <p:cond delay="0"/>
-                                          </p:stCondLst>
-                                        </p:cTn>
-                                        <p:tgtEl>
-                                          <p:spTgt spid="3">
-                                            <p:txEl>
-                                              <p:pRg st="8" end="8"/>
-                                            </p:txEl>
-                                          </p:spTgt>
-                                        </p:tgtEl>
-                                        <p:attrNameLst>
-                                          <p:attrName>style.visibility</p:attrName>
-                                        </p:attrNameLst>
-                                      </p:cBhvr>
-                                      <p:to>
-                                        <p:strVal val="visible"/>
-                                      </p:to>
-                                    </p:set>
-                                  </p:childTnLst>
-                                </p:cTn>
-                              </p:par>
-                              <p:par>
-                                <p:cTn id="31" presetID="1" presetClass="entr" presetSubtype="0" fill="hold" grpId="0" nodeType="withEffect">
-                                  <p:stCondLst>
-                                    <p:cond delay="0"/>
-                                  </p:stCondLst>
-                                  <p:childTnLst>
-                                    <p:set>
-                                      <p:cBhvr>
-                                        <p:cTn id="32" dur="1" fill="hold">
-                                          <p:stCondLst>
-                                            <p:cond delay="0"/>
-                                          </p:stCondLst>
-                                        </p:cTn>
-                                        <p:tgtEl>
-                                          <p:spTgt spid="3">
-                                            <p:txEl>
-                                              <p:pRg st="9" end="9"/>
-                                            </p:txEl>
-                                          </p:spTgt>
-                                        </p:tgtEl>
-                                        <p:attrNameLst>
-                                          <p:attrName>style.visibility</p:attrName>
-                                        </p:attrNameLst>
-                                      </p:cBhvr>
-                                      <p:to>
-                                        <p:strVal val="visible"/>
-                                      </p:to>
-                                    </p:set>
-                                  </p:childTnLst>
-                                </p:cTn>
-                              </p:par>
-                            </p:childTnLst>
-                          </p:cTn>
-                        </p:par>
-                      </p:childTnLst>
-                    </p:cTn>
-                  </p:par>
-                </p:childTnLst>
-              </p:cTn>
-              <p:prevCondLst>
-                <p:cond evt="onPrev" delay="0">
-                  <p:tgtEl>
-                    <p:sldTgt/>
-                  </p:tgtEl>
-                </p:cond>
-              </p:prevCondLst>
-              <p:nextCondLst>
-                <p:cond evt="onNext" delay="0">
-                  <p:tgtEl>
-                    <p:sldTgt/>
-                  </p:tgtEl>
-                </p:cond>
-              </p:nextCondLst>
-            </p:seq>
-          </p:childTnLst>
-        </p:cTn>
-      </p:par>
-    </p:tnLst>
-    <p:bldLst>
-      <p:bldP spid="3" grpId="0" uiExpand="1" build="p"/>
-      <p:bldP spid="5" grpId="0" animBg="1"/>
-    </p:bldLst>
-  </p:timing>
-</p:sld>
-</file>
-
-<file path=ppt/slides/slide20.xml><?xml version="1.0" encoding="utf-8"?>
-<p:sld xmlns:a="http://schemas.openxmlformats.org/drawingml/2006/main" xmlns:r="http://schemas.openxmlformats.org/officeDocument/2006/relationships" xmlns:p="http://schemas.openxmlformats.org/presentationml/2006/main">
-  <p:cSld>
-    <p:spTree>
-      <p:nvGrpSpPr>
-        <p:cNvPr id="1" name=""/>
-        <p:cNvGrpSpPr/>
-        <p:nvPr/>
-      </p:nvGrpSpPr>
-      <p:grpSpPr>
-        <a:xfrm>
-          <a:off x="0" y="0"/>
-          <a:ext cx="0" cy="0"/>
-          <a:chOff x="0" y="0"/>
-          <a:chExt cx="0" cy="0"/>
-        </a:xfrm>
-      </p:grpSpPr>
-      <p:sp>
-        <p:nvSpPr>
-          <p:cNvPr id="2" name="Title 1"/>
-          <p:cNvSpPr>
-            <a:spLocks noGrp="1"/>
-          </p:cNvSpPr>
-          <p:nvPr>
-            <p:ph type="title"/>
-          </p:nvPr>
-        </p:nvSpPr>
-        <p:spPr/>
-        <p:txBody>
-          <a:bodyPr/>
-          <a:lstStyle/>
-          <a:p>
-            <a:r>
-              <a:rPr lang="en-US" dirty="0" smtClean="0"/>
               <a:t>Writing </a:t>
             </a:r>
             <a:r>
@@ -13167,7 +14217,7 @@
                 </a:solidFill>
               </a:rPr>
               <a:pPr/>
-              <a:t>20</a:t>
+              <a:t>22</a:t>
             </a:fld>
             <a:endParaRPr lang="nl-BE">
               <a:solidFill>
@@ -14351,7 +15401,7 @@
 </p:sld>
 </file>
 
-<file path=ppt/slides/slide21.xml><?xml version="1.0" encoding="utf-8"?>
+<file path=ppt/slides/slide23.xml><?xml version="1.0" encoding="utf-8"?>
 <p:sld xmlns:a="http://schemas.openxmlformats.org/drawingml/2006/main" xmlns:r="http://schemas.openxmlformats.org/officeDocument/2006/relationships" xmlns:p="http://schemas.openxmlformats.org/presentationml/2006/main">
   <p:cSld>
     <p:spTree>
@@ -14452,7 +15502,7 @@
                 </a:solidFill>
               </a:rPr>
               <a:pPr/>
-              <a:t>21</a:t>
+              <a:t>23</a:t>
             </a:fld>
             <a:endParaRPr lang="nl-BE">
               <a:solidFill>
@@ -14486,7 +15536,7 @@
           <a:graphicData uri="http://schemas.openxmlformats.org/presentationml/2006/ole">
             <mc:AlternateContent xmlns:mc="http://schemas.openxmlformats.org/markup-compatibility/2006">
               <mc:Choice xmlns:v="urn:schemas-microsoft-com:vml" Requires="v">
-                <p:oleObj spid="_x0000_s1036" name="Equation" r:id="rId3" imgW="2082600" imgH="609480" progId="Equation.3">
+                <p:oleObj spid="_x0000_s1045" name="Equation" r:id="rId3" imgW="2082600" imgH="609480" progId="Equation.3">
                   <p:embed/>
                 </p:oleObj>
               </mc:Choice>
@@ -14543,7 +15593,7 @@
           <a:graphicData uri="http://schemas.openxmlformats.org/presentationml/2006/ole">
             <mc:AlternateContent xmlns:mc="http://schemas.openxmlformats.org/markup-compatibility/2006">
               <mc:Choice xmlns:v="urn:schemas-microsoft-com:vml" Requires="v">
-                <p:oleObj spid="_x0000_s1037" name="Equation" r:id="rId5" imgW="3466800" imgH="634680" progId="Equation.3">
+                <p:oleObj spid="_x0000_s1046" name="Equation" r:id="rId5" imgW="3466800" imgH="634680" progId="Equation.3">
                   <p:embed/>
                 </p:oleObj>
               </mc:Choice>
@@ -14600,7 +15650,7 @@
           <a:graphicData uri="http://schemas.openxmlformats.org/presentationml/2006/ole">
             <mc:AlternateContent xmlns:mc="http://schemas.openxmlformats.org/markup-compatibility/2006">
               <mc:Choice xmlns:v="urn:schemas-microsoft-com:vml" Requires="v">
-                <p:oleObj spid="_x0000_s1038" name="Equation" r:id="rId7" imgW="2717640" imgH="228600" progId="Equation.3">
+                <p:oleObj spid="_x0000_s1047" name="Equation" r:id="rId7" imgW="2717640" imgH="228600" progId="Equation.3">
                   <p:embed/>
                 </p:oleObj>
               </mc:Choice>
@@ -14655,7 +15705,7 @@
 </p:sld>
 </file>
 
-<file path=ppt/slides/slide22.xml><?xml version="1.0" encoding="utf-8"?>
+<file path=ppt/slides/slide24.xml><?xml version="1.0" encoding="utf-8"?>
 <p:sld xmlns:a="http://schemas.openxmlformats.org/drawingml/2006/main" xmlns:r="http://schemas.openxmlformats.org/officeDocument/2006/relationships" xmlns:p="http://schemas.openxmlformats.org/presentationml/2006/main">
   <p:cSld>
     <p:spTree>
@@ -14920,7 +15970,7 @@
                 </a:solidFill>
               </a:rPr>
               <a:pPr/>
-              <a:t>22</a:t>
+              <a:t>24</a:t>
             </a:fld>
             <a:endParaRPr lang="nl-BE">
               <a:solidFill>

</xml_diff>